<commit_message>
Added details on AppScale cloud monitoring
</commit_message>
<xml_diff>
--- a/Eager/elk-experiment/Huawei_Presentation_1.pptx
+++ b/Eager/elk-experiment/Huawei_Presentation_1.pptx
@@ -5,7 +5,7 @@
     <p:sldMasterId id="2147483648" r:id="rId1"/>
   </p:sldMasterIdLst>
   <p:notesMasterIdLst>
-    <p:notesMasterId r:id="rId9"/>
+    <p:notesMasterId r:id="rId12"/>
   </p:notesMasterIdLst>
   <p:sldIdLst>
     <p:sldId id="256" r:id="rId2"/>
@@ -15,6 +15,9 @@
     <p:sldId id="261" r:id="rId6"/>
     <p:sldId id="263" r:id="rId7"/>
     <p:sldId id="262" r:id="rId8"/>
+    <p:sldId id="264" r:id="rId9"/>
+    <p:sldId id="265" r:id="rId10"/>
+    <p:sldId id="266" r:id="rId11"/>
   </p:sldIdLst>
   <p:sldSz cx="9144000" cy="6858000" type="screen4x3"/>
   <p:notesSz cx="6858000" cy="9144000"/>
@@ -117,6 +120,753 @@
 </file>
 
 <file path=ppt/diagrams/colors1.xml><?xml version="1.0" encoding="utf-8"?>
+<dgm:colorsDef xmlns:dgm="http://schemas.openxmlformats.org/drawingml/2006/diagram" xmlns:a="http://schemas.openxmlformats.org/drawingml/2006/main" uniqueId="urn:microsoft.com/office/officeart/2005/8/colors/accent1_2">
+  <dgm:title val=""/>
+  <dgm:desc val=""/>
+  <dgm:catLst>
+    <dgm:cat type="accent1" pri="11200"/>
+  </dgm:catLst>
+  <dgm:styleLbl name="node0">
+    <dgm:fillClrLst meth="repeat">
+      <a:schemeClr val="accent1"/>
+    </dgm:fillClrLst>
+    <dgm:linClrLst meth="repeat">
+      <a:schemeClr val="lt1"/>
+    </dgm:linClrLst>
+    <dgm:effectClrLst/>
+    <dgm:txLinClrLst/>
+    <dgm:txFillClrLst/>
+    <dgm:txEffectClrLst/>
+  </dgm:styleLbl>
+  <dgm:styleLbl name="alignNode1">
+    <dgm:fillClrLst meth="repeat">
+      <a:schemeClr val="accent1"/>
+    </dgm:fillClrLst>
+    <dgm:linClrLst meth="repeat">
+      <a:schemeClr val="accent1"/>
+    </dgm:linClrLst>
+    <dgm:effectClrLst/>
+    <dgm:txLinClrLst/>
+    <dgm:txFillClrLst/>
+    <dgm:txEffectClrLst/>
+  </dgm:styleLbl>
+  <dgm:styleLbl name="node1">
+    <dgm:fillClrLst meth="repeat">
+      <a:schemeClr val="accent1"/>
+    </dgm:fillClrLst>
+    <dgm:linClrLst meth="repeat">
+      <a:schemeClr val="lt1"/>
+    </dgm:linClrLst>
+    <dgm:effectClrLst/>
+    <dgm:txLinClrLst/>
+    <dgm:txFillClrLst/>
+    <dgm:txEffectClrLst/>
+  </dgm:styleLbl>
+  <dgm:styleLbl name="lnNode1">
+    <dgm:fillClrLst meth="repeat">
+      <a:schemeClr val="accent1"/>
+    </dgm:fillClrLst>
+    <dgm:linClrLst meth="repeat">
+      <a:schemeClr val="lt1"/>
+    </dgm:linClrLst>
+    <dgm:effectClrLst/>
+    <dgm:txLinClrLst/>
+    <dgm:txFillClrLst/>
+    <dgm:txEffectClrLst/>
+  </dgm:styleLbl>
+  <dgm:styleLbl name="vennNode1">
+    <dgm:fillClrLst meth="repeat">
+      <a:schemeClr val="accent1">
+        <a:alpha val="50000"/>
+      </a:schemeClr>
+    </dgm:fillClrLst>
+    <dgm:linClrLst meth="repeat">
+      <a:schemeClr val="lt1"/>
+    </dgm:linClrLst>
+    <dgm:effectClrLst/>
+    <dgm:txLinClrLst/>
+    <dgm:txFillClrLst/>
+    <dgm:txEffectClrLst/>
+  </dgm:styleLbl>
+  <dgm:styleLbl name="node2">
+    <dgm:fillClrLst meth="repeat">
+      <a:schemeClr val="accent1"/>
+    </dgm:fillClrLst>
+    <dgm:linClrLst meth="repeat">
+      <a:schemeClr val="lt1"/>
+    </dgm:linClrLst>
+    <dgm:effectClrLst/>
+    <dgm:txLinClrLst/>
+    <dgm:txFillClrLst/>
+    <dgm:txEffectClrLst/>
+  </dgm:styleLbl>
+  <dgm:styleLbl name="node3">
+    <dgm:fillClrLst meth="repeat">
+      <a:schemeClr val="accent1"/>
+    </dgm:fillClrLst>
+    <dgm:linClrLst meth="repeat">
+      <a:schemeClr val="lt1"/>
+    </dgm:linClrLst>
+    <dgm:effectClrLst/>
+    <dgm:txLinClrLst/>
+    <dgm:txFillClrLst/>
+    <dgm:txEffectClrLst/>
+  </dgm:styleLbl>
+  <dgm:styleLbl name="node4">
+    <dgm:fillClrLst meth="repeat">
+      <a:schemeClr val="accent1"/>
+    </dgm:fillClrLst>
+    <dgm:linClrLst meth="repeat">
+      <a:schemeClr val="lt1"/>
+    </dgm:linClrLst>
+    <dgm:effectClrLst/>
+    <dgm:txLinClrLst/>
+    <dgm:txFillClrLst/>
+    <dgm:txEffectClrLst/>
+  </dgm:styleLbl>
+  <dgm:styleLbl name="fgImgPlace1">
+    <dgm:fillClrLst meth="repeat">
+      <a:schemeClr val="accent1">
+        <a:tint val="50000"/>
+      </a:schemeClr>
+    </dgm:fillClrLst>
+    <dgm:linClrLst meth="repeat">
+      <a:schemeClr val="lt1"/>
+    </dgm:linClrLst>
+    <dgm:effectClrLst/>
+    <dgm:txLinClrLst/>
+    <dgm:txFillClrLst meth="repeat">
+      <a:schemeClr val="lt1"/>
+    </dgm:txFillClrLst>
+    <dgm:txEffectClrLst/>
+  </dgm:styleLbl>
+  <dgm:styleLbl name="alignImgPlace1">
+    <dgm:fillClrLst meth="repeat">
+      <a:schemeClr val="accent1">
+        <a:tint val="50000"/>
+      </a:schemeClr>
+    </dgm:fillClrLst>
+    <dgm:linClrLst meth="repeat">
+      <a:schemeClr val="lt1"/>
+    </dgm:linClrLst>
+    <dgm:effectClrLst/>
+    <dgm:txLinClrLst/>
+    <dgm:txFillClrLst meth="repeat">
+      <a:schemeClr val="lt1"/>
+    </dgm:txFillClrLst>
+    <dgm:txEffectClrLst/>
+  </dgm:styleLbl>
+  <dgm:styleLbl name="bgImgPlace1">
+    <dgm:fillClrLst meth="repeat">
+      <a:schemeClr val="accent1">
+        <a:tint val="50000"/>
+      </a:schemeClr>
+    </dgm:fillClrLst>
+    <dgm:linClrLst meth="repeat">
+      <a:schemeClr val="lt1"/>
+    </dgm:linClrLst>
+    <dgm:effectClrLst/>
+    <dgm:txLinClrLst/>
+    <dgm:txFillClrLst meth="repeat">
+      <a:schemeClr val="lt1"/>
+    </dgm:txFillClrLst>
+    <dgm:txEffectClrLst/>
+  </dgm:styleLbl>
+  <dgm:styleLbl name="sibTrans2D1">
+    <dgm:fillClrLst meth="repeat">
+      <a:schemeClr val="accent1">
+        <a:tint val="60000"/>
+      </a:schemeClr>
+    </dgm:fillClrLst>
+    <dgm:linClrLst meth="repeat">
+      <a:schemeClr val="accent1">
+        <a:tint val="60000"/>
+      </a:schemeClr>
+    </dgm:linClrLst>
+    <dgm:effectClrLst/>
+    <dgm:txLinClrLst/>
+    <dgm:txFillClrLst/>
+    <dgm:txEffectClrLst/>
+  </dgm:styleLbl>
+  <dgm:styleLbl name="fgSibTrans2D1">
+    <dgm:fillClrLst meth="repeat">
+      <a:schemeClr val="accent1">
+        <a:tint val="60000"/>
+      </a:schemeClr>
+    </dgm:fillClrLst>
+    <dgm:linClrLst meth="repeat">
+      <a:schemeClr val="accent1">
+        <a:tint val="60000"/>
+      </a:schemeClr>
+    </dgm:linClrLst>
+    <dgm:effectClrLst/>
+    <dgm:txLinClrLst/>
+    <dgm:txFillClrLst/>
+    <dgm:txEffectClrLst/>
+  </dgm:styleLbl>
+  <dgm:styleLbl name="bgSibTrans2D1">
+    <dgm:fillClrLst meth="repeat">
+      <a:schemeClr val="accent1">
+        <a:tint val="60000"/>
+      </a:schemeClr>
+    </dgm:fillClrLst>
+    <dgm:linClrLst meth="repeat">
+      <a:schemeClr val="accent1">
+        <a:tint val="60000"/>
+      </a:schemeClr>
+    </dgm:linClrLst>
+    <dgm:effectClrLst/>
+    <dgm:txLinClrLst/>
+    <dgm:txFillClrLst/>
+    <dgm:txEffectClrLst/>
+  </dgm:styleLbl>
+  <dgm:styleLbl name="sibTrans1D1">
+    <dgm:fillClrLst meth="repeat">
+      <a:schemeClr val="accent1"/>
+    </dgm:fillClrLst>
+    <dgm:linClrLst meth="repeat">
+      <a:schemeClr val="accent1"/>
+    </dgm:linClrLst>
+    <dgm:effectClrLst/>
+    <dgm:txLinClrLst/>
+    <dgm:txFillClrLst meth="repeat">
+      <a:schemeClr val="tx1"/>
+    </dgm:txFillClrLst>
+    <dgm:txEffectClrLst/>
+  </dgm:styleLbl>
+  <dgm:styleLbl name="callout">
+    <dgm:fillClrLst meth="repeat">
+      <a:schemeClr val="accent1"/>
+    </dgm:fillClrLst>
+    <dgm:linClrLst meth="repeat">
+      <a:schemeClr val="accent1">
+        <a:tint val="50000"/>
+      </a:schemeClr>
+    </dgm:linClrLst>
+    <dgm:effectClrLst/>
+    <dgm:txLinClrLst/>
+    <dgm:txFillClrLst meth="repeat">
+      <a:schemeClr val="tx1"/>
+    </dgm:txFillClrLst>
+    <dgm:txEffectClrLst/>
+  </dgm:styleLbl>
+  <dgm:styleLbl name="asst0">
+    <dgm:fillClrLst meth="repeat">
+      <a:schemeClr val="accent1"/>
+    </dgm:fillClrLst>
+    <dgm:linClrLst meth="repeat">
+      <a:schemeClr val="lt1"/>
+    </dgm:linClrLst>
+    <dgm:effectClrLst/>
+    <dgm:txLinClrLst/>
+    <dgm:txFillClrLst/>
+    <dgm:txEffectClrLst/>
+  </dgm:styleLbl>
+  <dgm:styleLbl name="asst1">
+    <dgm:fillClrLst meth="repeat">
+      <a:schemeClr val="accent1"/>
+    </dgm:fillClrLst>
+    <dgm:linClrLst meth="repeat">
+      <a:schemeClr val="lt1"/>
+    </dgm:linClrLst>
+    <dgm:effectClrLst/>
+    <dgm:txLinClrLst/>
+    <dgm:txFillClrLst/>
+    <dgm:txEffectClrLst/>
+  </dgm:styleLbl>
+  <dgm:styleLbl name="asst2">
+    <dgm:fillClrLst meth="repeat">
+      <a:schemeClr val="accent1"/>
+    </dgm:fillClrLst>
+    <dgm:linClrLst meth="repeat">
+      <a:schemeClr val="lt1"/>
+    </dgm:linClrLst>
+    <dgm:effectClrLst/>
+    <dgm:txLinClrLst/>
+    <dgm:txFillClrLst/>
+    <dgm:txEffectClrLst/>
+  </dgm:styleLbl>
+  <dgm:styleLbl name="asst3">
+    <dgm:fillClrLst meth="repeat">
+      <a:schemeClr val="accent1"/>
+    </dgm:fillClrLst>
+    <dgm:linClrLst meth="repeat">
+      <a:schemeClr val="lt1"/>
+    </dgm:linClrLst>
+    <dgm:effectClrLst/>
+    <dgm:txLinClrLst/>
+    <dgm:txFillClrLst/>
+    <dgm:txEffectClrLst/>
+  </dgm:styleLbl>
+  <dgm:styleLbl name="asst4">
+    <dgm:fillClrLst meth="repeat">
+      <a:schemeClr val="accent1"/>
+    </dgm:fillClrLst>
+    <dgm:linClrLst meth="repeat">
+      <a:schemeClr val="lt1"/>
+    </dgm:linClrLst>
+    <dgm:effectClrLst/>
+    <dgm:txLinClrLst/>
+    <dgm:txFillClrLst/>
+    <dgm:txEffectClrLst/>
+  </dgm:styleLbl>
+  <dgm:styleLbl name="parChTrans2D1">
+    <dgm:fillClrLst meth="repeat">
+      <a:schemeClr val="accent1">
+        <a:tint val="60000"/>
+      </a:schemeClr>
+    </dgm:fillClrLst>
+    <dgm:linClrLst meth="repeat">
+      <a:schemeClr val="accent1">
+        <a:tint val="60000"/>
+      </a:schemeClr>
+    </dgm:linClrLst>
+    <dgm:effectClrLst/>
+    <dgm:txLinClrLst/>
+    <dgm:txFillClrLst meth="repeat">
+      <a:schemeClr val="lt1"/>
+    </dgm:txFillClrLst>
+    <dgm:txEffectClrLst/>
+  </dgm:styleLbl>
+  <dgm:styleLbl name="parChTrans2D2">
+    <dgm:fillClrLst meth="repeat">
+      <a:schemeClr val="accent1"/>
+    </dgm:fillClrLst>
+    <dgm:linClrLst meth="repeat">
+      <a:schemeClr val="accent1"/>
+    </dgm:linClrLst>
+    <dgm:effectClrLst/>
+    <dgm:txLinClrLst/>
+    <dgm:txFillClrLst meth="repeat">
+      <a:schemeClr val="lt1"/>
+    </dgm:txFillClrLst>
+    <dgm:txEffectClrLst/>
+  </dgm:styleLbl>
+  <dgm:styleLbl name="parChTrans2D3">
+    <dgm:fillClrLst meth="repeat">
+      <a:schemeClr val="accent1"/>
+    </dgm:fillClrLst>
+    <dgm:linClrLst meth="repeat">
+      <a:schemeClr val="accent1"/>
+    </dgm:linClrLst>
+    <dgm:effectClrLst/>
+    <dgm:txLinClrLst/>
+    <dgm:txFillClrLst meth="repeat">
+      <a:schemeClr val="lt1"/>
+    </dgm:txFillClrLst>
+    <dgm:txEffectClrLst/>
+  </dgm:styleLbl>
+  <dgm:styleLbl name="parChTrans2D4">
+    <dgm:fillClrLst meth="repeat">
+      <a:schemeClr val="accent1"/>
+    </dgm:fillClrLst>
+    <dgm:linClrLst meth="repeat">
+      <a:schemeClr val="accent1"/>
+    </dgm:linClrLst>
+    <dgm:effectClrLst/>
+    <dgm:txLinClrLst/>
+    <dgm:txFillClrLst meth="repeat">
+      <a:schemeClr val="lt1"/>
+    </dgm:txFillClrLst>
+    <dgm:txEffectClrLst/>
+  </dgm:styleLbl>
+  <dgm:styleLbl name="parChTrans1D1">
+    <dgm:fillClrLst meth="repeat">
+      <a:schemeClr val="accent1"/>
+    </dgm:fillClrLst>
+    <dgm:linClrLst meth="repeat">
+      <a:schemeClr val="accent1">
+        <a:shade val="60000"/>
+      </a:schemeClr>
+    </dgm:linClrLst>
+    <dgm:effectClrLst/>
+    <dgm:txLinClrLst/>
+    <dgm:txFillClrLst meth="repeat">
+      <a:schemeClr val="tx1"/>
+    </dgm:txFillClrLst>
+    <dgm:txEffectClrLst/>
+  </dgm:styleLbl>
+  <dgm:styleLbl name="parChTrans1D2">
+    <dgm:fillClrLst meth="repeat">
+      <a:schemeClr val="accent1"/>
+    </dgm:fillClrLst>
+    <dgm:linClrLst meth="repeat">
+      <a:schemeClr val="accent1">
+        <a:shade val="60000"/>
+      </a:schemeClr>
+    </dgm:linClrLst>
+    <dgm:effectClrLst/>
+    <dgm:txLinClrLst/>
+    <dgm:txFillClrLst meth="repeat">
+      <a:schemeClr val="tx1"/>
+    </dgm:txFillClrLst>
+    <dgm:txEffectClrLst/>
+  </dgm:styleLbl>
+  <dgm:styleLbl name="parChTrans1D3">
+    <dgm:fillClrLst meth="repeat">
+      <a:schemeClr val="accent1"/>
+    </dgm:fillClrLst>
+    <dgm:linClrLst meth="repeat">
+      <a:schemeClr val="accent1">
+        <a:shade val="80000"/>
+      </a:schemeClr>
+    </dgm:linClrLst>
+    <dgm:effectClrLst/>
+    <dgm:txLinClrLst/>
+    <dgm:txFillClrLst meth="repeat">
+      <a:schemeClr val="tx1"/>
+    </dgm:txFillClrLst>
+    <dgm:txEffectClrLst/>
+  </dgm:styleLbl>
+  <dgm:styleLbl name="parChTrans1D4">
+    <dgm:fillClrLst meth="repeat">
+      <a:schemeClr val="accent1"/>
+    </dgm:fillClrLst>
+    <dgm:linClrLst meth="repeat">
+      <a:schemeClr val="accent1">
+        <a:shade val="80000"/>
+      </a:schemeClr>
+    </dgm:linClrLst>
+    <dgm:effectClrLst/>
+    <dgm:txLinClrLst/>
+    <dgm:txFillClrLst meth="repeat">
+      <a:schemeClr val="tx1"/>
+    </dgm:txFillClrLst>
+    <dgm:txEffectClrLst/>
+  </dgm:styleLbl>
+  <dgm:styleLbl name="fgAcc1">
+    <dgm:fillClrLst meth="repeat">
+      <a:schemeClr val="lt1">
+        <a:alpha val="90000"/>
+      </a:schemeClr>
+    </dgm:fillClrLst>
+    <dgm:linClrLst meth="repeat">
+      <a:schemeClr val="accent1"/>
+    </dgm:linClrLst>
+    <dgm:effectClrLst/>
+    <dgm:txLinClrLst/>
+    <dgm:txFillClrLst meth="repeat">
+      <a:schemeClr val="dk1"/>
+    </dgm:txFillClrLst>
+    <dgm:txEffectClrLst/>
+  </dgm:styleLbl>
+  <dgm:styleLbl name="conFgAcc1">
+    <dgm:fillClrLst meth="repeat">
+      <a:schemeClr val="lt1">
+        <a:alpha val="90000"/>
+      </a:schemeClr>
+    </dgm:fillClrLst>
+    <dgm:linClrLst meth="repeat">
+      <a:schemeClr val="accent1"/>
+    </dgm:linClrLst>
+    <dgm:effectClrLst/>
+    <dgm:txLinClrLst/>
+    <dgm:txFillClrLst meth="repeat">
+      <a:schemeClr val="dk1"/>
+    </dgm:txFillClrLst>
+    <dgm:txEffectClrLst/>
+  </dgm:styleLbl>
+  <dgm:styleLbl name="alignAcc1">
+    <dgm:fillClrLst meth="repeat">
+      <a:schemeClr val="lt1">
+        <a:alpha val="90000"/>
+      </a:schemeClr>
+    </dgm:fillClrLst>
+    <dgm:linClrLst meth="repeat">
+      <a:schemeClr val="accent1"/>
+    </dgm:linClrLst>
+    <dgm:effectClrLst/>
+    <dgm:txLinClrLst/>
+    <dgm:txFillClrLst meth="repeat">
+      <a:schemeClr val="dk1"/>
+    </dgm:txFillClrLst>
+    <dgm:txEffectClrLst/>
+  </dgm:styleLbl>
+  <dgm:styleLbl name="trAlignAcc1">
+    <dgm:fillClrLst meth="repeat">
+      <a:schemeClr val="lt1">
+        <a:alpha val="40000"/>
+      </a:schemeClr>
+    </dgm:fillClrLst>
+    <dgm:linClrLst meth="repeat">
+      <a:schemeClr val="accent1"/>
+    </dgm:linClrLst>
+    <dgm:effectClrLst/>
+    <dgm:txLinClrLst/>
+    <dgm:txFillClrLst meth="repeat">
+      <a:schemeClr val="dk1"/>
+    </dgm:txFillClrLst>
+    <dgm:txEffectClrLst/>
+  </dgm:styleLbl>
+  <dgm:styleLbl name="bgAcc1">
+    <dgm:fillClrLst meth="repeat">
+      <a:schemeClr val="lt1">
+        <a:alpha val="90000"/>
+      </a:schemeClr>
+    </dgm:fillClrLst>
+    <dgm:linClrLst meth="repeat">
+      <a:schemeClr val="accent1"/>
+    </dgm:linClrLst>
+    <dgm:effectClrLst/>
+    <dgm:txLinClrLst/>
+    <dgm:txFillClrLst meth="repeat">
+      <a:schemeClr val="dk1"/>
+    </dgm:txFillClrLst>
+    <dgm:txEffectClrLst/>
+  </dgm:styleLbl>
+  <dgm:styleLbl name="solidFgAcc1">
+    <dgm:fillClrLst meth="repeat">
+      <a:schemeClr val="lt1"/>
+    </dgm:fillClrLst>
+    <dgm:linClrLst meth="repeat">
+      <a:schemeClr val="accent1"/>
+    </dgm:linClrLst>
+    <dgm:effectClrLst/>
+    <dgm:txLinClrLst/>
+    <dgm:txFillClrLst meth="repeat">
+      <a:schemeClr val="dk1"/>
+    </dgm:txFillClrLst>
+    <dgm:txEffectClrLst/>
+  </dgm:styleLbl>
+  <dgm:styleLbl name="solidAlignAcc1">
+    <dgm:fillClrLst meth="repeat">
+      <a:schemeClr val="lt1"/>
+    </dgm:fillClrLst>
+    <dgm:linClrLst meth="repeat">
+      <a:schemeClr val="accent1"/>
+    </dgm:linClrLst>
+    <dgm:effectClrLst/>
+    <dgm:txLinClrLst/>
+    <dgm:txFillClrLst meth="repeat">
+      <a:schemeClr val="dk1"/>
+    </dgm:txFillClrLst>
+    <dgm:txEffectClrLst/>
+  </dgm:styleLbl>
+  <dgm:styleLbl name="solidBgAcc1">
+    <dgm:fillClrLst meth="repeat">
+      <a:schemeClr val="lt1"/>
+    </dgm:fillClrLst>
+    <dgm:linClrLst meth="repeat">
+      <a:schemeClr val="accent1"/>
+    </dgm:linClrLst>
+    <dgm:effectClrLst/>
+    <dgm:txLinClrLst/>
+    <dgm:txFillClrLst meth="repeat">
+      <a:schemeClr val="dk1"/>
+    </dgm:txFillClrLst>
+    <dgm:txEffectClrLst/>
+  </dgm:styleLbl>
+  <dgm:styleLbl name="fgAccFollowNode1">
+    <dgm:fillClrLst meth="repeat">
+      <a:schemeClr val="accent1">
+        <a:alpha val="90000"/>
+        <a:tint val="40000"/>
+      </a:schemeClr>
+    </dgm:fillClrLst>
+    <dgm:linClrLst meth="repeat">
+      <a:schemeClr val="accent1">
+        <a:alpha val="90000"/>
+        <a:tint val="40000"/>
+      </a:schemeClr>
+    </dgm:linClrLst>
+    <dgm:effectClrLst/>
+    <dgm:txLinClrLst/>
+    <dgm:txFillClrLst meth="repeat">
+      <a:schemeClr val="dk1"/>
+    </dgm:txFillClrLst>
+    <dgm:txEffectClrLst/>
+  </dgm:styleLbl>
+  <dgm:styleLbl name="alignAccFollowNode1">
+    <dgm:fillClrLst meth="repeat">
+      <a:schemeClr val="accent1">
+        <a:alpha val="90000"/>
+        <a:tint val="40000"/>
+      </a:schemeClr>
+    </dgm:fillClrLst>
+    <dgm:linClrLst meth="repeat">
+      <a:schemeClr val="accent1">
+        <a:alpha val="90000"/>
+        <a:tint val="40000"/>
+      </a:schemeClr>
+    </dgm:linClrLst>
+    <dgm:effectClrLst/>
+    <dgm:txLinClrLst/>
+    <dgm:txFillClrLst meth="repeat">
+      <a:schemeClr val="dk1"/>
+    </dgm:txFillClrLst>
+    <dgm:txEffectClrLst/>
+  </dgm:styleLbl>
+  <dgm:styleLbl name="bgAccFollowNode1">
+    <dgm:fillClrLst meth="repeat">
+      <a:schemeClr val="accent1">
+        <a:alpha val="90000"/>
+        <a:tint val="40000"/>
+      </a:schemeClr>
+    </dgm:fillClrLst>
+    <dgm:linClrLst meth="repeat">
+      <a:schemeClr val="accent1">
+        <a:alpha val="90000"/>
+        <a:tint val="40000"/>
+      </a:schemeClr>
+    </dgm:linClrLst>
+    <dgm:effectClrLst/>
+    <dgm:txLinClrLst/>
+    <dgm:txFillClrLst meth="repeat">
+      <a:schemeClr val="dk1"/>
+    </dgm:txFillClrLst>
+    <dgm:txEffectClrLst/>
+  </dgm:styleLbl>
+  <dgm:styleLbl name="fgAcc0">
+    <dgm:fillClrLst meth="repeat">
+      <a:schemeClr val="lt1">
+        <a:alpha val="90000"/>
+      </a:schemeClr>
+    </dgm:fillClrLst>
+    <dgm:linClrLst meth="repeat">
+      <a:schemeClr val="accent1"/>
+    </dgm:linClrLst>
+    <dgm:effectClrLst/>
+    <dgm:txLinClrLst/>
+    <dgm:txFillClrLst meth="repeat">
+      <a:schemeClr val="dk1"/>
+    </dgm:txFillClrLst>
+    <dgm:txEffectClrLst/>
+  </dgm:styleLbl>
+  <dgm:styleLbl name="fgAcc2">
+    <dgm:fillClrLst meth="repeat">
+      <a:schemeClr val="lt1">
+        <a:alpha val="90000"/>
+      </a:schemeClr>
+    </dgm:fillClrLst>
+    <dgm:linClrLst meth="repeat">
+      <a:schemeClr val="accent1"/>
+    </dgm:linClrLst>
+    <dgm:effectClrLst/>
+    <dgm:txLinClrLst/>
+    <dgm:txFillClrLst meth="repeat">
+      <a:schemeClr val="dk1"/>
+    </dgm:txFillClrLst>
+    <dgm:txEffectClrLst/>
+  </dgm:styleLbl>
+  <dgm:styleLbl name="fgAcc3">
+    <dgm:fillClrLst meth="repeat">
+      <a:schemeClr val="lt1">
+        <a:alpha val="90000"/>
+      </a:schemeClr>
+    </dgm:fillClrLst>
+    <dgm:linClrLst meth="repeat">
+      <a:schemeClr val="accent1"/>
+    </dgm:linClrLst>
+    <dgm:effectClrLst/>
+    <dgm:txLinClrLst/>
+    <dgm:txFillClrLst meth="repeat">
+      <a:schemeClr val="dk1"/>
+    </dgm:txFillClrLst>
+    <dgm:txEffectClrLst/>
+  </dgm:styleLbl>
+  <dgm:styleLbl name="fgAcc4">
+    <dgm:fillClrLst meth="repeat">
+      <a:schemeClr val="lt1">
+        <a:alpha val="90000"/>
+      </a:schemeClr>
+    </dgm:fillClrLst>
+    <dgm:linClrLst meth="repeat">
+      <a:schemeClr val="accent1"/>
+    </dgm:linClrLst>
+    <dgm:effectClrLst/>
+    <dgm:txLinClrLst/>
+    <dgm:txFillClrLst meth="repeat">
+      <a:schemeClr val="dk1"/>
+    </dgm:txFillClrLst>
+    <dgm:txEffectClrLst/>
+  </dgm:styleLbl>
+  <dgm:styleLbl name="bgShp">
+    <dgm:fillClrLst meth="repeat">
+      <a:schemeClr val="accent1">
+        <a:tint val="40000"/>
+      </a:schemeClr>
+    </dgm:fillClrLst>
+    <dgm:linClrLst meth="repeat">
+      <a:schemeClr val="accent1"/>
+    </dgm:linClrLst>
+    <dgm:effectClrLst/>
+    <dgm:txLinClrLst/>
+    <dgm:txFillClrLst meth="repeat">
+      <a:schemeClr val="dk1"/>
+    </dgm:txFillClrLst>
+    <dgm:txEffectClrLst/>
+  </dgm:styleLbl>
+  <dgm:styleLbl name="dkBgShp">
+    <dgm:fillClrLst meth="repeat">
+      <a:schemeClr val="accent1">
+        <a:shade val="80000"/>
+      </a:schemeClr>
+    </dgm:fillClrLst>
+    <dgm:linClrLst meth="repeat">
+      <a:schemeClr val="accent1"/>
+    </dgm:linClrLst>
+    <dgm:effectClrLst/>
+    <dgm:txLinClrLst/>
+    <dgm:txFillClrLst meth="repeat">
+      <a:schemeClr val="lt1"/>
+    </dgm:txFillClrLst>
+    <dgm:txEffectClrLst/>
+  </dgm:styleLbl>
+  <dgm:styleLbl name="trBgShp">
+    <dgm:fillClrLst meth="repeat">
+      <a:schemeClr val="accent1">
+        <a:tint val="50000"/>
+        <a:alpha val="40000"/>
+      </a:schemeClr>
+    </dgm:fillClrLst>
+    <dgm:linClrLst meth="repeat">
+      <a:schemeClr val="accent1"/>
+    </dgm:linClrLst>
+    <dgm:effectClrLst/>
+    <dgm:txLinClrLst/>
+    <dgm:txFillClrLst meth="repeat">
+      <a:schemeClr val="lt1"/>
+    </dgm:txFillClrLst>
+    <dgm:txEffectClrLst/>
+  </dgm:styleLbl>
+  <dgm:styleLbl name="fgShp">
+    <dgm:fillClrLst meth="repeat">
+      <a:schemeClr val="accent1">
+        <a:tint val="60000"/>
+      </a:schemeClr>
+    </dgm:fillClrLst>
+    <dgm:linClrLst meth="repeat">
+      <a:schemeClr val="lt1"/>
+    </dgm:linClrLst>
+    <dgm:effectClrLst/>
+    <dgm:txLinClrLst/>
+    <dgm:txFillClrLst meth="repeat">
+      <a:schemeClr val="dk1"/>
+    </dgm:txFillClrLst>
+    <dgm:txEffectClrLst/>
+  </dgm:styleLbl>
+  <dgm:styleLbl name="revTx">
+    <dgm:fillClrLst meth="repeat">
+      <a:schemeClr val="lt1">
+        <a:alpha val="0"/>
+      </a:schemeClr>
+    </dgm:fillClrLst>
+    <dgm:linClrLst meth="repeat">
+      <a:schemeClr val="dk1">
+        <a:alpha val="0"/>
+      </a:schemeClr>
+    </dgm:linClrLst>
+    <dgm:effectClrLst/>
+    <dgm:txLinClrLst/>
+    <dgm:txFillClrLst meth="repeat">
+      <a:schemeClr val="tx1"/>
+    </dgm:txFillClrLst>
+    <dgm:txEffectClrLst/>
+  </dgm:styleLbl>
+</dgm:colorsDef>
+</file>
+
+<file path=ppt/diagrams/colors2.xml><?xml version="1.0" encoding="utf-8"?>
 <dgm:colorsDef xmlns:dgm="http://schemas.openxmlformats.org/drawingml/2006/diagram" xmlns:a="http://schemas.openxmlformats.org/drawingml/2006/main" uniqueId="urn:microsoft.com/office/officeart/2005/8/colors/accent1_2">
   <dgm:title val=""/>
   <dgm:desc val=""/>
@@ -1394,6 +2144,13 @@
         </dgm:presLayoutVars>
       </dgm:prSet>
       <dgm:spPr/>
+      <dgm:t>
+        <a:bodyPr/>
+        <a:lstStyle/>
+        <a:p>
+          <a:endParaRPr lang="en-US"/>
+        </a:p>
+      </dgm:t>
     </dgm:pt>
     <dgm:pt modelId="{DD54D866-502B-D44E-98B6-B9419A2A5181}" type="pres">
       <dgm:prSet presAssocID="{A27A3876-3C67-354A-A9E6-1281E94DE7B3}" presName="linNode" presStyleCnt="0"/>
@@ -1446,6 +2203,13 @@
         </dgm:presLayoutVars>
       </dgm:prSet>
       <dgm:spPr/>
+      <dgm:t>
+        <a:bodyPr/>
+        <a:lstStyle/>
+        <a:p>
+          <a:endParaRPr lang="en-US"/>
+        </a:p>
+      </dgm:t>
     </dgm:pt>
     <dgm:pt modelId="{ED256A8E-3577-F04B-A6F5-C5D127EEDFF7}" type="pres">
       <dgm:prSet presAssocID="{D2A98552-7206-B54B-8916-313B2DDD4B1F}" presName="descendantText" presStyleLbl="alignAccFollowNode1" presStyleIdx="1" presStyleCnt="4">
@@ -1478,6 +2242,13 @@
         </dgm:presLayoutVars>
       </dgm:prSet>
       <dgm:spPr/>
+      <dgm:t>
+        <a:bodyPr/>
+        <a:lstStyle/>
+        <a:p>
+          <a:endParaRPr lang="en-US"/>
+        </a:p>
+      </dgm:t>
     </dgm:pt>
     <dgm:pt modelId="{224DD58D-EE4F-DF4E-BF16-22540CD0A0F5}" type="pres">
       <dgm:prSet presAssocID="{B859EB50-B895-2549-9384-E2BCDE3C968C}" presName="descendantText" presStyleLbl="alignAccFollowNode1" presStyleIdx="2" presStyleCnt="4">
@@ -1510,6 +2281,13 @@
         </dgm:presLayoutVars>
       </dgm:prSet>
       <dgm:spPr/>
+      <dgm:t>
+        <a:bodyPr/>
+        <a:lstStyle/>
+        <a:p>
+          <a:endParaRPr lang="en-US"/>
+        </a:p>
+      </dgm:t>
     </dgm:pt>
     <dgm:pt modelId="{377D39BC-B80D-9944-8D55-3791B3605780}" type="pres">
       <dgm:prSet presAssocID="{B2DC663A-2019-3047-9DCF-0B248892D2E8}" presName="descendantText" presStyleLbl="alignAccFollowNode1" presStyleIdx="3" presStyleCnt="4">
@@ -1528,35 +2306,35 @@
     </dgm:pt>
   </dgm:ptLst>
   <dgm:cxnLst>
-    <dgm:cxn modelId="{F223971D-1215-2149-BFE9-EB0926F72A85}" type="presOf" srcId="{8D3E64A9-4621-224F-BDB9-F2731A1CC811}" destId="{ED256A8E-3577-F04B-A6F5-C5D127EEDFF7}" srcOrd="0" destOrd="2" presId="urn:microsoft.com/office/officeart/2005/8/layout/vList5"/>
-    <dgm:cxn modelId="{1A726084-BD4E-3544-BD4A-6EADA04118C2}" srcId="{D2A98552-7206-B54B-8916-313B2DDD4B1F}" destId="{BE5CD4A6-B5D8-C34A-A9A9-70A30BD82EEE}" srcOrd="1" destOrd="0" parTransId="{2EA5CC8F-0046-2A4D-B97D-C200CD764370}" sibTransId="{3B086D1B-5300-5C45-B552-EC2D10A8E026}"/>
-    <dgm:cxn modelId="{BBCA9D30-DA20-8A45-A95F-E5C052F81296}" type="presOf" srcId="{A27A3876-3C67-354A-A9E6-1281E94DE7B3}" destId="{2F51A5BA-F3CA-2D43-B035-27A42F7B00E1}" srcOrd="0" destOrd="0" presId="urn:microsoft.com/office/officeart/2005/8/layout/vList5"/>
-    <dgm:cxn modelId="{BDE2A438-3829-464A-9235-03F0E493651F}" srcId="{A27A3876-3C67-354A-A9E6-1281E94DE7B3}" destId="{97B9A300-C9B3-AB4E-A721-12CAD3F01375}" srcOrd="1" destOrd="0" parTransId="{D2848B50-03A0-C144-923D-660BCA5F1AD4}" sibTransId="{D68089A8-A972-7F47-8119-56C683DD45EE}"/>
-    <dgm:cxn modelId="{F570798A-DE72-E742-9847-236B2B8F43A4}" srcId="{B95D4F37-1D8A-8749-8B39-2CB7397FA252}" destId="{B2DC663A-2019-3047-9DCF-0B248892D2E8}" srcOrd="3" destOrd="0" parTransId="{ED829C2B-8C9A-7443-9ABA-DE776BCD6E8C}" sibTransId="{A8C43371-DCA0-9A42-BCD8-990D6C443216}"/>
-    <dgm:cxn modelId="{F6947121-F0B4-234F-A52D-B33006F1A607}" srcId="{A27A3876-3C67-354A-A9E6-1281E94DE7B3}" destId="{908F87EC-A238-4E4F-9FE2-FFCE714A35A1}" srcOrd="0" destOrd="0" parTransId="{696795E0-9803-4C40-B438-6FE89DA1CBAC}" sibTransId="{966D4E03-F813-364F-87D4-26EFE4E6C3C6}"/>
-    <dgm:cxn modelId="{D14FD0DC-96D7-1D45-9632-E69742A87A67}" srcId="{B95D4F37-1D8A-8749-8B39-2CB7397FA252}" destId="{D2A98552-7206-B54B-8916-313B2DDD4B1F}" srcOrd="1" destOrd="0" parTransId="{3D7D81E3-13C9-6541-AF66-E8BFF9598B99}" sibTransId="{96A96B73-D58D-B243-ADB0-4D6CDADFFDB7}"/>
-    <dgm:cxn modelId="{9CF250DA-D343-2743-918A-2B643828FF04}" type="presOf" srcId="{1988179C-0019-8D4F-BA6D-31EFF596AF01}" destId="{377D39BC-B80D-9944-8D55-3791B3605780}" srcOrd="0" destOrd="0" presId="urn:microsoft.com/office/officeart/2005/8/layout/vList5"/>
-    <dgm:cxn modelId="{2AC75AD4-7A33-8A4B-A72D-942058478B4F}" type="presOf" srcId="{97B9A300-C9B3-AB4E-A721-12CAD3F01375}" destId="{4B6D0C25-8FB9-184A-858D-D81E0BA90C4D}" srcOrd="0" destOrd="1" presId="urn:microsoft.com/office/officeart/2005/8/layout/vList5"/>
     <dgm:cxn modelId="{CF1832C9-5DEB-E749-AFB8-7F399FFB66A2}" type="presOf" srcId="{093DE271-6615-3C46-90F6-655CE029D9D0}" destId="{224DD58D-EE4F-DF4E-BF16-22540CD0A0F5}" srcOrd="0" destOrd="1" presId="urn:microsoft.com/office/officeart/2005/8/layout/vList5"/>
-    <dgm:cxn modelId="{43625586-24BE-4B41-9DA0-3F2088EE3174}" type="presOf" srcId="{31FF09B4-248A-D248-869E-D7534E0E666E}" destId="{377D39BC-B80D-9944-8D55-3791B3605780}" srcOrd="0" destOrd="1" presId="urn:microsoft.com/office/officeart/2005/8/layout/vList5"/>
-    <dgm:cxn modelId="{0456EE57-E0C4-AF4F-A719-A0A4A7A9D5F8}" type="presOf" srcId="{B95D4F37-1D8A-8749-8B39-2CB7397FA252}" destId="{794CF085-F8F9-DF4D-9A6F-419C288BE4E5}" srcOrd="0" destOrd="0" presId="urn:microsoft.com/office/officeart/2005/8/layout/vList5"/>
-    <dgm:cxn modelId="{48C3D795-EB2C-EF43-A1C3-A610D0FC9135}" type="presOf" srcId="{BE5CD4A6-B5D8-C34A-A9A9-70A30BD82EEE}" destId="{ED256A8E-3577-F04B-A6F5-C5D127EEDFF7}" srcOrd="0" destOrd="1" presId="urn:microsoft.com/office/officeart/2005/8/layout/vList5"/>
+    <dgm:cxn modelId="{BC496351-A574-B647-B0DC-0A5C885DAD87}" srcId="{B2DC663A-2019-3047-9DCF-0B248892D2E8}" destId="{31FF09B4-248A-D248-869E-D7534E0E666E}" srcOrd="1" destOrd="0" parTransId="{EAEE2F02-E9BF-AB45-9503-9B9F2DC99808}" sibTransId="{0C9D9831-79B4-384B-9128-3A22ED341B8F}"/>
     <dgm:cxn modelId="{22C3FAD5-3377-2841-B25C-B1E286A0A5F1}" type="presOf" srcId="{908F87EC-A238-4E4F-9FE2-FFCE714A35A1}" destId="{4B6D0C25-8FB9-184A-858D-D81E0BA90C4D}" srcOrd="0" destOrd="0" presId="urn:microsoft.com/office/officeart/2005/8/layout/vList5"/>
     <dgm:cxn modelId="{182E4315-E2E4-8342-8E74-8717E7BCBD8A}" type="presOf" srcId="{4823C63D-79A2-5346-A28E-66819C5F7312}" destId="{224DD58D-EE4F-DF4E-BF16-22540CD0A0F5}" srcOrd="0" destOrd="2" presId="urn:microsoft.com/office/officeart/2005/8/layout/vList5"/>
-    <dgm:cxn modelId="{970EC6FF-9B46-E246-B871-FB4BA0E5D5D4}" type="presOf" srcId="{5C0014C3-2263-504E-9FCE-9FA2E3674F4F}" destId="{224DD58D-EE4F-DF4E-BF16-22540CD0A0F5}" srcOrd="0" destOrd="0" presId="urn:microsoft.com/office/officeart/2005/8/layout/vList5"/>
+    <dgm:cxn modelId="{B6A0AE0B-6D07-7646-8D54-4F4CCCD1C5CB}" srcId="{D2A98552-7206-B54B-8916-313B2DDD4B1F}" destId="{D578440C-53B3-1A4D-8B1C-3238BD870238}" srcOrd="0" destOrd="0" parTransId="{B097BDE3-E98C-3141-AE87-3EE728D4B4CB}" sibTransId="{8ECDBF82-C89F-5F4D-A39E-7BAB46561AA4}"/>
+    <dgm:cxn modelId="{48C3D795-EB2C-EF43-A1C3-A610D0FC9135}" type="presOf" srcId="{BE5CD4A6-B5D8-C34A-A9A9-70A30BD82EEE}" destId="{ED256A8E-3577-F04B-A6F5-C5D127EEDFF7}" srcOrd="0" destOrd="1" presId="urn:microsoft.com/office/officeart/2005/8/layout/vList5"/>
+    <dgm:cxn modelId="{0456EE57-E0C4-AF4F-A719-A0A4A7A9D5F8}" type="presOf" srcId="{B95D4F37-1D8A-8749-8B39-2CB7397FA252}" destId="{794CF085-F8F9-DF4D-9A6F-419C288BE4E5}" srcOrd="0" destOrd="0" presId="urn:microsoft.com/office/officeart/2005/8/layout/vList5"/>
     <dgm:cxn modelId="{22226201-A1E4-9044-80FA-91A868FED612}" srcId="{B95D4F37-1D8A-8749-8B39-2CB7397FA252}" destId="{A27A3876-3C67-354A-A9E6-1281E94DE7B3}" srcOrd="0" destOrd="0" parTransId="{0342AF2F-A876-814D-8826-3007CC303742}" sibTransId="{2BBB9A7A-07EB-E74C-9338-4794382DD794}"/>
-    <dgm:cxn modelId="{98AF7EC9-B0A4-A447-90FB-2C679610506D}" srcId="{B859EB50-B895-2549-9384-E2BCDE3C968C}" destId="{093DE271-6615-3C46-90F6-655CE029D9D0}" srcOrd="1" destOrd="0" parTransId="{49A9E02E-934A-E246-AF9E-B4D9D0D62D6D}" sibTransId="{AFE06E13-E600-6B42-84D2-E0CB85125385}"/>
     <dgm:cxn modelId="{80E47031-440D-9548-AAFF-5165C259C821}" srcId="{D2A98552-7206-B54B-8916-313B2DDD4B1F}" destId="{8D3E64A9-4621-224F-BDB9-F2731A1CC811}" srcOrd="2" destOrd="0" parTransId="{4B0C63BF-3D86-D941-9BB7-89062269FE44}" sibTransId="{4DD396BB-8CD4-F547-9CF9-DF814FA39134}"/>
-    <dgm:cxn modelId="{BC496351-A574-B647-B0DC-0A5C885DAD87}" srcId="{B2DC663A-2019-3047-9DCF-0B248892D2E8}" destId="{31FF09B4-248A-D248-869E-D7534E0E666E}" srcOrd="1" destOrd="0" parTransId="{EAEE2F02-E9BF-AB45-9503-9B9F2DC99808}" sibTransId="{0C9D9831-79B4-384B-9128-3A22ED341B8F}"/>
     <dgm:cxn modelId="{BC11605E-D63B-1C48-8640-E1243EF3C8A7}" type="presOf" srcId="{D2A98552-7206-B54B-8916-313B2DDD4B1F}" destId="{FE20F8B6-CCEE-7C48-80ED-6768A026A7DE}" srcOrd="0" destOrd="0" presId="urn:microsoft.com/office/officeart/2005/8/layout/vList5"/>
+    <dgm:cxn modelId="{1A726084-BD4E-3544-BD4A-6EADA04118C2}" srcId="{D2A98552-7206-B54B-8916-313B2DDD4B1F}" destId="{BE5CD4A6-B5D8-C34A-A9A9-70A30BD82EEE}" srcOrd="1" destOrd="0" parTransId="{2EA5CC8F-0046-2A4D-B97D-C200CD764370}" sibTransId="{3B086D1B-5300-5C45-B552-EC2D10A8E026}"/>
+    <dgm:cxn modelId="{F570798A-DE72-E742-9847-236B2B8F43A4}" srcId="{B95D4F37-1D8A-8749-8B39-2CB7397FA252}" destId="{B2DC663A-2019-3047-9DCF-0B248892D2E8}" srcOrd="3" destOrd="0" parTransId="{ED829C2B-8C9A-7443-9ABA-DE776BCD6E8C}" sibTransId="{A8C43371-DCA0-9A42-BCD8-990D6C443216}"/>
     <dgm:cxn modelId="{E5BD6DC2-7B53-FA41-A05B-15E0CF514382}" type="presOf" srcId="{D578440C-53B3-1A4D-8B1C-3238BD870238}" destId="{ED256A8E-3577-F04B-A6F5-C5D127EEDFF7}" srcOrd="0" destOrd="0" presId="urn:microsoft.com/office/officeart/2005/8/layout/vList5"/>
+    <dgm:cxn modelId="{2AC75AD4-7A33-8A4B-A72D-942058478B4F}" type="presOf" srcId="{97B9A300-C9B3-AB4E-A721-12CAD3F01375}" destId="{4B6D0C25-8FB9-184A-858D-D81E0BA90C4D}" srcOrd="0" destOrd="1" presId="urn:microsoft.com/office/officeart/2005/8/layout/vList5"/>
+    <dgm:cxn modelId="{14DE4371-9B66-4D4F-9DFC-BDB9428C36B0}" srcId="{B2DC663A-2019-3047-9DCF-0B248892D2E8}" destId="{1988179C-0019-8D4F-BA6D-31EFF596AF01}" srcOrd="0" destOrd="0" parTransId="{B481B68A-1F19-314A-81D4-70BFB3A04400}" sibTransId="{1F0FF57F-7A88-7C4A-8E74-03E544111B09}"/>
+    <dgm:cxn modelId="{F6947121-F0B4-234F-A52D-B33006F1A607}" srcId="{A27A3876-3C67-354A-A9E6-1281E94DE7B3}" destId="{908F87EC-A238-4E4F-9FE2-FFCE714A35A1}" srcOrd="0" destOrd="0" parTransId="{696795E0-9803-4C40-B438-6FE89DA1CBAC}" sibTransId="{966D4E03-F813-364F-87D4-26EFE4E6C3C6}"/>
+    <dgm:cxn modelId="{BDE2A438-3829-464A-9235-03F0E493651F}" srcId="{A27A3876-3C67-354A-A9E6-1281E94DE7B3}" destId="{97B9A300-C9B3-AB4E-A721-12CAD3F01375}" srcOrd="1" destOrd="0" parTransId="{D2848B50-03A0-C144-923D-660BCA5F1AD4}" sibTransId="{D68089A8-A972-7F47-8119-56C683DD45EE}"/>
+    <dgm:cxn modelId="{701FD819-495C-694C-B02D-4BAC5818E8E2}" srcId="{B859EB50-B895-2549-9384-E2BCDE3C968C}" destId="{4823C63D-79A2-5346-A28E-66819C5F7312}" srcOrd="2" destOrd="0" parTransId="{EA11983D-6125-C140-9707-5FA7275EE591}" sibTransId="{5089D9F2-1822-ED4A-B700-94306F87DDEE}"/>
     <dgm:cxn modelId="{1018F0F1-6E7B-DC40-BE52-700C5AD8B728}" srcId="{B95D4F37-1D8A-8749-8B39-2CB7397FA252}" destId="{B859EB50-B895-2549-9384-E2BCDE3C968C}" srcOrd="2" destOrd="0" parTransId="{A1FC67BA-DBDE-8C4A-8361-C52EDE89BBAE}" sibTransId="{1B17C232-6568-9545-944B-5551ABA3B464}"/>
     <dgm:cxn modelId="{9C504291-6760-1B4A-A609-11D462DDB442}" srcId="{B859EB50-B895-2549-9384-E2BCDE3C968C}" destId="{5C0014C3-2263-504E-9FCE-9FA2E3674F4F}" srcOrd="0" destOrd="0" parTransId="{9C105334-FA49-694D-820C-36D5CA8EC00A}" sibTransId="{4C0134B1-5A1B-814F-B67D-369FAE3186CF}"/>
+    <dgm:cxn modelId="{43625586-24BE-4B41-9DA0-3F2088EE3174}" type="presOf" srcId="{31FF09B4-248A-D248-869E-D7534E0E666E}" destId="{377D39BC-B80D-9944-8D55-3791B3605780}" srcOrd="0" destOrd="1" presId="urn:microsoft.com/office/officeart/2005/8/layout/vList5"/>
+    <dgm:cxn modelId="{98AF7EC9-B0A4-A447-90FB-2C679610506D}" srcId="{B859EB50-B895-2549-9384-E2BCDE3C968C}" destId="{093DE271-6615-3C46-90F6-655CE029D9D0}" srcOrd="1" destOrd="0" parTransId="{49A9E02E-934A-E246-AF9E-B4D9D0D62D6D}" sibTransId="{AFE06E13-E600-6B42-84D2-E0CB85125385}"/>
+    <dgm:cxn modelId="{BBCA9D30-DA20-8A45-A95F-E5C052F81296}" type="presOf" srcId="{A27A3876-3C67-354A-A9E6-1281E94DE7B3}" destId="{2F51A5BA-F3CA-2D43-B035-27A42F7B00E1}" srcOrd="0" destOrd="0" presId="urn:microsoft.com/office/officeart/2005/8/layout/vList5"/>
+    <dgm:cxn modelId="{9CF250DA-D343-2743-918A-2B643828FF04}" type="presOf" srcId="{1988179C-0019-8D4F-BA6D-31EFF596AF01}" destId="{377D39BC-B80D-9944-8D55-3791B3605780}" srcOrd="0" destOrd="0" presId="urn:microsoft.com/office/officeart/2005/8/layout/vList5"/>
+    <dgm:cxn modelId="{F223971D-1215-2149-BFE9-EB0926F72A85}" type="presOf" srcId="{8D3E64A9-4621-224F-BDB9-F2731A1CC811}" destId="{ED256A8E-3577-F04B-A6F5-C5D127EEDFF7}" srcOrd="0" destOrd="2" presId="urn:microsoft.com/office/officeart/2005/8/layout/vList5"/>
+    <dgm:cxn modelId="{C7DCB44E-67A4-7044-A779-973DE1D694CE}" type="presOf" srcId="{B859EB50-B895-2549-9384-E2BCDE3C968C}" destId="{1F309CAE-C2CA-6D46-8C05-0080B6A637BD}" srcOrd="0" destOrd="0" presId="urn:microsoft.com/office/officeart/2005/8/layout/vList5"/>
+    <dgm:cxn modelId="{D14FD0DC-96D7-1D45-9632-E69742A87A67}" srcId="{B95D4F37-1D8A-8749-8B39-2CB7397FA252}" destId="{D2A98552-7206-B54B-8916-313B2DDD4B1F}" srcOrd="1" destOrd="0" parTransId="{3D7D81E3-13C9-6541-AF66-E8BFF9598B99}" sibTransId="{96A96B73-D58D-B243-ADB0-4D6CDADFFDB7}"/>
+    <dgm:cxn modelId="{970EC6FF-9B46-E246-B871-FB4BA0E5D5D4}" type="presOf" srcId="{5C0014C3-2263-504E-9FCE-9FA2E3674F4F}" destId="{224DD58D-EE4F-DF4E-BF16-22540CD0A0F5}" srcOrd="0" destOrd="0" presId="urn:microsoft.com/office/officeart/2005/8/layout/vList5"/>
     <dgm:cxn modelId="{D54FCA9B-A232-9B42-9D76-2B294D7E3DD1}" type="presOf" srcId="{B2DC663A-2019-3047-9DCF-0B248892D2E8}" destId="{808F9945-2453-CD40-B6C1-7FFB8A3ECFC0}" srcOrd="0" destOrd="0" presId="urn:microsoft.com/office/officeart/2005/8/layout/vList5"/>
-    <dgm:cxn modelId="{14DE4371-9B66-4D4F-9DFC-BDB9428C36B0}" srcId="{B2DC663A-2019-3047-9DCF-0B248892D2E8}" destId="{1988179C-0019-8D4F-BA6D-31EFF596AF01}" srcOrd="0" destOrd="0" parTransId="{B481B68A-1F19-314A-81D4-70BFB3A04400}" sibTransId="{1F0FF57F-7A88-7C4A-8E74-03E544111B09}"/>
-    <dgm:cxn modelId="{B6A0AE0B-6D07-7646-8D54-4F4CCCD1C5CB}" srcId="{D2A98552-7206-B54B-8916-313B2DDD4B1F}" destId="{D578440C-53B3-1A4D-8B1C-3238BD870238}" srcOrd="0" destOrd="0" parTransId="{B097BDE3-E98C-3141-AE87-3EE728D4B4CB}" sibTransId="{8ECDBF82-C89F-5F4D-A39E-7BAB46561AA4}"/>
-    <dgm:cxn modelId="{701FD819-495C-694C-B02D-4BAC5818E8E2}" srcId="{B859EB50-B895-2549-9384-E2BCDE3C968C}" destId="{4823C63D-79A2-5346-A28E-66819C5F7312}" srcOrd="2" destOrd="0" parTransId="{EA11983D-6125-C140-9707-5FA7275EE591}" sibTransId="{5089D9F2-1822-ED4A-B700-94306F87DDEE}"/>
-    <dgm:cxn modelId="{C7DCB44E-67A4-7044-A779-973DE1D694CE}" type="presOf" srcId="{B859EB50-B895-2549-9384-E2BCDE3C968C}" destId="{1F309CAE-C2CA-6D46-8C05-0080B6A637BD}" srcOrd="0" destOrd="0" presId="urn:microsoft.com/office/officeart/2005/8/layout/vList5"/>
     <dgm:cxn modelId="{2C9F2BD0-7BB3-4B49-A545-CB7C5AF543E8}" type="presParOf" srcId="{794CF085-F8F9-DF4D-9A6F-419C288BE4E5}" destId="{DD54D866-502B-D44E-98B6-B9419A2A5181}" srcOrd="0" destOrd="0" presId="urn:microsoft.com/office/officeart/2005/8/layout/vList5"/>
     <dgm:cxn modelId="{12E6ED8C-5AE0-F54A-86FB-9CAFE7BCBDC1}" type="presParOf" srcId="{DD54D866-502B-D44E-98B6-B9419A2A5181}" destId="{2F51A5BA-F3CA-2D43-B035-27A42F7B00E1}" srcOrd="0" destOrd="0" presId="urn:microsoft.com/office/officeart/2005/8/layout/vList5"/>
     <dgm:cxn modelId="{2799295C-C221-4346-9826-BC21BFC60B5A}" type="presParOf" srcId="{DD54D866-502B-D44E-98B6-B9419A2A5181}" destId="{4B6D0C25-8FB9-184A-858D-D81E0BA90C4D}" srcOrd="1" destOrd="0" presId="urn:microsoft.com/office/officeart/2005/8/layout/vList5"/>
@@ -1572,6 +2350,607 @@
     <dgm:cxn modelId="{DA58E0DB-0956-BA43-9FF8-33D50DF8988A}" type="presParOf" srcId="{794CF085-F8F9-DF4D-9A6F-419C288BE4E5}" destId="{297090C2-8EE1-894C-8DBE-9A4CD4CFAE2A}" srcOrd="6" destOrd="0" presId="urn:microsoft.com/office/officeart/2005/8/layout/vList5"/>
     <dgm:cxn modelId="{DA1B7FE9-D4AC-8B40-B556-DA2107D9C38A}" type="presParOf" srcId="{297090C2-8EE1-894C-8DBE-9A4CD4CFAE2A}" destId="{808F9945-2453-CD40-B6C1-7FFB8A3ECFC0}" srcOrd="0" destOrd="0" presId="urn:microsoft.com/office/officeart/2005/8/layout/vList5"/>
     <dgm:cxn modelId="{F3A9F787-734D-1A48-B275-758C68CB1E5C}" type="presParOf" srcId="{297090C2-8EE1-894C-8DBE-9A4CD4CFAE2A}" destId="{377D39BC-B80D-9944-8D55-3791B3605780}" srcOrd="1" destOrd="0" presId="urn:microsoft.com/office/officeart/2005/8/layout/vList5"/>
+  </dgm:cxnLst>
+  <dgm:bg/>
+  <dgm:whole/>
+  <dgm:extLst>
+    <a:ext uri="http://schemas.microsoft.com/office/drawing/2008/diagram">
+      <dsp:dataModelExt xmlns:dsp="http://schemas.microsoft.com/office/drawing/2008/diagram" relId="rId6" minVer="http://schemas.openxmlformats.org/drawingml/2006/diagram"/>
+    </a:ext>
+  </dgm:extLst>
+</dgm:dataModel>
+</file>
+
+<file path=ppt/diagrams/data2.xml><?xml version="1.0" encoding="utf-8"?>
+<dgm:dataModel xmlns:dgm="http://schemas.openxmlformats.org/drawingml/2006/diagram" xmlns:a="http://schemas.openxmlformats.org/drawingml/2006/main">
+  <dgm:ptLst>
+    <dgm:pt modelId="{73D78044-8498-8D4D-8B17-211B2692FB4C}" type="doc">
+      <dgm:prSet loTypeId="urn:microsoft.com/office/officeart/2005/8/layout/process4" loCatId="" qsTypeId="urn:microsoft.com/office/officeart/2005/8/quickstyle/simple4" qsCatId="simple" csTypeId="urn:microsoft.com/office/officeart/2005/8/colors/accent1_2" csCatId="accent1" phldr="1"/>
+      <dgm:spPr/>
+      <dgm:t>
+        <a:bodyPr/>
+        <a:lstStyle/>
+        <a:p>
+          <a:endParaRPr lang="en-US"/>
+        </a:p>
+      </dgm:t>
+    </dgm:pt>
+    <dgm:pt modelId="{0054937D-F517-A54D-84E4-A8B34FE6EA86}">
+      <dgm:prSet phldrT="[Text]" custT="1"/>
+      <dgm:spPr/>
+      <dgm:t>
+        <a:bodyPr/>
+        <a:lstStyle/>
+        <a:p>
+          <a:r>
+            <a:rPr lang="en-US" sz="2000" dirty="0" smtClean="0"/>
+            <a:t>Front-end Server (</a:t>
+          </a:r>
+          <a:r>
+            <a:rPr lang="en-US" sz="2000" dirty="0" err="1" smtClean="0"/>
+            <a:t>Nginx</a:t>
+          </a:r>
+          <a:r>
+            <a:rPr lang="en-US" sz="2000" dirty="0" smtClean="0"/>
+            <a:t>)</a:t>
+          </a:r>
+          <a:endParaRPr lang="en-US" sz="2000" dirty="0"/>
+        </a:p>
+      </dgm:t>
+    </dgm:pt>
+    <dgm:pt modelId="{D949AB94-A8EB-6F4D-9558-03BC2D13B678}" type="parTrans" cxnId="{AF03A6A9-73BC-AC4B-9E32-573BB944127F}">
+      <dgm:prSet/>
+      <dgm:spPr/>
+      <dgm:t>
+        <a:bodyPr/>
+        <a:lstStyle/>
+        <a:p>
+          <a:endParaRPr lang="en-US"/>
+        </a:p>
+      </dgm:t>
+    </dgm:pt>
+    <dgm:pt modelId="{6374F230-AE60-1048-851E-B323EDECAD0C}" type="sibTrans" cxnId="{AF03A6A9-73BC-AC4B-9E32-573BB944127F}">
+      <dgm:prSet/>
+      <dgm:spPr/>
+      <dgm:t>
+        <a:bodyPr/>
+        <a:lstStyle/>
+        <a:p>
+          <a:endParaRPr lang="en-US"/>
+        </a:p>
+      </dgm:t>
+    </dgm:pt>
+    <dgm:pt modelId="{F8A4A24F-DB6E-5B44-B1DD-CCB25A758DBB}">
+      <dgm:prSet phldrT="[Text]" custT="1"/>
+      <dgm:spPr/>
+      <dgm:t>
+        <a:bodyPr/>
+        <a:lstStyle/>
+        <a:p>
+          <a:r>
+            <a:rPr lang="en-US" sz="2000" dirty="0" smtClean="0"/>
+            <a:t>Load Balancer (</a:t>
+          </a:r>
+          <a:r>
+            <a:rPr lang="en-US" sz="2000" dirty="0" err="1" smtClean="0"/>
+            <a:t>HAProxy</a:t>
+          </a:r>
+          <a:r>
+            <a:rPr lang="en-US" sz="2000" dirty="0" smtClean="0"/>
+            <a:t>)</a:t>
+          </a:r>
+          <a:endParaRPr lang="en-US" sz="2000" dirty="0"/>
+        </a:p>
+      </dgm:t>
+    </dgm:pt>
+    <dgm:pt modelId="{D15865B2-8C8B-324D-A3D7-D4FCBBBDD3D1}" type="parTrans" cxnId="{18602924-F626-D348-8D9A-3FC8B541D98F}">
+      <dgm:prSet/>
+      <dgm:spPr/>
+      <dgm:t>
+        <a:bodyPr/>
+        <a:lstStyle/>
+        <a:p>
+          <a:endParaRPr lang="en-US"/>
+        </a:p>
+      </dgm:t>
+    </dgm:pt>
+    <dgm:pt modelId="{DB13A231-5CEE-9349-A1E1-B66ECA7E46BE}" type="sibTrans" cxnId="{18602924-F626-D348-8D9A-3FC8B541D98F}">
+      <dgm:prSet/>
+      <dgm:spPr/>
+      <dgm:t>
+        <a:bodyPr/>
+        <a:lstStyle/>
+        <a:p>
+          <a:endParaRPr lang="en-US"/>
+        </a:p>
+      </dgm:t>
+    </dgm:pt>
+    <dgm:pt modelId="{478A6395-6A47-544F-AEB7-6E7CE893456F}">
+      <dgm:prSet phldrT="[Text]" custT="1"/>
+      <dgm:spPr/>
+      <dgm:t>
+        <a:bodyPr/>
+        <a:lstStyle/>
+        <a:p>
+          <a:r>
+            <a:rPr lang="en-US" sz="2000" dirty="0" smtClean="0"/>
+            <a:t>Application Server (GAE </a:t>
+          </a:r>
+          <a:r>
+            <a:rPr lang="en-US" sz="2000" dirty="0" err="1" smtClean="0"/>
+            <a:t>Dev</a:t>
+          </a:r>
+          <a:r>
+            <a:rPr lang="en-US" sz="2000" dirty="0" smtClean="0"/>
+            <a:t> App Server)</a:t>
+          </a:r>
+          <a:endParaRPr lang="en-US" sz="2000" dirty="0"/>
+        </a:p>
+      </dgm:t>
+    </dgm:pt>
+    <dgm:pt modelId="{294A8962-D84F-3240-B1A7-3542F5B48485}" type="parTrans" cxnId="{50C9BC42-F630-7748-A994-864170B6AE78}">
+      <dgm:prSet/>
+      <dgm:spPr/>
+      <dgm:t>
+        <a:bodyPr/>
+        <a:lstStyle/>
+        <a:p>
+          <a:endParaRPr lang="en-US"/>
+        </a:p>
+      </dgm:t>
+    </dgm:pt>
+    <dgm:pt modelId="{CF4D92F8-D3F6-FB42-8857-068866810F3A}" type="sibTrans" cxnId="{50C9BC42-F630-7748-A994-864170B6AE78}">
+      <dgm:prSet/>
+      <dgm:spPr/>
+      <dgm:t>
+        <a:bodyPr/>
+        <a:lstStyle/>
+        <a:p>
+          <a:endParaRPr lang="en-US"/>
+        </a:p>
+      </dgm:t>
+    </dgm:pt>
+    <dgm:pt modelId="{06947581-C661-D648-88FD-A9ED3867A838}">
+      <dgm:prSet phldrT="[Text]"/>
+      <dgm:spPr/>
+      <dgm:t>
+        <a:bodyPr/>
+        <a:lstStyle/>
+        <a:p>
+          <a:r>
+            <a:rPr lang="en-US" dirty="0" err="1" smtClean="0"/>
+            <a:t>Datastore</a:t>
+          </a:r>
+          <a:endParaRPr lang="en-US" dirty="0"/>
+        </a:p>
+      </dgm:t>
+    </dgm:pt>
+    <dgm:pt modelId="{45B20CC3-6983-4740-83B3-D3EF3E7B9D35}" type="parTrans" cxnId="{35DE700F-E510-6F4D-AD93-D6CCE2D324F5}">
+      <dgm:prSet/>
+      <dgm:spPr/>
+      <dgm:t>
+        <a:bodyPr/>
+        <a:lstStyle/>
+        <a:p>
+          <a:endParaRPr lang="en-US"/>
+        </a:p>
+      </dgm:t>
+    </dgm:pt>
+    <dgm:pt modelId="{4210242D-254A-E744-A5C3-2A6141D8DFDD}" type="sibTrans" cxnId="{35DE700F-E510-6F4D-AD93-D6CCE2D324F5}">
+      <dgm:prSet/>
+      <dgm:spPr/>
+      <dgm:t>
+        <a:bodyPr/>
+        <a:lstStyle/>
+        <a:p>
+          <a:endParaRPr lang="en-US"/>
+        </a:p>
+      </dgm:t>
+    </dgm:pt>
+    <dgm:pt modelId="{E3B7B8CF-ED15-5249-8832-B4AB3725601E}">
+      <dgm:prSet phldrT="[Text]"/>
+      <dgm:spPr/>
+      <dgm:t>
+        <a:bodyPr/>
+        <a:lstStyle/>
+        <a:p>
+          <a:r>
+            <a:rPr lang="en-US" dirty="0" err="1" smtClean="0"/>
+            <a:t>Memcache</a:t>
+          </a:r>
+          <a:endParaRPr lang="en-US" dirty="0"/>
+        </a:p>
+      </dgm:t>
+    </dgm:pt>
+    <dgm:pt modelId="{C2FB3B6C-E966-A142-9814-6459EFD17899}" type="parTrans" cxnId="{2CB9F63B-812B-7743-BF24-6C4F0240C9C7}">
+      <dgm:prSet/>
+      <dgm:spPr/>
+      <dgm:t>
+        <a:bodyPr/>
+        <a:lstStyle/>
+        <a:p>
+          <a:endParaRPr lang="en-US"/>
+        </a:p>
+      </dgm:t>
+    </dgm:pt>
+    <dgm:pt modelId="{3717BD97-474C-C142-A944-846858AA2A65}" type="sibTrans" cxnId="{2CB9F63B-812B-7743-BF24-6C4F0240C9C7}">
+      <dgm:prSet/>
+      <dgm:spPr/>
+      <dgm:t>
+        <a:bodyPr/>
+        <a:lstStyle/>
+        <a:p>
+          <a:endParaRPr lang="en-US"/>
+        </a:p>
+      </dgm:t>
+    </dgm:pt>
+    <dgm:pt modelId="{E055B387-831E-3848-9D59-D97D5A4DB586}">
+      <dgm:prSet phldrT="[Text]"/>
+      <dgm:spPr/>
+      <dgm:t>
+        <a:bodyPr/>
+        <a:lstStyle/>
+        <a:p>
+          <a:r>
+            <a:rPr lang="en-US" dirty="0" err="1" smtClean="0"/>
+            <a:t>Taskqueue</a:t>
+          </a:r>
+          <a:endParaRPr lang="en-US" dirty="0"/>
+        </a:p>
+      </dgm:t>
+    </dgm:pt>
+    <dgm:pt modelId="{CA02151E-5573-2840-837D-34B45DBABA73}" type="parTrans" cxnId="{2F6F67FD-3B0A-E946-B8C9-9DC04D526B82}">
+      <dgm:prSet/>
+      <dgm:spPr/>
+      <dgm:t>
+        <a:bodyPr/>
+        <a:lstStyle/>
+        <a:p>
+          <a:endParaRPr lang="en-US"/>
+        </a:p>
+      </dgm:t>
+    </dgm:pt>
+    <dgm:pt modelId="{1990DCAE-0BE9-424C-875A-EFB290CD1A23}" type="sibTrans" cxnId="{2F6F67FD-3B0A-E946-B8C9-9DC04D526B82}">
+      <dgm:prSet/>
+      <dgm:spPr/>
+      <dgm:t>
+        <a:bodyPr/>
+        <a:lstStyle/>
+        <a:p>
+          <a:endParaRPr lang="en-US"/>
+        </a:p>
+      </dgm:t>
+    </dgm:pt>
+    <dgm:pt modelId="{A4B99DFB-F5B2-9847-8572-20B37FB228E6}">
+      <dgm:prSet phldrT="[Text]"/>
+      <dgm:spPr/>
+      <dgm:t>
+        <a:bodyPr/>
+        <a:lstStyle/>
+        <a:p>
+          <a:r>
+            <a:rPr lang="en-US" dirty="0" smtClean="0"/>
+            <a:t>Users</a:t>
+          </a:r>
+          <a:endParaRPr lang="en-US" dirty="0"/>
+        </a:p>
+      </dgm:t>
+    </dgm:pt>
+    <dgm:pt modelId="{17BBD0C0-1904-1141-951B-F076C2601B01}" type="parTrans" cxnId="{3FAE2372-EC4C-E642-A243-8E6A58DAC292}">
+      <dgm:prSet/>
+      <dgm:spPr/>
+      <dgm:t>
+        <a:bodyPr/>
+        <a:lstStyle/>
+        <a:p>
+          <a:endParaRPr lang="en-US"/>
+        </a:p>
+      </dgm:t>
+    </dgm:pt>
+    <dgm:pt modelId="{51C2C5BE-7949-CE42-A80C-27FAE7912C56}" type="sibTrans" cxnId="{3FAE2372-EC4C-E642-A243-8E6A58DAC292}">
+      <dgm:prSet/>
+      <dgm:spPr/>
+      <dgm:t>
+        <a:bodyPr/>
+        <a:lstStyle/>
+        <a:p>
+          <a:endParaRPr lang="en-US"/>
+        </a:p>
+      </dgm:t>
+    </dgm:pt>
+    <dgm:pt modelId="{06736642-D389-E442-8048-977C37C96CA4}">
+      <dgm:prSet phldrT="[Text]"/>
+      <dgm:spPr/>
+      <dgm:t>
+        <a:bodyPr/>
+        <a:lstStyle/>
+        <a:p>
+          <a:r>
+            <a:rPr lang="en-US" dirty="0" err="1" smtClean="0"/>
+            <a:t>Blobstore</a:t>
+          </a:r>
+          <a:endParaRPr lang="en-US" dirty="0"/>
+        </a:p>
+      </dgm:t>
+    </dgm:pt>
+    <dgm:pt modelId="{118090B6-11B9-BE46-BA64-2898E4C5C71C}" type="parTrans" cxnId="{34C7D0F4-81E8-3346-983D-198A22287B85}">
+      <dgm:prSet/>
+      <dgm:spPr/>
+      <dgm:t>
+        <a:bodyPr/>
+        <a:lstStyle/>
+        <a:p>
+          <a:endParaRPr lang="en-US"/>
+        </a:p>
+      </dgm:t>
+    </dgm:pt>
+    <dgm:pt modelId="{59B4789A-33C0-8C4B-9257-0DA78E427458}" type="sibTrans" cxnId="{34C7D0F4-81E8-3346-983D-198A22287B85}">
+      <dgm:prSet/>
+      <dgm:spPr/>
+      <dgm:t>
+        <a:bodyPr/>
+        <a:lstStyle/>
+        <a:p>
+          <a:endParaRPr lang="en-US"/>
+        </a:p>
+      </dgm:t>
+    </dgm:pt>
+    <dgm:pt modelId="{5D15EA2A-0935-6F44-935A-C396EB38F53F}">
+      <dgm:prSet phldrT="[Text]"/>
+      <dgm:spPr/>
+      <dgm:t>
+        <a:bodyPr/>
+        <a:lstStyle/>
+        <a:p>
+          <a:r>
+            <a:rPr lang="en-US" dirty="0" smtClean="0"/>
+            <a:t>Images</a:t>
+          </a:r>
+          <a:endParaRPr lang="en-US" dirty="0"/>
+        </a:p>
+      </dgm:t>
+    </dgm:pt>
+    <dgm:pt modelId="{30491C88-7838-6C4F-9B8B-A3E7F40EF9E4}" type="parTrans" cxnId="{6658BC5D-A652-7246-A315-66FBDE5EEBF1}">
+      <dgm:prSet/>
+      <dgm:spPr/>
+      <dgm:t>
+        <a:bodyPr/>
+        <a:lstStyle/>
+        <a:p>
+          <a:endParaRPr lang="en-US"/>
+        </a:p>
+      </dgm:t>
+    </dgm:pt>
+    <dgm:pt modelId="{DD86F55C-B8AF-2849-B3FF-7701946229F9}" type="sibTrans" cxnId="{6658BC5D-A652-7246-A315-66FBDE5EEBF1}">
+      <dgm:prSet/>
+      <dgm:spPr/>
+      <dgm:t>
+        <a:bodyPr/>
+        <a:lstStyle/>
+        <a:p>
+          <a:endParaRPr lang="en-US"/>
+        </a:p>
+      </dgm:t>
+    </dgm:pt>
+    <dgm:pt modelId="{C90D4AF1-EC56-6B4B-AF2F-811730ADA0B9}">
+      <dgm:prSet phldrT="[Text]" custT="1"/>
+      <dgm:spPr/>
+      <dgm:t>
+        <a:bodyPr/>
+        <a:lstStyle/>
+        <a:p>
+          <a:r>
+            <a:rPr lang="en-US" sz="2000" dirty="0" smtClean="0"/>
+            <a:t>Cloud SDK Front-end (</a:t>
+          </a:r>
+          <a:r>
+            <a:rPr lang="en-US" sz="2000" dirty="0" err="1" smtClean="0"/>
+            <a:t>PBServer</a:t>
+          </a:r>
+          <a:r>
+            <a:rPr lang="en-US" sz="2000" dirty="0" smtClean="0"/>
+            <a:t>)</a:t>
+          </a:r>
+          <a:endParaRPr lang="en-US" sz="2000" dirty="0"/>
+        </a:p>
+      </dgm:t>
+    </dgm:pt>
+    <dgm:pt modelId="{A8491E77-8B56-2943-821C-BD2075856DF9}" type="sibTrans" cxnId="{00E2713A-CDD1-5E4D-B45C-54566B520973}">
+      <dgm:prSet/>
+      <dgm:spPr/>
+      <dgm:t>
+        <a:bodyPr/>
+        <a:lstStyle/>
+        <a:p>
+          <a:endParaRPr lang="en-US"/>
+        </a:p>
+      </dgm:t>
+    </dgm:pt>
+    <dgm:pt modelId="{1FF2441C-04B4-2145-97E8-931B71EC4B70}" type="parTrans" cxnId="{00E2713A-CDD1-5E4D-B45C-54566B520973}">
+      <dgm:prSet/>
+      <dgm:spPr/>
+      <dgm:t>
+        <a:bodyPr/>
+        <a:lstStyle/>
+        <a:p>
+          <a:endParaRPr lang="en-US"/>
+        </a:p>
+      </dgm:t>
+    </dgm:pt>
+    <dgm:pt modelId="{201017B6-863D-4043-9541-11D435818326}" type="pres">
+      <dgm:prSet presAssocID="{73D78044-8498-8D4D-8B17-211B2692FB4C}" presName="Name0" presStyleCnt="0">
+        <dgm:presLayoutVars>
+          <dgm:dir/>
+          <dgm:animLvl val="lvl"/>
+          <dgm:resizeHandles val="exact"/>
+        </dgm:presLayoutVars>
+      </dgm:prSet>
+      <dgm:spPr/>
+    </dgm:pt>
+    <dgm:pt modelId="{16CFC8EF-7054-384B-91FC-7C69CCC84276}" type="pres">
+      <dgm:prSet presAssocID="{C90D4AF1-EC56-6B4B-AF2F-811730ADA0B9}" presName="boxAndChildren" presStyleCnt="0"/>
+      <dgm:spPr/>
+    </dgm:pt>
+    <dgm:pt modelId="{51E9CDBB-E0B0-0141-9E55-20A6BFEDAFFF}" type="pres">
+      <dgm:prSet presAssocID="{C90D4AF1-EC56-6B4B-AF2F-811730ADA0B9}" presName="parentTextBox" presStyleLbl="node1" presStyleIdx="0" presStyleCnt="4"/>
+      <dgm:spPr/>
+      <dgm:t>
+        <a:bodyPr/>
+        <a:lstStyle/>
+        <a:p>
+          <a:endParaRPr lang="en-US"/>
+        </a:p>
+      </dgm:t>
+    </dgm:pt>
+    <dgm:pt modelId="{2239CF04-2773-1D4C-9BF0-245FE270F59D}" type="pres">
+      <dgm:prSet presAssocID="{C90D4AF1-EC56-6B4B-AF2F-811730ADA0B9}" presName="entireBox" presStyleLbl="node1" presStyleIdx="0" presStyleCnt="4"/>
+      <dgm:spPr/>
+      <dgm:t>
+        <a:bodyPr/>
+        <a:lstStyle/>
+        <a:p>
+          <a:endParaRPr lang="en-US"/>
+        </a:p>
+      </dgm:t>
+    </dgm:pt>
+    <dgm:pt modelId="{DA537950-05C7-7B4E-B4B2-993EE5F0B0B6}" type="pres">
+      <dgm:prSet presAssocID="{C90D4AF1-EC56-6B4B-AF2F-811730ADA0B9}" presName="descendantBox" presStyleCnt="0"/>
+      <dgm:spPr/>
+    </dgm:pt>
+    <dgm:pt modelId="{F16B6330-D228-AF4E-B505-36448BACBFFC}" type="pres">
+      <dgm:prSet presAssocID="{06947581-C661-D648-88FD-A9ED3867A838}" presName="childTextBox" presStyleLbl="fgAccFollowNode1" presStyleIdx="0" presStyleCnt="6">
+        <dgm:presLayoutVars>
+          <dgm:bulletEnabled val="1"/>
+        </dgm:presLayoutVars>
+      </dgm:prSet>
+      <dgm:spPr/>
+    </dgm:pt>
+    <dgm:pt modelId="{36F2AFAF-F887-DD49-AD9E-328358184C3A}" type="pres">
+      <dgm:prSet presAssocID="{E3B7B8CF-ED15-5249-8832-B4AB3725601E}" presName="childTextBox" presStyleLbl="fgAccFollowNode1" presStyleIdx="1" presStyleCnt="6">
+        <dgm:presLayoutVars>
+          <dgm:bulletEnabled val="1"/>
+        </dgm:presLayoutVars>
+      </dgm:prSet>
+      <dgm:spPr/>
+    </dgm:pt>
+    <dgm:pt modelId="{D61F5191-C96D-E140-9139-BC77A7BF53CE}" type="pres">
+      <dgm:prSet presAssocID="{E055B387-831E-3848-9D59-D97D5A4DB586}" presName="childTextBox" presStyleLbl="fgAccFollowNode1" presStyleIdx="2" presStyleCnt="6">
+        <dgm:presLayoutVars>
+          <dgm:bulletEnabled val="1"/>
+        </dgm:presLayoutVars>
+      </dgm:prSet>
+      <dgm:spPr/>
+    </dgm:pt>
+    <dgm:pt modelId="{53C022A8-9F5C-E241-A832-51BBDE4E9AC5}" type="pres">
+      <dgm:prSet presAssocID="{A4B99DFB-F5B2-9847-8572-20B37FB228E6}" presName="childTextBox" presStyleLbl="fgAccFollowNode1" presStyleIdx="3" presStyleCnt="6">
+        <dgm:presLayoutVars>
+          <dgm:bulletEnabled val="1"/>
+        </dgm:presLayoutVars>
+      </dgm:prSet>
+      <dgm:spPr/>
+    </dgm:pt>
+    <dgm:pt modelId="{13C6CF5D-9190-8A4A-805F-C60CCD441072}" type="pres">
+      <dgm:prSet presAssocID="{06736642-D389-E442-8048-977C37C96CA4}" presName="childTextBox" presStyleLbl="fgAccFollowNode1" presStyleIdx="4" presStyleCnt="6">
+        <dgm:presLayoutVars>
+          <dgm:bulletEnabled val="1"/>
+        </dgm:presLayoutVars>
+      </dgm:prSet>
+      <dgm:spPr/>
+    </dgm:pt>
+    <dgm:pt modelId="{DB618EB2-E828-A643-B20E-87DAF513D3C9}" type="pres">
+      <dgm:prSet presAssocID="{5D15EA2A-0935-6F44-935A-C396EB38F53F}" presName="childTextBox" presStyleLbl="fgAccFollowNode1" presStyleIdx="5" presStyleCnt="6">
+        <dgm:presLayoutVars>
+          <dgm:bulletEnabled val="1"/>
+        </dgm:presLayoutVars>
+      </dgm:prSet>
+      <dgm:spPr/>
+    </dgm:pt>
+    <dgm:pt modelId="{6A525022-025E-3D4B-A7F8-BB402E63C2A0}" type="pres">
+      <dgm:prSet presAssocID="{CF4D92F8-D3F6-FB42-8857-068866810F3A}" presName="sp" presStyleCnt="0"/>
+      <dgm:spPr/>
+    </dgm:pt>
+    <dgm:pt modelId="{49F9D1AB-1DE1-8D4C-85B3-E06EDCE2C115}" type="pres">
+      <dgm:prSet presAssocID="{478A6395-6A47-544F-AEB7-6E7CE893456F}" presName="arrowAndChildren" presStyleCnt="0"/>
+      <dgm:spPr/>
+    </dgm:pt>
+    <dgm:pt modelId="{B76009E1-EC6D-504C-AFAF-E7F56B3DA4ED}" type="pres">
+      <dgm:prSet presAssocID="{478A6395-6A47-544F-AEB7-6E7CE893456F}" presName="parentTextArrow" presStyleLbl="node1" presStyleIdx="1" presStyleCnt="4"/>
+      <dgm:spPr/>
+      <dgm:t>
+        <a:bodyPr/>
+        <a:lstStyle/>
+        <a:p>
+          <a:endParaRPr lang="en-US"/>
+        </a:p>
+      </dgm:t>
+    </dgm:pt>
+    <dgm:pt modelId="{7F246CB4-BE33-F544-9B58-19EE858199C4}" type="pres">
+      <dgm:prSet presAssocID="{DB13A231-5CEE-9349-A1E1-B66ECA7E46BE}" presName="sp" presStyleCnt="0"/>
+      <dgm:spPr/>
+    </dgm:pt>
+    <dgm:pt modelId="{F0E98DF9-79D2-1841-B6A6-E901AAE4E037}" type="pres">
+      <dgm:prSet presAssocID="{F8A4A24F-DB6E-5B44-B1DD-CCB25A758DBB}" presName="arrowAndChildren" presStyleCnt="0"/>
+      <dgm:spPr/>
+    </dgm:pt>
+    <dgm:pt modelId="{33F52601-783C-254D-98BB-475875C90FFB}" type="pres">
+      <dgm:prSet presAssocID="{F8A4A24F-DB6E-5B44-B1DD-CCB25A758DBB}" presName="parentTextArrow" presStyleLbl="node1" presStyleIdx="2" presStyleCnt="4"/>
+      <dgm:spPr/>
+    </dgm:pt>
+    <dgm:pt modelId="{C2A69908-2517-724C-BCAD-57678C63A15F}" type="pres">
+      <dgm:prSet presAssocID="{6374F230-AE60-1048-851E-B323EDECAD0C}" presName="sp" presStyleCnt="0"/>
+      <dgm:spPr/>
+    </dgm:pt>
+    <dgm:pt modelId="{7009DE9D-7820-E149-9910-44976D23264C}" type="pres">
+      <dgm:prSet presAssocID="{0054937D-F517-A54D-84E4-A8B34FE6EA86}" presName="arrowAndChildren" presStyleCnt="0"/>
+      <dgm:spPr/>
+    </dgm:pt>
+    <dgm:pt modelId="{F54DD52A-F347-0F43-A36B-6F615394613B}" type="pres">
+      <dgm:prSet presAssocID="{0054937D-F517-A54D-84E4-A8B34FE6EA86}" presName="parentTextArrow" presStyleLbl="node1" presStyleIdx="3" presStyleCnt="4"/>
+      <dgm:spPr/>
+    </dgm:pt>
+  </dgm:ptLst>
+  <dgm:cxnLst>
+    <dgm:cxn modelId="{18602924-F626-D348-8D9A-3FC8B541D98F}" srcId="{73D78044-8498-8D4D-8B17-211B2692FB4C}" destId="{F8A4A24F-DB6E-5B44-B1DD-CCB25A758DBB}" srcOrd="1" destOrd="0" parTransId="{D15865B2-8C8B-324D-A3D7-D4FCBBBDD3D1}" sibTransId="{DB13A231-5CEE-9349-A1E1-B66ECA7E46BE}"/>
+    <dgm:cxn modelId="{AF03A6A9-73BC-AC4B-9E32-573BB944127F}" srcId="{73D78044-8498-8D4D-8B17-211B2692FB4C}" destId="{0054937D-F517-A54D-84E4-A8B34FE6EA86}" srcOrd="0" destOrd="0" parTransId="{D949AB94-A8EB-6F4D-9558-03BC2D13B678}" sibTransId="{6374F230-AE60-1048-851E-B323EDECAD0C}"/>
+    <dgm:cxn modelId="{E8C8E86D-6491-6A47-9D96-A6C8CE3441F6}" type="presOf" srcId="{478A6395-6A47-544F-AEB7-6E7CE893456F}" destId="{B76009E1-EC6D-504C-AFAF-E7F56B3DA4ED}" srcOrd="0" destOrd="0" presId="urn:microsoft.com/office/officeart/2005/8/layout/process4"/>
+    <dgm:cxn modelId="{2F6F67FD-3B0A-E946-B8C9-9DC04D526B82}" srcId="{C90D4AF1-EC56-6B4B-AF2F-811730ADA0B9}" destId="{E055B387-831E-3848-9D59-D97D5A4DB586}" srcOrd="2" destOrd="0" parTransId="{CA02151E-5573-2840-837D-34B45DBABA73}" sibTransId="{1990DCAE-0BE9-424C-875A-EFB290CD1A23}"/>
+    <dgm:cxn modelId="{435B7382-992A-DF42-9AF5-F401357CDA09}" type="presOf" srcId="{06947581-C661-D648-88FD-A9ED3867A838}" destId="{F16B6330-D228-AF4E-B505-36448BACBFFC}" srcOrd="0" destOrd="0" presId="urn:microsoft.com/office/officeart/2005/8/layout/process4"/>
+    <dgm:cxn modelId="{65557599-F4DB-4F47-80A8-82A70C99CFAD}" type="presOf" srcId="{5D15EA2A-0935-6F44-935A-C396EB38F53F}" destId="{DB618EB2-E828-A643-B20E-87DAF513D3C9}" srcOrd="0" destOrd="0" presId="urn:microsoft.com/office/officeart/2005/8/layout/process4"/>
+    <dgm:cxn modelId="{6658BC5D-A652-7246-A315-66FBDE5EEBF1}" srcId="{C90D4AF1-EC56-6B4B-AF2F-811730ADA0B9}" destId="{5D15EA2A-0935-6F44-935A-C396EB38F53F}" srcOrd="5" destOrd="0" parTransId="{30491C88-7838-6C4F-9B8B-A3E7F40EF9E4}" sibTransId="{DD86F55C-B8AF-2849-B3FF-7701946229F9}"/>
+    <dgm:cxn modelId="{FB9325B7-180E-7A45-B7E7-61716B9B82B4}" type="presOf" srcId="{E3B7B8CF-ED15-5249-8832-B4AB3725601E}" destId="{36F2AFAF-F887-DD49-AD9E-328358184C3A}" srcOrd="0" destOrd="0" presId="urn:microsoft.com/office/officeart/2005/8/layout/process4"/>
+    <dgm:cxn modelId="{97415DCB-F73B-0C4D-9CC7-100C0B9A50DC}" type="presOf" srcId="{73D78044-8498-8D4D-8B17-211B2692FB4C}" destId="{201017B6-863D-4043-9541-11D435818326}" srcOrd="0" destOrd="0" presId="urn:microsoft.com/office/officeart/2005/8/layout/process4"/>
+    <dgm:cxn modelId="{34C7D0F4-81E8-3346-983D-198A22287B85}" srcId="{C90D4AF1-EC56-6B4B-AF2F-811730ADA0B9}" destId="{06736642-D389-E442-8048-977C37C96CA4}" srcOrd="4" destOrd="0" parTransId="{118090B6-11B9-BE46-BA64-2898E4C5C71C}" sibTransId="{59B4789A-33C0-8C4B-9257-0DA78E427458}"/>
+    <dgm:cxn modelId="{40DEB312-AE1E-884C-8A7D-C714BD6A079D}" type="presOf" srcId="{C90D4AF1-EC56-6B4B-AF2F-811730ADA0B9}" destId="{2239CF04-2773-1D4C-9BF0-245FE270F59D}" srcOrd="1" destOrd="0" presId="urn:microsoft.com/office/officeart/2005/8/layout/process4"/>
+    <dgm:cxn modelId="{7FE4785C-F6D0-724A-B859-1BC20B73829B}" type="presOf" srcId="{0054937D-F517-A54D-84E4-A8B34FE6EA86}" destId="{F54DD52A-F347-0F43-A36B-6F615394613B}" srcOrd="0" destOrd="0" presId="urn:microsoft.com/office/officeart/2005/8/layout/process4"/>
+    <dgm:cxn modelId="{B78D9BD9-9AE1-B64E-BBF4-28D652A3E080}" type="presOf" srcId="{06736642-D389-E442-8048-977C37C96CA4}" destId="{13C6CF5D-9190-8A4A-805F-C60CCD441072}" srcOrd="0" destOrd="0" presId="urn:microsoft.com/office/officeart/2005/8/layout/process4"/>
+    <dgm:cxn modelId="{2CB9F63B-812B-7743-BF24-6C4F0240C9C7}" srcId="{C90D4AF1-EC56-6B4B-AF2F-811730ADA0B9}" destId="{E3B7B8CF-ED15-5249-8832-B4AB3725601E}" srcOrd="1" destOrd="0" parTransId="{C2FB3B6C-E966-A142-9814-6459EFD17899}" sibTransId="{3717BD97-474C-C142-A944-846858AA2A65}"/>
+    <dgm:cxn modelId="{3FAE2372-EC4C-E642-A243-8E6A58DAC292}" srcId="{C90D4AF1-EC56-6B4B-AF2F-811730ADA0B9}" destId="{A4B99DFB-F5B2-9847-8572-20B37FB228E6}" srcOrd="3" destOrd="0" parTransId="{17BBD0C0-1904-1141-951B-F076C2601B01}" sibTransId="{51C2C5BE-7949-CE42-A80C-27FAE7912C56}"/>
+    <dgm:cxn modelId="{3A0820FB-C591-6C4D-BC27-537E6FAC13CA}" type="presOf" srcId="{C90D4AF1-EC56-6B4B-AF2F-811730ADA0B9}" destId="{51E9CDBB-E0B0-0141-9E55-20A6BFEDAFFF}" srcOrd="0" destOrd="0" presId="urn:microsoft.com/office/officeart/2005/8/layout/process4"/>
+    <dgm:cxn modelId="{50C9BC42-F630-7748-A994-864170B6AE78}" srcId="{73D78044-8498-8D4D-8B17-211B2692FB4C}" destId="{478A6395-6A47-544F-AEB7-6E7CE893456F}" srcOrd="2" destOrd="0" parTransId="{294A8962-D84F-3240-B1A7-3542F5B48485}" sibTransId="{CF4D92F8-D3F6-FB42-8857-068866810F3A}"/>
+    <dgm:cxn modelId="{35DE700F-E510-6F4D-AD93-D6CCE2D324F5}" srcId="{C90D4AF1-EC56-6B4B-AF2F-811730ADA0B9}" destId="{06947581-C661-D648-88FD-A9ED3867A838}" srcOrd="0" destOrd="0" parTransId="{45B20CC3-6983-4740-83B3-D3EF3E7B9D35}" sibTransId="{4210242D-254A-E744-A5C3-2A6141D8DFDD}"/>
+    <dgm:cxn modelId="{656EFA55-C53C-6342-9337-10000BBEE481}" type="presOf" srcId="{A4B99DFB-F5B2-9847-8572-20B37FB228E6}" destId="{53C022A8-9F5C-E241-A832-51BBDE4E9AC5}" srcOrd="0" destOrd="0" presId="urn:microsoft.com/office/officeart/2005/8/layout/process4"/>
+    <dgm:cxn modelId="{00E2713A-CDD1-5E4D-B45C-54566B520973}" srcId="{73D78044-8498-8D4D-8B17-211B2692FB4C}" destId="{C90D4AF1-EC56-6B4B-AF2F-811730ADA0B9}" srcOrd="3" destOrd="0" parTransId="{1FF2441C-04B4-2145-97E8-931B71EC4B70}" sibTransId="{A8491E77-8B56-2943-821C-BD2075856DF9}"/>
+    <dgm:cxn modelId="{A9F21847-1E21-BA4A-96AC-B440E35AE860}" type="presOf" srcId="{E055B387-831E-3848-9D59-D97D5A4DB586}" destId="{D61F5191-C96D-E140-9139-BC77A7BF53CE}" srcOrd="0" destOrd="0" presId="urn:microsoft.com/office/officeart/2005/8/layout/process4"/>
+    <dgm:cxn modelId="{3F313F11-738F-6F4B-BFC5-91EC4A92C07E}" type="presOf" srcId="{F8A4A24F-DB6E-5B44-B1DD-CCB25A758DBB}" destId="{33F52601-783C-254D-98BB-475875C90FFB}" srcOrd="0" destOrd="0" presId="urn:microsoft.com/office/officeart/2005/8/layout/process4"/>
+    <dgm:cxn modelId="{165A9F09-37D0-1942-BDA4-701E3AAAD414}" type="presParOf" srcId="{201017B6-863D-4043-9541-11D435818326}" destId="{16CFC8EF-7054-384B-91FC-7C69CCC84276}" srcOrd="0" destOrd="0" presId="urn:microsoft.com/office/officeart/2005/8/layout/process4"/>
+    <dgm:cxn modelId="{EBDC29B4-E433-9C4D-8737-95D5C70DAAFA}" type="presParOf" srcId="{16CFC8EF-7054-384B-91FC-7C69CCC84276}" destId="{51E9CDBB-E0B0-0141-9E55-20A6BFEDAFFF}" srcOrd="0" destOrd="0" presId="urn:microsoft.com/office/officeart/2005/8/layout/process4"/>
+    <dgm:cxn modelId="{3F5F38EB-1A84-8940-B50C-A72F7170E0C8}" type="presParOf" srcId="{16CFC8EF-7054-384B-91FC-7C69CCC84276}" destId="{2239CF04-2773-1D4C-9BF0-245FE270F59D}" srcOrd="1" destOrd="0" presId="urn:microsoft.com/office/officeart/2005/8/layout/process4"/>
+    <dgm:cxn modelId="{CAEDBE1E-B4F3-7046-AE35-2938B77428F5}" type="presParOf" srcId="{16CFC8EF-7054-384B-91FC-7C69CCC84276}" destId="{DA537950-05C7-7B4E-B4B2-993EE5F0B0B6}" srcOrd="2" destOrd="0" presId="urn:microsoft.com/office/officeart/2005/8/layout/process4"/>
+    <dgm:cxn modelId="{16BAC3A0-B86E-B64F-BCE3-53FEDD77478A}" type="presParOf" srcId="{DA537950-05C7-7B4E-B4B2-993EE5F0B0B6}" destId="{F16B6330-D228-AF4E-B505-36448BACBFFC}" srcOrd="0" destOrd="0" presId="urn:microsoft.com/office/officeart/2005/8/layout/process4"/>
+    <dgm:cxn modelId="{5068C0B4-17A4-0244-BB9E-DE37B43F7E3B}" type="presParOf" srcId="{DA537950-05C7-7B4E-B4B2-993EE5F0B0B6}" destId="{36F2AFAF-F887-DD49-AD9E-328358184C3A}" srcOrd="1" destOrd="0" presId="urn:microsoft.com/office/officeart/2005/8/layout/process4"/>
+    <dgm:cxn modelId="{12C28C60-FA2C-EF41-BC9F-1EA7E2B893DE}" type="presParOf" srcId="{DA537950-05C7-7B4E-B4B2-993EE5F0B0B6}" destId="{D61F5191-C96D-E140-9139-BC77A7BF53CE}" srcOrd="2" destOrd="0" presId="urn:microsoft.com/office/officeart/2005/8/layout/process4"/>
+    <dgm:cxn modelId="{0DEF9262-4957-714F-AB98-FF4C178C436A}" type="presParOf" srcId="{DA537950-05C7-7B4E-B4B2-993EE5F0B0B6}" destId="{53C022A8-9F5C-E241-A832-51BBDE4E9AC5}" srcOrd="3" destOrd="0" presId="urn:microsoft.com/office/officeart/2005/8/layout/process4"/>
+    <dgm:cxn modelId="{62189423-4D93-C541-B518-1D8163FDFC04}" type="presParOf" srcId="{DA537950-05C7-7B4E-B4B2-993EE5F0B0B6}" destId="{13C6CF5D-9190-8A4A-805F-C60CCD441072}" srcOrd="4" destOrd="0" presId="urn:microsoft.com/office/officeart/2005/8/layout/process4"/>
+    <dgm:cxn modelId="{74840DAC-A5F4-5D49-985A-E69B2571A085}" type="presParOf" srcId="{DA537950-05C7-7B4E-B4B2-993EE5F0B0B6}" destId="{DB618EB2-E828-A643-B20E-87DAF513D3C9}" srcOrd="5" destOrd="0" presId="urn:microsoft.com/office/officeart/2005/8/layout/process4"/>
+    <dgm:cxn modelId="{588B7E15-FCE5-D149-88AB-23A48CF34A26}" type="presParOf" srcId="{201017B6-863D-4043-9541-11D435818326}" destId="{6A525022-025E-3D4B-A7F8-BB402E63C2A0}" srcOrd="1" destOrd="0" presId="urn:microsoft.com/office/officeart/2005/8/layout/process4"/>
+    <dgm:cxn modelId="{4702E115-FDA1-1C4A-A69A-8FC3EE89A74E}" type="presParOf" srcId="{201017B6-863D-4043-9541-11D435818326}" destId="{49F9D1AB-1DE1-8D4C-85B3-E06EDCE2C115}" srcOrd="2" destOrd="0" presId="urn:microsoft.com/office/officeart/2005/8/layout/process4"/>
+    <dgm:cxn modelId="{46DC4EA8-06FF-B443-A309-C0D1BA0422EE}" type="presParOf" srcId="{49F9D1AB-1DE1-8D4C-85B3-E06EDCE2C115}" destId="{B76009E1-EC6D-504C-AFAF-E7F56B3DA4ED}" srcOrd="0" destOrd="0" presId="urn:microsoft.com/office/officeart/2005/8/layout/process4"/>
+    <dgm:cxn modelId="{DE225571-441B-8340-92DC-8EB7A8B4EA6B}" type="presParOf" srcId="{201017B6-863D-4043-9541-11D435818326}" destId="{7F246CB4-BE33-F544-9B58-19EE858199C4}" srcOrd="3" destOrd="0" presId="urn:microsoft.com/office/officeart/2005/8/layout/process4"/>
+    <dgm:cxn modelId="{61957ED5-0EE7-7E41-86CF-D3AD7A149A64}" type="presParOf" srcId="{201017B6-863D-4043-9541-11D435818326}" destId="{F0E98DF9-79D2-1841-B6A6-E901AAE4E037}" srcOrd="4" destOrd="0" presId="urn:microsoft.com/office/officeart/2005/8/layout/process4"/>
+    <dgm:cxn modelId="{D77F7D88-8F3A-5140-98E5-F0284B16EF38}" type="presParOf" srcId="{F0E98DF9-79D2-1841-B6A6-E901AAE4E037}" destId="{33F52601-783C-254D-98BB-475875C90FFB}" srcOrd="0" destOrd="0" presId="urn:microsoft.com/office/officeart/2005/8/layout/process4"/>
+    <dgm:cxn modelId="{53A4327C-942E-AE4F-9DB8-7A2FEB58BE8B}" type="presParOf" srcId="{201017B6-863D-4043-9541-11D435818326}" destId="{C2A69908-2517-724C-BCAD-57678C63A15F}" srcOrd="5" destOrd="0" presId="urn:microsoft.com/office/officeart/2005/8/layout/process4"/>
+    <dgm:cxn modelId="{83CFEB31-89ED-C847-9B96-85E5C9B44EF4}" type="presParOf" srcId="{201017B6-863D-4043-9541-11D435818326}" destId="{7009DE9D-7820-E149-9910-44976D23264C}" srcOrd="6" destOrd="0" presId="urn:microsoft.com/office/officeart/2005/8/layout/process4"/>
+    <dgm:cxn modelId="{B637864D-9A2B-164F-9BA2-A3ED8EBA17D4}" type="presParOf" srcId="{7009DE9D-7820-E149-9910-44976D23264C}" destId="{F54DD52A-F347-0F43-A36B-6F615394613B}" srcOrd="0" destOrd="0" presId="urn:microsoft.com/office/officeart/2005/8/layout/process4"/>
   </dgm:cxnLst>
   <dgm:bg/>
   <dgm:whole/>
@@ -2409,6 +3788,900 @@
 </dsp:drawing>
 </file>
 
+<file path=ppt/diagrams/drawing2.xml><?xml version="1.0" encoding="utf-8"?>
+<dsp:drawing xmlns:dgm="http://schemas.openxmlformats.org/drawingml/2006/diagram" xmlns:dsp="http://schemas.microsoft.com/office/drawing/2008/diagram" xmlns:a="http://schemas.openxmlformats.org/drawingml/2006/main">
+  <dsp:spTree>
+    <dsp:nvGrpSpPr>
+      <dsp:cNvPr id="0" name=""/>
+      <dsp:cNvGrpSpPr/>
+    </dsp:nvGrpSpPr>
+    <dsp:grpSpPr/>
+    <dsp:sp modelId="{2239CF04-2773-1D4C-9BF0-245FE270F59D}">
+      <dsp:nvSpPr>
+        <dsp:cNvPr id="0" name=""/>
+        <dsp:cNvSpPr/>
+      </dsp:nvSpPr>
+      <dsp:spPr>
+        <a:xfrm>
+          <a:off x="0" y="3712270"/>
+          <a:ext cx="8229600" cy="812154"/>
+        </a:xfrm>
+        <a:prstGeom prst="rect">
+          <a:avLst/>
+        </a:prstGeom>
+        <a:gradFill rotWithShape="0">
+          <a:gsLst>
+            <a:gs pos="0">
+              <a:schemeClr val="accent1">
+                <a:hueOff val="0"/>
+                <a:satOff val="0"/>
+                <a:lumOff val="0"/>
+                <a:alphaOff val="0"/>
+                <a:tint val="100000"/>
+                <a:shade val="100000"/>
+                <a:satMod val="130000"/>
+              </a:schemeClr>
+            </a:gs>
+            <a:gs pos="100000">
+              <a:schemeClr val="accent1">
+                <a:hueOff val="0"/>
+                <a:satOff val="0"/>
+                <a:lumOff val="0"/>
+                <a:alphaOff val="0"/>
+                <a:tint val="50000"/>
+                <a:shade val="100000"/>
+                <a:satMod val="350000"/>
+              </a:schemeClr>
+            </a:gs>
+          </a:gsLst>
+          <a:lin ang="16200000" scaled="0"/>
+        </a:gradFill>
+        <a:ln>
+          <a:noFill/>
+        </a:ln>
+        <a:effectLst>
+          <a:outerShdw blurRad="40000" dist="23000" dir="5400000" rotWithShape="0">
+            <a:srgbClr val="000000">
+              <a:alpha val="35000"/>
+            </a:srgbClr>
+          </a:outerShdw>
+        </a:effectLst>
+      </dsp:spPr>
+      <dsp:style>
+        <a:lnRef idx="0">
+          <a:scrgbClr r="0" g="0" b="0"/>
+        </a:lnRef>
+        <a:fillRef idx="3">
+          <a:scrgbClr r="0" g="0" b="0"/>
+        </a:fillRef>
+        <a:effectRef idx="2">
+          <a:scrgbClr r="0" g="0" b="0"/>
+        </a:effectRef>
+        <a:fontRef idx="minor">
+          <a:schemeClr val="lt1"/>
+        </a:fontRef>
+      </dsp:style>
+      <dsp:txBody>
+        <a:bodyPr spcFirstLastPara="0" vert="horz" wrap="square" lIns="142240" tIns="142240" rIns="142240" bIns="142240" numCol="1" spcCol="1270" anchor="ctr" anchorCtr="0">
+          <a:noAutofit/>
+        </a:bodyPr>
+        <a:lstStyle/>
+        <a:p>
+          <a:pPr lvl="0" algn="ctr" defTabSz="889000">
+            <a:lnSpc>
+              <a:spcPct val="90000"/>
+            </a:lnSpc>
+            <a:spcBef>
+              <a:spcPct val="0"/>
+            </a:spcBef>
+            <a:spcAft>
+              <a:spcPct val="35000"/>
+            </a:spcAft>
+          </a:pPr>
+          <a:r>
+            <a:rPr lang="en-US" sz="2000" kern="1200" dirty="0" smtClean="0"/>
+            <a:t>Cloud SDK Front-end (</a:t>
+          </a:r>
+          <a:r>
+            <a:rPr lang="en-US" sz="2000" kern="1200" dirty="0" err="1" smtClean="0"/>
+            <a:t>PBServer</a:t>
+          </a:r>
+          <a:r>
+            <a:rPr lang="en-US" sz="2000" kern="1200" dirty="0" smtClean="0"/>
+            <a:t>)</a:t>
+          </a:r>
+          <a:endParaRPr lang="en-US" sz="2000" kern="1200" dirty="0"/>
+        </a:p>
+      </dsp:txBody>
+      <dsp:txXfrm>
+        <a:off x="0" y="3712270"/>
+        <a:ext cx="8229600" cy="438563"/>
+      </dsp:txXfrm>
+    </dsp:sp>
+    <dsp:sp modelId="{F16B6330-D228-AF4E-B505-36448BACBFFC}">
+      <dsp:nvSpPr>
+        <dsp:cNvPr id="0" name=""/>
+        <dsp:cNvSpPr/>
+      </dsp:nvSpPr>
+      <dsp:spPr>
+        <a:xfrm>
+          <a:off x="4018" y="4134590"/>
+          <a:ext cx="1370260" cy="373590"/>
+        </a:xfrm>
+        <a:prstGeom prst="rect">
+          <a:avLst/>
+        </a:prstGeom>
+        <a:solidFill>
+          <a:schemeClr val="accent1">
+            <a:alpha val="90000"/>
+            <a:tint val="40000"/>
+            <a:hueOff val="0"/>
+            <a:satOff val="0"/>
+            <a:lumOff val="0"/>
+            <a:alphaOff val="0"/>
+          </a:schemeClr>
+        </a:solidFill>
+        <a:ln w="9525" cap="flat" cmpd="sng" algn="ctr">
+          <a:solidFill>
+            <a:schemeClr val="accent1">
+              <a:alpha val="90000"/>
+              <a:tint val="40000"/>
+              <a:hueOff val="0"/>
+              <a:satOff val="0"/>
+              <a:lumOff val="0"/>
+              <a:alphaOff val="0"/>
+            </a:schemeClr>
+          </a:solidFill>
+          <a:prstDash val="solid"/>
+        </a:ln>
+        <a:effectLst/>
+      </dsp:spPr>
+      <dsp:style>
+        <a:lnRef idx="1">
+          <a:scrgbClr r="0" g="0" b="0"/>
+        </a:lnRef>
+        <a:fillRef idx="1">
+          <a:scrgbClr r="0" g="0" b="0"/>
+        </a:fillRef>
+        <a:effectRef idx="0">
+          <a:scrgbClr r="0" g="0" b="0"/>
+        </a:effectRef>
+        <a:fontRef idx="minor"/>
+      </dsp:style>
+      <dsp:txBody>
+        <a:bodyPr spcFirstLastPara="0" vert="horz" wrap="square" lIns="135128" tIns="24130" rIns="135128" bIns="24130" numCol="1" spcCol="1270" anchor="ctr" anchorCtr="0">
+          <a:noAutofit/>
+        </a:bodyPr>
+        <a:lstStyle/>
+        <a:p>
+          <a:pPr lvl="0" algn="ctr" defTabSz="844550">
+            <a:lnSpc>
+              <a:spcPct val="90000"/>
+            </a:lnSpc>
+            <a:spcBef>
+              <a:spcPct val="0"/>
+            </a:spcBef>
+            <a:spcAft>
+              <a:spcPct val="35000"/>
+            </a:spcAft>
+          </a:pPr>
+          <a:r>
+            <a:rPr lang="en-US" sz="1900" kern="1200" dirty="0" err="1" smtClean="0"/>
+            <a:t>Datastore</a:t>
+          </a:r>
+          <a:endParaRPr lang="en-US" sz="1900" kern="1200" dirty="0"/>
+        </a:p>
+      </dsp:txBody>
+      <dsp:txXfrm>
+        <a:off x="4018" y="4134590"/>
+        <a:ext cx="1370260" cy="373590"/>
+      </dsp:txXfrm>
+    </dsp:sp>
+    <dsp:sp modelId="{36F2AFAF-F887-DD49-AD9E-328358184C3A}">
+      <dsp:nvSpPr>
+        <dsp:cNvPr id="0" name=""/>
+        <dsp:cNvSpPr/>
+      </dsp:nvSpPr>
+      <dsp:spPr>
+        <a:xfrm>
+          <a:off x="1374278" y="4134590"/>
+          <a:ext cx="1370260" cy="373590"/>
+        </a:xfrm>
+        <a:prstGeom prst="rect">
+          <a:avLst/>
+        </a:prstGeom>
+        <a:solidFill>
+          <a:schemeClr val="accent1">
+            <a:alpha val="90000"/>
+            <a:tint val="40000"/>
+            <a:hueOff val="0"/>
+            <a:satOff val="0"/>
+            <a:lumOff val="0"/>
+            <a:alphaOff val="0"/>
+          </a:schemeClr>
+        </a:solidFill>
+        <a:ln w="9525" cap="flat" cmpd="sng" algn="ctr">
+          <a:solidFill>
+            <a:schemeClr val="accent1">
+              <a:alpha val="90000"/>
+              <a:tint val="40000"/>
+              <a:hueOff val="0"/>
+              <a:satOff val="0"/>
+              <a:lumOff val="0"/>
+              <a:alphaOff val="0"/>
+            </a:schemeClr>
+          </a:solidFill>
+          <a:prstDash val="solid"/>
+        </a:ln>
+        <a:effectLst/>
+      </dsp:spPr>
+      <dsp:style>
+        <a:lnRef idx="1">
+          <a:scrgbClr r="0" g="0" b="0"/>
+        </a:lnRef>
+        <a:fillRef idx="1">
+          <a:scrgbClr r="0" g="0" b="0"/>
+        </a:fillRef>
+        <a:effectRef idx="0">
+          <a:scrgbClr r="0" g="0" b="0"/>
+        </a:effectRef>
+        <a:fontRef idx="minor"/>
+      </dsp:style>
+      <dsp:txBody>
+        <a:bodyPr spcFirstLastPara="0" vert="horz" wrap="square" lIns="135128" tIns="24130" rIns="135128" bIns="24130" numCol="1" spcCol="1270" anchor="ctr" anchorCtr="0">
+          <a:noAutofit/>
+        </a:bodyPr>
+        <a:lstStyle/>
+        <a:p>
+          <a:pPr lvl="0" algn="ctr" defTabSz="844550">
+            <a:lnSpc>
+              <a:spcPct val="90000"/>
+            </a:lnSpc>
+            <a:spcBef>
+              <a:spcPct val="0"/>
+            </a:spcBef>
+            <a:spcAft>
+              <a:spcPct val="35000"/>
+            </a:spcAft>
+          </a:pPr>
+          <a:r>
+            <a:rPr lang="en-US" sz="1900" kern="1200" dirty="0" err="1" smtClean="0"/>
+            <a:t>Memcache</a:t>
+          </a:r>
+          <a:endParaRPr lang="en-US" sz="1900" kern="1200" dirty="0"/>
+        </a:p>
+      </dsp:txBody>
+      <dsp:txXfrm>
+        <a:off x="1374278" y="4134590"/>
+        <a:ext cx="1370260" cy="373590"/>
+      </dsp:txXfrm>
+    </dsp:sp>
+    <dsp:sp modelId="{D61F5191-C96D-E140-9139-BC77A7BF53CE}">
+      <dsp:nvSpPr>
+        <dsp:cNvPr id="0" name=""/>
+        <dsp:cNvSpPr/>
+      </dsp:nvSpPr>
+      <dsp:spPr>
+        <a:xfrm>
+          <a:off x="2744539" y="4134590"/>
+          <a:ext cx="1370260" cy="373590"/>
+        </a:xfrm>
+        <a:prstGeom prst="rect">
+          <a:avLst/>
+        </a:prstGeom>
+        <a:solidFill>
+          <a:schemeClr val="accent1">
+            <a:alpha val="90000"/>
+            <a:tint val="40000"/>
+            <a:hueOff val="0"/>
+            <a:satOff val="0"/>
+            <a:lumOff val="0"/>
+            <a:alphaOff val="0"/>
+          </a:schemeClr>
+        </a:solidFill>
+        <a:ln w="9525" cap="flat" cmpd="sng" algn="ctr">
+          <a:solidFill>
+            <a:schemeClr val="accent1">
+              <a:alpha val="90000"/>
+              <a:tint val="40000"/>
+              <a:hueOff val="0"/>
+              <a:satOff val="0"/>
+              <a:lumOff val="0"/>
+              <a:alphaOff val="0"/>
+            </a:schemeClr>
+          </a:solidFill>
+          <a:prstDash val="solid"/>
+        </a:ln>
+        <a:effectLst/>
+      </dsp:spPr>
+      <dsp:style>
+        <a:lnRef idx="1">
+          <a:scrgbClr r="0" g="0" b="0"/>
+        </a:lnRef>
+        <a:fillRef idx="1">
+          <a:scrgbClr r="0" g="0" b="0"/>
+        </a:fillRef>
+        <a:effectRef idx="0">
+          <a:scrgbClr r="0" g="0" b="0"/>
+        </a:effectRef>
+        <a:fontRef idx="minor"/>
+      </dsp:style>
+      <dsp:txBody>
+        <a:bodyPr spcFirstLastPara="0" vert="horz" wrap="square" lIns="135128" tIns="24130" rIns="135128" bIns="24130" numCol="1" spcCol="1270" anchor="ctr" anchorCtr="0">
+          <a:noAutofit/>
+        </a:bodyPr>
+        <a:lstStyle/>
+        <a:p>
+          <a:pPr lvl="0" algn="ctr" defTabSz="844550">
+            <a:lnSpc>
+              <a:spcPct val="90000"/>
+            </a:lnSpc>
+            <a:spcBef>
+              <a:spcPct val="0"/>
+            </a:spcBef>
+            <a:spcAft>
+              <a:spcPct val="35000"/>
+            </a:spcAft>
+          </a:pPr>
+          <a:r>
+            <a:rPr lang="en-US" sz="1900" kern="1200" dirty="0" err="1" smtClean="0"/>
+            <a:t>Taskqueue</a:t>
+          </a:r>
+          <a:endParaRPr lang="en-US" sz="1900" kern="1200" dirty="0"/>
+        </a:p>
+      </dsp:txBody>
+      <dsp:txXfrm>
+        <a:off x="2744539" y="4134590"/>
+        <a:ext cx="1370260" cy="373590"/>
+      </dsp:txXfrm>
+    </dsp:sp>
+    <dsp:sp modelId="{53C022A8-9F5C-E241-A832-51BBDE4E9AC5}">
+      <dsp:nvSpPr>
+        <dsp:cNvPr id="0" name=""/>
+        <dsp:cNvSpPr/>
+      </dsp:nvSpPr>
+      <dsp:spPr>
+        <a:xfrm>
+          <a:off x="4114800" y="4134590"/>
+          <a:ext cx="1370260" cy="373590"/>
+        </a:xfrm>
+        <a:prstGeom prst="rect">
+          <a:avLst/>
+        </a:prstGeom>
+        <a:solidFill>
+          <a:schemeClr val="accent1">
+            <a:alpha val="90000"/>
+            <a:tint val="40000"/>
+            <a:hueOff val="0"/>
+            <a:satOff val="0"/>
+            <a:lumOff val="0"/>
+            <a:alphaOff val="0"/>
+          </a:schemeClr>
+        </a:solidFill>
+        <a:ln w="9525" cap="flat" cmpd="sng" algn="ctr">
+          <a:solidFill>
+            <a:schemeClr val="accent1">
+              <a:alpha val="90000"/>
+              <a:tint val="40000"/>
+              <a:hueOff val="0"/>
+              <a:satOff val="0"/>
+              <a:lumOff val="0"/>
+              <a:alphaOff val="0"/>
+            </a:schemeClr>
+          </a:solidFill>
+          <a:prstDash val="solid"/>
+        </a:ln>
+        <a:effectLst/>
+      </dsp:spPr>
+      <dsp:style>
+        <a:lnRef idx="1">
+          <a:scrgbClr r="0" g="0" b="0"/>
+        </a:lnRef>
+        <a:fillRef idx="1">
+          <a:scrgbClr r="0" g="0" b="0"/>
+        </a:fillRef>
+        <a:effectRef idx="0">
+          <a:scrgbClr r="0" g="0" b="0"/>
+        </a:effectRef>
+        <a:fontRef idx="minor"/>
+      </dsp:style>
+      <dsp:txBody>
+        <a:bodyPr spcFirstLastPara="0" vert="horz" wrap="square" lIns="135128" tIns="24130" rIns="135128" bIns="24130" numCol="1" spcCol="1270" anchor="ctr" anchorCtr="0">
+          <a:noAutofit/>
+        </a:bodyPr>
+        <a:lstStyle/>
+        <a:p>
+          <a:pPr lvl="0" algn="ctr" defTabSz="844550">
+            <a:lnSpc>
+              <a:spcPct val="90000"/>
+            </a:lnSpc>
+            <a:spcBef>
+              <a:spcPct val="0"/>
+            </a:spcBef>
+            <a:spcAft>
+              <a:spcPct val="35000"/>
+            </a:spcAft>
+          </a:pPr>
+          <a:r>
+            <a:rPr lang="en-US" sz="1900" kern="1200" dirty="0" smtClean="0"/>
+            <a:t>Users</a:t>
+          </a:r>
+          <a:endParaRPr lang="en-US" sz="1900" kern="1200" dirty="0"/>
+        </a:p>
+      </dsp:txBody>
+      <dsp:txXfrm>
+        <a:off x="4114800" y="4134590"/>
+        <a:ext cx="1370260" cy="373590"/>
+      </dsp:txXfrm>
+    </dsp:sp>
+    <dsp:sp modelId="{13C6CF5D-9190-8A4A-805F-C60CCD441072}">
+      <dsp:nvSpPr>
+        <dsp:cNvPr id="0" name=""/>
+        <dsp:cNvSpPr/>
+      </dsp:nvSpPr>
+      <dsp:spPr>
+        <a:xfrm>
+          <a:off x="5485060" y="4134590"/>
+          <a:ext cx="1370260" cy="373590"/>
+        </a:xfrm>
+        <a:prstGeom prst="rect">
+          <a:avLst/>
+        </a:prstGeom>
+        <a:solidFill>
+          <a:schemeClr val="accent1">
+            <a:alpha val="90000"/>
+            <a:tint val="40000"/>
+            <a:hueOff val="0"/>
+            <a:satOff val="0"/>
+            <a:lumOff val="0"/>
+            <a:alphaOff val="0"/>
+          </a:schemeClr>
+        </a:solidFill>
+        <a:ln w="9525" cap="flat" cmpd="sng" algn="ctr">
+          <a:solidFill>
+            <a:schemeClr val="accent1">
+              <a:alpha val="90000"/>
+              <a:tint val="40000"/>
+              <a:hueOff val="0"/>
+              <a:satOff val="0"/>
+              <a:lumOff val="0"/>
+              <a:alphaOff val="0"/>
+            </a:schemeClr>
+          </a:solidFill>
+          <a:prstDash val="solid"/>
+        </a:ln>
+        <a:effectLst/>
+      </dsp:spPr>
+      <dsp:style>
+        <a:lnRef idx="1">
+          <a:scrgbClr r="0" g="0" b="0"/>
+        </a:lnRef>
+        <a:fillRef idx="1">
+          <a:scrgbClr r="0" g="0" b="0"/>
+        </a:fillRef>
+        <a:effectRef idx="0">
+          <a:scrgbClr r="0" g="0" b="0"/>
+        </a:effectRef>
+        <a:fontRef idx="minor"/>
+      </dsp:style>
+      <dsp:txBody>
+        <a:bodyPr spcFirstLastPara="0" vert="horz" wrap="square" lIns="135128" tIns="24130" rIns="135128" bIns="24130" numCol="1" spcCol="1270" anchor="ctr" anchorCtr="0">
+          <a:noAutofit/>
+        </a:bodyPr>
+        <a:lstStyle/>
+        <a:p>
+          <a:pPr lvl="0" algn="ctr" defTabSz="844550">
+            <a:lnSpc>
+              <a:spcPct val="90000"/>
+            </a:lnSpc>
+            <a:spcBef>
+              <a:spcPct val="0"/>
+            </a:spcBef>
+            <a:spcAft>
+              <a:spcPct val="35000"/>
+            </a:spcAft>
+          </a:pPr>
+          <a:r>
+            <a:rPr lang="en-US" sz="1900" kern="1200" dirty="0" err="1" smtClean="0"/>
+            <a:t>Blobstore</a:t>
+          </a:r>
+          <a:endParaRPr lang="en-US" sz="1900" kern="1200" dirty="0"/>
+        </a:p>
+      </dsp:txBody>
+      <dsp:txXfrm>
+        <a:off x="5485060" y="4134590"/>
+        <a:ext cx="1370260" cy="373590"/>
+      </dsp:txXfrm>
+    </dsp:sp>
+    <dsp:sp modelId="{DB618EB2-E828-A643-B20E-87DAF513D3C9}">
+      <dsp:nvSpPr>
+        <dsp:cNvPr id="0" name=""/>
+        <dsp:cNvSpPr/>
+      </dsp:nvSpPr>
+      <dsp:spPr>
+        <a:xfrm>
+          <a:off x="6855321" y="4134590"/>
+          <a:ext cx="1370260" cy="373590"/>
+        </a:xfrm>
+        <a:prstGeom prst="rect">
+          <a:avLst/>
+        </a:prstGeom>
+        <a:solidFill>
+          <a:schemeClr val="accent1">
+            <a:alpha val="90000"/>
+            <a:tint val="40000"/>
+            <a:hueOff val="0"/>
+            <a:satOff val="0"/>
+            <a:lumOff val="0"/>
+            <a:alphaOff val="0"/>
+          </a:schemeClr>
+        </a:solidFill>
+        <a:ln w="9525" cap="flat" cmpd="sng" algn="ctr">
+          <a:solidFill>
+            <a:schemeClr val="accent1">
+              <a:alpha val="90000"/>
+              <a:tint val="40000"/>
+              <a:hueOff val="0"/>
+              <a:satOff val="0"/>
+              <a:lumOff val="0"/>
+              <a:alphaOff val="0"/>
+            </a:schemeClr>
+          </a:solidFill>
+          <a:prstDash val="solid"/>
+        </a:ln>
+        <a:effectLst/>
+      </dsp:spPr>
+      <dsp:style>
+        <a:lnRef idx="1">
+          <a:scrgbClr r="0" g="0" b="0"/>
+        </a:lnRef>
+        <a:fillRef idx="1">
+          <a:scrgbClr r="0" g="0" b="0"/>
+        </a:fillRef>
+        <a:effectRef idx="0">
+          <a:scrgbClr r="0" g="0" b="0"/>
+        </a:effectRef>
+        <a:fontRef idx="minor"/>
+      </dsp:style>
+      <dsp:txBody>
+        <a:bodyPr spcFirstLastPara="0" vert="horz" wrap="square" lIns="135128" tIns="24130" rIns="135128" bIns="24130" numCol="1" spcCol="1270" anchor="ctr" anchorCtr="0">
+          <a:noAutofit/>
+        </a:bodyPr>
+        <a:lstStyle/>
+        <a:p>
+          <a:pPr lvl="0" algn="ctr" defTabSz="844550">
+            <a:lnSpc>
+              <a:spcPct val="90000"/>
+            </a:lnSpc>
+            <a:spcBef>
+              <a:spcPct val="0"/>
+            </a:spcBef>
+            <a:spcAft>
+              <a:spcPct val="35000"/>
+            </a:spcAft>
+          </a:pPr>
+          <a:r>
+            <a:rPr lang="en-US" sz="1900" kern="1200" dirty="0" smtClean="0"/>
+            <a:t>Images</a:t>
+          </a:r>
+          <a:endParaRPr lang="en-US" sz="1900" kern="1200" dirty="0"/>
+        </a:p>
+      </dsp:txBody>
+      <dsp:txXfrm>
+        <a:off x="6855321" y="4134590"/>
+        <a:ext cx="1370260" cy="373590"/>
+      </dsp:txXfrm>
+    </dsp:sp>
+    <dsp:sp modelId="{B76009E1-EC6D-504C-AFAF-E7F56B3DA4ED}">
+      <dsp:nvSpPr>
+        <dsp:cNvPr id="0" name=""/>
+        <dsp:cNvSpPr/>
+      </dsp:nvSpPr>
+      <dsp:spPr>
+        <a:xfrm rot="10800000">
+          <a:off x="0" y="2475359"/>
+          <a:ext cx="8229600" cy="1249092"/>
+        </a:xfrm>
+        <a:prstGeom prst="upArrowCallout">
+          <a:avLst/>
+        </a:prstGeom>
+        <a:gradFill rotWithShape="0">
+          <a:gsLst>
+            <a:gs pos="0">
+              <a:schemeClr val="accent1">
+                <a:hueOff val="0"/>
+                <a:satOff val="0"/>
+                <a:lumOff val="0"/>
+                <a:alphaOff val="0"/>
+                <a:tint val="100000"/>
+                <a:shade val="100000"/>
+                <a:satMod val="130000"/>
+              </a:schemeClr>
+            </a:gs>
+            <a:gs pos="100000">
+              <a:schemeClr val="accent1">
+                <a:hueOff val="0"/>
+                <a:satOff val="0"/>
+                <a:lumOff val="0"/>
+                <a:alphaOff val="0"/>
+                <a:tint val="50000"/>
+                <a:shade val="100000"/>
+                <a:satMod val="350000"/>
+              </a:schemeClr>
+            </a:gs>
+          </a:gsLst>
+          <a:lin ang="16200000" scaled="0"/>
+        </a:gradFill>
+        <a:ln>
+          <a:noFill/>
+        </a:ln>
+        <a:effectLst>
+          <a:outerShdw blurRad="40000" dist="23000" dir="5400000" rotWithShape="0">
+            <a:srgbClr val="000000">
+              <a:alpha val="35000"/>
+            </a:srgbClr>
+          </a:outerShdw>
+        </a:effectLst>
+      </dsp:spPr>
+      <dsp:style>
+        <a:lnRef idx="0">
+          <a:scrgbClr r="0" g="0" b="0"/>
+        </a:lnRef>
+        <a:fillRef idx="3">
+          <a:scrgbClr r="0" g="0" b="0"/>
+        </a:fillRef>
+        <a:effectRef idx="2">
+          <a:scrgbClr r="0" g="0" b="0"/>
+        </a:effectRef>
+        <a:fontRef idx="minor">
+          <a:schemeClr val="lt1"/>
+        </a:fontRef>
+      </dsp:style>
+      <dsp:txBody>
+        <a:bodyPr spcFirstLastPara="0" vert="horz" wrap="square" lIns="142240" tIns="142240" rIns="142240" bIns="142240" numCol="1" spcCol="1270" anchor="ctr" anchorCtr="0">
+          <a:noAutofit/>
+        </a:bodyPr>
+        <a:lstStyle/>
+        <a:p>
+          <a:pPr lvl="0" algn="ctr" defTabSz="889000">
+            <a:lnSpc>
+              <a:spcPct val="90000"/>
+            </a:lnSpc>
+            <a:spcBef>
+              <a:spcPct val="0"/>
+            </a:spcBef>
+            <a:spcAft>
+              <a:spcPct val="35000"/>
+            </a:spcAft>
+          </a:pPr>
+          <a:r>
+            <a:rPr lang="en-US" sz="2000" kern="1200" dirty="0" smtClean="0"/>
+            <a:t>Application Server (GAE </a:t>
+          </a:r>
+          <a:r>
+            <a:rPr lang="en-US" sz="2000" kern="1200" dirty="0" err="1" smtClean="0"/>
+            <a:t>Dev</a:t>
+          </a:r>
+          <a:r>
+            <a:rPr lang="en-US" sz="2000" kern="1200" dirty="0" smtClean="0"/>
+            <a:t> App Server)</a:t>
+          </a:r>
+          <a:endParaRPr lang="en-US" sz="2000" kern="1200" dirty="0"/>
+        </a:p>
+      </dsp:txBody>
+      <dsp:txXfrm rot="10800000">
+        <a:off x="0" y="2475359"/>
+        <a:ext cx="8229600" cy="811623"/>
+      </dsp:txXfrm>
+    </dsp:sp>
+    <dsp:sp modelId="{33F52601-783C-254D-98BB-475875C90FFB}">
+      <dsp:nvSpPr>
+        <dsp:cNvPr id="0" name=""/>
+        <dsp:cNvSpPr/>
+      </dsp:nvSpPr>
+      <dsp:spPr>
+        <a:xfrm rot="10800000">
+          <a:off x="0" y="1238449"/>
+          <a:ext cx="8229600" cy="1249092"/>
+        </a:xfrm>
+        <a:prstGeom prst="upArrowCallout">
+          <a:avLst/>
+        </a:prstGeom>
+        <a:gradFill rotWithShape="0">
+          <a:gsLst>
+            <a:gs pos="0">
+              <a:schemeClr val="accent1">
+                <a:hueOff val="0"/>
+                <a:satOff val="0"/>
+                <a:lumOff val="0"/>
+                <a:alphaOff val="0"/>
+                <a:tint val="100000"/>
+                <a:shade val="100000"/>
+                <a:satMod val="130000"/>
+              </a:schemeClr>
+            </a:gs>
+            <a:gs pos="100000">
+              <a:schemeClr val="accent1">
+                <a:hueOff val="0"/>
+                <a:satOff val="0"/>
+                <a:lumOff val="0"/>
+                <a:alphaOff val="0"/>
+                <a:tint val="50000"/>
+                <a:shade val="100000"/>
+                <a:satMod val="350000"/>
+              </a:schemeClr>
+            </a:gs>
+          </a:gsLst>
+          <a:lin ang="16200000" scaled="0"/>
+        </a:gradFill>
+        <a:ln>
+          <a:noFill/>
+        </a:ln>
+        <a:effectLst>
+          <a:outerShdw blurRad="40000" dist="23000" dir="5400000" rotWithShape="0">
+            <a:srgbClr val="000000">
+              <a:alpha val="35000"/>
+            </a:srgbClr>
+          </a:outerShdw>
+        </a:effectLst>
+      </dsp:spPr>
+      <dsp:style>
+        <a:lnRef idx="0">
+          <a:scrgbClr r="0" g="0" b="0"/>
+        </a:lnRef>
+        <a:fillRef idx="3">
+          <a:scrgbClr r="0" g="0" b="0"/>
+        </a:fillRef>
+        <a:effectRef idx="2">
+          <a:scrgbClr r="0" g="0" b="0"/>
+        </a:effectRef>
+        <a:fontRef idx="minor">
+          <a:schemeClr val="lt1"/>
+        </a:fontRef>
+      </dsp:style>
+      <dsp:txBody>
+        <a:bodyPr spcFirstLastPara="0" vert="horz" wrap="square" lIns="142240" tIns="142240" rIns="142240" bIns="142240" numCol="1" spcCol="1270" anchor="ctr" anchorCtr="0">
+          <a:noAutofit/>
+        </a:bodyPr>
+        <a:lstStyle/>
+        <a:p>
+          <a:pPr lvl="0" algn="ctr" defTabSz="889000">
+            <a:lnSpc>
+              <a:spcPct val="90000"/>
+            </a:lnSpc>
+            <a:spcBef>
+              <a:spcPct val="0"/>
+            </a:spcBef>
+            <a:spcAft>
+              <a:spcPct val="35000"/>
+            </a:spcAft>
+          </a:pPr>
+          <a:r>
+            <a:rPr lang="en-US" sz="2000" kern="1200" dirty="0" smtClean="0"/>
+            <a:t>Load Balancer (</a:t>
+          </a:r>
+          <a:r>
+            <a:rPr lang="en-US" sz="2000" kern="1200" dirty="0" err="1" smtClean="0"/>
+            <a:t>HAProxy</a:t>
+          </a:r>
+          <a:r>
+            <a:rPr lang="en-US" sz="2000" kern="1200" dirty="0" smtClean="0"/>
+            <a:t>)</a:t>
+          </a:r>
+          <a:endParaRPr lang="en-US" sz="2000" kern="1200" dirty="0"/>
+        </a:p>
+      </dsp:txBody>
+      <dsp:txXfrm rot="10800000">
+        <a:off x="0" y="1238449"/>
+        <a:ext cx="8229600" cy="811623"/>
+      </dsp:txXfrm>
+    </dsp:sp>
+    <dsp:sp modelId="{F54DD52A-F347-0F43-A36B-6F615394613B}">
+      <dsp:nvSpPr>
+        <dsp:cNvPr id="0" name=""/>
+        <dsp:cNvSpPr/>
+      </dsp:nvSpPr>
+      <dsp:spPr>
+        <a:xfrm rot="10800000">
+          <a:off x="0" y="1538"/>
+          <a:ext cx="8229600" cy="1249092"/>
+        </a:xfrm>
+        <a:prstGeom prst="upArrowCallout">
+          <a:avLst/>
+        </a:prstGeom>
+        <a:gradFill rotWithShape="0">
+          <a:gsLst>
+            <a:gs pos="0">
+              <a:schemeClr val="accent1">
+                <a:hueOff val="0"/>
+                <a:satOff val="0"/>
+                <a:lumOff val="0"/>
+                <a:alphaOff val="0"/>
+                <a:tint val="100000"/>
+                <a:shade val="100000"/>
+                <a:satMod val="130000"/>
+              </a:schemeClr>
+            </a:gs>
+            <a:gs pos="100000">
+              <a:schemeClr val="accent1">
+                <a:hueOff val="0"/>
+                <a:satOff val="0"/>
+                <a:lumOff val="0"/>
+                <a:alphaOff val="0"/>
+                <a:tint val="50000"/>
+                <a:shade val="100000"/>
+                <a:satMod val="350000"/>
+              </a:schemeClr>
+            </a:gs>
+          </a:gsLst>
+          <a:lin ang="16200000" scaled="0"/>
+        </a:gradFill>
+        <a:ln>
+          <a:noFill/>
+        </a:ln>
+        <a:effectLst>
+          <a:outerShdw blurRad="40000" dist="23000" dir="5400000" rotWithShape="0">
+            <a:srgbClr val="000000">
+              <a:alpha val="35000"/>
+            </a:srgbClr>
+          </a:outerShdw>
+        </a:effectLst>
+      </dsp:spPr>
+      <dsp:style>
+        <a:lnRef idx="0">
+          <a:scrgbClr r="0" g="0" b="0"/>
+        </a:lnRef>
+        <a:fillRef idx="3">
+          <a:scrgbClr r="0" g="0" b="0"/>
+        </a:fillRef>
+        <a:effectRef idx="2">
+          <a:scrgbClr r="0" g="0" b="0"/>
+        </a:effectRef>
+        <a:fontRef idx="minor">
+          <a:schemeClr val="lt1"/>
+        </a:fontRef>
+      </dsp:style>
+      <dsp:txBody>
+        <a:bodyPr spcFirstLastPara="0" vert="horz" wrap="square" lIns="142240" tIns="142240" rIns="142240" bIns="142240" numCol="1" spcCol="1270" anchor="ctr" anchorCtr="0">
+          <a:noAutofit/>
+        </a:bodyPr>
+        <a:lstStyle/>
+        <a:p>
+          <a:pPr lvl="0" algn="ctr" defTabSz="889000">
+            <a:lnSpc>
+              <a:spcPct val="90000"/>
+            </a:lnSpc>
+            <a:spcBef>
+              <a:spcPct val="0"/>
+            </a:spcBef>
+            <a:spcAft>
+              <a:spcPct val="35000"/>
+            </a:spcAft>
+          </a:pPr>
+          <a:r>
+            <a:rPr lang="en-US" sz="2000" kern="1200" dirty="0" smtClean="0"/>
+            <a:t>Front-end Server (</a:t>
+          </a:r>
+          <a:r>
+            <a:rPr lang="en-US" sz="2000" kern="1200" dirty="0" err="1" smtClean="0"/>
+            <a:t>Nginx</a:t>
+          </a:r>
+          <a:r>
+            <a:rPr lang="en-US" sz="2000" kern="1200" dirty="0" smtClean="0"/>
+            <a:t>)</a:t>
+          </a:r>
+          <a:endParaRPr lang="en-US" sz="2000" kern="1200" dirty="0"/>
+        </a:p>
+      </dsp:txBody>
+      <dsp:txXfrm rot="10800000">
+        <a:off x="0" y="1538"/>
+        <a:ext cx="8229600" cy="811623"/>
+      </dsp:txXfrm>
+    </dsp:sp>
+  </dsp:spTree>
+</dsp:drawing>
+</file>
+
 <file path=ppt/diagrams/layout1.xml><?xml version="1.0" encoding="utf-8"?>
 <dgm:layoutDef xmlns:dgm="http://schemas.openxmlformats.org/drawingml/2006/diagram" xmlns:a="http://schemas.openxmlformats.org/drawingml/2006/main" uniqueId="urn:microsoft.com/office/officeart/2005/8/layout/vList5">
   <dgm:title val=""/>
@@ -2642,7 +4915,1394 @@
 </dgm:layoutDef>
 </file>
 
+<file path=ppt/diagrams/layout2.xml><?xml version="1.0" encoding="utf-8"?>
+<dgm:layoutDef xmlns:dgm="http://schemas.openxmlformats.org/drawingml/2006/diagram" xmlns:a="http://schemas.openxmlformats.org/drawingml/2006/main" uniqueId="urn:microsoft.com/office/officeart/2005/8/layout/process4">
+  <dgm:title val=""/>
+  <dgm:desc val=""/>
+  <dgm:catLst>
+    <dgm:cat type="process" pri="16000"/>
+    <dgm:cat type="list" pri="20000"/>
+  </dgm:catLst>
+  <dgm:sampData>
+    <dgm:dataModel>
+      <dgm:ptLst>
+        <dgm:pt modelId="0" type="doc"/>
+        <dgm:pt modelId="1">
+          <dgm:prSet phldr="1"/>
+        </dgm:pt>
+        <dgm:pt modelId="11">
+          <dgm:prSet phldr="1"/>
+        </dgm:pt>
+        <dgm:pt modelId="12">
+          <dgm:prSet phldr="1"/>
+        </dgm:pt>
+        <dgm:pt modelId="2">
+          <dgm:prSet phldr="1"/>
+        </dgm:pt>
+        <dgm:pt modelId="21">
+          <dgm:prSet phldr="1"/>
+        </dgm:pt>
+        <dgm:pt modelId="22">
+          <dgm:prSet phldr="1"/>
+        </dgm:pt>
+        <dgm:pt modelId="3">
+          <dgm:prSet phldr="1"/>
+        </dgm:pt>
+        <dgm:pt modelId="31">
+          <dgm:prSet phldr="1"/>
+        </dgm:pt>
+        <dgm:pt modelId="32">
+          <dgm:prSet phldr="1"/>
+        </dgm:pt>
+      </dgm:ptLst>
+      <dgm:cxnLst>
+        <dgm:cxn modelId="4" srcId="0" destId="1" srcOrd="0" destOrd="0"/>
+        <dgm:cxn modelId="5" srcId="0" destId="2" srcOrd="1" destOrd="0"/>
+        <dgm:cxn modelId="6" srcId="0" destId="3" srcOrd="2" destOrd="0"/>
+        <dgm:cxn modelId="13" srcId="1" destId="11" srcOrd="0" destOrd="0"/>
+        <dgm:cxn modelId="14" srcId="1" destId="12" srcOrd="1" destOrd="0"/>
+        <dgm:cxn modelId="23" srcId="2" destId="21" srcOrd="0" destOrd="0"/>
+        <dgm:cxn modelId="24" srcId="2" destId="22" srcOrd="1" destOrd="0"/>
+        <dgm:cxn modelId="33" srcId="3" destId="31" srcOrd="0" destOrd="0"/>
+        <dgm:cxn modelId="34" srcId="3" destId="32" srcOrd="1" destOrd="0"/>
+      </dgm:cxnLst>
+      <dgm:bg/>
+      <dgm:whole/>
+    </dgm:dataModel>
+  </dgm:sampData>
+  <dgm:styleData>
+    <dgm:dataModel>
+      <dgm:ptLst>
+        <dgm:pt modelId="0" type="doc"/>
+        <dgm:pt modelId="1"/>
+        <dgm:pt modelId="11"/>
+        <dgm:pt modelId="2"/>
+        <dgm:pt modelId="21"/>
+      </dgm:ptLst>
+      <dgm:cxnLst>
+        <dgm:cxn modelId="4" srcId="0" destId="1" srcOrd="0" destOrd="0"/>
+        <dgm:cxn modelId="5" srcId="0" destId="2" srcOrd="1" destOrd="0"/>
+        <dgm:cxn modelId="13" srcId="1" destId="11" srcOrd="0" destOrd="0"/>
+        <dgm:cxn modelId="23" srcId="2" destId="21" srcOrd="0" destOrd="0"/>
+      </dgm:cxnLst>
+      <dgm:bg/>
+      <dgm:whole/>
+    </dgm:dataModel>
+  </dgm:styleData>
+  <dgm:clrData>
+    <dgm:dataModel>
+      <dgm:ptLst>
+        <dgm:pt modelId="0" type="doc"/>
+        <dgm:pt modelId="1"/>
+        <dgm:pt modelId="11"/>
+        <dgm:pt modelId="2"/>
+        <dgm:pt modelId="21"/>
+        <dgm:pt modelId="3"/>
+        <dgm:pt modelId="31"/>
+        <dgm:pt modelId="4"/>
+        <dgm:pt modelId="41"/>
+      </dgm:ptLst>
+      <dgm:cxnLst>
+        <dgm:cxn modelId="5" srcId="0" destId="1" srcOrd="0" destOrd="0"/>
+        <dgm:cxn modelId="6" srcId="0" destId="2" srcOrd="1" destOrd="0"/>
+        <dgm:cxn modelId="7" srcId="0" destId="3" srcOrd="2" destOrd="0"/>
+        <dgm:cxn modelId="8" srcId="0" destId="4" srcOrd="3" destOrd="0"/>
+        <dgm:cxn modelId="13" srcId="1" destId="11" srcOrd="0" destOrd="0"/>
+        <dgm:cxn modelId="23" srcId="2" destId="21" srcOrd="0" destOrd="0"/>
+        <dgm:cxn modelId="33" srcId="3" destId="31" srcOrd="0" destOrd="0"/>
+        <dgm:cxn modelId="43" srcId="4" destId="41" srcOrd="0" destOrd="0"/>
+      </dgm:cxnLst>
+      <dgm:bg/>
+      <dgm:whole/>
+    </dgm:dataModel>
+  </dgm:clrData>
+  <dgm:layoutNode name="Name0">
+    <dgm:varLst>
+      <dgm:dir/>
+      <dgm:animLvl val="lvl"/>
+      <dgm:resizeHandles val="exact"/>
+    </dgm:varLst>
+    <dgm:alg type="lin">
+      <dgm:param type="linDir" val="fromB"/>
+    </dgm:alg>
+    <dgm:shape xmlns:r="http://schemas.openxmlformats.org/officeDocument/2006/relationships" r:blip="">
+      <dgm:adjLst/>
+    </dgm:shape>
+    <dgm:presOf/>
+    <dgm:constrLst>
+      <dgm:constr type="h" for="ch" forName="boxAndChildren" refType="h"/>
+      <dgm:constr type="h" for="ch" forName="arrowAndChildren" refType="h" refFor="ch" refForName="boxAndChildren" op="equ" fact="1.538"/>
+      <dgm:constr type="w" for="ch" forName="arrowAndChildren" refType="w"/>
+      <dgm:constr type="w" for="ch" forName="boxAndChildren" refType="w"/>
+      <dgm:constr type="h" for="ch" forName="sp" refType="h" fact="-0.015"/>
+      <dgm:constr type="primFontSz" for="des" forName="parentTextBox" val="65"/>
+      <dgm:constr type="primFontSz" for="des" forName="parentTextArrow" refType="primFontSz" refFor="des" refForName="parentTextBox" op="equ"/>
+      <dgm:constr type="primFontSz" for="des" forName="childTextArrow" val="65"/>
+      <dgm:constr type="primFontSz" for="des" forName="childTextBox" refType="primFontSz" refFor="des" refForName="childTextArrow" op="equ"/>
+    </dgm:constrLst>
+    <dgm:ruleLst/>
+    <dgm:forEach name="Name1" axis="ch" ptType="node" st="-1" step="-1">
+      <dgm:choose name="Name2">
+        <dgm:if name="Name3" axis="self" ptType="node" func="revPos" op="equ" val="1">
+          <dgm:layoutNode name="boxAndChildren">
+            <dgm:alg type="composite"/>
+            <dgm:shape xmlns:r="http://schemas.openxmlformats.org/officeDocument/2006/relationships" r:blip="">
+              <dgm:adjLst/>
+            </dgm:shape>
+            <dgm:presOf/>
+            <dgm:choose name="Name4">
+              <dgm:if name="Name5" axis="ch" ptType="node" func="cnt" op="gte" val="1">
+                <dgm:constrLst>
+                  <dgm:constr type="w" for="ch" forName="parentTextBox" refType="w"/>
+                  <dgm:constr type="h" for="ch" forName="parentTextBox" refType="h" fact="0.54"/>
+                  <dgm:constr type="t" for="ch" forName="parentTextBox"/>
+                  <dgm:constr type="w" for="ch" forName="entireBox" refType="w"/>
+                  <dgm:constr type="h" for="ch" forName="entireBox" refType="h"/>
+                  <dgm:constr type="w" for="ch" forName="descendantBox" refType="w"/>
+                  <dgm:constr type="b" for="ch" forName="descendantBox" refType="h" fact="0.98"/>
+                  <dgm:constr type="h" for="ch" forName="descendantBox" refType="h" fact="0.46"/>
+                </dgm:constrLst>
+              </dgm:if>
+              <dgm:else name="Name6">
+                <dgm:constrLst>
+                  <dgm:constr type="w" for="ch" forName="parentTextBox" refType="w"/>
+                  <dgm:constr type="h" for="ch" forName="parentTextBox" refType="h"/>
+                </dgm:constrLst>
+              </dgm:else>
+            </dgm:choose>
+            <dgm:ruleLst/>
+            <dgm:layoutNode name="parentTextBox">
+              <dgm:alg type="tx"/>
+              <dgm:choose name="Name7">
+                <dgm:if name="Name8" axis="ch" ptType="node" func="cnt" op="gte" val="1">
+                  <dgm:shape xmlns:r="http://schemas.openxmlformats.org/officeDocument/2006/relationships" type="rect" r:blip="" zOrderOff="1" hideGeom="1">
+                    <dgm:adjLst/>
+                  </dgm:shape>
+                </dgm:if>
+                <dgm:else name="Name9">
+                  <dgm:shape xmlns:r="http://schemas.openxmlformats.org/officeDocument/2006/relationships" type="rect" r:blip="">
+                    <dgm:adjLst/>
+                  </dgm:shape>
+                </dgm:else>
+              </dgm:choose>
+              <dgm:presOf axis="self"/>
+              <dgm:constrLst/>
+              <dgm:ruleLst>
+                <dgm:rule type="primFontSz" val="5" fact="NaN" max="NaN"/>
+              </dgm:ruleLst>
+            </dgm:layoutNode>
+            <dgm:choose name="Name10">
+              <dgm:if name="Name11" axis="ch" ptType="node" func="cnt" op="gte" val="1">
+                <dgm:layoutNode name="entireBox">
+                  <dgm:alg type="sp"/>
+                  <dgm:shape xmlns:r="http://schemas.openxmlformats.org/officeDocument/2006/relationships" type="rect" r:blip="">
+                    <dgm:adjLst/>
+                  </dgm:shape>
+                  <dgm:presOf axis="self"/>
+                  <dgm:constrLst/>
+                  <dgm:ruleLst/>
+                </dgm:layoutNode>
+                <dgm:layoutNode name="descendantBox" styleLbl="fgAccFollowNode1">
+                  <dgm:choose name="Name12">
+                    <dgm:if name="Name13" func="var" arg="dir" op="equ" val="norm">
+                      <dgm:alg type="lin"/>
+                    </dgm:if>
+                    <dgm:else name="Name14">
+                      <dgm:alg type="lin">
+                        <dgm:param type="linDir" val="fromR"/>
+                      </dgm:alg>
+                    </dgm:else>
+                  </dgm:choose>
+                  <dgm:shape xmlns:r="http://schemas.openxmlformats.org/officeDocument/2006/relationships" r:blip="">
+                    <dgm:adjLst/>
+                  </dgm:shape>
+                  <dgm:presOf/>
+                  <dgm:constrLst>
+                    <dgm:constr type="w" for="ch" forName="childTextBox" refType="w"/>
+                    <dgm:constr type="h" for="ch" forName="childTextBox" refType="h"/>
+                  </dgm:constrLst>
+                  <dgm:ruleLst/>
+                  <dgm:forEach name="Name15" axis="ch" ptType="node">
+                    <dgm:layoutNode name="childTextBox" styleLbl="fgAccFollowNode1">
+                      <dgm:varLst>
+                        <dgm:bulletEnabled val="1"/>
+                      </dgm:varLst>
+                      <dgm:alg type="tx"/>
+                      <dgm:shape xmlns:r="http://schemas.openxmlformats.org/officeDocument/2006/relationships" type="rect" r:blip="">
+                        <dgm:adjLst/>
+                      </dgm:shape>
+                      <dgm:presOf axis="desOrSelf" ptType="node"/>
+                      <dgm:constrLst>
+                        <dgm:constr type="tMarg" refType="primFontSz" fact="0.1"/>
+                        <dgm:constr type="bMarg" refType="primFontSz" fact="0.1"/>
+                      </dgm:constrLst>
+                      <dgm:ruleLst>
+                        <dgm:rule type="primFontSz" val="5" fact="NaN" max="NaN"/>
+                      </dgm:ruleLst>
+                    </dgm:layoutNode>
+                  </dgm:forEach>
+                </dgm:layoutNode>
+              </dgm:if>
+              <dgm:else name="Name16"/>
+            </dgm:choose>
+          </dgm:layoutNode>
+        </dgm:if>
+        <dgm:else name="Name17">
+          <dgm:layoutNode name="arrowAndChildren">
+            <dgm:alg type="composite"/>
+            <dgm:shape xmlns:r="http://schemas.openxmlformats.org/officeDocument/2006/relationships" r:blip="">
+              <dgm:adjLst/>
+            </dgm:shape>
+            <dgm:presOf/>
+            <dgm:choose name="Name18">
+              <dgm:if name="Name19" axis="ch" ptType="node" func="cnt" op="gte" val="1">
+                <dgm:constrLst>
+                  <dgm:constr type="w" for="ch" forName="parentTextArrow" refType="w"/>
+                  <dgm:constr type="t" for="ch" forName="parentTextArrow"/>
+                  <dgm:constr type="h" for="ch" forName="parentTextArrow" refType="h" fact="0.351"/>
+                  <dgm:constr type="w" for="ch" forName="arrow" refType="w"/>
+                  <dgm:constr type="h" for="ch" forName="arrow" refType="h"/>
+                  <dgm:constr type="w" for="ch" forName="descendantArrow" refType="w"/>
+                  <dgm:constr type="b" for="ch" forName="descendantArrow" refType="h" fact="0.65"/>
+                  <dgm:constr type="h" for="ch" forName="descendantArrow" refType="h" fact="0.299"/>
+                </dgm:constrLst>
+              </dgm:if>
+              <dgm:else name="Name20">
+                <dgm:constrLst>
+                  <dgm:constr type="w" for="ch" forName="parentTextArrow" refType="w"/>
+                  <dgm:constr type="h" for="ch" forName="parentTextArrow" refType="h"/>
+                </dgm:constrLst>
+              </dgm:else>
+            </dgm:choose>
+            <dgm:ruleLst/>
+            <dgm:layoutNode name="parentTextArrow">
+              <dgm:alg type="tx"/>
+              <dgm:choose name="Name21">
+                <dgm:if name="Name22" axis="ch" ptType="node" func="cnt" op="gte" val="1">
+                  <dgm:shape xmlns:r="http://schemas.openxmlformats.org/officeDocument/2006/relationships" type="rect" r:blip="" zOrderOff="1" hideGeom="1">
+                    <dgm:adjLst/>
+                  </dgm:shape>
+                </dgm:if>
+                <dgm:else name="Name23">
+                  <dgm:shape xmlns:r="http://schemas.openxmlformats.org/officeDocument/2006/relationships" rot="180" type="upArrowCallout" r:blip="">
+                    <dgm:adjLst/>
+                  </dgm:shape>
+                </dgm:else>
+              </dgm:choose>
+              <dgm:presOf axis="self"/>
+              <dgm:constrLst/>
+              <dgm:ruleLst>
+                <dgm:rule type="primFontSz" val="5" fact="NaN" max="NaN"/>
+              </dgm:ruleLst>
+            </dgm:layoutNode>
+            <dgm:choose name="Name24">
+              <dgm:if name="Name25" axis="ch" ptType="node" func="cnt" op="gte" val="1">
+                <dgm:layoutNode name="arrow">
+                  <dgm:alg type="sp"/>
+                  <dgm:shape xmlns:r="http://schemas.openxmlformats.org/officeDocument/2006/relationships" rot="180" type="upArrowCallout" r:blip="">
+                    <dgm:adjLst/>
+                  </dgm:shape>
+                  <dgm:presOf axis="self"/>
+                  <dgm:constrLst/>
+                  <dgm:ruleLst/>
+                </dgm:layoutNode>
+                <dgm:layoutNode name="descendantArrow">
+                  <dgm:choose name="Name26">
+                    <dgm:if name="Name27" func="var" arg="dir" op="equ" val="norm">
+                      <dgm:alg type="lin"/>
+                    </dgm:if>
+                    <dgm:else name="Name28">
+                      <dgm:alg type="lin">
+                        <dgm:param type="linDir" val="fromR"/>
+                      </dgm:alg>
+                    </dgm:else>
+                  </dgm:choose>
+                  <dgm:shape xmlns:r="http://schemas.openxmlformats.org/officeDocument/2006/relationships" r:blip="">
+                    <dgm:adjLst/>
+                  </dgm:shape>
+                  <dgm:presOf/>
+                  <dgm:constrLst>
+                    <dgm:constr type="w" for="ch" forName="childTextArrow" refType="w"/>
+                    <dgm:constr type="h" for="ch" forName="childTextArrow" refType="h"/>
+                  </dgm:constrLst>
+                  <dgm:ruleLst/>
+                  <dgm:forEach name="Name29" axis="ch" ptType="node">
+                    <dgm:layoutNode name="childTextArrow" styleLbl="fgAccFollowNode1">
+                      <dgm:varLst>
+                        <dgm:bulletEnabled val="1"/>
+                      </dgm:varLst>
+                      <dgm:alg type="tx"/>
+                      <dgm:shape xmlns:r="http://schemas.openxmlformats.org/officeDocument/2006/relationships" type="rect" r:blip="">
+                        <dgm:adjLst/>
+                      </dgm:shape>
+                      <dgm:presOf axis="desOrSelf" ptType="node"/>
+                      <dgm:constrLst>
+                        <dgm:constr type="tMarg" refType="primFontSz" fact="0.1"/>
+                        <dgm:constr type="bMarg" refType="primFontSz" fact="0.1"/>
+                      </dgm:constrLst>
+                      <dgm:ruleLst>
+                        <dgm:rule type="primFontSz" val="5" fact="NaN" max="NaN"/>
+                      </dgm:ruleLst>
+                    </dgm:layoutNode>
+                  </dgm:forEach>
+                </dgm:layoutNode>
+              </dgm:if>
+              <dgm:else name="Name30"/>
+            </dgm:choose>
+          </dgm:layoutNode>
+        </dgm:else>
+      </dgm:choose>
+      <dgm:forEach name="Name31" axis="precedSib" ptType="sibTrans" st="-1" cnt="1">
+        <dgm:layoutNode name="sp">
+          <dgm:alg type="sp"/>
+          <dgm:shape xmlns:r="http://schemas.openxmlformats.org/officeDocument/2006/relationships" r:blip="">
+            <dgm:adjLst/>
+          </dgm:shape>
+          <dgm:presOf axis="self"/>
+          <dgm:constrLst/>
+          <dgm:ruleLst/>
+        </dgm:layoutNode>
+      </dgm:forEach>
+    </dgm:forEach>
+  </dgm:layoutNode>
+</dgm:layoutDef>
+</file>
+
 <file path=ppt/diagrams/quickStyle1.xml><?xml version="1.0" encoding="utf-8"?>
+<dgm:styleDef xmlns:dgm="http://schemas.openxmlformats.org/drawingml/2006/diagram" xmlns:a="http://schemas.openxmlformats.org/drawingml/2006/main" uniqueId="urn:microsoft.com/office/officeart/2005/8/quickstyle/simple4">
+  <dgm:title val=""/>
+  <dgm:desc val=""/>
+  <dgm:catLst>
+    <dgm:cat type="simple" pri="10400"/>
+  </dgm:catLst>
+  <dgm:scene3d>
+    <a:camera prst="orthographicFront"/>
+    <a:lightRig rig="threePt" dir="t"/>
+  </dgm:scene3d>
+  <dgm:styleLbl name="node0">
+    <dgm:scene3d>
+      <a:camera prst="orthographicFront"/>
+      <a:lightRig rig="threePt" dir="t"/>
+    </dgm:scene3d>
+    <dgm:sp3d/>
+    <dgm:txPr/>
+    <dgm:style>
+      <a:lnRef idx="0">
+        <a:scrgbClr r="0" g="0" b="0"/>
+      </a:lnRef>
+      <a:fillRef idx="3">
+        <a:scrgbClr r="0" g="0" b="0"/>
+      </a:fillRef>
+      <a:effectRef idx="2">
+        <a:scrgbClr r="0" g="0" b="0"/>
+      </a:effectRef>
+      <a:fontRef idx="minor">
+        <a:schemeClr val="lt1"/>
+      </a:fontRef>
+    </dgm:style>
+  </dgm:styleLbl>
+  <dgm:styleLbl name="lnNode1">
+    <dgm:scene3d>
+      <a:camera prst="orthographicFront"/>
+      <a:lightRig rig="threePt" dir="t"/>
+    </dgm:scene3d>
+    <dgm:sp3d/>
+    <dgm:txPr/>
+    <dgm:style>
+      <a:lnRef idx="1">
+        <a:scrgbClr r="0" g="0" b="0"/>
+      </a:lnRef>
+      <a:fillRef idx="3">
+        <a:scrgbClr r="0" g="0" b="0"/>
+      </a:fillRef>
+      <a:effectRef idx="2">
+        <a:scrgbClr r="0" g="0" b="0"/>
+      </a:effectRef>
+      <a:fontRef idx="minor">
+        <a:schemeClr val="lt1"/>
+      </a:fontRef>
+    </dgm:style>
+  </dgm:styleLbl>
+  <dgm:styleLbl name="vennNode1">
+    <dgm:scene3d>
+      <a:camera prst="orthographicFront"/>
+      <a:lightRig rig="threePt" dir="t"/>
+    </dgm:scene3d>
+    <dgm:sp3d/>
+    <dgm:txPr/>
+    <dgm:style>
+      <a:lnRef idx="0">
+        <a:scrgbClr r="0" g="0" b="0"/>
+      </a:lnRef>
+      <a:fillRef idx="3">
+        <a:scrgbClr r="0" g="0" b="0"/>
+      </a:fillRef>
+      <a:effectRef idx="0">
+        <a:scrgbClr r="0" g="0" b="0"/>
+      </a:effectRef>
+      <a:fontRef idx="minor">
+        <a:schemeClr val="tx1"/>
+      </a:fontRef>
+    </dgm:style>
+  </dgm:styleLbl>
+  <dgm:styleLbl name="alignNode1">
+    <dgm:scene3d>
+      <a:camera prst="orthographicFront"/>
+      <a:lightRig rig="threePt" dir="t"/>
+    </dgm:scene3d>
+    <dgm:sp3d/>
+    <dgm:txPr/>
+    <dgm:style>
+      <a:lnRef idx="1">
+        <a:scrgbClr r="0" g="0" b="0"/>
+      </a:lnRef>
+      <a:fillRef idx="3">
+        <a:scrgbClr r="0" g="0" b="0"/>
+      </a:fillRef>
+      <a:effectRef idx="2">
+        <a:scrgbClr r="0" g="0" b="0"/>
+      </a:effectRef>
+      <a:fontRef idx="minor">
+        <a:schemeClr val="lt1"/>
+      </a:fontRef>
+    </dgm:style>
+  </dgm:styleLbl>
+  <dgm:styleLbl name="node1">
+    <dgm:scene3d>
+      <a:camera prst="orthographicFront"/>
+      <a:lightRig rig="threePt" dir="t"/>
+    </dgm:scene3d>
+    <dgm:sp3d/>
+    <dgm:txPr/>
+    <dgm:style>
+      <a:lnRef idx="0">
+        <a:scrgbClr r="0" g="0" b="0"/>
+      </a:lnRef>
+      <a:fillRef idx="3">
+        <a:scrgbClr r="0" g="0" b="0"/>
+      </a:fillRef>
+      <a:effectRef idx="2">
+        <a:scrgbClr r="0" g="0" b="0"/>
+      </a:effectRef>
+      <a:fontRef idx="minor">
+        <a:schemeClr val="lt1"/>
+      </a:fontRef>
+    </dgm:style>
+  </dgm:styleLbl>
+  <dgm:styleLbl name="node2">
+    <dgm:scene3d>
+      <a:camera prst="orthographicFront"/>
+      <a:lightRig rig="threePt" dir="t"/>
+    </dgm:scene3d>
+    <dgm:sp3d/>
+    <dgm:txPr/>
+    <dgm:style>
+      <a:lnRef idx="0">
+        <a:scrgbClr r="0" g="0" b="0"/>
+      </a:lnRef>
+      <a:fillRef idx="3">
+        <a:scrgbClr r="0" g="0" b="0"/>
+      </a:fillRef>
+      <a:effectRef idx="2">
+        <a:scrgbClr r="0" g="0" b="0"/>
+      </a:effectRef>
+      <a:fontRef idx="minor">
+        <a:schemeClr val="lt1"/>
+      </a:fontRef>
+    </dgm:style>
+  </dgm:styleLbl>
+  <dgm:styleLbl name="node3">
+    <dgm:scene3d>
+      <a:camera prst="orthographicFront"/>
+      <a:lightRig rig="threePt" dir="t"/>
+    </dgm:scene3d>
+    <dgm:sp3d/>
+    <dgm:txPr/>
+    <dgm:style>
+      <a:lnRef idx="0">
+        <a:scrgbClr r="0" g="0" b="0"/>
+      </a:lnRef>
+      <a:fillRef idx="3">
+        <a:scrgbClr r="0" g="0" b="0"/>
+      </a:fillRef>
+      <a:effectRef idx="2">
+        <a:scrgbClr r="0" g="0" b="0"/>
+      </a:effectRef>
+      <a:fontRef idx="minor">
+        <a:schemeClr val="lt1"/>
+      </a:fontRef>
+    </dgm:style>
+  </dgm:styleLbl>
+  <dgm:styleLbl name="node4">
+    <dgm:scene3d>
+      <a:camera prst="orthographicFront"/>
+      <a:lightRig rig="threePt" dir="t"/>
+    </dgm:scene3d>
+    <dgm:sp3d/>
+    <dgm:txPr/>
+    <dgm:style>
+      <a:lnRef idx="0">
+        <a:scrgbClr r="0" g="0" b="0"/>
+      </a:lnRef>
+      <a:fillRef idx="3">
+        <a:scrgbClr r="0" g="0" b="0"/>
+      </a:fillRef>
+      <a:effectRef idx="2">
+        <a:scrgbClr r="0" g="0" b="0"/>
+      </a:effectRef>
+      <a:fontRef idx="minor">
+        <a:schemeClr val="lt1"/>
+      </a:fontRef>
+    </dgm:style>
+  </dgm:styleLbl>
+  <dgm:styleLbl name="fgImgPlace1">
+    <dgm:scene3d>
+      <a:camera prst="orthographicFront"/>
+      <a:lightRig rig="threePt" dir="t"/>
+    </dgm:scene3d>
+    <dgm:sp3d/>
+    <dgm:txPr/>
+    <dgm:style>
+      <a:lnRef idx="0">
+        <a:scrgbClr r="0" g="0" b="0"/>
+      </a:lnRef>
+      <a:fillRef idx="1">
+        <a:scrgbClr r="0" g="0" b="0"/>
+      </a:fillRef>
+      <a:effectRef idx="2">
+        <a:scrgbClr r="0" g="0" b="0"/>
+      </a:effectRef>
+      <a:fontRef idx="minor"/>
+    </dgm:style>
+  </dgm:styleLbl>
+  <dgm:styleLbl name="alignImgPlace1">
+    <dgm:scene3d>
+      <a:camera prst="orthographicFront"/>
+      <a:lightRig rig="threePt" dir="t"/>
+    </dgm:scene3d>
+    <dgm:sp3d/>
+    <dgm:txPr/>
+    <dgm:style>
+      <a:lnRef idx="0">
+        <a:scrgbClr r="0" g="0" b="0"/>
+      </a:lnRef>
+      <a:fillRef idx="1">
+        <a:scrgbClr r="0" g="0" b="0"/>
+      </a:fillRef>
+      <a:effectRef idx="2">
+        <a:scrgbClr r="0" g="0" b="0"/>
+      </a:effectRef>
+      <a:fontRef idx="minor"/>
+    </dgm:style>
+  </dgm:styleLbl>
+  <dgm:styleLbl name="bgImgPlace1">
+    <dgm:scene3d>
+      <a:camera prst="orthographicFront"/>
+      <a:lightRig rig="threePt" dir="t"/>
+    </dgm:scene3d>
+    <dgm:sp3d/>
+    <dgm:txPr/>
+    <dgm:style>
+      <a:lnRef idx="0">
+        <a:scrgbClr r="0" g="0" b="0"/>
+      </a:lnRef>
+      <a:fillRef idx="1">
+        <a:scrgbClr r="0" g="0" b="0"/>
+      </a:fillRef>
+      <a:effectRef idx="2">
+        <a:scrgbClr r="0" g="0" b="0"/>
+      </a:effectRef>
+      <a:fontRef idx="minor"/>
+    </dgm:style>
+  </dgm:styleLbl>
+  <dgm:styleLbl name="sibTrans2D1">
+    <dgm:scene3d>
+      <a:camera prst="orthographicFront"/>
+      <a:lightRig rig="threePt" dir="t"/>
+    </dgm:scene3d>
+    <dgm:sp3d/>
+    <dgm:txPr/>
+    <dgm:style>
+      <a:lnRef idx="0">
+        <a:scrgbClr r="0" g="0" b="0"/>
+      </a:lnRef>
+      <a:fillRef idx="3">
+        <a:scrgbClr r="0" g="0" b="0"/>
+      </a:fillRef>
+      <a:effectRef idx="2">
+        <a:scrgbClr r="0" g="0" b="0"/>
+      </a:effectRef>
+      <a:fontRef idx="minor">
+        <a:schemeClr val="lt1"/>
+      </a:fontRef>
+    </dgm:style>
+  </dgm:styleLbl>
+  <dgm:styleLbl name="fgSibTrans2D1">
+    <dgm:scene3d>
+      <a:camera prst="orthographicFront"/>
+      <a:lightRig rig="threePt" dir="t"/>
+    </dgm:scene3d>
+    <dgm:sp3d/>
+    <dgm:txPr/>
+    <dgm:style>
+      <a:lnRef idx="0">
+        <a:scrgbClr r="0" g="0" b="0"/>
+      </a:lnRef>
+      <a:fillRef idx="3">
+        <a:scrgbClr r="0" g="0" b="0"/>
+      </a:fillRef>
+      <a:effectRef idx="2">
+        <a:scrgbClr r="0" g="0" b="0"/>
+      </a:effectRef>
+      <a:fontRef idx="minor">
+        <a:schemeClr val="lt1"/>
+      </a:fontRef>
+    </dgm:style>
+  </dgm:styleLbl>
+  <dgm:styleLbl name="bgSibTrans2D1">
+    <dgm:scene3d>
+      <a:camera prst="orthographicFront"/>
+      <a:lightRig rig="threePt" dir="t"/>
+    </dgm:scene3d>
+    <dgm:sp3d/>
+    <dgm:txPr/>
+    <dgm:style>
+      <a:lnRef idx="0">
+        <a:scrgbClr r="0" g="0" b="0"/>
+      </a:lnRef>
+      <a:fillRef idx="3">
+        <a:scrgbClr r="0" g="0" b="0"/>
+      </a:fillRef>
+      <a:effectRef idx="2">
+        <a:scrgbClr r="0" g="0" b="0"/>
+      </a:effectRef>
+      <a:fontRef idx="minor">
+        <a:schemeClr val="lt1"/>
+      </a:fontRef>
+    </dgm:style>
+  </dgm:styleLbl>
+  <dgm:styleLbl name="sibTrans1D1">
+    <dgm:scene3d>
+      <a:camera prst="orthographicFront"/>
+      <a:lightRig rig="threePt" dir="t"/>
+    </dgm:scene3d>
+    <dgm:sp3d/>
+    <dgm:txPr/>
+    <dgm:style>
+      <a:lnRef idx="1">
+        <a:scrgbClr r="0" g="0" b="0"/>
+      </a:lnRef>
+      <a:fillRef idx="0">
+        <a:scrgbClr r="0" g="0" b="0"/>
+      </a:fillRef>
+      <a:effectRef idx="0">
+        <a:scrgbClr r="0" g="0" b="0"/>
+      </a:effectRef>
+      <a:fontRef idx="minor"/>
+    </dgm:style>
+  </dgm:styleLbl>
+  <dgm:styleLbl name="callout">
+    <dgm:scene3d>
+      <a:camera prst="orthographicFront"/>
+      <a:lightRig rig="threePt" dir="t"/>
+    </dgm:scene3d>
+    <dgm:sp3d/>
+    <dgm:txPr/>
+    <dgm:style>
+      <a:lnRef idx="2">
+        <a:scrgbClr r="0" g="0" b="0"/>
+      </a:lnRef>
+      <a:fillRef idx="1">
+        <a:scrgbClr r="0" g="0" b="0"/>
+      </a:fillRef>
+      <a:effectRef idx="1">
+        <a:scrgbClr r="0" g="0" b="0"/>
+      </a:effectRef>
+      <a:fontRef idx="minor"/>
+    </dgm:style>
+  </dgm:styleLbl>
+  <dgm:styleLbl name="asst0">
+    <dgm:scene3d>
+      <a:camera prst="orthographicFront"/>
+      <a:lightRig rig="threePt" dir="t"/>
+    </dgm:scene3d>
+    <dgm:sp3d/>
+    <dgm:txPr/>
+    <dgm:style>
+      <a:lnRef idx="0">
+        <a:scrgbClr r="0" g="0" b="0"/>
+      </a:lnRef>
+      <a:fillRef idx="3">
+        <a:scrgbClr r="0" g="0" b="0"/>
+      </a:fillRef>
+      <a:effectRef idx="2">
+        <a:scrgbClr r="0" g="0" b="0"/>
+      </a:effectRef>
+      <a:fontRef idx="minor">
+        <a:schemeClr val="lt1"/>
+      </a:fontRef>
+    </dgm:style>
+  </dgm:styleLbl>
+  <dgm:styleLbl name="asst1">
+    <dgm:scene3d>
+      <a:camera prst="orthographicFront"/>
+      <a:lightRig rig="threePt" dir="t"/>
+    </dgm:scene3d>
+    <dgm:sp3d/>
+    <dgm:txPr/>
+    <dgm:style>
+      <a:lnRef idx="0">
+        <a:scrgbClr r="0" g="0" b="0"/>
+      </a:lnRef>
+      <a:fillRef idx="3">
+        <a:scrgbClr r="0" g="0" b="0"/>
+      </a:fillRef>
+      <a:effectRef idx="2">
+        <a:scrgbClr r="0" g="0" b="0"/>
+      </a:effectRef>
+      <a:fontRef idx="minor">
+        <a:schemeClr val="lt1"/>
+      </a:fontRef>
+    </dgm:style>
+  </dgm:styleLbl>
+  <dgm:styleLbl name="asst2">
+    <dgm:scene3d>
+      <a:camera prst="orthographicFront"/>
+      <a:lightRig rig="threePt" dir="t"/>
+    </dgm:scene3d>
+    <dgm:sp3d/>
+    <dgm:txPr/>
+    <dgm:style>
+      <a:lnRef idx="0">
+        <a:scrgbClr r="0" g="0" b="0"/>
+      </a:lnRef>
+      <a:fillRef idx="3">
+        <a:scrgbClr r="0" g="0" b="0"/>
+      </a:fillRef>
+      <a:effectRef idx="2">
+        <a:scrgbClr r="0" g="0" b="0"/>
+      </a:effectRef>
+      <a:fontRef idx="minor">
+        <a:schemeClr val="lt1"/>
+      </a:fontRef>
+    </dgm:style>
+  </dgm:styleLbl>
+  <dgm:styleLbl name="asst3">
+    <dgm:scene3d>
+      <a:camera prst="orthographicFront"/>
+      <a:lightRig rig="threePt" dir="t"/>
+    </dgm:scene3d>
+    <dgm:sp3d/>
+    <dgm:txPr/>
+    <dgm:style>
+      <a:lnRef idx="0">
+        <a:scrgbClr r="0" g="0" b="0"/>
+      </a:lnRef>
+      <a:fillRef idx="3">
+        <a:scrgbClr r="0" g="0" b="0"/>
+      </a:fillRef>
+      <a:effectRef idx="2">
+        <a:scrgbClr r="0" g="0" b="0"/>
+      </a:effectRef>
+      <a:fontRef idx="minor">
+        <a:schemeClr val="lt1"/>
+      </a:fontRef>
+    </dgm:style>
+  </dgm:styleLbl>
+  <dgm:styleLbl name="asst4">
+    <dgm:scene3d>
+      <a:camera prst="orthographicFront"/>
+      <a:lightRig rig="threePt" dir="t"/>
+    </dgm:scene3d>
+    <dgm:sp3d/>
+    <dgm:txPr/>
+    <dgm:style>
+      <a:lnRef idx="0">
+        <a:scrgbClr r="0" g="0" b="0"/>
+      </a:lnRef>
+      <a:fillRef idx="3">
+        <a:scrgbClr r="0" g="0" b="0"/>
+      </a:fillRef>
+      <a:effectRef idx="2">
+        <a:scrgbClr r="0" g="0" b="0"/>
+      </a:effectRef>
+      <a:fontRef idx="minor">
+        <a:schemeClr val="lt1"/>
+      </a:fontRef>
+    </dgm:style>
+  </dgm:styleLbl>
+  <dgm:styleLbl name="parChTrans2D1">
+    <dgm:scene3d>
+      <a:camera prst="orthographicFront"/>
+      <a:lightRig rig="threePt" dir="t"/>
+    </dgm:scene3d>
+    <dgm:sp3d/>
+    <dgm:txPr/>
+    <dgm:style>
+      <a:lnRef idx="0">
+        <a:scrgbClr r="0" g="0" b="0"/>
+      </a:lnRef>
+      <a:fillRef idx="3">
+        <a:scrgbClr r="0" g="0" b="0"/>
+      </a:fillRef>
+      <a:effectRef idx="2">
+        <a:scrgbClr r="0" g="0" b="0"/>
+      </a:effectRef>
+      <a:fontRef idx="minor">
+        <a:schemeClr val="lt1"/>
+      </a:fontRef>
+    </dgm:style>
+  </dgm:styleLbl>
+  <dgm:styleLbl name="parChTrans2D2">
+    <dgm:scene3d>
+      <a:camera prst="orthographicFront"/>
+      <a:lightRig rig="threePt" dir="t"/>
+    </dgm:scene3d>
+    <dgm:sp3d/>
+    <dgm:txPr/>
+    <dgm:style>
+      <a:lnRef idx="0">
+        <a:scrgbClr r="0" g="0" b="0"/>
+      </a:lnRef>
+      <a:fillRef idx="3">
+        <a:scrgbClr r="0" g="0" b="0"/>
+      </a:fillRef>
+      <a:effectRef idx="2">
+        <a:scrgbClr r="0" g="0" b="0"/>
+      </a:effectRef>
+      <a:fontRef idx="minor">
+        <a:schemeClr val="lt1"/>
+      </a:fontRef>
+    </dgm:style>
+  </dgm:styleLbl>
+  <dgm:styleLbl name="parChTrans2D3">
+    <dgm:scene3d>
+      <a:camera prst="orthographicFront"/>
+      <a:lightRig rig="threePt" dir="t"/>
+    </dgm:scene3d>
+    <dgm:sp3d/>
+    <dgm:txPr/>
+    <dgm:style>
+      <a:lnRef idx="1">
+        <a:scrgbClr r="0" g="0" b="0"/>
+      </a:lnRef>
+      <a:fillRef idx="3">
+        <a:scrgbClr r="0" g="0" b="0"/>
+      </a:fillRef>
+      <a:effectRef idx="2">
+        <a:scrgbClr r="0" g="0" b="0"/>
+      </a:effectRef>
+      <a:fontRef idx="minor">
+        <a:schemeClr val="lt1"/>
+      </a:fontRef>
+    </dgm:style>
+  </dgm:styleLbl>
+  <dgm:styleLbl name="parChTrans2D4">
+    <dgm:scene3d>
+      <a:camera prst="orthographicFront"/>
+      <a:lightRig rig="threePt" dir="t"/>
+    </dgm:scene3d>
+    <dgm:sp3d/>
+    <dgm:txPr/>
+    <dgm:style>
+      <a:lnRef idx="1">
+        <a:scrgbClr r="0" g="0" b="0"/>
+      </a:lnRef>
+      <a:fillRef idx="3">
+        <a:scrgbClr r="0" g="0" b="0"/>
+      </a:fillRef>
+      <a:effectRef idx="2">
+        <a:scrgbClr r="0" g="0" b="0"/>
+      </a:effectRef>
+      <a:fontRef idx="minor">
+        <a:schemeClr val="lt1"/>
+      </a:fontRef>
+    </dgm:style>
+  </dgm:styleLbl>
+  <dgm:styleLbl name="parChTrans1D1">
+    <dgm:scene3d>
+      <a:camera prst="orthographicFront"/>
+      <a:lightRig rig="threePt" dir="t"/>
+    </dgm:scene3d>
+    <dgm:sp3d/>
+    <dgm:txPr/>
+    <dgm:style>
+      <a:lnRef idx="1">
+        <a:scrgbClr r="0" g="0" b="0"/>
+      </a:lnRef>
+      <a:fillRef idx="0">
+        <a:scrgbClr r="0" g="0" b="0"/>
+      </a:fillRef>
+      <a:effectRef idx="0">
+        <a:scrgbClr r="0" g="0" b="0"/>
+      </a:effectRef>
+      <a:fontRef idx="minor"/>
+    </dgm:style>
+  </dgm:styleLbl>
+  <dgm:styleLbl name="parChTrans1D2">
+    <dgm:scene3d>
+      <a:camera prst="orthographicFront"/>
+      <a:lightRig rig="threePt" dir="t"/>
+    </dgm:scene3d>
+    <dgm:sp3d/>
+    <dgm:txPr/>
+    <dgm:style>
+      <a:lnRef idx="1">
+        <a:scrgbClr r="0" g="0" b="0"/>
+      </a:lnRef>
+      <a:fillRef idx="0">
+        <a:scrgbClr r="0" g="0" b="0"/>
+      </a:fillRef>
+      <a:effectRef idx="0">
+        <a:scrgbClr r="0" g="0" b="0"/>
+      </a:effectRef>
+      <a:fontRef idx="minor"/>
+    </dgm:style>
+  </dgm:styleLbl>
+  <dgm:styleLbl name="parChTrans1D3">
+    <dgm:scene3d>
+      <a:camera prst="orthographicFront"/>
+      <a:lightRig rig="threePt" dir="t"/>
+    </dgm:scene3d>
+    <dgm:sp3d/>
+    <dgm:txPr/>
+    <dgm:style>
+      <a:lnRef idx="1">
+        <a:scrgbClr r="0" g="0" b="0"/>
+      </a:lnRef>
+      <a:fillRef idx="0">
+        <a:scrgbClr r="0" g="0" b="0"/>
+      </a:fillRef>
+      <a:effectRef idx="0">
+        <a:scrgbClr r="0" g="0" b="0"/>
+      </a:effectRef>
+      <a:fontRef idx="minor"/>
+    </dgm:style>
+  </dgm:styleLbl>
+  <dgm:styleLbl name="parChTrans1D4">
+    <dgm:scene3d>
+      <a:camera prst="orthographicFront"/>
+      <a:lightRig rig="threePt" dir="t"/>
+    </dgm:scene3d>
+    <dgm:sp3d/>
+    <dgm:txPr/>
+    <dgm:style>
+      <a:lnRef idx="1">
+        <a:scrgbClr r="0" g="0" b="0"/>
+      </a:lnRef>
+      <a:fillRef idx="0">
+        <a:scrgbClr r="0" g="0" b="0"/>
+      </a:fillRef>
+      <a:effectRef idx="0">
+        <a:scrgbClr r="0" g="0" b="0"/>
+      </a:effectRef>
+      <a:fontRef idx="minor"/>
+    </dgm:style>
+  </dgm:styleLbl>
+  <dgm:styleLbl name="fgAcc1">
+    <dgm:scene3d>
+      <a:camera prst="orthographicFront"/>
+      <a:lightRig rig="threePt" dir="t"/>
+    </dgm:scene3d>
+    <dgm:sp3d/>
+    <dgm:txPr/>
+    <dgm:style>
+      <a:lnRef idx="1">
+        <a:scrgbClr r="0" g="0" b="0"/>
+      </a:lnRef>
+      <a:fillRef idx="1">
+        <a:scrgbClr r="0" g="0" b="0"/>
+      </a:fillRef>
+      <a:effectRef idx="0">
+        <a:scrgbClr r="0" g="0" b="0"/>
+      </a:effectRef>
+      <a:fontRef idx="minor"/>
+    </dgm:style>
+  </dgm:styleLbl>
+  <dgm:styleLbl name="conFgAcc1">
+    <dgm:scene3d>
+      <a:camera prst="orthographicFront"/>
+      <a:lightRig rig="threePt" dir="t"/>
+    </dgm:scene3d>
+    <dgm:sp3d/>
+    <dgm:txPr/>
+    <dgm:style>
+      <a:lnRef idx="1">
+        <a:scrgbClr r="0" g="0" b="0"/>
+      </a:lnRef>
+      <a:fillRef idx="1">
+        <a:scrgbClr r="0" g="0" b="0"/>
+      </a:fillRef>
+      <a:effectRef idx="0">
+        <a:scrgbClr r="0" g="0" b="0"/>
+      </a:effectRef>
+      <a:fontRef idx="minor"/>
+    </dgm:style>
+  </dgm:styleLbl>
+  <dgm:styleLbl name="alignAcc1">
+    <dgm:scene3d>
+      <a:camera prst="orthographicFront"/>
+      <a:lightRig rig="threePt" dir="t"/>
+    </dgm:scene3d>
+    <dgm:sp3d/>
+    <dgm:txPr/>
+    <dgm:style>
+      <a:lnRef idx="1">
+        <a:scrgbClr r="0" g="0" b="0"/>
+      </a:lnRef>
+      <a:fillRef idx="1">
+        <a:scrgbClr r="0" g="0" b="0"/>
+      </a:fillRef>
+      <a:effectRef idx="0">
+        <a:scrgbClr r="0" g="0" b="0"/>
+      </a:effectRef>
+      <a:fontRef idx="minor"/>
+    </dgm:style>
+  </dgm:styleLbl>
+  <dgm:styleLbl name="trAlignAcc1">
+    <dgm:scene3d>
+      <a:camera prst="orthographicFront"/>
+      <a:lightRig rig="threePt" dir="t"/>
+    </dgm:scene3d>
+    <dgm:sp3d/>
+    <dgm:txPr/>
+    <dgm:style>
+      <a:lnRef idx="1">
+        <a:scrgbClr r="0" g="0" b="0"/>
+      </a:lnRef>
+      <a:fillRef idx="1">
+        <a:scrgbClr r="0" g="0" b="0"/>
+      </a:fillRef>
+      <a:effectRef idx="0">
+        <a:scrgbClr r="0" g="0" b="0"/>
+      </a:effectRef>
+      <a:fontRef idx="minor"/>
+    </dgm:style>
+  </dgm:styleLbl>
+  <dgm:styleLbl name="bgAcc1">
+    <dgm:scene3d>
+      <a:camera prst="orthographicFront"/>
+      <a:lightRig rig="threePt" dir="t"/>
+    </dgm:scene3d>
+    <dgm:sp3d/>
+    <dgm:txPr/>
+    <dgm:style>
+      <a:lnRef idx="1">
+        <a:scrgbClr r="0" g="0" b="0"/>
+      </a:lnRef>
+      <a:fillRef idx="1">
+        <a:scrgbClr r="0" g="0" b="0"/>
+      </a:fillRef>
+      <a:effectRef idx="0">
+        <a:scrgbClr r="0" g="0" b="0"/>
+      </a:effectRef>
+      <a:fontRef idx="minor"/>
+    </dgm:style>
+  </dgm:styleLbl>
+  <dgm:styleLbl name="solidFgAcc1">
+    <dgm:scene3d>
+      <a:camera prst="orthographicFront"/>
+      <a:lightRig rig="threePt" dir="t"/>
+    </dgm:scene3d>
+    <dgm:sp3d/>
+    <dgm:txPr/>
+    <dgm:style>
+      <a:lnRef idx="1">
+        <a:scrgbClr r="0" g="0" b="0"/>
+      </a:lnRef>
+      <a:fillRef idx="1">
+        <a:scrgbClr r="0" g="0" b="0"/>
+      </a:fillRef>
+      <a:effectRef idx="0">
+        <a:scrgbClr r="0" g="0" b="0"/>
+      </a:effectRef>
+      <a:fontRef idx="minor"/>
+    </dgm:style>
+  </dgm:styleLbl>
+  <dgm:styleLbl name="solidAlignAcc1">
+    <dgm:scene3d>
+      <a:camera prst="orthographicFront"/>
+      <a:lightRig rig="threePt" dir="t"/>
+    </dgm:scene3d>
+    <dgm:sp3d/>
+    <dgm:txPr/>
+    <dgm:style>
+      <a:lnRef idx="1">
+        <a:scrgbClr r="0" g="0" b="0"/>
+      </a:lnRef>
+      <a:fillRef idx="1">
+        <a:scrgbClr r="0" g="0" b="0"/>
+      </a:fillRef>
+      <a:effectRef idx="0">
+        <a:scrgbClr r="0" g="0" b="0"/>
+      </a:effectRef>
+      <a:fontRef idx="minor"/>
+    </dgm:style>
+  </dgm:styleLbl>
+  <dgm:styleLbl name="solidBgAcc1">
+    <dgm:scene3d>
+      <a:camera prst="orthographicFront"/>
+      <a:lightRig rig="threePt" dir="t"/>
+    </dgm:scene3d>
+    <dgm:sp3d/>
+    <dgm:txPr/>
+    <dgm:style>
+      <a:lnRef idx="1">
+        <a:scrgbClr r="0" g="0" b="0"/>
+      </a:lnRef>
+      <a:fillRef idx="1">
+        <a:scrgbClr r="0" g="0" b="0"/>
+      </a:fillRef>
+      <a:effectRef idx="0">
+        <a:scrgbClr r="0" g="0" b="0"/>
+      </a:effectRef>
+      <a:fontRef idx="minor"/>
+    </dgm:style>
+  </dgm:styleLbl>
+  <dgm:styleLbl name="fgAccFollowNode1">
+    <dgm:scene3d>
+      <a:camera prst="orthographicFront"/>
+      <a:lightRig rig="threePt" dir="t"/>
+    </dgm:scene3d>
+    <dgm:sp3d/>
+    <dgm:txPr/>
+    <dgm:style>
+      <a:lnRef idx="1">
+        <a:scrgbClr r="0" g="0" b="0"/>
+      </a:lnRef>
+      <a:fillRef idx="1">
+        <a:scrgbClr r="0" g="0" b="0"/>
+      </a:fillRef>
+      <a:effectRef idx="0">
+        <a:scrgbClr r="0" g="0" b="0"/>
+      </a:effectRef>
+      <a:fontRef idx="minor"/>
+    </dgm:style>
+  </dgm:styleLbl>
+  <dgm:styleLbl name="alignAccFollowNode1">
+    <dgm:scene3d>
+      <a:camera prst="orthographicFront"/>
+      <a:lightRig rig="threePt" dir="t"/>
+    </dgm:scene3d>
+    <dgm:sp3d/>
+    <dgm:txPr/>
+    <dgm:style>
+      <a:lnRef idx="1">
+        <a:scrgbClr r="0" g="0" b="0"/>
+      </a:lnRef>
+      <a:fillRef idx="1">
+        <a:scrgbClr r="0" g="0" b="0"/>
+      </a:fillRef>
+      <a:effectRef idx="0">
+        <a:scrgbClr r="0" g="0" b="0"/>
+      </a:effectRef>
+      <a:fontRef idx="minor"/>
+    </dgm:style>
+  </dgm:styleLbl>
+  <dgm:styleLbl name="bgAccFollowNode1">
+    <dgm:scene3d>
+      <a:camera prst="orthographicFront"/>
+      <a:lightRig rig="threePt" dir="t"/>
+    </dgm:scene3d>
+    <dgm:sp3d/>
+    <dgm:txPr/>
+    <dgm:style>
+      <a:lnRef idx="1">
+        <a:scrgbClr r="0" g="0" b="0"/>
+      </a:lnRef>
+      <a:fillRef idx="1">
+        <a:scrgbClr r="0" g="0" b="0"/>
+      </a:fillRef>
+      <a:effectRef idx="0">
+        <a:scrgbClr r="0" g="0" b="0"/>
+      </a:effectRef>
+      <a:fontRef idx="minor"/>
+    </dgm:style>
+  </dgm:styleLbl>
+  <dgm:styleLbl name="fgAcc0">
+    <dgm:scene3d>
+      <a:camera prst="orthographicFront"/>
+      <a:lightRig rig="threePt" dir="t"/>
+    </dgm:scene3d>
+    <dgm:sp3d/>
+    <dgm:txPr/>
+    <dgm:style>
+      <a:lnRef idx="1">
+        <a:scrgbClr r="0" g="0" b="0"/>
+      </a:lnRef>
+      <a:fillRef idx="1">
+        <a:scrgbClr r="0" g="0" b="0"/>
+      </a:fillRef>
+      <a:effectRef idx="0">
+        <a:scrgbClr r="0" g="0" b="0"/>
+      </a:effectRef>
+      <a:fontRef idx="minor"/>
+    </dgm:style>
+  </dgm:styleLbl>
+  <dgm:styleLbl name="fgAcc2">
+    <dgm:scene3d>
+      <a:camera prst="orthographicFront"/>
+      <a:lightRig rig="threePt" dir="t"/>
+    </dgm:scene3d>
+    <dgm:sp3d/>
+    <dgm:txPr/>
+    <dgm:style>
+      <a:lnRef idx="1">
+        <a:scrgbClr r="0" g="0" b="0"/>
+      </a:lnRef>
+      <a:fillRef idx="1">
+        <a:scrgbClr r="0" g="0" b="0"/>
+      </a:fillRef>
+      <a:effectRef idx="0">
+        <a:scrgbClr r="0" g="0" b="0"/>
+      </a:effectRef>
+      <a:fontRef idx="minor"/>
+    </dgm:style>
+  </dgm:styleLbl>
+  <dgm:styleLbl name="fgAcc3">
+    <dgm:scene3d>
+      <a:camera prst="orthographicFront"/>
+      <a:lightRig rig="threePt" dir="t"/>
+    </dgm:scene3d>
+    <dgm:sp3d/>
+    <dgm:txPr/>
+    <dgm:style>
+      <a:lnRef idx="1">
+        <a:scrgbClr r="0" g="0" b="0"/>
+      </a:lnRef>
+      <a:fillRef idx="1">
+        <a:scrgbClr r="0" g="0" b="0"/>
+      </a:fillRef>
+      <a:effectRef idx="0">
+        <a:scrgbClr r="0" g="0" b="0"/>
+      </a:effectRef>
+      <a:fontRef idx="minor"/>
+    </dgm:style>
+  </dgm:styleLbl>
+  <dgm:styleLbl name="fgAcc4">
+    <dgm:scene3d>
+      <a:camera prst="orthographicFront"/>
+      <a:lightRig rig="threePt" dir="t"/>
+    </dgm:scene3d>
+    <dgm:sp3d/>
+    <dgm:txPr/>
+    <dgm:style>
+      <a:lnRef idx="1">
+        <a:scrgbClr r="0" g="0" b="0"/>
+      </a:lnRef>
+      <a:fillRef idx="1">
+        <a:scrgbClr r="0" g="0" b="0"/>
+      </a:fillRef>
+      <a:effectRef idx="0">
+        <a:scrgbClr r="0" g="0" b="0"/>
+      </a:effectRef>
+      <a:fontRef idx="minor"/>
+    </dgm:style>
+  </dgm:styleLbl>
+  <dgm:styleLbl name="bgShp">
+    <dgm:scene3d>
+      <a:camera prst="orthographicFront"/>
+      <a:lightRig rig="threePt" dir="t"/>
+    </dgm:scene3d>
+    <dgm:sp3d/>
+    <dgm:txPr/>
+    <dgm:style>
+      <a:lnRef idx="0">
+        <a:scrgbClr r="0" g="0" b="0"/>
+      </a:lnRef>
+      <a:fillRef idx="1">
+        <a:scrgbClr r="0" g="0" b="0"/>
+      </a:fillRef>
+      <a:effectRef idx="2">
+        <a:scrgbClr r="0" g="0" b="0"/>
+      </a:effectRef>
+      <a:fontRef idx="minor"/>
+    </dgm:style>
+  </dgm:styleLbl>
+  <dgm:styleLbl name="dkBgShp">
+    <dgm:scene3d>
+      <a:camera prst="orthographicFront"/>
+      <a:lightRig rig="threePt" dir="t"/>
+    </dgm:scene3d>
+    <dgm:sp3d/>
+    <dgm:txPr/>
+    <dgm:style>
+      <a:lnRef idx="0">
+        <a:scrgbClr r="0" g="0" b="0"/>
+      </a:lnRef>
+      <a:fillRef idx="1">
+        <a:scrgbClr r="0" g="0" b="0"/>
+      </a:fillRef>
+      <a:effectRef idx="2">
+        <a:scrgbClr r="0" g="0" b="0"/>
+      </a:effectRef>
+      <a:fontRef idx="minor"/>
+    </dgm:style>
+  </dgm:styleLbl>
+  <dgm:styleLbl name="trBgShp">
+    <dgm:scene3d>
+      <a:camera prst="orthographicFront"/>
+      <a:lightRig rig="threePt" dir="t"/>
+    </dgm:scene3d>
+    <dgm:sp3d/>
+    <dgm:txPr/>
+    <dgm:style>
+      <a:lnRef idx="0">
+        <a:scrgbClr r="0" g="0" b="0"/>
+      </a:lnRef>
+      <a:fillRef idx="1">
+        <a:scrgbClr r="0" g="0" b="0"/>
+      </a:fillRef>
+      <a:effectRef idx="0">
+        <a:scrgbClr r="0" g="0" b="0"/>
+      </a:effectRef>
+      <a:fontRef idx="minor"/>
+    </dgm:style>
+  </dgm:styleLbl>
+  <dgm:styleLbl name="fgShp">
+    <dgm:scene3d>
+      <a:camera prst="orthographicFront"/>
+      <a:lightRig rig="threePt" dir="t"/>
+    </dgm:scene3d>
+    <dgm:sp3d/>
+    <dgm:txPr/>
+    <dgm:style>
+      <a:lnRef idx="0">
+        <a:scrgbClr r="0" g="0" b="0"/>
+      </a:lnRef>
+      <a:fillRef idx="3">
+        <a:scrgbClr r="0" g="0" b="0"/>
+      </a:fillRef>
+      <a:effectRef idx="2">
+        <a:scrgbClr r="0" g="0" b="0"/>
+      </a:effectRef>
+      <a:fontRef idx="minor"/>
+    </dgm:style>
+  </dgm:styleLbl>
+  <dgm:styleLbl name="revTx">
+    <dgm:scene3d>
+      <a:camera prst="orthographicFront"/>
+      <a:lightRig rig="threePt" dir="t"/>
+    </dgm:scene3d>
+    <dgm:sp3d/>
+    <dgm:txPr/>
+    <dgm:style>
+      <a:lnRef idx="0">
+        <a:scrgbClr r="0" g="0" b="0"/>
+      </a:lnRef>
+      <a:fillRef idx="0">
+        <a:scrgbClr r="0" g="0" b="0"/>
+      </a:fillRef>
+      <a:effectRef idx="0">
+        <a:scrgbClr r="0" g="0" b="0"/>
+      </a:effectRef>
+      <a:fontRef idx="minor"/>
+    </dgm:style>
+  </dgm:styleLbl>
+</dgm:styleDef>
+</file>
+
+<file path=ppt/diagrams/quickStyle2.xml><?xml version="1.0" encoding="utf-8"?>
 <dgm:styleDef xmlns:dgm="http://schemas.openxmlformats.org/drawingml/2006/diagram" xmlns:a="http://schemas.openxmlformats.org/drawingml/2006/main" uniqueId="urn:microsoft.com/office/officeart/2005/8/quickstyle/simple4">
   <dgm:title val=""/>
   <dgm:desc val=""/>
@@ -4299,7 +7959,7 @@
           <a:p>
             <a:fld id="{4A5245BB-0D79-6B47-AF19-6C2947DF989D}" type="datetimeFigureOut">
               <a:rPr lang="en-US" smtClean="0"/>
-              <a:t>1/4/16</a:t>
+              <a:t>1/6/16</a:t>
             </a:fld>
             <a:endParaRPr lang="en-US"/>
           </a:p>
@@ -4469,7 +8129,7 @@
           <a:p>
             <a:fld id="{4A5245BB-0D79-6B47-AF19-6C2947DF989D}" type="datetimeFigureOut">
               <a:rPr lang="en-US" smtClean="0"/>
-              <a:t>1/4/16</a:t>
+              <a:t>1/6/16</a:t>
             </a:fld>
             <a:endParaRPr lang="en-US"/>
           </a:p>
@@ -4649,7 +8309,7 @@
           <a:p>
             <a:fld id="{4A5245BB-0D79-6B47-AF19-6C2947DF989D}" type="datetimeFigureOut">
               <a:rPr lang="en-US" smtClean="0"/>
-              <a:t>1/4/16</a:t>
+              <a:t>1/6/16</a:t>
             </a:fld>
             <a:endParaRPr lang="en-US"/>
           </a:p>
@@ -4819,7 +8479,7 @@
           <a:p>
             <a:fld id="{4A5245BB-0D79-6B47-AF19-6C2947DF989D}" type="datetimeFigureOut">
               <a:rPr lang="en-US" smtClean="0"/>
-              <a:t>1/4/16</a:t>
+              <a:t>1/6/16</a:t>
             </a:fld>
             <a:endParaRPr lang="en-US"/>
           </a:p>
@@ -5065,7 +8725,7 @@
           <a:p>
             <a:fld id="{4A5245BB-0D79-6B47-AF19-6C2947DF989D}" type="datetimeFigureOut">
               <a:rPr lang="en-US" smtClean="0"/>
-              <a:t>1/4/16</a:t>
+              <a:t>1/6/16</a:t>
             </a:fld>
             <a:endParaRPr lang="en-US"/>
           </a:p>
@@ -5353,7 +9013,7 @@
           <a:p>
             <a:fld id="{4A5245BB-0D79-6B47-AF19-6C2947DF989D}" type="datetimeFigureOut">
               <a:rPr lang="en-US" smtClean="0"/>
-              <a:t>1/4/16</a:t>
+              <a:t>1/6/16</a:t>
             </a:fld>
             <a:endParaRPr lang="en-US"/>
           </a:p>
@@ -5775,7 +9435,7 @@
           <a:p>
             <a:fld id="{4A5245BB-0D79-6B47-AF19-6C2947DF989D}" type="datetimeFigureOut">
               <a:rPr lang="en-US" smtClean="0"/>
-              <a:t>1/4/16</a:t>
+              <a:t>1/6/16</a:t>
             </a:fld>
             <a:endParaRPr lang="en-US"/>
           </a:p>
@@ -5893,7 +9553,7 @@
           <a:p>
             <a:fld id="{4A5245BB-0D79-6B47-AF19-6C2947DF989D}" type="datetimeFigureOut">
               <a:rPr lang="en-US" smtClean="0"/>
-              <a:t>1/4/16</a:t>
+              <a:t>1/6/16</a:t>
             </a:fld>
             <a:endParaRPr lang="en-US"/>
           </a:p>
@@ -5988,7 +9648,7 @@
           <a:p>
             <a:fld id="{4A5245BB-0D79-6B47-AF19-6C2947DF989D}" type="datetimeFigureOut">
               <a:rPr lang="en-US" smtClean="0"/>
-              <a:t>1/4/16</a:t>
+              <a:t>1/6/16</a:t>
             </a:fld>
             <a:endParaRPr lang="en-US"/>
           </a:p>
@@ -6265,7 +9925,7 @@
           <a:p>
             <a:fld id="{4A5245BB-0D79-6B47-AF19-6C2947DF989D}" type="datetimeFigureOut">
               <a:rPr lang="en-US" smtClean="0"/>
-              <a:t>1/4/16</a:t>
+              <a:t>1/6/16</a:t>
             </a:fld>
             <a:endParaRPr lang="en-US"/>
           </a:p>
@@ -6518,7 +10178,7 @@
           <a:p>
             <a:fld id="{4A5245BB-0D79-6B47-AF19-6C2947DF989D}" type="datetimeFigureOut">
               <a:rPr lang="en-US" smtClean="0"/>
-              <a:t>1/4/16</a:t>
+              <a:t>1/6/16</a:t>
             </a:fld>
             <a:endParaRPr lang="en-US"/>
           </a:p>
@@ -6731,7 +10391,7 @@
           <a:p>
             <a:fld id="{4A5245BB-0D79-6B47-AF19-6C2947DF989D}" type="datetimeFigureOut">
               <a:rPr lang="en-US" smtClean="0"/>
-              <a:t>1/4/16</a:t>
+              <a:t>1/6/16</a:t>
             </a:fld>
             <a:endParaRPr lang="en-US"/>
           </a:p>
@@ -7148,6 +10808,119 @@
     <p:extLst>
       <p:ext uri="{BB962C8B-B14F-4D97-AF65-F5344CB8AC3E}">
         <p14:creationId xmlns:p14="http://schemas.microsoft.com/office/powerpoint/2010/main" val="1816765292"/>
+      </p:ext>
+    </p:extLst>
+  </p:cSld>
+  <p:clrMapOvr>
+    <a:masterClrMapping/>
+  </p:clrMapOvr>
+</p:sld>
+</file>
+
+<file path=ppt/slides/slide10.xml><?xml version="1.0" encoding="utf-8"?>
+<p:sld xmlns:a="http://schemas.openxmlformats.org/drawingml/2006/main" xmlns:r="http://schemas.openxmlformats.org/officeDocument/2006/relationships" xmlns:p="http://schemas.openxmlformats.org/presentationml/2006/main">
+  <p:cSld>
+    <p:spTree>
+      <p:nvGrpSpPr>
+        <p:cNvPr id="1" name=""/>
+        <p:cNvGrpSpPr/>
+        <p:nvPr/>
+      </p:nvGrpSpPr>
+      <p:grpSpPr>
+        <a:xfrm>
+          <a:off x="0" y="0"/>
+          <a:ext cx="0" cy="0"/>
+          <a:chOff x="0" y="0"/>
+          <a:chExt cx="0" cy="0"/>
+        </a:xfrm>
+      </p:grpSpPr>
+      <p:sp>
+        <p:nvSpPr>
+          <p:cNvPr id="2" name="Title 1"/>
+          <p:cNvSpPr>
+            <a:spLocks noGrp="1"/>
+          </p:cNvSpPr>
+          <p:nvPr>
+            <p:ph type="title"/>
+          </p:nvPr>
+        </p:nvSpPr>
+        <p:spPr/>
+        <p:txBody>
+          <a:bodyPr>
+            <a:normAutofit fontScale="90000"/>
+          </a:bodyPr>
+          <a:lstStyle/>
+          <a:p>
+            <a:r>
+              <a:rPr lang="en-US" dirty="0" smtClean="0"/>
+              <a:t>HTTP Request to SDK Call Correlation</a:t>
+            </a:r>
+            <a:endParaRPr lang="en-US" dirty="0"/>
+          </a:p>
+        </p:txBody>
+      </p:sp>
+      <p:sp>
+        <p:nvSpPr>
+          <p:cNvPr id="3" name="Content Placeholder 2"/>
+          <p:cNvSpPr>
+            <a:spLocks noGrp="1"/>
+          </p:cNvSpPr>
+          <p:nvPr>
+            <p:ph idx="1"/>
+          </p:nvPr>
+        </p:nvSpPr>
+        <p:spPr/>
+        <p:txBody>
+          <a:bodyPr/>
+          <a:lstStyle/>
+          <a:p>
+            <a:r>
+              <a:rPr lang="en-US" dirty="0" smtClean="0"/>
+              <a:t>Front-end server (</a:t>
+            </a:r>
+            <a:r>
+              <a:rPr lang="en-US" dirty="0" err="1" smtClean="0"/>
+              <a:t>Nginx</a:t>
+            </a:r>
+            <a:r>
+              <a:rPr lang="en-US" dirty="0" smtClean="0"/>
+              <a:t>) tags each incoming request with a unique ID</a:t>
+            </a:r>
+          </a:p>
+          <a:p>
+            <a:r>
+              <a:rPr lang="en-US" dirty="0" err="1" smtClean="0"/>
+              <a:t>PBServer</a:t>
+            </a:r>
+            <a:r>
+              <a:rPr lang="en-US" dirty="0" smtClean="0"/>
+              <a:t> records this “HTTP request ID” whenever inspecting a cloud SDK call</a:t>
+            </a:r>
+          </a:p>
+          <a:p>
+            <a:r>
+              <a:rPr lang="en-US" dirty="0" err="1" smtClean="0"/>
+              <a:t>ElasticSearch</a:t>
+            </a:r>
+            <a:r>
+              <a:rPr lang="en-US" dirty="0" smtClean="0"/>
+              <a:t> can aggregate (group) cloud SDK calls by HTTP request ID</a:t>
+            </a:r>
+          </a:p>
+          <a:p>
+            <a:pPr lvl="1"/>
+            <a:r>
+              <a:rPr lang="en-US" dirty="0" smtClean="0"/>
+              <a:t>Implemented a Python script that performs a SDK call time analysis at request level</a:t>
+            </a:r>
+            <a:endParaRPr lang="en-US" dirty="0"/>
+          </a:p>
+        </p:txBody>
+      </p:sp>
+    </p:spTree>
+    <p:extLst>
+      <p:ext uri="{BB962C8B-B14F-4D97-AF65-F5344CB8AC3E}">
+        <p14:creationId xmlns:p14="http://schemas.microsoft.com/office/powerpoint/2010/main" val="3289274012"/>
       </p:ext>
     </p:extLst>
   </p:cSld>
@@ -9410,6 +13183,227 @@
     <p:extLst>
       <p:ext uri="{BB962C8B-B14F-4D97-AF65-F5344CB8AC3E}">
         <p14:creationId xmlns:p14="http://schemas.microsoft.com/office/powerpoint/2010/main" val="426320169"/>
+      </p:ext>
+    </p:extLst>
+  </p:cSld>
+  <p:clrMapOvr>
+    <a:masterClrMapping/>
+  </p:clrMapOvr>
+</p:sld>
+</file>
+
+<file path=ppt/slides/slide8.xml><?xml version="1.0" encoding="utf-8"?>
+<p:sld xmlns:a="http://schemas.openxmlformats.org/drawingml/2006/main" xmlns:r="http://schemas.openxmlformats.org/officeDocument/2006/relationships" xmlns:p="http://schemas.openxmlformats.org/presentationml/2006/main">
+  <p:cSld>
+    <p:spTree>
+      <p:nvGrpSpPr>
+        <p:cNvPr id="1" name=""/>
+        <p:cNvGrpSpPr/>
+        <p:nvPr/>
+      </p:nvGrpSpPr>
+      <p:grpSpPr>
+        <a:xfrm>
+          <a:off x="0" y="0"/>
+          <a:ext cx="0" cy="0"/>
+          <a:chOff x="0" y="0"/>
+          <a:chExt cx="0" cy="0"/>
+        </a:xfrm>
+      </p:grpSpPr>
+      <p:sp>
+        <p:nvSpPr>
+          <p:cNvPr id="2" name="Title 1"/>
+          <p:cNvSpPr>
+            <a:spLocks noGrp="1"/>
+          </p:cNvSpPr>
+          <p:nvPr>
+            <p:ph type="title"/>
+          </p:nvPr>
+        </p:nvSpPr>
+        <p:spPr/>
+        <p:txBody>
+          <a:bodyPr/>
+          <a:lstStyle/>
+          <a:p>
+            <a:r>
+              <a:rPr lang="en-US" dirty="0" err="1" smtClean="0"/>
+              <a:t>AppScale</a:t>
+            </a:r>
+            <a:r>
+              <a:rPr lang="en-US" dirty="0" smtClean="0"/>
+              <a:t> Cloud Stack</a:t>
+            </a:r>
+            <a:endParaRPr lang="en-US" dirty="0"/>
+          </a:p>
+        </p:txBody>
+      </p:sp>
+      <p:graphicFrame>
+        <p:nvGraphicFramePr>
+          <p:cNvPr id="5" name="Content Placeholder 4"/>
+          <p:cNvGraphicFramePr>
+            <a:graphicFrameLocks noGrp="1"/>
+          </p:cNvGraphicFramePr>
+          <p:nvPr>
+            <p:ph idx="1"/>
+            <p:extLst>
+              <p:ext uri="{D42A27DB-BD31-4B8C-83A1-F6EECF244321}">
+                <p14:modId xmlns:p14="http://schemas.microsoft.com/office/powerpoint/2010/main" val="2312023601"/>
+              </p:ext>
+            </p:extLst>
+          </p:nvPr>
+        </p:nvGraphicFramePr>
+        <p:xfrm>
+          <a:off x="457200" y="1600200"/>
+          <a:ext cx="8229600" cy="4525963"/>
+        </p:xfrm>
+        <a:graphic>
+          <a:graphicData uri="http://schemas.openxmlformats.org/drawingml/2006/diagram">
+            <dgm:relIds xmlns:dgm="http://schemas.openxmlformats.org/drawingml/2006/diagram" xmlns:r="http://schemas.openxmlformats.org/officeDocument/2006/relationships" r:dm="rId2" r:lo="rId3" r:qs="rId4" r:cs="rId5"/>
+          </a:graphicData>
+        </a:graphic>
+      </p:graphicFrame>
+    </p:spTree>
+    <p:extLst>
+      <p:ext uri="{BB962C8B-B14F-4D97-AF65-F5344CB8AC3E}">
+        <p14:creationId xmlns:p14="http://schemas.microsoft.com/office/powerpoint/2010/main" val="3662247244"/>
+      </p:ext>
+    </p:extLst>
+  </p:cSld>
+  <p:clrMapOvr>
+    <a:masterClrMapping/>
+  </p:clrMapOvr>
+</p:sld>
+</file>
+
+<file path=ppt/slides/slide9.xml><?xml version="1.0" encoding="utf-8"?>
+<p:sld xmlns:a="http://schemas.openxmlformats.org/drawingml/2006/main" xmlns:r="http://schemas.openxmlformats.org/officeDocument/2006/relationships" xmlns:p="http://schemas.openxmlformats.org/presentationml/2006/main">
+  <p:cSld>
+    <p:spTree>
+      <p:nvGrpSpPr>
+        <p:cNvPr id="1" name=""/>
+        <p:cNvGrpSpPr/>
+        <p:nvPr/>
+      </p:nvGrpSpPr>
+      <p:grpSpPr>
+        <a:xfrm>
+          <a:off x="0" y="0"/>
+          <a:ext cx="0" cy="0"/>
+          <a:chOff x="0" y="0"/>
+          <a:chExt cx="0" cy="0"/>
+        </a:xfrm>
+      </p:grpSpPr>
+      <p:sp>
+        <p:nvSpPr>
+          <p:cNvPr id="2" name="Title 1"/>
+          <p:cNvSpPr>
+            <a:spLocks noGrp="1"/>
+          </p:cNvSpPr>
+          <p:nvPr>
+            <p:ph type="title"/>
+          </p:nvPr>
+        </p:nvSpPr>
+        <p:spPr/>
+        <p:txBody>
+          <a:bodyPr/>
+          <a:lstStyle/>
+          <a:p>
+            <a:r>
+              <a:rPr lang="en-US" dirty="0" smtClean="0"/>
+              <a:t>Monitoring Cloud SDK Invocations</a:t>
+            </a:r>
+            <a:endParaRPr lang="en-US" dirty="0"/>
+          </a:p>
+        </p:txBody>
+      </p:sp>
+      <p:sp>
+        <p:nvSpPr>
+          <p:cNvPr id="3" name="Content Placeholder 2"/>
+          <p:cNvSpPr>
+            <a:spLocks noGrp="1"/>
+          </p:cNvSpPr>
+          <p:nvPr>
+            <p:ph idx="1"/>
+          </p:nvPr>
+        </p:nvSpPr>
+        <p:spPr/>
+        <p:txBody>
+          <a:bodyPr>
+            <a:normAutofit fontScale="92500"/>
+          </a:bodyPr>
+          <a:lstStyle/>
+          <a:p>
+            <a:r>
+              <a:rPr lang="en-US" dirty="0" smtClean="0"/>
+              <a:t>Added some instrumentation to </a:t>
+            </a:r>
+            <a:r>
+              <a:rPr lang="en-US" dirty="0" err="1" smtClean="0"/>
+              <a:t>PBServer</a:t>
+            </a:r>
+            <a:r>
+              <a:rPr lang="en-US" dirty="0" smtClean="0"/>
+              <a:t> to record all cloud SDK calls</a:t>
+            </a:r>
+          </a:p>
+          <a:p>
+            <a:pPr lvl="1"/>
+            <a:r>
+              <a:rPr lang="en-US" dirty="0" smtClean="0"/>
+              <a:t>Timestamp</a:t>
+            </a:r>
+          </a:p>
+          <a:p>
+            <a:pPr lvl="1"/>
+            <a:r>
+              <a:rPr lang="en-US" dirty="0" smtClean="0"/>
+              <a:t>Source application and HTTP request</a:t>
+            </a:r>
+          </a:p>
+          <a:p>
+            <a:pPr lvl="1"/>
+            <a:r>
+              <a:rPr lang="en-US" dirty="0" smtClean="0"/>
+              <a:t>Target cloud SDK service and operation</a:t>
+            </a:r>
+          </a:p>
+          <a:p>
+            <a:pPr lvl="1"/>
+            <a:r>
+              <a:rPr lang="en-US" dirty="0" smtClean="0"/>
+              <a:t>Request size and hash (PB payload)</a:t>
+            </a:r>
+          </a:p>
+          <a:p>
+            <a:pPr lvl="1"/>
+            <a:r>
+              <a:rPr lang="en-US" dirty="0" smtClean="0"/>
+              <a:t>Time spent executing the SDK call</a:t>
+            </a:r>
+          </a:p>
+          <a:p>
+            <a:r>
+              <a:rPr lang="en-US" dirty="0" err="1" smtClean="0"/>
+              <a:t>PBServer</a:t>
+            </a:r>
+            <a:r>
+              <a:rPr lang="en-US" dirty="0" smtClean="0"/>
+              <a:t> accumulates this information in memory, and reports to </a:t>
+            </a:r>
+            <a:r>
+              <a:rPr lang="en-US" dirty="0" err="1" smtClean="0"/>
+              <a:t>ElasticSearch</a:t>
+            </a:r>
+            <a:r>
+              <a:rPr lang="en-US" dirty="0" smtClean="0"/>
+              <a:t> in batches</a:t>
+            </a:r>
+            <a:endParaRPr lang="en-US" dirty="0"/>
+          </a:p>
+        </p:txBody>
+      </p:sp>
+    </p:spTree>
+    <p:extLst>
+      <p:ext uri="{BB962C8B-B14F-4D97-AF65-F5344CB8AC3E}">
+        <p14:creationId xmlns:p14="http://schemas.microsoft.com/office/powerpoint/2010/main" val="2934107477"/>
       </p:ext>
     </p:extLst>
   </p:cSld>

</xml_diff>

<commit_message>
First complete draft of the presentation
</commit_message>
<xml_diff>
--- a/Eager/elk-experiment/Huawei_Presentation_1.pptx
+++ b/Eager/elk-experiment/Huawei_Presentation_1.pptx
@@ -5,19 +5,21 @@
     <p:sldMasterId id="2147483648" r:id="rId1"/>
   </p:sldMasterIdLst>
   <p:notesMasterIdLst>
-    <p:notesMasterId r:id="rId12"/>
+    <p:notesMasterId r:id="rId14"/>
   </p:notesMasterIdLst>
   <p:sldIdLst>
     <p:sldId id="256" r:id="rId2"/>
-    <p:sldId id="257" r:id="rId3"/>
-    <p:sldId id="258" r:id="rId4"/>
-    <p:sldId id="260" r:id="rId5"/>
-    <p:sldId id="261" r:id="rId6"/>
-    <p:sldId id="263" r:id="rId7"/>
-    <p:sldId id="262" r:id="rId8"/>
-    <p:sldId id="264" r:id="rId9"/>
-    <p:sldId id="265" r:id="rId10"/>
-    <p:sldId id="266" r:id="rId11"/>
+    <p:sldId id="258" r:id="rId3"/>
+    <p:sldId id="260" r:id="rId4"/>
+    <p:sldId id="261" r:id="rId5"/>
+    <p:sldId id="263" r:id="rId6"/>
+    <p:sldId id="262" r:id="rId7"/>
+    <p:sldId id="264" r:id="rId8"/>
+    <p:sldId id="265" r:id="rId9"/>
+    <p:sldId id="266" r:id="rId10"/>
+    <p:sldId id="269" r:id="rId11"/>
+    <p:sldId id="267" r:id="rId12"/>
+    <p:sldId id="268" r:id="rId13"/>
   </p:sldIdLst>
   <p:sldSz cx="9144000" cy="6858000" type="screen4x3"/>
   <p:notesSz cx="6858000" cy="9144000"/>
@@ -2314,8 +2316,8 @@
     <dgm:cxn modelId="{48C3D795-EB2C-EF43-A1C3-A610D0FC9135}" type="presOf" srcId="{BE5CD4A6-B5D8-C34A-A9A9-70A30BD82EEE}" destId="{ED256A8E-3577-F04B-A6F5-C5D127EEDFF7}" srcOrd="0" destOrd="1" presId="urn:microsoft.com/office/officeart/2005/8/layout/vList5"/>
     <dgm:cxn modelId="{0456EE57-E0C4-AF4F-A719-A0A4A7A9D5F8}" type="presOf" srcId="{B95D4F37-1D8A-8749-8B39-2CB7397FA252}" destId="{794CF085-F8F9-DF4D-9A6F-419C288BE4E5}" srcOrd="0" destOrd="0" presId="urn:microsoft.com/office/officeart/2005/8/layout/vList5"/>
     <dgm:cxn modelId="{22226201-A1E4-9044-80FA-91A868FED612}" srcId="{B95D4F37-1D8A-8749-8B39-2CB7397FA252}" destId="{A27A3876-3C67-354A-A9E6-1281E94DE7B3}" srcOrd="0" destOrd="0" parTransId="{0342AF2F-A876-814D-8826-3007CC303742}" sibTransId="{2BBB9A7A-07EB-E74C-9338-4794382DD794}"/>
+    <dgm:cxn modelId="{BC11605E-D63B-1C48-8640-E1243EF3C8A7}" type="presOf" srcId="{D2A98552-7206-B54B-8916-313B2DDD4B1F}" destId="{FE20F8B6-CCEE-7C48-80ED-6768A026A7DE}" srcOrd="0" destOrd="0" presId="urn:microsoft.com/office/officeart/2005/8/layout/vList5"/>
     <dgm:cxn modelId="{80E47031-440D-9548-AAFF-5165C259C821}" srcId="{D2A98552-7206-B54B-8916-313B2DDD4B1F}" destId="{8D3E64A9-4621-224F-BDB9-F2731A1CC811}" srcOrd="2" destOrd="0" parTransId="{4B0C63BF-3D86-D941-9BB7-89062269FE44}" sibTransId="{4DD396BB-8CD4-F547-9CF9-DF814FA39134}"/>
-    <dgm:cxn modelId="{BC11605E-D63B-1C48-8640-E1243EF3C8A7}" type="presOf" srcId="{D2A98552-7206-B54B-8916-313B2DDD4B1F}" destId="{FE20F8B6-CCEE-7C48-80ED-6768A026A7DE}" srcOrd="0" destOrd="0" presId="urn:microsoft.com/office/officeart/2005/8/layout/vList5"/>
     <dgm:cxn modelId="{1A726084-BD4E-3544-BD4A-6EADA04118C2}" srcId="{D2A98552-7206-B54B-8916-313B2DDD4B1F}" destId="{BE5CD4A6-B5D8-C34A-A9A9-70A30BD82EEE}" srcOrd="1" destOrd="0" parTransId="{2EA5CC8F-0046-2A4D-B97D-C200CD764370}" sibTransId="{3B086D1B-5300-5C45-B552-EC2D10A8E026}"/>
     <dgm:cxn modelId="{F570798A-DE72-E742-9847-236B2B8F43A4}" srcId="{B95D4F37-1D8A-8749-8B39-2CB7397FA252}" destId="{B2DC663A-2019-3047-9DCF-0B248892D2E8}" srcOrd="3" destOrd="0" parTransId="{ED829C2B-8C9A-7443-9ABA-DE776BCD6E8C}" sibTransId="{A8C43371-DCA0-9A42-BCD8-990D6C443216}"/>
     <dgm:cxn modelId="{E5BD6DC2-7B53-FA41-A05B-15E0CF514382}" type="presOf" srcId="{D578440C-53B3-1A4D-8B1C-3238BD870238}" destId="{ED256A8E-3577-F04B-A6F5-C5D127EEDFF7}" srcOrd="0" destOrd="0" presId="urn:microsoft.com/office/officeart/2005/8/layout/vList5"/>
@@ -2327,8 +2329,8 @@
     <dgm:cxn modelId="{1018F0F1-6E7B-DC40-BE52-700C5AD8B728}" srcId="{B95D4F37-1D8A-8749-8B39-2CB7397FA252}" destId="{B859EB50-B895-2549-9384-E2BCDE3C968C}" srcOrd="2" destOrd="0" parTransId="{A1FC67BA-DBDE-8C4A-8361-C52EDE89BBAE}" sibTransId="{1B17C232-6568-9545-944B-5551ABA3B464}"/>
     <dgm:cxn modelId="{9C504291-6760-1B4A-A609-11D462DDB442}" srcId="{B859EB50-B895-2549-9384-E2BCDE3C968C}" destId="{5C0014C3-2263-504E-9FCE-9FA2E3674F4F}" srcOrd="0" destOrd="0" parTransId="{9C105334-FA49-694D-820C-36D5CA8EC00A}" sibTransId="{4C0134B1-5A1B-814F-B67D-369FAE3186CF}"/>
     <dgm:cxn modelId="{43625586-24BE-4B41-9DA0-3F2088EE3174}" type="presOf" srcId="{31FF09B4-248A-D248-869E-D7534E0E666E}" destId="{377D39BC-B80D-9944-8D55-3791B3605780}" srcOrd="0" destOrd="1" presId="urn:microsoft.com/office/officeart/2005/8/layout/vList5"/>
+    <dgm:cxn modelId="{BBCA9D30-DA20-8A45-A95F-E5C052F81296}" type="presOf" srcId="{A27A3876-3C67-354A-A9E6-1281E94DE7B3}" destId="{2F51A5BA-F3CA-2D43-B035-27A42F7B00E1}" srcOrd="0" destOrd="0" presId="urn:microsoft.com/office/officeart/2005/8/layout/vList5"/>
     <dgm:cxn modelId="{98AF7EC9-B0A4-A447-90FB-2C679610506D}" srcId="{B859EB50-B895-2549-9384-E2BCDE3C968C}" destId="{093DE271-6615-3C46-90F6-655CE029D9D0}" srcOrd="1" destOrd="0" parTransId="{49A9E02E-934A-E246-AF9E-B4D9D0D62D6D}" sibTransId="{AFE06E13-E600-6B42-84D2-E0CB85125385}"/>
-    <dgm:cxn modelId="{BBCA9D30-DA20-8A45-A95F-E5C052F81296}" type="presOf" srcId="{A27A3876-3C67-354A-A9E6-1281E94DE7B3}" destId="{2F51A5BA-F3CA-2D43-B035-27A42F7B00E1}" srcOrd="0" destOrd="0" presId="urn:microsoft.com/office/officeart/2005/8/layout/vList5"/>
     <dgm:cxn modelId="{9CF250DA-D343-2743-918A-2B643828FF04}" type="presOf" srcId="{1988179C-0019-8D4F-BA6D-31EFF596AF01}" destId="{377D39BC-B80D-9944-8D55-3791B3605780}" srcOrd="0" destOrd="0" presId="urn:microsoft.com/office/officeart/2005/8/layout/vList5"/>
     <dgm:cxn modelId="{F223971D-1215-2149-BFE9-EB0926F72A85}" type="presOf" srcId="{8D3E64A9-4621-224F-BDB9-F2731A1CC811}" destId="{ED256A8E-3577-F04B-A6F5-C5D127EEDFF7}" srcOrd="0" destOrd="2" presId="urn:microsoft.com/office/officeart/2005/8/layout/vList5"/>
     <dgm:cxn modelId="{C7DCB44E-67A4-7044-A779-973DE1D694CE}" type="presOf" srcId="{B859EB50-B895-2549-9384-E2BCDE3C968C}" destId="{1F309CAE-C2CA-6D46-8C05-0080B6A637BD}" srcOrd="0" destOrd="0" presId="urn:microsoft.com/office/officeart/2005/8/layout/vList5"/>
@@ -2355,7 +2357,7 @@
   <dgm:whole/>
   <dgm:extLst>
     <a:ext uri="http://schemas.microsoft.com/office/drawing/2008/diagram">
-      <dsp:dataModelExt xmlns:dsp="http://schemas.microsoft.com/office/drawing/2008/diagram" relId="rId6" minVer="http://schemas.openxmlformats.org/drawingml/2006/diagram"/>
+      <dsp:dataModelExt xmlns:dsp="http://schemas.microsoft.com/office/drawing/2008/diagram" relId="rId7" minVer="http://schemas.openxmlformats.org/drawingml/2006/diagram"/>
     </a:ext>
   </dgm:extLst>
 </dgm:dataModel>
@@ -2786,6 +2788,13 @@
         </dgm:presLayoutVars>
       </dgm:prSet>
       <dgm:spPr/>
+      <dgm:t>
+        <a:bodyPr/>
+        <a:lstStyle/>
+        <a:p>
+          <a:endParaRPr lang="en-US"/>
+        </a:p>
+      </dgm:t>
     </dgm:pt>
     <dgm:pt modelId="{16CFC8EF-7054-384B-91FC-7C69CCC84276}" type="pres">
       <dgm:prSet presAssocID="{C90D4AF1-EC56-6B4B-AF2F-811730ADA0B9}" presName="boxAndChildren" presStyleCnt="0"/>
@@ -2824,6 +2833,13 @@
         </dgm:presLayoutVars>
       </dgm:prSet>
       <dgm:spPr/>
+      <dgm:t>
+        <a:bodyPr/>
+        <a:lstStyle/>
+        <a:p>
+          <a:endParaRPr lang="en-US"/>
+        </a:p>
+      </dgm:t>
     </dgm:pt>
     <dgm:pt modelId="{36F2AFAF-F887-DD49-AD9E-328358184C3A}" type="pres">
       <dgm:prSet presAssocID="{E3B7B8CF-ED15-5249-8832-B4AB3725601E}" presName="childTextBox" presStyleLbl="fgAccFollowNode1" presStyleIdx="1" presStyleCnt="6">
@@ -2832,6 +2848,13 @@
         </dgm:presLayoutVars>
       </dgm:prSet>
       <dgm:spPr/>
+      <dgm:t>
+        <a:bodyPr/>
+        <a:lstStyle/>
+        <a:p>
+          <a:endParaRPr lang="en-US"/>
+        </a:p>
+      </dgm:t>
     </dgm:pt>
     <dgm:pt modelId="{D61F5191-C96D-E140-9139-BC77A7BF53CE}" type="pres">
       <dgm:prSet presAssocID="{E055B387-831E-3848-9D59-D97D5A4DB586}" presName="childTextBox" presStyleLbl="fgAccFollowNode1" presStyleIdx="2" presStyleCnt="6">
@@ -2840,6 +2863,13 @@
         </dgm:presLayoutVars>
       </dgm:prSet>
       <dgm:spPr/>
+      <dgm:t>
+        <a:bodyPr/>
+        <a:lstStyle/>
+        <a:p>
+          <a:endParaRPr lang="en-US"/>
+        </a:p>
+      </dgm:t>
     </dgm:pt>
     <dgm:pt modelId="{53C022A8-9F5C-E241-A832-51BBDE4E9AC5}" type="pres">
       <dgm:prSet presAssocID="{A4B99DFB-F5B2-9847-8572-20B37FB228E6}" presName="childTextBox" presStyleLbl="fgAccFollowNode1" presStyleIdx="3" presStyleCnt="6">
@@ -2848,6 +2878,13 @@
         </dgm:presLayoutVars>
       </dgm:prSet>
       <dgm:spPr/>
+      <dgm:t>
+        <a:bodyPr/>
+        <a:lstStyle/>
+        <a:p>
+          <a:endParaRPr lang="en-US"/>
+        </a:p>
+      </dgm:t>
     </dgm:pt>
     <dgm:pt modelId="{13C6CF5D-9190-8A4A-805F-C60CCD441072}" type="pres">
       <dgm:prSet presAssocID="{06736642-D389-E442-8048-977C37C96CA4}" presName="childTextBox" presStyleLbl="fgAccFollowNode1" presStyleIdx="4" presStyleCnt="6">
@@ -2856,6 +2893,13 @@
         </dgm:presLayoutVars>
       </dgm:prSet>
       <dgm:spPr/>
+      <dgm:t>
+        <a:bodyPr/>
+        <a:lstStyle/>
+        <a:p>
+          <a:endParaRPr lang="en-US"/>
+        </a:p>
+      </dgm:t>
     </dgm:pt>
     <dgm:pt modelId="{DB618EB2-E828-A643-B20E-87DAF513D3C9}" type="pres">
       <dgm:prSet presAssocID="{5D15EA2A-0935-6F44-935A-C396EB38F53F}" presName="childTextBox" presStyleLbl="fgAccFollowNode1" presStyleIdx="5" presStyleCnt="6">
@@ -2864,6 +2908,13 @@
         </dgm:presLayoutVars>
       </dgm:prSet>
       <dgm:spPr/>
+      <dgm:t>
+        <a:bodyPr/>
+        <a:lstStyle/>
+        <a:p>
+          <a:endParaRPr lang="en-US"/>
+        </a:p>
+      </dgm:t>
     </dgm:pt>
     <dgm:pt modelId="{6A525022-025E-3D4B-A7F8-BB402E63C2A0}" type="pres">
       <dgm:prSet presAssocID="{CF4D92F8-D3F6-FB42-8857-068866810F3A}" presName="sp" presStyleCnt="0"/>
@@ -2895,6 +2946,13 @@
     <dgm:pt modelId="{33F52601-783C-254D-98BB-475875C90FFB}" type="pres">
       <dgm:prSet presAssocID="{F8A4A24F-DB6E-5B44-B1DD-CCB25A758DBB}" presName="parentTextArrow" presStyleLbl="node1" presStyleIdx="2" presStyleCnt="4"/>
       <dgm:spPr/>
+      <dgm:t>
+        <a:bodyPr/>
+        <a:lstStyle/>
+        <a:p>
+          <a:endParaRPr lang="en-US"/>
+        </a:p>
+      </dgm:t>
     </dgm:pt>
     <dgm:pt modelId="{C2A69908-2517-724C-BCAD-57678C63A15F}" type="pres">
       <dgm:prSet presAssocID="{6374F230-AE60-1048-851E-B323EDECAD0C}" presName="sp" presStyleCnt="0"/>
@@ -2907,31 +2965,38 @@
     <dgm:pt modelId="{F54DD52A-F347-0F43-A36B-6F615394613B}" type="pres">
       <dgm:prSet presAssocID="{0054937D-F517-A54D-84E4-A8B34FE6EA86}" presName="parentTextArrow" presStyleLbl="node1" presStyleIdx="3" presStyleCnt="4"/>
       <dgm:spPr/>
+      <dgm:t>
+        <a:bodyPr/>
+        <a:lstStyle/>
+        <a:p>
+          <a:endParaRPr lang="en-US"/>
+        </a:p>
+      </dgm:t>
     </dgm:pt>
   </dgm:ptLst>
   <dgm:cxnLst>
+    <dgm:cxn modelId="{00E2713A-CDD1-5E4D-B45C-54566B520973}" srcId="{73D78044-8498-8D4D-8B17-211B2692FB4C}" destId="{C90D4AF1-EC56-6B4B-AF2F-811730ADA0B9}" srcOrd="3" destOrd="0" parTransId="{1FF2441C-04B4-2145-97E8-931B71EC4B70}" sibTransId="{A8491E77-8B56-2943-821C-BD2075856DF9}"/>
+    <dgm:cxn modelId="{7FE4785C-F6D0-724A-B859-1BC20B73829B}" type="presOf" srcId="{0054937D-F517-A54D-84E4-A8B34FE6EA86}" destId="{F54DD52A-F347-0F43-A36B-6F615394613B}" srcOrd="0" destOrd="0" presId="urn:microsoft.com/office/officeart/2005/8/layout/process4"/>
+    <dgm:cxn modelId="{E8C8E86D-6491-6A47-9D96-A6C8CE3441F6}" type="presOf" srcId="{478A6395-6A47-544F-AEB7-6E7CE893456F}" destId="{B76009E1-EC6D-504C-AFAF-E7F56B3DA4ED}" srcOrd="0" destOrd="0" presId="urn:microsoft.com/office/officeart/2005/8/layout/process4"/>
+    <dgm:cxn modelId="{65557599-F4DB-4F47-80A8-82A70C99CFAD}" type="presOf" srcId="{5D15EA2A-0935-6F44-935A-C396EB38F53F}" destId="{DB618EB2-E828-A643-B20E-87DAF513D3C9}" srcOrd="0" destOrd="0" presId="urn:microsoft.com/office/officeart/2005/8/layout/process4"/>
+    <dgm:cxn modelId="{3A0820FB-C591-6C4D-BC27-537E6FAC13CA}" type="presOf" srcId="{C90D4AF1-EC56-6B4B-AF2F-811730ADA0B9}" destId="{51E9CDBB-E0B0-0141-9E55-20A6BFEDAFFF}" srcOrd="0" destOrd="0" presId="urn:microsoft.com/office/officeart/2005/8/layout/process4"/>
+    <dgm:cxn modelId="{3F313F11-738F-6F4B-BFC5-91EC4A92C07E}" type="presOf" srcId="{F8A4A24F-DB6E-5B44-B1DD-CCB25A758DBB}" destId="{33F52601-783C-254D-98BB-475875C90FFB}" srcOrd="0" destOrd="0" presId="urn:microsoft.com/office/officeart/2005/8/layout/process4"/>
+    <dgm:cxn modelId="{97415DCB-F73B-0C4D-9CC7-100C0B9A50DC}" type="presOf" srcId="{73D78044-8498-8D4D-8B17-211B2692FB4C}" destId="{201017B6-863D-4043-9541-11D435818326}" srcOrd="0" destOrd="0" presId="urn:microsoft.com/office/officeart/2005/8/layout/process4"/>
     <dgm:cxn modelId="{18602924-F626-D348-8D9A-3FC8B541D98F}" srcId="{73D78044-8498-8D4D-8B17-211B2692FB4C}" destId="{F8A4A24F-DB6E-5B44-B1DD-CCB25A758DBB}" srcOrd="1" destOrd="0" parTransId="{D15865B2-8C8B-324D-A3D7-D4FCBBBDD3D1}" sibTransId="{DB13A231-5CEE-9349-A1E1-B66ECA7E46BE}"/>
-    <dgm:cxn modelId="{AF03A6A9-73BC-AC4B-9E32-573BB944127F}" srcId="{73D78044-8498-8D4D-8B17-211B2692FB4C}" destId="{0054937D-F517-A54D-84E4-A8B34FE6EA86}" srcOrd="0" destOrd="0" parTransId="{D949AB94-A8EB-6F4D-9558-03BC2D13B678}" sibTransId="{6374F230-AE60-1048-851E-B323EDECAD0C}"/>
-    <dgm:cxn modelId="{E8C8E86D-6491-6A47-9D96-A6C8CE3441F6}" type="presOf" srcId="{478A6395-6A47-544F-AEB7-6E7CE893456F}" destId="{B76009E1-EC6D-504C-AFAF-E7F56B3DA4ED}" srcOrd="0" destOrd="0" presId="urn:microsoft.com/office/officeart/2005/8/layout/process4"/>
+    <dgm:cxn modelId="{3FAE2372-EC4C-E642-A243-8E6A58DAC292}" srcId="{C90D4AF1-EC56-6B4B-AF2F-811730ADA0B9}" destId="{A4B99DFB-F5B2-9847-8572-20B37FB228E6}" srcOrd="3" destOrd="0" parTransId="{17BBD0C0-1904-1141-951B-F076C2601B01}" sibTransId="{51C2C5BE-7949-CE42-A80C-27FAE7912C56}"/>
+    <dgm:cxn modelId="{FB9325B7-180E-7A45-B7E7-61716B9B82B4}" type="presOf" srcId="{E3B7B8CF-ED15-5249-8832-B4AB3725601E}" destId="{36F2AFAF-F887-DD49-AD9E-328358184C3A}" srcOrd="0" destOrd="0" presId="urn:microsoft.com/office/officeart/2005/8/layout/process4"/>
+    <dgm:cxn modelId="{50C9BC42-F630-7748-A994-864170B6AE78}" srcId="{73D78044-8498-8D4D-8B17-211B2692FB4C}" destId="{478A6395-6A47-544F-AEB7-6E7CE893456F}" srcOrd="2" destOrd="0" parTransId="{294A8962-D84F-3240-B1A7-3542F5B48485}" sibTransId="{CF4D92F8-D3F6-FB42-8857-068866810F3A}"/>
+    <dgm:cxn modelId="{A9F21847-1E21-BA4A-96AC-B440E35AE860}" type="presOf" srcId="{E055B387-831E-3848-9D59-D97D5A4DB586}" destId="{D61F5191-C96D-E140-9139-BC77A7BF53CE}" srcOrd="0" destOrd="0" presId="urn:microsoft.com/office/officeart/2005/8/layout/process4"/>
+    <dgm:cxn modelId="{6658BC5D-A652-7246-A315-66FBDE5EEBF1}" srcId="{C90D4AF1-EC56-6B4B-AF2F-811730ADA0B9}" destId="{5D15EA2A-0935-6F44-935A-C396EB38F53F}" srcOrd="5" destOrd="0" parTransId="{30491C88-7838-6C4F-9B8B-A3E7F40EF9E4}" sibTransId="{DD86F55C-B8AF-2849-B3FF-7701946229F9}"/>
     <dgm:cxn modelId="{2F6F67FD-3B0A-E946-B8C9-9DC04D526B82}" srcId="{C90D4AF1-EC56-6B4B-AF2F-811730ADA0B9}" destId="{E055B387-831E-3848-9D59-D97D5A4DB586}" srcOrd="2" destOrd="0" parTransId="{CA02151E-5573-2840-837D-34B45DBABA73}" sibTransId="{1990DCAE-0BE9-424C-875A-EFB290CD1A23}"/>
     <dgm:cxn modelId="{435B7382-992A-DF42-9AF5-F401357CDA09}" type="presOf" srcId="{06947581-C661-D648-88FD-A9ED3867A838}" destId="{F16B6330-D228-AF4E-B505-36448BACBFFC}" srcOrd="0" destOrd="0" presId="urn:microsoft.com/office/officeart/2005/8/layout/process4"/>
-    <dgm:cxn modelId="{65557599-F4DB-4F47-80A8-82A70C99CFAD}" type="presOf" srcId="{5D15EA2A-0935-6F44-935A-C396EB38F53F}" destId="{DB618EB2-E828-A643-B20E-87DAF513D3C9}" srcOrd="0" destOrd="0" presId="urn:microsoft.com/office/officeart/2005/8/layout/process4"/>
-    <dgm:cxn modelId="{6658BC5D-A652-7246-A315-66FBDE5EEBF1}" srcId="{C90D4AF1-EC56-6B4B-AF2F-811730ADA0B9}" destId="{5D15EA2A-0935-6F44-935A-C396EB38F53F}" srcOrd="5" destOrd="0" parTransId="{30491C88-7838-6C4F-9B8B-A3E7F40EF9E4}" sibTransId="{DD86F55C-B8AF-2849-B3FF-7701946229F9}"/>
-    <dgm:cxn modelId="{FB9325B7-180E-7A45-B7E7-61716B9B82B4}" type="presOf" srcId="{E3B7B8CF-ED15-5249-8832-B4AB3725601E}" destId="{36F2AFAF-F887-DD49-AD9E-328358184C3A}" srcOrd="0" destOrd="0" presId="urn:microsoft.com/office/officeart/2005/8/layout/process4"/>
-    <dgm:cxn modelId="{97415DCB-F73B-0C4D-9CC7-100C0B9A50DC}" type="presOf" srcId="{73D78044-8498-8D4D-8B17-211B2692FB4C}" destId="{201017B6-863D-4043-9541-11D435818326}" srcOrd="0" destOrd="0" presId="urn:microsoft.com/office/officeart/2005/8/layout/process4"/>
+    <dgm:cxn modelId="{656EFA55-C53C-6342-9337-10000BBEE481}" type="presOf" srcId="{A4B99DFB-F5B2-9847-8572-20B37FB228E6}" destId="{53C022A8-9F5C-E241-A832-51BBDE4E9AC5}" srcOrd="0" destOrd="0" presId="urn:microsoft.com/office/officeart/2005/8/layout/process4"/>
+    <dgm:cxn modelId="{40DEB312-AE1E-884C-8A7D-C714BD6A079D}" type="presOf" srcId="{C90D4AF1-EC56-6B4B-AF2F-811730ADA0B9}" destId="{2239CF04-2773-1D4C-9BF0-245FE270F59D}" srcOrd="1" destOrd="0" presId="urn:microsoft.com/office/officeart/2005/8/layout/process4"/>
     <dgm:cxn modelId="{34C7D0F4-81E8-3346-983D-198A22287B85}" srcId="{C90D4AF1-EC56-6B4B-AF2F-811730ADA0B9}" destId="{06736642-D389-E442-8048-977C37C96CA4}" srcOrd="4" destOrd="0" parTransId="{118090B6-11B9-BE46-BA64-2898E4C5C71C}" sibTransId="{59B4789A-33C0-8C4B-9257-0DA78E427458}"/>
-    <dgm:cxn modelId="{40DEB312-AE1E-884C-8A7D-C714BD6A079D}" type="presOf" srcId="{C90D4AF1-EC56-6B4B-AF2F-811730ADA0B9}" destId="{2239CF04-2773-1D4C-9BF0-245FE270F59D}" srcOrd="1" destOrd="0" presId="urn:microsoft.com/office/officeart/2005/8/layout/process4"/>
-    <dgm:cxn modelId="{7FE4785C-F6D0-724A-B859-1BC20B73829B}" type="presOf" srcId="{0054937D-F517-A54D-84E4-A8B34FE6EA86}" destId="{F54DD52A-F347-0F43-A36B-6F615394613B}" srcOrd="0" destOrd="0" presId="urn:microsoft.com/office/officeart/2005/8/layout/process4"/>
     <dgm:cxn modelId="{B78D9BD9-9AE1-B64E-BBF4-28D652A3E080}" type="presOf" srcId="{06736642-D389-E442-8048-977C37C96CA4}" destId="{13C6CF5D-9190-8A4A-805F-C60CCD441072}" srcOrd="0" destOrd="0" presId="urn:microsoft.com/office/officeart/2005/8/layout/process4"/>
+    <dgm:cxn modelId="{AF03A6A9-73BC-AC4B-9E32-573BB944127F}" srcId="{73D78044-8498-8D4D-8B17-211B2692FB4C}" destId="{0054937D-F517-A54D-84E4-A8B34FE6EA86}" srcOrd="0" destOrd="0" parTransId="{D949AB94-A8EB-6F4D-9558-03BC2D13B678}" sibTransId="{6374F230-AE60-1048-851E-B323EDECAD0C}"/>
+    <dgm:cxn modelId="{35DE700F-E510-6F4D-AD93-D6CCE2D324F5}" srcId="{C90D4AF1-EC56-6B4B-AF2F-811730ADA0B9}" destId="{06947581-C661-D648-88FD-A9ED3867A838}" srcOrd="0" destOrd="0" parTransId="{45B20CC3-6983-4740-83B3-D3EF3E7B9D35}" sibTransId="{4210242D-254A-E744-A5C3-2A6141D8DFDD}"/>
     <dgm:cxn modelId="{2CB9F63B-812B-7743-BF24-6C4F0240C9C7}" srcId="{C90D4AF1-EC56-6B4B-AF2F-811730ADA0B9}" destId="{E3B7B8CF-ED15-5249-8832-B4AB3725601E}" srcOrd="1" destOrd="0" parTransId="{C2FB3B6C-E966-A142-9814-6459EFD17899}" sibTransId="{3717BD97-474C-C142-A944-846858AA2A65}"/>
-    <dgm:cxn modelId="{3FAE2372-EC4C-E642-A243-8E6A58DAC292}" srcId="{C90D4AF1-EC56-6B4B-AF2F-811730ADA0B9}" destId="{A4B99DFB-F5B2-9847-8572-20B37FB228E6}" srcOrd="3" destOrd="0" parTransId="{17BBD0C0-1904-1141-951B-F076C2601B01}" sibTransId="{51C2C5BE-7949-CE42-A80C-27FAE7912C56}"/>
-    <dgm:cxn modelId="{3A0820FB-C591-6C4D-BC27-537E6FAC13CA}" type="presOf" srcId="{C90D4AF1-EC56-6B4B-AF2F-811730ADA0B9}" destId="{51E9CDBB-E0B0-0141-9E55-20A6BFEDAFFF}" srcOrd="0" destOrd="0" presId="urn:microsoft.com/office/officeart/2005/8/layout/process4"/>
-    <dgm:cxn modelId="{50C9BC42-F630-7748-A994-864170B6AE78}" srcId="{73D78044-8498-8D4D-8B17-211B2692FB4C}" destId="{478A6395-6A47-544F-AEB7-6E7CE893456F}" srcOrd="2" destOrd="0" parTransId="{294A8962-D84F-3240-B1A7-3542F5B48485}" sibTransId="{CF4D92F8-D3F6-FB42-8857-068866810F3A}"/>
-    <dgm:cxn modelId="{35DE700F-E510-6F4D-AD93-D6CCE2D324F5}" srcId="{C90D4AF1-EC56-6B4B-AF2F-811730ADA0B9}" destId="{06947581-C661-D648-88FD-A9ED3867A838}" srcOrd="0" destOrd="0" parTransId="{45B20CC3-6983-4740-83B3-D3EF3E7B9D35}" sibTransId="{4210242D-254A-E744-A5C3-2A6141D8DFDD}"/>
-    <dgm:cxn modelId="{656EFA55-C53C-6342-9337-10000BBEE481}" type="presOf" srcId="{A4B99DFB-F5B2-9847-8572-20B37FB228E6}" destId="{53C022A8-9F5C-E241-A832-51BBDE4E9AC5}" srcOrd="0" destOrd="0" presId="urn:microsoft.com/office/officeart/2005/8/layout/process4"/>
-    <dgm:cxn modelId="{00E2713A-CDD1-5E4D-B45C-54566B520973}" srcId="{73D78044-8498-8D4D-8B17-211B2692FB4C}" destId="{C90D4AF1-EC56-6B4B-AF2F-811730ADA0B9}" srcOrd="3" destOrd="0" parTransId="{1FF2441C-04B4-2145-97E8-931B71EC4B70}" sibTransId="{A8491E77-8B56-2943-821C-BD2075856DF9}"/>
-    <dgm:cxn modelId="{A9F21847-1E21-BA4A-96AC-B440E35AE860}" type="presOf" srcId="{E055B387-831E-3848-9D59-D97D5A4DB586}" destId="{D61F5191-C96D-E140-9139-BC77A7BF53CE}" srcOrd="0" destOrd="0" presId="urn:microsoft.com/office/officeart/2005/8/layout/process4"/>
-    <dgm:cxn modelId="{3F313F11-738F-6F4B-BFC5-91EC4A92C07E}" type="presOf" srcId="{F8A4A24F-DB6E-5B44-B1DD-CCB25A758DBB}" destId="{33F52601-783C-254D-98BB-475875C90FFB}" srcOrd="0" destOrd="0" presId="urn:microsoft.com/office/officeart/2005/8/layout/process4"/>
     <dgm:cxn modelId="{165A9F09-37D0-1942-BDA4-701E3AAAD414}" type="presParOf" srcId="{201017B6-863D-4043-9541-11D435818326}" destId="{16CFC8EF-7054-384B-91FC-7C69CCC84276}" srcOrd="0" destOrd="0" presId="urn:microsoft.com/office/officeart/2005/8/layout/process4"/>
     <dgm:cxn modelId="{EBDC29B4-E433-9C4D-8737-95D5C70DAAFA}" type="presParOf" srcId="{16CFC8EF-7054-384B-91FC-7C69CCC84276}" destId="{51E9CDBB-E0B0-0141-9E55-20A6BFEDAFFF}" srcOrd="0" destOrd="0" presId="urn:microsoft.com/office/officeart/2005/8/layout/process4"/>
     <dgm:cxn modelId="{3F5F38EB-1A84-8940-B50C-A72F7170E0C8}" type="presParOf" srcId="{16CFC8EF-7054-384B-91FC-7C69CCC84276}" destId="{2239CF04-2773-1D4C-9BF0-245FE270F59D}" srcOrd="1" destOrd="0" presId="urn:microsoft.com/office/officeart/2005/8/layout/process4"/>
@@ -7418,7 +7483,7 @@
           <a:p>
             <a:fld id="{46BC3617-597D-1247-997B-8DDF16F77B98}" type="datetimeFigureOut">
               <a:rPr lang="en-US" smtClean="0"/>
-              <a:t>1/6/16</a:t>
+              <a:t>1/8/16</a:t>
             </a:fld>
             <a:endParaRPr lang="en-US"/>
           </a:p>
@@ -7732,11 +7797,11 @@
           <a:p>
             <a:r>
               <a:rPr lang="en-US" dirty="0" smtClean="0"/>
-              <a:t>System availability</a:t>
+              <a:t>Superimpose</a:t>
             </a:r>
             <a:r>
               <a:rPr lang="en-US" baseline="0" dirty="0" smtClean="0"/>
-              <a:t> and resource utilization can be monitored in a similar fashion</a:t>
+              <a:t> ELK stack here</a:t>
             </a:r>
             <a:endParaRPr lang="en-US" dirty="0"/>
           </a:p>
@@ -7759,7 +7824,99 @@
           <a:p>
             <a:fld id="{0234187D-EF17-904D-8546-F963831F2721}" type="slidenum">
               <a:rPr lang="en-US" smtClean="0"/>
-              <a:t>7</a:t>
+              <a:t>2</a:t>
+            </a:fld>
+            <a:endParaRPr lang="en-US"/>
+          </a:p>
+        </p:txBody>
+      </p:sp>
+    </p:spTree>
+    <p:extLst>
+      <p:ext uri="{BB962C8B-B14F-4D97-AF65-F5344CB8AC3E}">
+        <p14:creationId xmlns:p14="http://schemas.microsoft.com/office/powerpoint/2010/main" val="3854889495"/>
+      </p:ext>
+    </p:extLst>
+  </p:cSld>
+  <p:clrMapOvr>
+    <a:masterClrMapping/>
+  </p:clrMapOvr>
+</p:notes>
+</file>
+
+<file path=ppt/notesSlides/notesSlide2.xml><?xml version="1.0" encoding="utf-8"?>
+<p:notes xmlns:a="http://schemas.openxmlformats.org/drawingml/2006/main" xmlns:r="http://schemas.openxmlformats.org/officeDocument/2006/relationships" xmlns:p="http://schemas.openxmlformats.org/presentationml/2006/main">
+  <p:cSld>
+    <p:spTree>
+      <p:nvGrpSpPr>
+        <p:cNvPr id="1" name=""/>
+        <p:cNvGrpSpPr/>
+        <p:nvPr/>
+      </p:nvGrpSpPr>
+      <p:grpSpPr>
+        <a:xfrm>
+          <a:off x="0" y="0"/>
+          <a:ext cx="0" cy="0"/>
+          <a:chOff x="0" y="0"/>
+          <a:chExt cx="0" cy="0"/>
+        </a:xfrm>
+      </p:grpSpPr>
+      <p:sp>
+        <p:nvSpPr>
+          <p:cNvPr id="2" name="Slide Image Placeholder 1"/>
+          <p:cNvSpPr>
+            <a:spLocks noGrp="1" noRot="1" noChangeAspect="1"/>
+          </p:cNvSpPr>
+          <p:nvPr>
+            <p:ph type="sldImg"/>
+          </p:nvPr>
+        </p:nvSpPr>
+        <p:spPr/>
+      </p:sp>
+      <p:sp>
+        <p:nvSpPr>
+          <p:cNvPr id="3" name="Notes Placeholder 2"/>
+          <p:cNvSpPr>
+            <a:spLocks noGrp="1"/>
+          </p:cNvSpPr>
+          <p:nvPr>
+            <p:ph type="body" idx="1"/>
+          </p:nvPr>
+        </p:nvSpPr>
+        <p:spPr/>
+        <p:txBody>
+          <a:bodyPr/>
+          <a:lstStyle/>
+          <a:p>
+            <a:r>
+              <a:rPr lang="en-US" dirty="0" smtClean="0"/>
+              <a:t>System availability</a:t>
+            </a:r>
+            <a:r>
+              <a:rPr lang="en-US" baseline="0" dirty="0" smtClean="0"/>
+              <a:t> and resource utilization can be monitored in a similar fashion</a:t>
+            </a:r>
+            <a:endParaRPr lang="en-US" dirty="0"/>
+          </a:p>
+        </p:txBody>
+      </p:sp>
+      <p:sp>
+        <p:nvSpPr>
+          <p:cNvPr id="4" name="Slide Number Placeholder 3"/>
+          <p:cNvSpPr>
+            <a:spLocks noGrp="1"/>
+          </p:cNvSpPr>
+          <p:nvPr>
+            <p:ph type="sldNum" sz="quarter" idx="10"/>
+          </p:nvPr>
+        </p:nvSpPr>
+        <p:spPr/>
+        <p:txBody>
+          <a:bodyPr/>
+          <a:lstStyle/>
+          <a:p>
+            <a:fld id="{0234187D-EF17-904D-8546-F963831F2721}" type="slidenum">
+              <a:rPr lang="en-US" smtClean="0"/>
+              <a:t>6</a:t>
             </a:fld>
             <a:endParaRPr lang="en-US"/>
           </a:p>
@@ -7959,7 +8116,7 @@
           <a:p>
             <a:fld id="{4A5245BB-0D79-6B47-AF19-6C2947DF989D}" type="datetimeFigureOut">
               <a:rPr lang="en-US" smtClean="0"/>
-              <a:t>1/6/16</a:t>
+              <a:t>1/8/16</a:t>
             </a:fld>
             <a:endParaRPr lang="en-US"/>
           </a:p>
@@ -8129,7 +8286,7 @@
           <a:p>
             <a:fld id="{4A5245BB-0D79-6B47-AF19-6C2947DF989D}" type="datetimeFigureOut">
               <a:rPr lang="en-US" smtClean="0"/>
-              <a:t>1/6/16</a:t>
+              <a:t>1/8/16</a:t>
             </a:fld>
             <a:endParaRPr lang="en-US"/>
           </a:p>
@@ -8309,7 +8466,7 @@
           <a:p>
             <a:fld id="{4A5245BB-0D79-6B47-AF19-6C2947DF989D}" type="datetimeFigureOut">
               <a:rPr lang="en-US" smtClean="0"/>
-              <a:t>1/6/16</a:t>
+              <a:t>1/8/16</a:t>
             </a:fld>
             <a:endParaRPr lang="en-US"/>
           </a:p>
@@ -8479,7 +8636,7 @@
           <a:p>
             <a:fld id="{4A5245BB-0D79-6B47-AF19-6C2947DF989D}" type="datetimeFigureOut">
               <a:rPr lang="en-US" smtClean="0"/>
-              <a:t>1/6/16</a:t>
+              <a:t>1/8/16</a:t>
             </a:fld>
             <a:endParaRPr lang="en-US"/>
           </a:p>
@@ -8725,7 +8882,7 @@
           <a:p>
             <a:fld id="{4A5245BB-0D79-6B47-AF19-6C2947DF989D}" type="datetimeFigureOut">
               <a:rPr lang="en-US" smtClean="0"/>
-              <a:t>1/6/16</a:t>
+              <a:t>1/8/16</a:t>
             </a:fld>
             <a:endParaRPr lang="en-US"/>
           </a:p>
@@ -9013,7 +9170,7 @@
           <a:p>
             <a:fld id="{4A5245BB-0D79-6B47-AF19-6C2947DF989D}" type="datetimeFigureOut">
               <a:rPr lang="en-US" smtClean="0"/>
-              <a:t>1/6/16</a:t>
+              <a:t>1/8/16</a:t>
             </a:fld>
             <a:endParaRPr lang="en-US"/>
           </a:p>
@@ -9435,7 +9592,7 @@
           <a:p>
             <a:fld id="{4A5245BB-0D79-6B47-AF19-6C2947DF989D}" type="datetimeFigureOut">
               <a:rPr lang="en-US" smtClean="0"/>
-              <a:t>1/6/16</a:t>
+              <a:t>1/8/16</a:t>
             </a:fld>
             <a:endParaRPr lang="en-US"/>
           </a:p>
@@ -9553,7 +9710,7 @@
           <a:p>
             <a:fld id="{4A5245BB-0D79-6B47-AF19-6C2947DF989D}" type="datetimeFigureOut">
               <a:rPr lang="en-US" smtClean="0"/>
-              <a:t>1/6/16</a:t>
+              <a:t>1/8/16</a:t>
             </a:fld>
             <a:endParaRPr lang="en-US"/>
           </a:p>
@@ -9648,7 +9805,7 @@
           <a:p>
             <a:fld id="{4A5245BB-0D79-6B47-AF19-6C2947DF989D}" type="datetimeFigureOut">
               <a:rPr lang="en-US" smtClean="0"/>
-              <a:t>1/6/16</a:t>
+              <a:t>1/8/16</a:t>
             </a:fld>
             <a:endParaRPr lang="en-US"/>
           </a:p>
@@ -9925,7 +10082,7 @@
           <a:p>
             <a:fld id="{4A5245BB-0D79-6B47-AF19-6C2947DF989D}" type="datetimeFigureOut">
               <a:rPr lang="en-US" smtClean="0"/>
-              <a:t>1/6/16</a:t>
+              <a:t>1/8/16</a:t>
             </a:fld>
             <a:endParaRPr lang="en-US"/>
           </a:p>
@@ -10178,7 +10335,7 @@
           <a:p>
             <a:fld id="{4A5245BB-0D79-6B47-AF19-6C2947DF989D}" type="datetimeFigureOut">
               <a:rPr lang="en-US" smtClean="0"/>
-              <a:t>1/6/16</a:t>
+              <a:t>1/8/16</a:t>
             </a:fld>
             <a:endParaRPr lang="en-US"/>
           </a:p>
@@ -10391,7 +10548,7 @@
           <a:p>
             <a:fld id="{4A5245BB-0D79-6B47-AF19-6C2947DF989D}" type="datetimeFigureOut">
               <a:rPr lang="en-US" smtClean="0"/>
-              <a:t>1/6/16</a:t>
+              <a:t>1/8/16</a:t>
             </a:fld>
             <a:endParaRPr lang="en-US"/>
           </a:p>
@@ -10781,7 +10938,11 @@
           <a:bodyPr/>
           <a:lstStyle/>
           <a:p>
-            <a:endParaRPr lang="en-US"/>
+            <a:r>
+              <a:rPr lang="en-US" dirty="0" smtClean="0"/>
+              <a:t>Application Platform Monitoring</a:t>
+            </a:r>
+            <a:endParaRPr lang="en-US" dirty="0"/>
           </a:p>
         </p:txBody>
       </p:sp>
@@ -10800,7 +10961,11 @@
           <a:bodyPr/>
           <a:lstStyle/>
           <a:p>
-            <a:endParaRPr lang="en-US"/>
+            <a:r>
+              <a:rPr lang="en-US" dirty="0" smtClean="0"/>
+              <a:t>Architecture and Early Prototypes</a:t>
+            </a:r>
+            <a:endParaRPr lang="en-US" dirty="0"/>
           </a:p>
         </p:txBody>
       </p:sp>
@@ -10846,14 +11011,777 @@
         </p:nvSpPr>
         <p:spPr/>
         <p:txBody>
-          <a:bodyPr>
-            <a:normAutofit fontScale="90000"/>
+          <a:bodyPr/>
+          <a:lstStyle/>
+          <a:p>
+            <a:r>
+              <a:rPr lang="en-US" dirty="0" smtClean="0"/>
+              <a:t>Overall </a:t>
+            </a:r>
+            <a:r>
+              <a:rPr lang="en-US" dirty="0" smtClean="0"/>
+              <a:t>APM Architecture</a:t>
+            </a:r>
+            <a:endParaRPr lang="en-US" dirty="0"/>
+          </a:p>
+        </p:txBody>
+      </p:sp>
+      <p:sp>
+        <p:nvSpPr>
+          <p:cNvPr id="4" name="Rectangle 3"/>
+          <p:cNvSpPr/>
+          <p:nvPr/>
+        </p:nvSpPr>
+        <p:spPr>
+          <a:xfrm>
+            <a:off x="3385872" y="1567913"/>
+            <a:ext cx="2199339" cy="932973"/>
+          </a:xfrm>
+          <a:prstGeom prst="rect">
+            <a:avLst/>
+          </a:prstGeom>
+          <a:solidFill>
+            <a:srgbClr val="1F497D"/>
+          </a:solidFill>
+        </p:spPr>
+        <p:style>
+          <a:lnRef idx="1">
+            <a:schemeClr val="accent1"/>
+          </a:lnRef>
+          <a:fillRef idx="3">
+            <a:schemeClr val="accent1"/>
+          </a:fillRef>
+          <a:effectRef idx="2">
+            <a:schemeClr val="accent1"/>
+          </a:effectRef>
+          <a:fontRef idx="minor">
+            <a:schemeClr val="lt1"/>
+          </a:fontRef>
+        </p:style>
+        <p:txBody>
+          <a:bodyPr rtlCol="0" anchor="ctr"/>
+          <a:lstStyle/>
+          <a:p>
+            <a:pPr algn="ctr"/>
+            <a:r>
+              <a:rPr lang="en-US" dirty="0" smtClean="0"/>
+              <a:t>Frontend Server/</a:t>
+            </a:r>
+          </a:p>
+          <a:p>
+            <a:pPr algn="ctr"/>
+            <a:r>
+              <a:rPr lang="en-US" dirty="0" smtClean="0"/>
+              <a:t>Load Balancer</a:t>
+            </a:r>
+            <a:endParaRPr lang="en-US" dirty="0"/>
+          </a:p>
+        </p:txBody>
+      </p:sp>
+      <p:sp>
+        <p:nvSpPr>
+          <p:cNvPr id="5" name="Rectangle 4"/>
+          <p:cNvSpPr/>
+          <p:nvPr/>
+        </p:nvSpPr>
+        <p:spPr>
+          <a:xfrm>
+            <a:off x="3385872" y="2894554"/>
+            <a:ext cx="2199339" cy="1804252"/>
+          </a:xfrm>
+          <a:prstGeom prst="rect">
+            <a:avLst/>
+          </a:prstGeom>
+          <a:solidFill>
+            <a:srgbClr val="1F497D"/>
+          </a:solidFill>
+        </p:spPr>
+        <p:style>
+          <a:lnRef idx="1">
+            <a:schemeClr val="accent1"/>
+          </a:lnRef>
+          <a:fillRef idx="3">
+            <a:schemeClr val="accent1"/>
+          </a:fillRef>
+          <a:effectRef idx="2">
+            <a:schemeClr val="accent1"/>
+          </a:effectRef>
+          <a:fontRef idx="minor">
+            <a:schemeClr val="lt1"/>
+          </a:fontRef>
+        </p:style>
+        <p:txBody>
+          <a:bodyPr rtlCol="0" anchor="ctr"/>
+          <a:lstStyle/>
+          <a:p>
+            <a:pPr algn="ctr"/>
+            <a:r>
+              <a:rPr lang="en-US" dirty="0" smtClean="0"/>
+              <a:t>App Server</a:t>
+            </a:r>
+            <a:endParaRPr lang="en-US" dirty="0"/>
+          </a:p>
+        </p:txBody>
+      </p:sp>
+      <p:sp>
+        <p:nvSpPr>
+          <p:cNvPr id="6" name="Rectangle 5"/>
+          <p:cNvSpPr/>
+          <p:nvPr/>
+        </p:nvSpPr>
+        <p:spPr>
+          <a:xfrm>
+            <a:off x="4163395" y="4062318"/>
+            <a:ext cx="644292" cy="531277"/>
+          </a:xfrm>
+          <a:prstGeom prst="rect">
+            <a:avLst/>
+          </a:prstGeom>
+          <a:solidFill>
+            <a:srgbClr val="FF6600"/>
+          </a:solidFill>
+        </p:spPr>
+        <p:style>
+          <a:lnRef idx="1">
+            <a:schemeClr val="accent1"/>
+          </a:lnRef>
+          <a:fillRef idx="3">
+            <a:schemeClr val="accent1"/>
+          </a:fillRef>
+          <a:effectRef idx="2">
+            <a:schemeClr val="accent1"/>
+          </a:effectRef>
+          <a:fontRef idx="minor">
+            <a:schemeClr val="lt1"/>
+          </a:fontRef>
+        </p:style>
+        <p:txBody>
+          <a:bodyPr rtlCol="0" anchor="ctr"/>
+          <a:lstStyle/>
+          <a:p>
+            <a:pPr algn="ctr"/>
+            <a:r>
+              <a:rPr lang="en-US" dirty="0" smtClean="0"/>
+              <a:t>App</a:t>
+            </a:r>
+          </a:p>
+        </p:txBody>
+      </p:sp>
+      <p:cxnSp>
+        <p:nvCxnSpPr>
+          <p:cNvPr id="8" name="Straight Arrow Connector 7"/>
+          <p:cNvCxnSpPr>
+            <a:stCxn id="4" idx="2"/>
+            <a:endCxn id="5" idx="0"/>
+          </p:cNvCxnSpPr>
+          <p:nvPr/>
+        </p:nvCxnSpPr>
+        <p:spPr>
+          <a:xfrm>
+            <a:off x="4485542" y="2500886"/>
+            <a:ext cx="0" cy="393668"/>
+          </a:xfrm>
+          <a:prstGeom prst="straightConnector1">
+            <a:avLst/>
+          </a:prstGeom>
+          <a:ln>
+            <a:tailEnd type="arrow"/>
+          </a:ln>
+        </p:spPr>
+        <p:style>
+          <a:lnRef idx="2">
+            <a:schemeClr val="accent1"/>
+          </a:lnRef>
+          <a:fillRef idx="0">
+            <a:schemeClr val="accent1"/>
+          </a:fillRef>
+          <a:effectRef idx="1">
+            <a:schemeClr val="accent1"/>
+          </a:effectRef>
+          <a:fontRef idx="minor">
+            <a:schemeClr val="tx1"/>
+          </a:fontRef>
+        </p:style>
+      </p:cxnSp>
+      <p:sp>
+        <p:nvSpPr>
+          <p:cNvPr id="9" name="Rectangle 8"/>
+          <p:cNvSpPr/>
+          <p:nvPr/>
+        </p:nvSpPr>
+        <p:spPr>
+          <a:xfrm>
+            <a:off x="1454111" y="5118394"/>
+            <a:ext cx="6062861" cy="1503123"/>
+          </a:xfrm>
+          <a:prstGeom prst="rect">
+            <a:avLst/>
+          </a:prstGeom>
+          <a:solidFill>
+            <a:schemeClr val="tx2"/>
+          </a:solidFill>
+        </p:spPr>
+        <p:style>
+          <a:lnRef idx="1">
+            <a:schemeClr val="accent1"/>
+          </a:lnRef>
+          <a:fillRef idx="3">
+            <a:schemeClr val="accent1"/>
+          </a:fillRef>
+          <a:effectRef idx="2">
+            <a:schemeClr val="accent1"/>
+          </a:effectRef>
+          <a:fontRef idx="minor">
+            <a:schemeClr val="lt1"/>
+          </a:fontRef>
+        </p:style>
+        <p:txBody>
+          <a:bodyPr rtlCol="0" anchor="ctr"/>
+          <a:lstStyle/>
+          <a:p>
+            <a:pPr algn="ctr"/>
+            <a:r>
+              <a:rPr lang="en-US" dirty="0" smtClean="0"/>
+              <a:t>Cloud SDK</a:t>
+            </a:r>
+          </a:p>
+          <a:p>
+            <a:pPr algn="ctr"/>
+            <a:r>
+              <a:rPr lang="en-US" dirty="0" smtClean="0"/>
+              <a:t>(Core </a:t>
+            </a:r>
+            <a:r>
+              <a:rPr lang="en-US" dirty="0" err="1" smtClean="0"/>
+              <a:t>PaaS</a:t>
+            </a:r>
+            <a:r>
+              <a:rPr lang="en-US" dirty="0" smtClean="0"/>
+              <a:t> Cloud Services)</a:t>
+            </a:r>
+            <a:endParaRPr lang="en-US" dirty="0"/>
+          </a:p>
+        </p:txBody>
+      </p:sp>
+      <p:cxnSp>
+        <p:nvCxnSpPr>
+          <p:cNvPr id="11" name="Straight Arrow Connector 10"/>
+          <p:cNvCxnSpPr>
+            <a:stCxn id="5" idx="2"/>
+            <a:endCxn id="9" idx="0"/>
+          </p:cNvCxnSpPr>
+          <p:nvPr/>
+        </p:nvCxnSpPr>
+        <p:spPr>
+          <a:xfrm>
+            <a:off x="4485542" y="4698806"/>
+            <a:ext cx="0" cy="419588"/>
+          </a:xfrm>
+          <a:prstGeom prst="straightConnector1">
+            <a:avLst/>
+          </a:prstGeom>
+          <a:ln>
+            <a:tailEnd type="arrow"/>
+          </a:ln>
+        </p:spPr>
+        <p:style>
+          <a:lnRef idx="2">
+            <a:schemeClr val="accent1"/>
+          </a:lnRef>
+          <a:fillRef idx="0">
+            <a:schemeClr val="accent1"/>
+          </a:fillRef>
+          <a:effectRef idx="1">
+            <a:schemeClr val="accent1"/>
+          </a:effectRef>
+          <a:fontRef idx="minor">
+            <a:schemeClr val="tx1"/>
+          </a:fontRef>
+        </p:style>
+      </p:cxnSp>
+      <p:grpSp>
+        <p:nvGrpSpPr>
+          <p:cNvPr id="13" name="Group 12"/>
+          <p:cNvGrpSpPr/>
+          <p:nvPr/>
+        </p:nvGrpSpPr>
+        <p:grpSpPr>
+          <a:xfrm>
+            <a:off x="7157689" y="3194831"/>
+            <a:ext cx="1866045" cy="1205091"/>
+            <a:chOff x="3019384" y="2941457"/>
+            <a:chExt cx="2358488" cy="1529039"/>
+          </a:xfrm>
+        </p:grpSpPr>
+        <p:sp>
+          <p:nvSpPr>
+            <p:cNvPr id="14" name="Rectangle 13"/>
+            <p:cNvSpPr/>
+            <p:nvPr/>
+          </p:nvSpPr>
+          <p:spPr>
+            <a:xfrm>
+              <a:off x="3019384" y="2941457"/>
+              <a:ext cx="2358488" cy="1529039"/>
+            </a:xfrm>
+            <a:prstGeom prst="rect">
+              <a:avLst/>
+            </a:prstGeom>
+            <a:noFill/>
+            <a:ln>
+              <a:solidFill>
+                <a:schemeClr val="tx1"/>
+              </a:solidFill>
+            </a:ln>
+          </p:spPr>
+          <p:style>
+            <a:lnRef idx="1">
+              <a:schemeClr val="accent1"/>
+            </a:lnRef>
+            <a:fillRef idx="3">
+              <a:schemeClr val="accent1"/>
+            </a:fillRef>
+            <a:effectRef idx="2">
+              <a:schemeClr val="accent1"/>
+            </a:effectRef>
+            <a:fontRef idx="minor">
+              <a:schemeClr val="lt1"/>
+            </a:fontRef>
+          </p:style>
+          <p:txBody>
+            <a:bodyPr rtlCol="0" anchor="ctr"/>
+            <a:lstStyle/>
+            <a:p>
+              <a:pPr algn="ctr"/>
+              <a:endParaRPr lang="en-US"/>
+            </a:p>
+          </p:txBody>
+        </p:sp>
+        <p:pic>
+          <p:nvPicPr>
+            <p:cNvPr id="15" name="Picture 14" descr="elasticsearch.png"/>
+            <p:cNvPicPr>
+              <a:picLocks noChangeAspect="1"/>
+            </p:cNvPicPr>
+            <p:nvPr/>
+          </p:nvPicPr>
+          <p:blipFill>
+            <a:blip r:embed="rId2">
+              <a:extLst>
+                <a:ext uri="{28A0092B-C50C-407E-A947-70E740481C1C}">
+                  <a14:useLocalDpi xmlns:a14="http://schemas.microsoft.com/office/drawing/2010/main" val="0"/>
+                </a:ext>
+              </a:extLst>
+            </a:blip>
+            <a:stretch>
+              <a:fillRect/>
+            </a:stretch>
+          </p:blipFill>
+          <p:spPr>
+            <a:xfrm>
+              <a:off x="3269592" y="3032163"/>
+              <a:ext cx="1875022" cy="1327516"/>
+            </a:xfrm>
+            <a:prstGeom prst="rect">
+              <a:avLst/>
+            </a:prstGeom>
+          </p:spPr>
+        </p:pic>
+      </p:grpSp>
+      <p:cxnSp>
+        <p:nvCxnSpPr>
+          <p:cNvPr id="17" name="Elbow Connector 16"/>
+          <p:cNvCxnSpPr>
+            <a:stCxn id="4" idx="3"/>
+            <a:endCxn id="14" idx="0"/>
+          </p:cNvCxnSpPr>
+          <p:nvPr/>
+        </p:nvCxnSpPr>
+        <p:spPr>
+          <a:xfrm>
+            <a:off x="5585211" y="2034400"/>
+            <a:ext cx="2505501" cy="1160431"/>
+          </a:xfrm>
+          <a:prstGeom prst="bentConnector2">
+            <a:avLst/>
+          </a:prstGeom>
+          <a:ln>
+            <a:tailEnd type="arrow"/>
+          </a:ln>
+        </p:spPr>
+        <p:style>
+          <a:lnRef idx="2">
+            <a:schemeClr val="accent1"/>
+          </a:lnRef>
+          <a:fillRef idx="0">
+            <a:schemeClr val="accent1"/>
+          </a:fillRef>
+          <a:effectRef idx="1">
+            <a:schemeClr val="accent1"/>
+          </a:effectRef>
+          <a:fontRef idx="minor">
+            <a:schemeClr val="tx1"/>
+          </a:fontRef>
+        </p:style>
+      </p:cxnSp>
+      <p:sp>
+        <p:nvSpPr>
+          <p:cNvPr id="18" name="Line Callout 1 17"/>
+          <p:cNvSpPr/>
+          <p:nvPr/>
+        </p:nvSpPr>
+        <p:spPr>
+          <a:xfrm>
+            <a:off x="457200" y="1567913"/>
+            <a:ext cx="1382939" cy="803394"/>
+          </a:xfrm>
+          <a:prstGeom prst="borderCallout1">
+            <a:avLst>
+              <a:gd name="adj1" fmla="val 33266"/>
+              <a:gd name="adj2" fmla="val 104112"/>
+              <a:gd name="adj3" fmla="val 41533"/>
+              <a:gd name="adj4" fmla="val 213731"/>
+            </a:avLst>
+          </a:prstGeom>
+          <a:solidFill>
+            <a:srgbClr val="008000"/>
+          </a:solidFill>
+          <a:ln>
+            <a:solidFill>
+              <a:srgbClr val="008000"/>
+            </a:solidFill>
+          </a:ln>
+        </p:spPr>
+        <p:style>
+          <a:lnRef idx="1">
+            <a:schemeClr val="accent1"/>
+          </a:lnRef>
+          <a:fillRef idx="3">
+            <a:schemeClr val="accent1"/>
+          </a:fillRef>
+          <a:effectRef idx="2">
+            <a:schemeClr val="accent1"/>
+          </a:effectRef>
+          <a:fontRef idx="minor">
+            <a:schemeClr val="lt1"/>
+          </a:fontRef>
+        </p:style>
+        <p:txBody>
+          <a:bodyPr rtlCol="0" anchor="ctr"/>
+          <a:lstStyle/>
+          <a:p>
+            <a:pPr algn="ctr"/>
+            <a:r>
+              <a:rPr lang="en-US" sz="1400" dirty="0" smtClean="0"/>
+              <a:t>Generate unique request IDs</a:t>
+            </a:r>
+            <a:endParaRPr lang="en-US" sz="1400" dirty="0"/>
+          </a:p>
+        </p:txBody>
+      </p:sp>
+      <p:cxnSp>
+        <p:nvCxnSpPr>
+          <p:cNvPr id="20" name="Straight Arrow Connector 19"/>
+          <p:cNvCxnSpPr>
+            <a:stCxn id="5" idx="3"/>
+            <a:endCxn id="14" idx="1"/>
+          </p:cNvCxnSpPr>
+          <p:nvPr/>
+        </p:nvCxnSpPr>
+        <p:spPr>
+          <a:xfrm>
+            <a:off x="5585211" y="3796680"/>
+            <a:ext cx="1572478" cy="697"/>
+          </a:xfrm>
+          <a:prstGeom prst="straightConnector1">
+            <a:avLst/>
+          </a:prstGeom>
+          <a:ln>
+            <a:tailEnd type="arrow"/>
+          </a:ln>
+        </p:spPr>
+        <p:style>
+          <a:lnRef idx="2">
+            <a:schemeClr val="accent1"/>
+          </a:lnRef>
+          <a:fillRef idx="0">
+            <a:schemeClr val="accent1"/>
+          </a:fillRef>
+          <a:effectRef idx="1">
+            <a:schemeClr val="accent1"/>
+          </a:effectRef>
+          <a:fontRef idx="minor">
+            <a:schemeClr val="tx1"/>
+          </a:fontRef>
+        </p:style>
+      </p:cxnSp>
+      <p:cxnSp>
+        <p:nvCxnSpPr>
+          <p:cNvPr id="22" name="Elbow Connector 21"/>
+          <p:cNvCxnSpPr>
+            <a:stCxn id="9" idx="3"/>
+            <a:endCxn id="14" idx="2"/>
+          </p:cNvCxnSpPr>
+          <p:nvPr/>
+        </p:nvCxnSpPr>
+        <p:spPr>
+          <a:xfrm flipV="1">
+            <a:off x="7516972" y="4399922"/>
+            <a:ext cx="573740" cy="1470034"/>
+          </a:xfrm>
+          <a:prstGeom prst="bentConnector2">
+            <a:avLst/>
+          </a:prstGeom>
+          <a:ln>
+            <a:tailEnd type="arrow"/>
+          </a:ln>
+        </p:spPr>
+        <p:style>
+          <a:lnRef idx="2">
+            <a:schemeClr val="accent1"/>
+          </a:lnRef>
+          <a:fillRef idx="0">
+            <a:schemeClr val="accent1"/>
+          </a:fillRef>
+          <a:effectRef idx="1">
+            <a:schemeClr val="accent1"/>
+          </a:effectRef>
+          <a:fontRef idx="minor">
+            <a:schemeClr val="tx1"/>
+          </a:fontRef>
+        </p:style>
+      </p:cxnSp>
+      <p:sp>
+        <p:nvSpPr>
+          <p:cNvPr id="23" name="TextBox 22"/>
+          <p:cNvSpPr txBox="1"/>
+          <p:nvPr/>
+        </p:nvSpPr>
+        <p:spPr>
+          <a:xfrm>
+            <a:off x="5611119" y="1417638"/>
+            <a:ext cx="2565828" cy="646331"/>
+          </a:xfrm>
+          <a:prstGeom prst="rect">
+            <a:avLst/>
+          </a:prstGeom>
+          <a:noFill/>
+        </p:spPr>
+        <p:txBody>
+          <a:bodyPr wrap="square" rtlCol="0">
+            <a:spAutoFit/>
           </a:bodyPr>
           <a:lstStyle/>
           <a:p>
+            <a:pPr algn="ctr"/>
             <a:r>
               <a:rPr lang="en-US" dirty="0" smtClean="0"/>
-              <a:t>HTTP Request to SDK Call Correlation</a:t>
+              <a:t>Access logs and other request traffic metrics </a:t>
+            </a:r>
+            <a:endParaRPr lang="en-US" dirty="0"/>
+          </a:p>
+        </p:txBody>
+      </p:sp>
+      <p:sp>
+        <p:nvSpPr>
+          <p:cNvPr id="24" name="TextBox 23"/>
+          <p:cNvSpPr txBox="1"/>
+          <p:nvPr/>
+        </p:nvSpPr>
+        <p:spPr>
+          <a:xfrm>
+            <a:off x="5662955" y="3155957"/>
+            <a:ext cx="1412510" cy="646331"/>
+          </a:xfrm>
+          <a:prstGeom prst="rect">
+            <a:avLst/>
+          </a:prstGeom>
+          <a:noFill/>
+        </p:spPr>
+        <p:txBody>
+          <a:bodyPr wrap="square" rtlCol="0">
+            <a:spAutoFit/>
+          </a:bodyPr>
+          <a:lstStyle/>
+          <a:p>
+            <a:pPr algn="ctr"/>
+            <a:r>
+              <a:rPr lang="en-US" dirty="0" smtClean="0"/>
+              <a:t>App Server logs</a:t>
+            </a:r>
+            <a:endParaRPr lang="en-US" dirty="0"/>
+          </a:p>
+        </p:txBody>
+      </p:sp>
+      <p:sp>
+        <p:nvSpPr>
+          <p:cNvPr id="25" name="TextBox 24"/>
+          <p:cNvSpPr txBox="1"/>
+          <p:nvPr/>
+        </p:nvSpPr>
+        <p:spPr>
+          <a:xfrm>
+            <a:off x="7529015" y="5908830"/>
+            <a:ext cx="1313293" cy="646331"/>
+          </a:xfrm>
+          <a:prstGeom prst="rect">
+            <a:avLst/>
+          </a:prstGeom>
+          <a:noFill/>
+        </p:spPr>
+        <p:txBody>
+          <a:bodyPr wrap="square" rtlCol="0">
+            <a:spAutoFit/>
+          </a:bodyPr>
+          <a:lstStyle/>
+          <a:p>
+            <a:pPr algn="ctr"/>
+            <a:r>
+              <a:rPr lang="en-US" dirty="0" smtClean="0"/>
+              <a:t>Cloud SDK call data</a:t>
+            </a:r>
+            <a:endParaRPr lang="en-US" dirty="0"/>
+          </a:p>
+        </p:txBody>
+      </p:sp>
+    </p:spTree>
+    <p:extLst>
+      <p:ext uri="{BB962C8B-B14F-4D97-AF65-F5344CB8AC3E}">
+        <p14:creationId xmlns:p14="http://schemas.microsoft.com/office/powerpoint/2010/main" val="630386242"/>
+      </p:ext>
+    </p:extLst>
+  </p:cSld>
+  <p:clrMapOvr>
+    <a:masterClrMapping/>
+  </p:clrMapOvr>
+  <p:timing>
+    <p:tnLst>
+      <p:par>
+        <p:cTn xmlns:p14="http://schemas.microsoft.com/office/powerpoint/2010/main" id="1" dur="indefinite" restart="never" nodeType="tmRoot">
+          <p:childTnLst>
+            <p:seq concurrent="1" nextAc="seek">
+              <p:cTn id="2" dur="indefinite" nodeType="mainSeq">
+                <p:childTnLst>
+                  <p:par>
+                    <p:cTn id="3" fill="hold">
+                      <p:stCondLst>
+                        <p:cond delay="indefinite"/>
+                        <p:cond evt="onBegin" delay="0">
+                          <p:tn val="2"/>
+                        </p:cond>
+                      </p:stCondLst>
+                      <p:childTnLst>
+                        <p:par>
+                          <p:cTn id="4" fill="hold">
+                            <p:stCondLst>
+                              <p:cond delay="0"/>
+                            </p:stCondLst>
+                            <p:childTnLst>
+                              <p:par>
+                                <p:cTn id="5" presetID="3" presetClass="entr" presetSubtype="10" fill="hold" nodeType="withEffect">
+                                  <p:stCondLst>
+                                    <p:cond delay="0"/>
+                                  </p:stCondLst>
+                                  <p:childTnLst>
+                                    <p:set>
+                                      <p:cBhvr>
+                                        <p:cTn id="6" dur="1" fill="hold">
+                                          <p:stCondLst>
+                                            <p:cond delay="0"/>
+                                          </p:stCondLst>
+                                        </p:cTn>
+                                        <p:tgtEl>
+                                          <p:spTgt spid="13"/>
+                                        </p:tgtEl>
+                                        <p:attrNameLst>
+                                          <p:attrName>style.visibility</p:attrName>
+                                        </p:attrNameLst>
+                                      </p:cBhvr>
+                                      <p:to>
+                                        <p:strVal val="visible"/>
+                                      </p:to>
+                                    </p:set>
+                                    <p:animEffect transition="in" filter="blinds(horizontal)">
+                                      <p:cBhvr>
+                                        <p:cTn id="7" dur="500"/>
+                                        <p:tgtEl>
+                                          <p:spTgt spid="13"/>
+                                        </p:tgtEl>
+                                      </p:cBhvr>
+                                    </p:animEffect>
+                                  </p:childTnLst>
+                                </p:cTn>
+                              </p:par>
+                            </p:childTnLst>
+                          </p:cTn>
+                        </p:par>
+                      </p:childTnLst>
+                    </p:cTn>
+                  </p:par>
+                </p:childTnLst>
+              </p:cTn>
+              <p:prevCondLst>
+                <p:cond evt="onPrev" delay="0">
+                  <p:tgtEl>
+                    <p:sldTgt/>
+                  </p:tgtEl>
+                </p:cond>
+              </p:prevCondLst>
+              <p:nextCondLst>
+                <p:cond evt="onNext" delay="0">
+                  <p:tgtEl>
+                    <p:sldTgt/>
+                  </p:tgtEl>
+                </p:cond>
+              </p:nextCondLst>
+            </p:seq>
+          </p:childTnLst>
+        </p:cTn>
+      </p:par>
+    </p:tnLst>
+  </p:timing>
+</p:sld>
+</file>
+
+<file path=ppt/slides/slide11.xml><?xml version="1.0" encoding="utf-8"?>
+<p:sld xmlns:a="http://schemas.openxmlformats.org/drawingml/2006/main" xmlns:r="http://schemas.openxmlformats.org/officeDocument/2006/relationships" xmlns:p="http://schemas.openxmlformats.org/presentationml/2006/main">
+  <p:cSld>
+    <p:spTree>
+      <p:nvGrpSpPr>
+        <p:cNvPr id="1" name=""/>
+        <p:cNvGrpSpPr/>
+        <p:nvPr/>
+      </p:nvGrpSpPr>
+      <p:grpSpPr>
+        <a:xfrm>
+          <a:off x="0" y="0"/>
+          <a:ext cx="0" cy="0"/>
+          <a:chOff x="0" y="0"/>
+          <a:chExt cx="0" cy="0"/>
+        </a:xfrm>
+      </p:grpSpPr>
+      <p:sp>
+        <p:nvSpPr>
+          <p:cNvPr id="2" name="Title 1"/>
+          <p:cNvSpPr>
+            <a:spLocks noGrp="1"/>
+          </p:cNvSpPr>
+          <p:nvPr>
+            <p:ph type="title"/>
+          </p:nvPr>
+        </p:nvSpPr>
+        <p:spPr/>
+        <p:txBody>
+          <a:bodyPr/>
+          <a:lstStyle/>
+          <a:p>
+            <a:r>
+              <a:rPr lang="en-US" dirty="0" smtClean="0"/>
+              <a:t>Cerebro on </a:t>
+            </a:r>
+            <a:r>
+              <a:rPr lang="en-US" dirty="0" err="1" smtClean="0"/>
+              <a:t>ElasticSearch</a:t>
             </a:r>
             <a:endParaRPr lang="en-US" dirty="0"/>
           </a:p>
@@ -10876,57 +11804,400 @@
           <a:p>
             <a:r>
               <a:rPr lang="en-US" dirty="0" smtClean="0"/>
-              <a:t>Front-end server (</a:t>
+              <a:t>Cerebro is an SLA prediction system for </a:t>
             </a:r>
             <a:r>
               <a:rPr lang="en-US" dirty="0" err="1" smtClean="0"/>
-              <a:t>Nginx</a:t>
+              <a:t>PaaS</a:t>
             </a:r>
             <a:r>
               <a:rPr lang="en-US" dirty="0" smtClean="0"/>
-              <a:t>) tags each incoming request with a unique ID</a:t>
-            </a:r>
-          </a:p>
-          <a:p>
+              <a:t> clouds</a:t>
+            </a:r>
+          </a:p>
+          <a:p>
+            <a:pPr lvl="1"/>
+            <a:r>
+              <a:rPr lang="en-US" dirty="0" smtClean="0"/>
+              <a:t>Response Time SLAs for Cloud-hosted Web Applications (SOCC 2015)</a:t>
+            </a:r>
+          </a:p>
+          <a:p>
+            <a:pPr lvl="1"/>
+            <a:r>
+              <a:rPr lang="en-US" dirty="0" smtClean="0"/>
+              <a:t>SLA Durability for Web Service Response Time (</a:t>
+            </a:r>
             <a:r>
               <a:rPr lang="en-US" dirty="0" err="1" smtClean="0"/>
-              <a:t>PBServer</a:t>
+              <a:t>CloudCom</a:t>
             </a:r>
             <a:r>
               <a:rPr lang="en-US" dirty="0" smtClean="0"/>
-              <a:t> records this “HTTP request ID” whenever inspecting a cloud SDK call</a:t>
-            </a:r>
-          </a:p>
-          <a:p>
-            <a:r>
-              <a:rPr lang="en-US" dirty="0" err="1" smtClean="0"/>
-              <a:t>ElasticSearch</a:t>
-            </a:r>
+              <a:t> 2015)</a:t>
+            </a:r>
+          </a:p>
+          <a:p>
             <a:r>
               <a:rPr lang="en-US" dirty="0" smtClean="0"/>
-              <a:t> can aggregate (group) cloud SDK calls by HTTP request ID</a:t>
-            </a:r>
-          </a:p>
-          <a:p>
-            <a:pPr lvl="1"/>
-            <a:r>
-              <a:rPr lang="en-US" dirty="0" smtClean="0"/>
-              <a:t>Implemented a Python script that performs a SDK call time analysis at request level</a:t>
-            </a:r>
-            <a:endParaRPr lang="en-US" dirty="0"/>
+              <a:t>Uses a combination of static analysis and performance benchmarking</a:t>
+            </a:r>
           </a:p>
         </p:txBody>
       </p:sp>
     </p:spTree>
     <p:extLst>
       <p:ext uri="{BB962C8B-B14F-4D97-AF65-F5344CB8AC3E}">
-        <p14:creationId xmlns:p14="http://schemas.microsoft.com/office/powerpoint/2010/main" val="3289274012"/>
+        <p14:creationId xmlns:p14="http://schemas.microsoft.com/office/powerpoint/2010/main" val="1810051915"/>
       </p:ext>
     </p:extLst>
   </p:cSld>
   <p:clrMapOvr>
     <a:masterClrMapping/>
   </p:clrMapOvr>
+  <p:timing>
+    <p:tnLst>
+      <p:par>
+        <p:cTn xmlns:p14="http://schemas.microsoft.com/office/powerpoint/2010/main" id="1" dur="indefinite" restart="never" nodeType="tmRoot"/>
+      </p:par>
+    </p:tnLst>
+  </p:timing>
+</p:sld>
+</file>
+
+<file path=ppt/slides/slide12.xml><?xml version="1.0" encoding="utf-8"?>
+<p:sld xmlns:a="http://schemas.openxmlformats.org/drawingml/2006/main" xmlns:r="http://schemas.openxmlformats.org/officeDocument/2006/relationships" xmlns:p="http://schemas.openxmlformats.org/presentationml/2006/main">
+  <p:cSld>
+    <p:spTree>
+      <p:nvGrpSpPr>
+        <p:cNvPr id="1" name=""/>
+        <p:cNvGrpSpPr/>
+        <p:nvPr/>
+      </p:nvGrpSpPr>
+      <p:grpSpPr>
+        <a:xfrm>
+          <a:off x="0" y="0"/>
+          <a:ext cx="0" cy="0"/>
+          <a:chOff x="0" y="0"/>
+          <a:chExt cx="0" cy="0"/>
+        </a:xfrm>
+      </p:grpSpPr>
+      <p:sp>
+        <p:nvSpPr>
+          <p:cNvPr id="2" name="Title 1"/>
+          <p:cNvSpPr>
+            <a:spLocks noGrp="1"/>
+          </p:cNvSpPr>
+          <p:nvPr>
+            <p:ph type="title"/>
+          </p:nvPr>
+        </p:nvSpPr>
+        <p:spPr/>
+        <p:txBody>
+          <a:bodyPr/>
+          <a:lstStyle/>
+          <a:p>
+            <a:r>
+              <a:rPr lang="en-US" dirty="0" smtClean="0"/>
+              <a:t>Cerebro Architecture</a:t>
+            </a:r>
+            <a:endParaRPr lang="en-US" dirty="0"/>
+          </a:p>
+        </p:txBody>
+      </p:sp>
+      <p:pic>
+        <p:nvPicPr>
+          <p:cNvPr id="4" name="Content Placeholder 3" descr="cerebro_arch.png"/>
+          <p:cNvPicPr>
+            <a:picLocks noGrp="1" noChangeAspect="1"/>
+          </p:cNvPicPr>
+          <p:nvPr>
+            <p:ph idx="1"/>
+          </p:nvPr>
+        </p:nvPicPr>
+        <p:blipFill>
+          <a:blip r:embed="rId2">
+            <a:extLst>
+              <a:ext uri="{28A0092B-C50C-407E-A947-70E740481C1C}">
+                <a14:useLocalDpi xmlns:a14="http://schemas.microsoft.com/office/drawing/2010/main" val="0"/>
+              </a:ext>
+            </a:extLst>
+          </a:blip>
+          <a:srcRect l="-15284" r="-15284"/>
+          <a:stretch>
+            <a:fillRect/>
+          </a:stretch>
+        </p:blipFill>
+        <p:spPr/>
+      </p:pic>
+      <p:sp>
+        <p:nvSpPr>
+          <p:cNvPr id="5" name="Line Callout 1 4"/>
+          <p:cNvSpPr/>
+          <p:nvPr/>
+        </p:nvSpPr>
+        <p:spPr>
+          <a:xfrm>
+            <a:off x="596101" y="1943694"/>
+            <a:ext cx="1956768" cy="1049595"/>
+          </a:xfrm>
+          <a:prstGeom prst="borderCallout1">
+            <a:avLst>
+              <a:gd name="adj1" fmla="val 63194"/>
+              <a:gd name="adj2" fmla="val 101407"/>
+              <a:gd name="adj3" fmla="val 144598"/>
+              <a:gd name="adj4" fmla="val 145585"/>
+            </a:avLst>
+          </a:prstGeom>
+          <a:solidFill>
+            <a:srgbClr val="008000"/>
+          </a:solidFill>
+          <a:ln>
+            <a:solidFill>
+              <a:srgbClr val="008000"/>
+            </a:solidFill>
+          </a:ln>
+        </p:spPr>
+        <p:style>
+          <a:lnRef idx="1">
+            <a:schemeClr val="accent1"/>
+          </a:lnRef>
+          <a:fillRef idx="3">
+            <a:schemeClr val="accent1"/>
+          </a:fillRef>
+          <a:effectRef idx="2">
+            <a:schemeClr val="accent1"/>
+          </a:effectRef>
+          <a:fontRef idx="minor">
+            <a:schemeClr val="lt1"/>
+          </a:fontRef>
+        </p:style>
+        <p:txBody>
+          <a:bodyPr rtlCol="0" anchor="ctr"/>
+          <a:lstStyle/>
+          <a:p>
+            <a:pPr algn="ctr"/>
+            <a:r>
+              <a:rPr lang="en-US" sz="1400" dirty="0" smtClean="0"/>
+              <a:t>Modified the SDK Monitor to store data in </a:t>
+            </a:r>
+            <a:r>
+              <a:rPr lang="en-US" sz="1400" dirty="0" err="1" smtClean="0"/>
+              <a:t>ElasticSearch</a:t>
+            </a:r>
+            <a:endParaRPr lang="en-US" sz="1400" dirty="0"/>
+          </a:p>
+        </p:txBody>
+      </p:sp>
+      <p:sp>
+        <p:nvSpPr>
+          <p:cNvPr id="6" name="Line Callout 1 5"/>
+          <p:cNvSpPr/>
+          <p:nvPr/>
+        </p:nvSpPr>
+        <p:spPr>
+          <a:xfrm>
+            <a:off x="891048" y="5601365"/>
+            <a:ext cx="1956768" cy="1049595"/>
+          </a:xfrm>
+          <a:prstGeom prst="borderCallout1">
+            <a:avLst>
+              <a:gd name="adj1" fmla="val 63194"/>
+              <a:gd name="adj2" fmla="val 101407"/>
+              <a:gd name="adj3" fmla="val 37191"/>
+              <a:gd name="adj4" fmla="val 231677"/>
+            </a:avLst>
+          </a:prstGeom>
+          <a:solidFill>
+            <a:srgbClr val="008000"/>
+          </a:solidFill>
+          <a:ln>
+            <a:solidFill>
+              <a:srgbClr val="008000"/>
+            </a:solidFill>
+          </a:ln>
+        </p:spPr>
+        <p:style>
+          <a:lnRef idx="1">
+            <a:schemeClr val="accent1"/>
+          </a:lnRef>
+          <a:fillRef idx="3">
+            <a:schemeClr val="accent1"/>
+          </a:fillRef>
+          <a:effectRef idx="2">
+            <a:schemeClr val="accent1"/>
+          </a:effectRef>
+          <a:fontRef idx="minor">
+            <a:schemeClr val="lt1"/>
+          </a:fontRef>
+        </p:style>
+        <p:txBody>
+          <a:bodyPr rtlCol="0" anchor="ctr"/>
+          <a:lstStyle/>
+          <a:p>
+            <a:pPr algn="ctr"/>
+            <a:r>
+              <a:rPr lang="en-US" sz="1400" dirty="0" smtClean="0"/>
+              <a:t>Modified the SLA Predictor to retrieve data from </a:t>
+            </a:r>
+            <a:r>
+              <a:rPr lang="en-US" sz="1400" dirty="0" err="1" smtClean="0"/>
+              <a:t>ElasticSearch</a:t>
+            </a:r>
+            <a:endParaRPr lang="en-US" sz="1400" dirty="0"/>
+          </a:p>
+        </p:txBody>
+      </p:sp>
+    </p:spTree>
+    <p:extLst>
+      <p:ext uri="{BB962C8B-B14F-4D97-AF65-F5344CB8AC3E}">
+        <p14:creationId xmlns:p14="http://schemas.microsoft.com/office/powerpoint/2010/main" val="58555158"/>
+      </p:ext>
+    </p:extLst>
+  </p:cSld>
+  <p:clrMapOvr>
+    <a:masterClrMapping/>
+  </p:clrMapOvr>
+  <p:timing>
+    <p:tnLst>
+      <p:par>
+        <p:cTn xmlns:p14="http://schemas.microsoft.com/office/powerpoint/2010/main" id="1" dur="indefinite" restart="never" nodeType="tmRoot">
+          <p:childTnLst>
+            <p:seq concurrent="1" nextAc="seek">
+              <p:cTn id="2" dur="indefinite" nodeType="mainSeq">
+                <p:childTnLst>
+                  <p:par>
+                    <p:cTn id="3" fill="hold">
+                      <p:stCondLst>
+                        <p:cond delay="indefinite"/>
+                      </p:stCondLst>
+                      <p:childTnLst>
+                        <p:par>
+                          <p:cTn id="4" fill="hold">
+                            <p:stCondLst>
+                              <p:cond delay="0"/>
+                            </p:stCondLst>
+                            <p:childTnLst>
+                              <p:par>
+                                <p:cTn id="5" presetID="3" presetClass="entr" presetSubtype="10" fill="hold" grpId="0" nodeType="clickEffect">
+                                  <p:stCondLst>
+                                    <p:cond delay="0"/>
+                                  </p:stCondLst>
+                                  <p:childTnLst>
+                                    <p:set>
+                                      <p:cBhvr>
+                                        <p:cTn id="6" dur="1" fill="hold">
+                                          <p:stCondLst>
+                                            <p:cond delay="0"/>
+                                          </p:stCondLst>
+                                        </p:cTn>
+                                        <p:tgtEl>
+                                          <p:spTgt spid="5"/>
+                                        </p:tgtEl>
+                                        <p:attrNameLst>
+                                          <p:attrName>style.visibility</p:attrName>
+                                        </p:attrNameLst>
+                                      </p:cBhvr>
+                                      <p:to>
+                                        <p:strVal val="visible"/>
+                                      </p:to>
+                                    </p:set>
+                                    <p:animEffect transition="in" filter="blinds(horizontal)">
+                                      <p:cBhvr>
+                                        <p:cTn id="7" dur="500"/>
+                                        <p:tgtEl>
+                                          <p:spTgt spid="5"/>
+                                        </p:tgtEl>
+                                      </p:cBhvr>
+                                    </p:animEffect>
+                                  </p:childTnLst>
+                                </p:cTn>
+                              </p:par>
+                            </p:childTnLst>
+                          </p:cTn>
+                        </p:par>
+                      </p:childTnLst>
+                    </p:cTn>
+                  </p:par>
+                  <p:par>
+                    <p:cTn id="8" fill="hold">
+                      <p:stCondLst>
+                        <p:cond delay="indefinite"/>
+                      </p:stCondLst>
+                      <p:childTnLst>
+                        <p:par>
+                          <p:cTn id="9" fill="hold">
+                            <p:stCondLst>
+                              <p:cond delay="0"/>
+                            </p:stCondLst>
+                            <p:childTnLst>
+                              <p:par>
+                                <p:cTn id="10" presetID="3" presetClass="entr" presetSubtype="10" fill="hold" grpId="0" nodeType="clickEffect">
+                                  <p:stCondLst>
+                                    <p:cond delay="0"/>
+                                  </p:stCondLst>
+                                  <p:childTnLst>
+                                    <p:set>
+                                      <p:cBhvr>
+                                        <p:cTn id="11" dur="1" fill="hold">
+                                          <p:stCondLst>
+                                            <p:cond delay="0"/>
+                                          </p:stCondLst>
+                                        </p:cTn>
+                                        <p:tgtEl>
+                                          <p:spTgt spid="6"/>
+                                        </p:tgtEl>
+                                        <p:attrNameLst>
+                                          <p:attrName>style.visibility</p:attrName>
+                                        </p:attrNameLst>
+                                      </p:cBhvr>
+                                      <p:to>
+                                        <p:strVal val="visible"/>
+                                      </p:to>
+                                    </p:set>
+                                    <p:animEffect transition="in" filter="blinds(horizontal)">
+                                      <p:cBhvr>
+                                        <p:cTn id="12" dur="500"/>
+                                        <p:tgtEl>
+                                          <p:spTgt spid="6"/>
+                                        </p:tgtEl>
+                                      </p:cBhvr>
+                                    </p:animEffect>
+                                  </p:childTnLst>
+                                </p:cTn>
+                              </p:par>
+                            </p:childTnLst>
+                          </p:cTn>
+                        </p:par>
+                      </p:childTnLst>
+                    </p:cTn>
+                  </p:par>
+                </p:childTnLst>
+              </p:cTn>
+              <p:prevCondLst>
+                <p:cond evt="onPrev" delay="0">
+                  <p:tgtEl>
+                    <p:sldTgt/>
+                  </p:tgtEl>
+                </p:cond>
+              </p:prevCondLst>
+              <p:nextCondLst>
+                <p:cond evt="onNext" delay="0">
+                  <p:tgtEl>
+                    <p:sldTgt/>
+                  </p:tgtEl>
+                </p:cond>
+              </p:nextCondLst>
+            </p:seq>
+          </p:childTnLst>
+        </p:cTn>
+      </p:par>
+    </p:tnLst>
+    <p:bldLst>
+      <p:bldP spid="5" grpId="0" animBg="1"/>
+      <p:bldP spid="6" grpId="0" animBg="1"/>
+    </p:bldLst>
+  </p:timing>
 </p:sld>
 </file>
 
@@ -10962,179 +12233,6 @@
           <a:bodyPr/>
           <a:lstStyle/>
           <a:p>
-            <a:endParaRPr lang="en-US"/>
-          </a:p>
-        </p:txBody>
-      </p:sp>
-      <p:sp>
-        <p:nvSpPr>
-          <p:cNvPr id="3" name="Content Placeholder 2"/>
-          <p:cNvSpPr>
-            <a:spLocks noGrp="1"/>
-          </p:cNvSpPr>
-          <p:nvPr>
-            <p:ph idx="1"/>
-          </p:nvPr>
-        </p:nvSpPr>
-        <p:spPr/>
-        <p:txBody>
-          <a:bodyPr>
-            <a:normAutofit fontScale="85000" lnSpcReduction="20000"/>
-          </a:bodyPr>
-          <a:lstStyle/>
-          <a:p>
-            <a:r>
-              <a:rPr lang="en-US" dirty="0" smtClean="0"/>
-              <a:t>APM Overview</a:t>
-            </a:r>
-          </a:p>
-          <a:p>
-            <a:pPr lvl="1"/>
-            <a:r>
-              <a:rPr lang="en-US" dirty="0" smtClean="0"/>
-              <a:t>Data collection, storage and visualization</a:t>
-            </a:r>
-          </a:p>
-          <a:p>
-            <a:r>
-              <a:rPr lang="en-US" dirty="0" smtClean="0"/>
-              <a:t>ELK Stack Overview</a:t>
-            </a:r>
-          </a:p>
-          <a:p>
-            <a:pPr lvl="1"/>
-            <a:r>
-              <a:rPr lang="en-US" dirty="0" err="1" smtClean="0"/>
-              <a:t>Logstash</a:t>
-            </a:r>
-            <a:r>
-              <a:rPr lang="en-US" dirty="0" smtClean="0"/>
-              <a:t>, </a:t>
-            </a:r>
-            <a:r>
-              <a:rPr lang="en-US" dirty="0" err="1" smtClean="0"/>
-              <a:t>ElasticSearch</a:t>
-            </a:r>
-            <a:r>
-              <a:rPr lang="en-US" dirty="0" smtClean="0"/>
-              <a:t> and </a:t>
-            </a:r>
-            <a:r>
-              <a:rPr lang="en-US" dirty="0" err="1" smtClean="0"/>
-              <a:t>Kibana</a:t>
-            </a:r>
-            <a:endParaRPr lang="en-US" dirty="0" smtClean="0"/>
-          </a:p>
-          <a:p>
-            <a:r>
-              <a:rPr lang="en-US" dirty="0" smtClean="0"/>
-              <a:t>High level data gathering</a:t>
-            </a:r>
-          </a:p>
-          <a:p>
-            <a:pPr lvl="1"/>
-            <a:r>
-              <a:rPr lang="en-US" dirty="0" err="1" smtClean="0"/>
-              <a:t>Nginx</a:t>
-            </a:r>
-            <a:r>
-              <a:rPr lang="en-US" dirty="0" smtClean="0"/>
-              <a:t> logs, </a:t>
-            </a:r>
-            <a:r>
-              <a:rPr lang="en-US" dirty="0" err="1" smtClean="0"/>
-              <a:t>HAProxy</a:t>
-            </a:r>
-            <a:r>
-              <a:rPr lang="en-US" dirty="0" smtClean="0"/>
-              <a:t> stats, Service ping</a:t>
-            </a:r>
-          </a:p>
-          <a:p>
-            <a:r>
-              <a:rPr lang="en-US" dirty="0" smtClean="0"/>
-              <a:t>Low level data gathering</a:t>
-            </a:r>
-          </a:p>
-          <a:p>
-            <a:pPr lvl="1"/>
-            <a:r>
-              <a:rPr lang="en-US" dirty="0" err="1" smtClean="0"/>
-              <a:t>AppScale</a:t>
-            </a:r>
-            <a:r>
-              <a:rPr lang="en-US" dirty="0" smtClean="0"/>
-              <a:t> SDK call interception</a:t>
-            </a:r>
-          </a:p>
-          <a:p>
-            <a:pPr lvl="1"/>
-            <a:r>
-              <a:rPr lang="en-US" dirty="0" smtClean="0"/>
-              <a:t>Anomaly detection</a:t>
-            </a:r>
-          </a:p>
-          <a:p>
-            <a:pPr lvl="1"/>
-            <a:r>
-              <a:rPr lang="en-US" dirty="0" smtClean="0"/>
-              <a:t>Request size analysis</a:t>
-            </a:r>
-          </a:p>
-          <a:p>
-            <a:r>
-              <a:rPr lang="en-US" dirty="0" smtClean="0"/>
-              <a:t>Predictions</a:t>
-            </a:r>
-            <a:endParaRPr lang="en-US" dirty="0"/>
-          </a:p>
-        </p:txBody>
-      </p:sp>
-    </p:spTree>
-    <p:extLst>
-      <p:ext uri="{BB962C8B-B14F-4D97-AF65-F5344CB8AC3E}">
-        <p14:creationId xmlns:p14="http://schemas.microsoft.com/office/powerpoint/2010/main" val="1725315810"/>
-      </p:ext>
-    </p:extLst>
-  </p:cSld>
-  <p:clrMapOvr>
-    <a:masterClrMapping/>
-  </p:clrMapOvr>
-</p:sld>
-</file>
-
-<file path=ppt/slides/slide3.xml><?xml version="1.0" encoding="utf-8"?>
-<p:sld xmlns:a="http://schemas.openxmlformats.org/drawingml/2006/main" xmlns:r="http://schemas.openxmlformats.org/officeDocument/2006/relationships" xmlns:p="http://schemas.openxmlformats.org/presentationml/2006/main">
-  <p:cSld>
-    <p:spTree>
-      <p:nvGrpSpPr>
-        <p:cNvPr id="1" name=""/>
-        <p:cNvGrpSpPr/>
-        <p:nvPr/>
-      </p:nvGrpSpPr>
-      <p:grpSpPr>
-        <a:xfrm>
-          <a:off x="0" y="0"/>
-          <a:ext cx="0" cy="0"/>
-          <a:chOff x="0" y="0"/>
-          <a:chExt cx="0" cy="0"/>
-        </a:xfrm>
-      </p:grpSpPr>
-      <p:sp>
-        <p:nvSpPr>
-          <p:cNvPr id="2" name="Title 1"/>
-          <p:cNvSpPr>
-            <a:spLocks noGrp="1"/>
-          </p:cNvSpPr>
-          <p:nvPr>
-            <p:ph type="title"/>
-          </p:nvPr>
-        </p:nvSpPr>
-        <p:spPr/>
-        <p:txBody>
-          <a:bodyPr/>
-          <a:lstStyle/>
-          <a:p>
             <a:r>
               <a:rPr lang="en-US" dirty="0" smtClean="0"/>
               <a:t>APM Overview</a:t>
@@ -11164,10 +12262,222 @@
         </p:xfrm>
         <a:graphic>
           <a:graphicData uri="http://schemas.openxmlformats.org/drawingml/2006/diagram">
-            <dgm:relIds xmlns:dgm="http://schemas.openxmlformats.org/drawingml/2006/diagram" xmlns:r="http://schemas.openxmlformats.org/officeDocument/2006/relationships" r:dm="rId2" r:lo="rId3" r:qs="rId4" r:cs="rId5"/>
+            <dgm:relIds xmlns:dgm="http://schemas.openxmlformats.org/drawingml/2006/diagram" xmlns:r="http://schemas.openxmlformats.org/officeDocument/2006/relationships" r:dm="rId3" r:lo="rId4" r:qs="rId5" r:cs="rId6"/>
           </a:graphicData>
         </a:graphic>
       </p:graphicFrame>
+      <p:grpSp>
+        <p:nvGrpSpPr>
+          <p:cNvPr id="4" name="Group 3"/>
+          <p:cNvGrpSpPr/>
+          <p:nvPr/>
+        </p:nvGrpSpPr>
+        <p:grpSpPr>
+          <a:xfrm>
+            <a:off x="6274900" y="3256254"/>
+            <a:ext cx="1866045" cy="1205091"/>
+            <a:chOff x="3019384" y="2941457"/>
+            <a:chExt cx="2358488" cy="1529039"/>
+          </a:xfrm>
+        </p:grpSpPr>
+        <p:sp>
+          <p:nvSpPr>
+            <p:cNvPr id="6" name="Rectangle 5"/>
+            <p:cNvSpPr/>
+            <p:nvPr/>
+          </p:nvSpPr>
+          <p:spPr>
+            <a:xfrm>
+              <a:off x="3019384" y="2941457"/>
+              <a:ext cx="2358488" cy="1529039"/>
+            </a:xfrm>
+            <a:prstGeom prst="rect">
+              <a:avLst/>
+            </a:prstGeom>
+            <a:noFill/>
+            <a:ln>
+              <a:solidFill>
+                <a:schemeClr val="tx1"/>
+              </a:solidFill>
+            </a:ln>
+          </p:spPr>
+          <p:style>
+            <a:lnRef idx="1">
+              <a:schemeClr val="accent1"/>
+            </a:lnRef>
+            <a:fillRef idx="3">
+              <a:schemeClr val="accent1"/>
+            </a:fillRef>
+            <a:effectRef idx="2">
+              <a:schemeClr val="accent1"/>
+            </a:effectRef>
+            <a:fontRef idx="minor">
+              <a:schemeClr val="lt1"/>
+            </a:fontRef>
+          </p:style>
+          <p:txBody>
+            <a:bodyPr rtlCol="0" anchor="ctr"/>
+            <a:lstStyle/>
+            <a:p>
+              <a:pPr algn="ctr"/>
+              <a:endParaRPr lang="en-US"/>
+            </a:p>
+          </p:txBody>
+        </p:sp>
+        <p:pic>
+          <p:nvPicPr>
+            <p:cNvPr id="7" name="Picture 6" descr="elasticsearch.png"/>
+            <p:cNvPicPr>
+              <a:picLocks noChangeAspect="1"/>
+            </p:cNvPicPr>
+            <p:nvPr/>
+          </p:nvPicPr>
+          <p:blipFill>
+            <a:blip r:embed="rId8">
+              <a:extLst>
+                <a:ext uri="{28A0092B-C50C-407E-A947-70E740481C1C}">
+                  <a14:useLocalDpi xmlns:a14="http://schemas.microsoft.com/office/drawing/2010/main" val="0"/>
+                </a:ext>
+              </a:extLst>
+            </a:blip>
+            <a:stretch>
+              <a:fillRect/>
+            </a:stretch>
+          </p:blipFill>
+          <p:spPr>
+            <a:xfrm>
+              <a:off x="3269592" y="3032163"/>
+              <a:ext cx="1875022" cy="1327516"/>
+            </a:xfrm>
+            <a:prstGeom prst="rect">
+              <a:avLst/>
+            </a:prstGeom>
+          </p:spPr>
+        </p:pic>
+      </p:grpSp>
+      <p:grpSp>
+        <p:nvGrpSpPr>
+          <p:cNvPr id="8" name="Group 7"/>
+          <p:cNvGrpSpPr/>
+          <p:nvPr/>
+        </p:nvGrpSpPr>
+        <p:grpSpPr>
+          <a:xfrm>
+            <a:off x="5813310" y="5024736"/>
+            <a:ext cx="2789225" cy="1088469"/>
+            <a:chOff x="3133727" y="5338679"/>
+            <a:chExt cx="2789225" cy="1088469"/>
+          </a:xfrm>
+        </p:grpSpPr>
+        <p:pic>
+          <p:nvPicPr>
+            <p:cNvPr id="9" name="Picture 8" descr="logstash-logo.png"/>
+            <p:cNvPicPr>
+              <a:picLocks noChangeAspect="1"/>
+            </p:cNvPicPr>
+            <p:nvPr/>
+          </p:nvPicPr>
+          <p:blipFill>
+            <a:blip r:embed="rId9">
+              <a:extLst>
+                <a:ext uri="{28A0092B-C50C-407E-A947-70E740481C1C}">
+                  <a14:useLocalDpi xmlns:a14="http://schemas.microsoft.com/office/drawing/2010/main" val="0"/>
+                </a:ext>
+              </a:extLst>
+            </a:blip>
+            <a:stretch>
+              <a:fillRect/>
+            </a:stretch>
+          </p:blipFill>
+          <p:spPr>
+            <a:xfrm>
+              <a:off x="3237397" y="5338679"/>
+              <a:ext cx="2553510" cy="968397"/>
+            </a:xfrm>
+            <a:prstGeom prst="rect">
+              <a:avLst/>
+            </a:prstGeom>
+          </p:spPr>
+        </p:pic>
+        <p:sp>
+          <p:nvSpPr>
+            <p:cNvPr id="10" name="Rectangle 9"/>
+            <p:cNvSpPr/>
+            <p:nvPr/>
+          </p:nvSpPr>
+          <p:spPr>
+            <a:xfrm>
+              <a:off x="3133727" y="5338679"/>
+              <a:ext cx="2789225" cy="1088469"/>
+            </a:xfrm>
+            <a:prstGeom prst="rect">
+              <a:avLst/>
+            </a:prstGeom>
+            <a:noFill/>
+            <a:ln>
+              <a:solidFill>
+                <a:schemeClr val="tx1"/>
+              </a:solidFill>
+            </a:ln>
+          </p:spPr>
+          <p:style>
+            <a:lnRef idx="1">
+              <a:schemeClr val="accent1"/>
+            </a:lnRef>
+            <a:fillRef idx="3">
+              <a:schemeClr val="accent1"/>
+            </a:fillRef>
+            <a:effectRef idx="2">
+              <a:schemeClr val="accent1"/>
+            </a:effectRef>
+            <a:fontRef idx="minor">
+              <a:schemeClr val="lt1"/>
+            </a:fontRef>
+          </p:style>
+          <p:txBody>
+            <a:bodyPr rtlCol="0" anchor="ctr"/>
+            <a:lstStyle/>
+            <a:p>
+              <a:pPr algn="ctr"/>
+              <a:endParaRPr lang="en-US" dirty="0">
+                <a:solidFill>
+                  <a:schemeClr val="tx1"/>
+                </a:solidFill>
+              </a:endParaRPr>
+            </a:p>
+          </p:txBody>
+        </p:sp>
+      </p:grpSp>
+      <p:pic>
+        <p:nvPicPr>
+          <p:cNvPr id="11" name="Picture 10" descr="Screen-Shot-2013-11-22-at-14.14.28.png"/>
+          <p:cNvPicPr>
+            <a:picLocks noChangeAspect="1"/>
+          </p:cNvPicPr>
+          <p:nvPr/>
+        </p:nvPicPr>
+        <p:blipFill>
+          <a:blip r:embed="rId10">
+            <a:extLst>
+              <a:ext uri="{28A0092B-C50C-407E-A947-70E740481C1C}">
+                <a14:useLocalDpi xmlns:a14="http://schemas.microsoft.com/office/drawing/2010/main" val="0"/>
+              </a:ext>
+            </a:extLst>
+          </a:blip>
+          <a:stretch>
+            <a:fillRect/>
+          </a:stretch>
+        </p:blipFill>
+        <p:spPr>
+          <a:xfrm>
+            <a:off x="6462353" y="1639074"/>
+            <a:ext cx="1491139" cy="985284"/>
+          </a:xfrm>
+          <a:prstGeom prst="rect">
+            <a:avLst/>
+          </a:prstGeom>
+        </p:spPr>
+      </p:pic>
     </p:spTree>
     <p:extLst>
       <p:ext uri="{BB962C8B-B14F-4D97-AF65-F5344CB8AC3E}">
@@ -11178,10 +12488,163 @@
   <p:clrMapOvr>
     <a:masterClrMapping/>
   </p:clrMapOvr>
+  <p:timing>
+    <p:tnLst>
+      <p:par>
+        <p:cTn xmlns:p14="http://schemas.microsoft.com/office/powerpoint/2010/main" id="1" dur="indefinite" restart="never" nodeType="tmRoot">
+          <p:childTnLst>
+            <p:seq concurrent="1" nextAc="seek">
+              <p:cTn id="2" dur="indefinite" nodeType="mainSeq">
+                <p:childTnLst>
+                  <p:par>
+                    <p:cTn id="3" fill="hold">
+                      <p:stCondLst>
+                        <p:cond delay="indefinite"/>
+                      </p:stCondLst>
+                      <p:childTnLst>
+                        <p:par>
+                          <p:cTn id="4" fill="hold">
+                            <p:stCondLst>
+                              <p:cond delay="0"/>
+                            </p:stCondLst>
+                            <p:childTnLst>
+                              <p:par>
+                                <p:cTn id="5" presetID="3" presetClass="entr" presetSubtype="10" fill="hold" nodeType="clickEffect">
+                                  <p:stCondLst>
+                                    <p:cond delay="0"/>
+                                  </p:stCondLst>
+                                  <p:childTnLst>
+                                    <p:set>
+                                      <p:cBhvr>
+                                        <p:cTn id="6" dur="1" fill="hold">
+                                          <p:stCondLst>
+                                            <p:cond delay="0"/>
+                                          </p:stCondLst>
+                                        </p:cTn>
+                                        <p:tgtEl>
+                                          <p:spTgt spid="8"/>
+                                        </p:tgtEl>
+                                        <p:attrNameLst>
+                                          <p:attrName>style.visibility</p:attrName>
+                                        </p:attrNameLst>
+                                      </p:cBhvr>
+                                      <p:to>
+                                        <p:strVal val="visible"/>
+                                      </p:to>
+                                    </p:set>
+                                    <p:animEffect transition="in" filter="blinds(horizontal)">
+                                      <p:cBhvr>
+                                        <p:cTn id="7" dur="500"/>
+                                        <p:tgtEl>
+                                          <p:spTgt spid="8"/>
+                                        </p:tgtEl>
+                                      </p:cBhvr>
+                                    </p:animEffect>
+                                  </p:childTnLst>
+                                </p:cTn>
+                              </p:par>
+                              <p:par>
+                                <p:cTn id="8" presetID="3" presetClass="entr" presetSubtype="10" fill="hold" nodeType="withEffect">
+                                  <p:stCondLst>
+                                    <p:cond delay="0"/>
+                                  </p:stCondLst>
+                                  <p:childTnLst>
+                                    <p:set>
+                                      <p:cBhvr>
+                                        <p:cTn id="9" dur="1" fill="hold">
+                                          <p:stCondLst>
+                                            <p:cond delay="0"/>
+                                          </p:stCondLst>
+                                        </p:cTn>
+                                        <p:tgtEl>
+                                          <p:spTgt spid="4"/>
+                                        </p:tgtEl>
+                                        <p:attrNameLst>
+                                          <p:attrName>style.visibility</p:attrName>
+                                        </p:attrNameLst>
+                                      </p:cBhvr>
+                                      <p:to>
+                                        <p:strVal val="visible"/>
+                                      </p:to>
+                                    </p:set>
+                                    <p:animEffect transition="in" filter="blinds(horizontal)">
+                                      <p:cBhvr>
+                                        <p:cTn id="10" dur="500"/>
+                                        <p:tgtEl>
+                                          <p:spTgt spid="4"/>
+                                        </p:tgtEl>
+                                      </p:cBhvr>
+                                    </p:animEffect>
+                                  </p:childTnLst>
+                                </p:cTn>
+                              </p:par>
+                              <p:par>
+                                <p:cTn id="11" presetID="3" presetClass="entr" presetSubtype="10" fill="hold" nodeType="withEffect">
+                                  <p:stCondLst>
+                                    <p:cond delay="0"/>
+                                  </p:stCondLst>
+                                  <p:childTnLst>
+                                    <p:set>
+                                      <p:cBhvr>
+                                        <p:cTn id="12" dur="1" fill="hold">
+                                          <p:stCondLst>
+                                            <p:cond delay="0"/>
+                                          </p:stCondLst>
+                                        </p:cTn>
+                                        <p:tgtEl>
+                                          <p:spTgt spid="11"/>
+                                        </p:tgtEl>
+                                        <p:attrNameLst>
+                                          <p:attrName>style.visibility</p:attrName>
+                                        </p:attrNameLst>
+                                      </p:cBhvr>
+                                      <p:to>
+                                        <p:strVal val="visible"/>
+                                      </p:to>
+                                    </p:set>
+                                    <p:animEffect transition="in" filter="blinds(horizontal)">
+                                      <p:cBhvr>
+                                        <p:cTn id="13" dur="500"/>
+                                        <p:tgtEl>
+                                          <p:spTgt spid="11"/>
+                                        </p:tgtEl>
+                                      </p:cBhvr>
+                                    </p:animEffect>
+                                  </p:childTnLst>
+                                </p:cTn>
+                              </p:par>
+                            </p:childTnLst>
+                          </p:cTn>
+                        </p:par>
+                      </p:childTnLst>
+                    </p:cTn>
+                  </p:par>
+                </p:childTnLst>
+              </p:cTn>
+              <p:prevCondLst>
+                <p:cond evt="onPrev" delay="0">
+                  <p:tgtEl>
+                    <p:sldTgt/>
+                  </p:tgtEl>
+                </p:cond>
+              </p:prevCondLst>
+              <p:nextCondLst>
+                <p:cond evt="onNext" delay="0">
+                  <p:tgtEl>
+                    <p:sldTgt/>
+                  </p:tgtEl>
+                </p:cond>
+              </p:nextCondLst>
+            </p:seq>
+          </p:childTnLst>
+        </p:cTn>
+      </p:par>
+    </p:tnLst>
+  </p:timing>
 </p:sld>
 </file>
 
-<file path=ppt/slides/slide4.xml><?xml version="1.0" encoding="utf-8"?>
+<file path=ppt/slides/slide3.xml><?xml version="1.0" encoding="utf-8"?>
 <p:sld xmlns:a="http://schemas.openxmlformats.org/drawingml/2006/main" xmlns:r="http://schemas.openxmlformats.org/officeDocument/2006/relationships" xmlns:p="http://schemas.openxmlformats.org/presentationml/2006/main">
   <p:cSld>
     <p:spTree>
@@ -12138,10 +13601,17 @@
   <p:clrMapOvr>
     <a:masterClrMapping/>
   </p:clrMapOvr>
+  <p:timing>
+    <p:tnLst>
+      <p:par>
+        <p:cTn xmlns:p14="http://schemas.microsoft.com/office/powerpoint/2010/main" id="1" dur="indefinite" restart="never" nodeType="tmRoot"/>
+      </p:par>
+    </p:tnLst>
+  </p:timing>
 </p:sld>
 </file>
 
-<file path=ppt/slides/slide5.xml><?xml version="1.0" encoding="utf-8"?>
+<file path=ppt/slides/slide4.xml><?xml version="1.0" encoding="utf-8"?>
 <p:sld xmlns:a="http://schemas.openxmlformats.org/drawingml/2006/main" xmlns:r="http://schemas.openxmlformats.org/officeDocument/2006/relationships" xmlns:p="http://schemas.openxmlformats.org/presentationml/2006/main">
   <p:cSld>
     <p:spTree>
@@ -12264,10 +13734,17 @@
   <p:clrMapOvr>
     <a:masterClrMapping/>
   </p:clrMapOvr>
+  <p:timing>
+    <p:tnLst>
+      <p:par>
+        <p:cTn xmlns:p14="http://schemas.microsoft.com/office/powerpoint/2010/main" id="1" dur="indefinite" restart="never" nodeType="tmRoot"/>
+      </p:par>
+    </p:tnLst>
+  </p:timing>
 </p:sld>
 </file>
 
-<file path=ppt/slides/slide6.xml><?xml version="1.0" encoding="utf-8"?>
+<file path=ppt/slides/slide5.xml><?xml version="1.0" encoding="utf-8"?>
 <p:sld xmlns:a="http://schemas.openxmlformats.org/drawingml/2006/main" xmlns:r="http://schemas.openxmlformats.org/officeDocument/2006/relationships" xmlns:p="http://schemas.openxmlformats.org/presentationml/2006/main">
   <p:cSld>
     <p:spTree>
@@ -12909,10 +14386,17 @@
   <p:clrMapOvr>
     <a:masterClrMapping/>
   </p:clrMapOvr>
+  <p:timing>
+    <p:tnLst>
+      <p:par>
+        <p:cTn xmlns:p14="http://schemas.microsoft.com/office/powerpoint/2010/main" id="1" dur="indefinite" restart="never" nodeType="tmRoot"/>
+      </p:par>
+    </p:tnLst>
+  </p:timing>
 </p:sld>
 </file>
 
-<file path=ppt/slides/slide7.xml><?xml version="1.0" encoding="utf-8"?>
+<file path=ppt/slides/slide6.xml><?xml version="1.0" encoding="utf-8"?>
 <p:sld xmlns:a="http://schemas.openxmlformats.org/drawingml/2006/main" xmlns:r="http://schemas.openxmlformats.org/officeDocument/2006/relationships" xmlns:p="http://schemas.openxmlformats.org/presentationml/2006/main">
   <p:cSld>
     <p:spTree>
@@ -12966,10 +14450,15 @@
             <p:ph idx="1"/>
           </p:nvPr>
         </p:nvSpPr>
-        <p:spPr/>
+        <p:spPr>
+          <a:xfrm>
+            <a:off x="457200" y="1600200"/>
+            <a:ext cx="8229600" cy="2533389"/>
+          </a:xfrm>
+        </p:spPr>
         <p:txBody>
           <a:bodyPr>
-            <a:normAutofit lnSpcReduction="10000"/>
+            <a:normAutofit/>
           </a:bodyPr>
           <a:lstStyle/>
           <a:p>
@@ -13095,87 +14584,326 @@
                 <a:latin typeface="Courier New"/>
                 <a:cs typeface="Courier New"/>
               </a:rPr>
-              <a:t>/stats</a:t>
-            </a:r>
-          </a:p>
-          <a:p>
-            <a:r>
-              <a:rPr lang="en-US" dirty="0" smtClean="0">
+              <a:t>/</a:t>
+            </a:r>
+            <a:r>
+              <a:rPr lang="en-US" sz="1200" dirty="0" smtClean="0">
+                <a:latin typeface="Courier New"/>
                 <a:cs typeface="Courier New"/>
               </a:rPr>
-              <a:t>Implemented an agent in Python</a:t>
-            </a:r>
-          </a:p>
-          <a:p>
-            <a:pPr lvl="1"/>
-            <a:r>
-              <a:rPr lang="en-US" sz="2400" dirty="0" smtClean="0">
-                <a:cs typeface="Courier New"/>
-              </a:rPr>
-              <a:t>Retrieves data from the </a:t>
-            </a:r>
-            <a:r>
-              <a:rPr lang="en-US" sz="2400" dirty="0" err="1" smtClean="0">
-                <a:cs typeface="Courier New"/>
-              </a:rPr>
-              <a:t>HAProxy</a:t>
-            </a:r>
-            <a:r>
-              <a:rPr lang="en-US" sz="2400" dirty="0" smtClean="0">
-                <a:cs typeface="Courier New"/>
-              </a:rPr>
-              <a:t> socket</a:t>
-            </a:r>
-          </a:p>
-          <a:p>
-            <a:pPr lvl="1"/>
-            <a:r>
-              <a:rPr lang="en-US" sz="2400" dirty="0" smtClean="0">
-                <a:cs typeface="Courier New"/>
-              </a:rPr>
-              <a:t>Formats information into a JSON string</a:t>
-            </a:r>
-          </a:p>
-          <a:p>
-            <a:pPr lvl="1"/>
-            <a:r>
-              <a:rPr lang="en-US" sz="2400" dirty="0" smtClean="0">
-                <a:cs typeface="Courier New"/>
-              </a:rPr>
-              <a:t>Stores the data in </a:t>
-            </a:r>
-            <a:r>
-              <a:rPr lang="en-US" sz="2400" dirty="0" err="1" smtClean="0">
-                <a:cs typeface="Courier New"/>
-              </a:rPr>
-              <a:t>ElasticSearch</a:t>
-            </a:r>
-            <a:endParaRPr lang="en-US" sz="2400" dirty="0" smtClean="0">
+              <a:t>stats</a:t>
+            </a:r>
+            <a:endParaRPr lang="en-US" sz="1200" dirty="0" smtClean="0">
+              <a:latin typeface="Courier New"/>
               <a:cs typeface="Courier New"/>
             </a:endParaRPr>
           </a:p>
-          <a:p>
-            <a:r>
-              <a:rPr lang="en-US" dirty="0" smtClean="0">
-                <a:cs typeface="Courier New"/>
-              </a:rPr>
-              <a:t>Python script scheduled to run as a </a:t>
-            </a:r>
-            <a:r>
-              <a:rPr lang="en-US" dirty="0" err="1" smtClean="0">
-                <a:cs typeface="Courier New"/>
-              </a:rPr>
-              <a:t>cron</a:t>
-            </a:r>
-            <a:r>
-              <a:rPr lang="en-US" dirty="0" smtClean="0">
-                <a:cs typeface="Courier New"/>
-              </a:rPr>
-              <a:t> job</a:t>
-            </a:r>
-            <a:endParaRPr lang="en-US" dirty="0">
-              <a:cs typeface="Courier New"/>
-            </a:endParaRPr>
+        </p:txBody>
+      </p:sp>
+      <p:sp>
+        <p:nvSpPr>
+          <p:cNvPr id="4" name="Rectangle 3"/>
+          <p:cNvSpPr/>
+          <p:nvPr/>
+        </p:nvSpPr>
+        <p:spPr>
+          <a:xfrm>
+            <a:off x="457200" y="4898109"/>
+            <a:ext cx="1891973" cy="1166216"/>
+          </a:xfrm>
+          <a:prstGeom prst="rect">
+            <a:avLst/>
+          </a:prstGeom>
+        </p:spPr>
+        <p:style>
+          <a:lnRef idx="1">
+            <a:schemeClr val="accent1"/>
+          </a:lnRef>
+          <a:fillRef idx="3">
+            <a:schemeClr val="accent1"/>
+          </a:fillRef>
+          <a:effectRef idx="2">
+            <a:schemeClr val="accent1"/>
+          </a:effectRef>
+          <a:fontRef idx="minor">
+            <a:schemeClr val="lt1"/>
+          </a:fontRef>
+        </p:style>
+        <p:txBody>
+          <a:bodyPr rtlCol="0" anchor="ctr"/>
+          <a:lstStyle/>
+          <a:p>
+            <a:pPr algn="ctr"/>
+            <a:r>
+              <a:rPr lang="en-US" dirty="0" err="1" smtClean="0"/>
+              <a:t>HAProxy</a:t>
+            </a:r>
+            <a:endParaRPr lang="en-US" dirty="0"/>
+          </a:p>
+        </p:txBody>
+      </p:sp>
+      <p:sp>
+        <p:nvSpPr>
+          <p:cNvPr id="5" name="Rectangle 4"/>
+          <p:cNvSpPr/>
+          <p:nvPr/>
+        </p:nvSpPr>
+        <p:spPr>
+          <a:xfrm>
+            <a:off x="3706734" y="4898109"/>
+            <a:ext cx="1891973" cy="1166216"/>
+          </a:xfrm>
+          <a:prstGeom prst="rect">
+            <a:avLst/>
+          </a:prstGeom>
+          <a:solidFill>
+            <a:schemeClr val="tx2">
+              <a:lumMod val="60000"/>
+              <a:lumOff val="40000"/>
+            </a:schemeClr>
+          </a:solidFill>
+        </p:spPr>
+        <p:style>
+          <a:lnRef idx="1">
+            <a:schemeClr val="accent1"/>
+          </a:lnRef>
+          <a:fillRef idx="3">
+            <a:schemeClr val="accent1"/>
+          </a:fillRef>
+          <a:effectRef idx="2">
+            <a:schemeClr val="accent1"/>
+          </a:effectRef>
+          <a:fontRef idx="minor">
+            <a:schemeClr val="lt1"/>
+          </a:fontRef>
+        </p:style>
+        <p:txBody>
+          <a:bodyPr rtlCol="0" anchor="ctr"/>
+          <a:lstStyle/>
+          <a:p>
+            <a:pPr algn="ctr"/>
+            <a:r>
+              <a:rPr lang="en-US" dirty="0" smtClean="0"/>
+              <a:t>Agent</a:t>
+            </a:r>
+          </a:p>
+          <a:p>
+            <a:pPr algn="ctr"/>
+            <a:r>
+              <a:rPr lang="en-US" dirty="0" smtClean="0"/>
+              <a:t>(Python)</a:t>
+            </a:r>
+            <a:endParaRPr lang="en-US" dirty="0"/>
+          </a:p>
+        </p:txBody>
+      </p:sp>
+      <p:sp>
+        <p:nvSpPr>
+          <p:cNvPr id="6" name="Rectangle 5"/>
+          <p:cNvSpPr/>
+          <p:nvPr/>
+        </p:nvSpPr>
+        <p:spPr>
+          <a:xfrm>
+            <a:off x="6956269" y="4895014"/>
+            <a:ext cx="1891973" cy="1166216"/>
+          </a:xfrm>
+          <a:prstGeom prst="rect">
+            <a:avLst/>
+          </a:prstGeom>
+          <a:solidFill>
+            <a:srgbClr val="1F497D"/>
+          </a:solidFill>
+        </p:spPr>
+        <p:style>
+          <a:lnRef idx="1">
+            <a:schemeClr val="accent1"/>
+          </a:lnRef>
+          <a:fillRef idx="3">
+            <a:schemeClr val="accent1"/>
+          </a:fillRef>
+          <a:effectRef idx="2">
+            <a:schemeClr val="accent1"/>
+          </a:effectRef>
+          <a:fontRef idx="minor">
+            <a:schemeClr val="lt1"/>
+          </a:fontRef>
+        </p:style>
+        <p:txBody>
+          <a:bodyPr rtlCol="0" anchor="ctr"/>
+          <a:lstStyle/>
+          <a:p>
+            <a:pPr algn="ctr"/>
+            <a:r>
+              <a:rPr lang="en-US" dirty="0" err="1" smtClean="0"/>
+              <a:t>ElasticSearch</a:t>
+            </a:r>
+            <a:endParaRPr lang="en-US" dirty="0"/>
+          </a:p>
+        </p:txBody>
+      </p:sp>
+      <p:cxnSp>
+        <p:nvCxnSpPr>
+          <p:cNvPr id="10" name="Straight Arrow Connector 9"/>
+          <p:cNvCxnSpPr>
+            <a:stCxn id="4" idx="3"/>
+            <a:endCxn id="5" idx="1"/>
+          </p:cNvCxnSpPr>
+          <p:nvPr/>
+        </p:nvCxnSpPr>
+        <p:spPr>
+          <a:xfrm>
+            <a:off x="2349173" y="5481217"/>
+            <a:ext cx="1357561" cy="0"/>
+          </a:xfrm>
+          <a:prstGeom prst="straightConnector1">
+            <a:avLst/>
+          </a:prstGeom>
+          <a:ln>
+            <a:tailEnd type="arrow"/>
+          </a:ln>
+        </p:spPr>
+        <p:style>
+          <a:lnRef idx="2">
+            <a:schemeClr val="accent1"/>
+          </a:lnRef>
+          <a:fillRef idx="0">
+            <a:schemeClr val="accent1"/>
+          </a:fillRef>
+          <a:effectRef idx="1">
+            <a:schemeClr val="accent1"/>
+          </a:effectRef>
+          <a:fontRef idx="minor">
+            <a:schemeClr val="tx1"/>
+          </a:fontRef>
+        </p:style>
+      </p:cxnSp>
+      <p:cxnSp>
+        <p:nvCxnSpPr>
+          <p:cNvPr id="12" name="Straight Arrow Connector 11"/>
+          <p:cNvCxnSpPr>
+            <a:stCxn id="5" idx="3"/>
+            <a:endCxn id="6" idx="1"/>
+          </p:cNvCxnSpPr>
+          <p:nvPr/>
+        </p:nvCxnSpPr>
+        <p:spPr>
+          <a:xfrm flipV="1">
+            <a:off x="5598707" y="5478122"/>
+            <a:ext cx="1357562" cy="3095"/>
+          </a:xfrm>
+          <a:prstGeom prst="straightConnector1">
+            <a:avLst/>
+          </a:prstGeom>
+          <a:ln>
+            <a:tailEnd type="arrow"/>
+          </a:ln>
+        </p:spPr>
+        <p:style>
+          <a:lnRef idx="2">
+            <a:schemeClr val="accent1"/>
+          </a:lnRef>
+          <a:fillRef idx="0">
+            <a:schemeClr val="accent1"/>
+          </a:fillRef>
+          <a:effectRef idx="1">
+            <a:schemeClr val="accent1"/>
+          </a:effectRef>
+          <a:fontRef idx="minor">
+            <a:schemeClr val="tx1"/>
+          </a:fontRef>
+        </p:style>
+      </p:cxnSp>
+      <p:sp>
+        <p:nvSpPr>
+          <p:cNvPr id="13" name="TextBox 12"/>
+          <p:cNvSpPr txBox="1"/>
+          <p:nvPr/>
+        </p:nvSpPr>
+        <p:spPr>
+          <a:xfrm>
+            <a:off x="2349173" y="4895014"/>
+            <a:ext cx="1357561" cy="523220"/>
+          </a:xfrm>
+          <a:prstGeom prst="rect">
+            <a:avLst/>
+          </a:prstGeom>
+          <a:noFill/>
+        </p:spPr>
+        <p:txBody>
+          <a:bodyPr wrap="square" rtlCol="0">
+            <a:spAutoFit/>
+          </a:bodyPr>
+          <a:lstStyle/>
+          <a:p>
+            <a:pPr algn="ctr"/>
+            <a:r>
+              <a:rPr lang="en-US" sz="1400" dirty="0" smtClean="0"/>
+              <a:t>UNIX Socket Call</a:t>
+            </a:r>
+            <a:endParaRPr lang="en-US" sz="1400" dirty="0"/>
+          </a:p>
+        </p:txBody>
+      </p:sp>
+      <p:sp>
+        <p:nvSpPr>
+          <p:cNvPr id="14" name="TextBox 13"/>
+          <p:cNvSpPr txBox="1"/>
+          <p:nvPr/>
+        </p:nvSpPr>
+        <p:spPr>
+          <a:xfrm>
+            <a:off x="5598708" y="4895014"/>
+            <a:ext cx="1357561" cy="307777"/>
+          </a:xfrm>
+          <a:prstGeom prst="rect">
+            <a:avLst/>
+          </a:prstGeom>
+          <a:noFill/>
+        </p:spPr>
+        <p:txBody>
+          <a:bodyPr wrap="square" rtlCol="0">
+            <a:spAutoFit/>
+          </a:bodyPr>
+          <a:lstStyle/>
+          <a:p>
+            <a:pPr algn="ctr"/>
+            <a:r>
+              <a:rPr lang="en-US" sz="1400" dirty="0" smtClean="0"/>
+              <a:t>JSON+HTTP</a:t>
+            </a:r>
+            <a:endParaRPr lang="en-US" sz="1400" dirty="0"/>
+          </a:p>
+        </p:txBody>
+      </p:sp>
+      <p:sp>
+        <p:nvSpPr>
+          <p:cNvPr id="15" name="TextBox 14"/>
+          <p:cNvSpPr txBox="1"/>
+          <p:nvPr/>
+        </p:nvSpPr>
+        <p:spPr>
+          <a:xfrm>
+            <a:off x="3978868" y="6064325"/>
+            <a:ext cx="1357561" cy="307777"/>
+          </a:xfrm>
+          <a:prstGeom prst="rect">
+            <a:avLst/>
+          </a:prstGeom>
+          <a:noFill/>
+        </p:spPr>
+        <p:txBody>
+          <a:bodyPr wrap="square" rtlCol="0">
+            <a:spAutoFit/>
+          </a:bodyPr>
+          <a:lstStyle/>
+          <a:p>
+            <a:pPr algn="ctr"/>
+            <a:r>
+              <a:rPr lang="en-US" sz="1400" dirty="0" err="1" smtClean="0"/>
+              <a:t>CronJob</a:t>
+            </a:r>
+            <a:endParaRPr lang="en-US" sz="1400" dirty="0"/>
           </a:p>
         </p:txBody>
       </p:sp>
@@ -13189,10 +14917,17 @@
   <p:clrMapOvr>
     <a:masterClrMapping/>
   </p:clrMapOvr>
+  <p:timing>
+    <p:tnLst>
+      <p:par>
+        <p:cTn xmlns:p14="http://schemas.microsoft.com/office/powerpoint/2010/main" id="1" dur="indefinite" restart="never" nodeType="tmRoot"/>
+      </p:par>
+    </p:tnLst>
+  </p:timing>
 </p:sld>
 </file>
 
-<file path=ppt/slides/slide8.xml><?xml version="1.0" encoding="utf-8"?>
+<file path=ppt/slides/slide7.xml><?xml version="1.0" encoding="utf-8"?>
 <p:sld xmlns:a="http://schemas.openxmlformats.org/drawingml/2006/main" xmlns:r="http://schemas.openxmlformats.org/officeDocument/2006/relationships" xmlns:p="http://schemas.openxmlformats.org/presentationml/2006/main">
   <p:cSld>
     <p:spTree>
@@ -13271,6 +15006,159 @@
   <p:clrMapOvr>
     <a:masterClrMapping/>
   </p:clrMapOvr>
+  <p:timing>
+    <p:tnLst>
+      <p:par>
+        <p:cTn xmlns:p14="http://schemas.microsoft.com/office/powerpoint/2010/main" id="1" dur="indefinite" restart="never" nodeType="tmRoot"/>
+      </p:par>
+    </p:tnLst>
+  </p:timing>
+</p:sld>
+</file>
+
+<file path=ppt/slides/slide8.xml><?xml version="1.0" encoding="utf-8"?>
+<p:sld xmlns:a="http://schemas.openxmlformats.org/drawingml/2006/main" xmlns:r="http://schemas.openxmlformats.org/officeDocument/2006/relationships" xmlns:p="http://schemas.openxmlformats.org/presentationml/2006/main">
+  <p:cSld>
+    <p:spTree>
+      <p:nvGrpSpPr>
+        <p:cNvPr id="1" name=""/>
+        <p:cNvGrpSpPr/>
+        <p:nvPr/>
+      </p:nvGrpSpPr>
+      <p:grpSpPr>
+        <a:xfrm>
+          <a:off x="0" y="0"/>
+          <a:ext cx="0" cy="0"/>
+          <a:chOff x="0" y="0"/>
+          <a:chExt cx="0" cy="0"/>
+        </a:xfrm>
+      </p:grpSpPr>
+      <p:sp>
+        <p:nvSpPr>
+          <p:cNvPr id="2" name="Title 1"/>
+          <p:cNvSpPr>
+            <a:spLocks noGrp="1"/>
+          </p:cNvSpPr>
+          <p:nvPr>
+            <p:ph type="title"/>
+          </p:nvPr>
+        </p:nvSpPr>
+        <p:spPr/>
+        <p:txBody>
+          <a:bodyPr/>
+          <a:lstStyle/>
+          <a:p>
+            <a:r>
+              <a:rPr lang="en-US" dirty="0" smtClean="0"/>
+              <a:t>Monitoring Cloud SDK Invocations</a:t>
+            </a:r>
+            <a:endParaRPr lang="en-US" dirty="0"/>
+          </a:p>
+        </p:txBody>
+      </p:sp>
+      <p:sp>
+        <p:nvSpPr>
+          <p:cNvPr id="3" name="Content Placeholder 2"/>
+          <p:cNvSpPr>
+            <a:spLocks noGrp="1"/>
+          </p:cNvSpPr>
+          <p:nvPr>
+            <p:ph idx="1"/>
+          </p:nvPr>
+        </p:nvSpPr>
+        <p:spPr/>
+        <p:txBody>
+          <a:bodyPr>
+            <a:normAutofit fontScale="92500"/>
+          </a:bodyPr>
+          <a:lstStyle/>
+          <a:p>
+            <a:r>
+              <a:rPr lang="en-US" dirty="0" smtClean="0"/>
+              <a:t>Added some instrumentation to </a:t>
+            </a:r>
+            <a:r>
+              <a:rPr lang="en-US" dirty="0" err="1" smtClean="0"/>
+              <a:t>PBServer</a:t>
+            </a:r>
+            <a:r>
+              <a:rPr lang="en-US" dirty="0" smtClean="0"/>
+              <a:t> to record all cloud SDK calls</a:t>
+            </a:r>
+          </a:p>
+          <a:p>
+            <a:pPr lvl="1"/>
+            <a:r>
+              <a:rPr lang="en-US" dirty="0" smtClean="0"/>
+              <a:t>Timestamp</a:t>
+            </a:r>
+          </a:p>
+          <a:p>
+            <a:pPr lvl="1"/>
+            <a:r>
+              <a:rPr lang="en-US" dirty="0" smtClean="0"/>
+              <a:t>Source application and HTTP request</a:t>
+            </a:r>
+          </a:p>
+          <a:p>
+            <a:pPr lvl="1"/>
+            <a:r>
+              <a:rPr lang="en-US" dirty="0" smtClean="0"/>
+              <a:t>Target cloud SDK service and operation</a:t>
+            </a:r>
+          </a:p>
+          <a:p>
+            <a:pPr lvl="1"/>
+            <a:r>
+              <a:rPr lang="en-US" dirty="0" smtClean="0"/>
+              <a:t>Request size and hash (PB payload)</a:t>
+            </a:r>
+          </a:p>
+          <a:p>
+            <a:pPr lvl="1"/>
+            <a:r>
+              <a:rPr lang="en-US" dirty="0" smtClean="0"/>
+              <a:t>Time spent executing the SDK call</a:t>
+            </a:r>
+          </a:p>
+          <a:p>
+            <a:r>
+              <a:rPr lang="en-US" dirty="0" err="1" smtClean="0"/>
+              <a:t>PBServer</a:t>
+            </a:r>
+            <a:r>
+              <a:rPr lang="en-US" dirty="0" smtClean="0"/>
+              <a:t> accumulates this information in memory, and reports to </a:t>
+            </a:r>
+            <a:r>
+              <a:rPr lang="en-US" dirty="0" err="1" smtClean="0"/>
+              <a:t>ElasticSearch</a:t>
+            </a:r>
+            <a:r>
+              <a:rPr lang="en-US" dirty="0" smtClean="0"/>
+              <a:t> in batches</a:t>
+            </a:r>
+            <a:endParaRPr lang="en-US" dirty="0"/>
+          </a:p>
+        </p:txBody>
+      </p:sp>
+    </p:spTree>
+    <p:extLst>
+      <p:ext uri="{BB962C8B-B14F-4D97-AF65-F5344CB8AC3E}">
+        <p14:creationId xmlns:p14="http://schemas.microsoft.com/office/powerpoint/2010/main" val="2934107477"/>
+      </p:ext>
+    </p:extLst>
+  </p:cSld>
+  <p:clrMapOvr>
+    <a:masterClrMapping/>
+  </p:clrMapOvr>
+  <p:timing>
+    <p:tnLst>
+      <p:par>
+        <p:cTn xmlns:p14="http://schemas.microsoft.com/office/powerpoint/2010/main" id="1" dur="indefinite" restart="never" nodeType="tmRoot"/>
+      </p:par>
+    </p:tnLst>
+  </p:timing>
 </p:sld>
 </file>
 
@@ -13303,12 +15191,14 @@
         </p:nvSpPr>
         <p:spPr/>
         <p:txBody>
-          <a:bodyPr/>
+          <a:bodyPr>
+            <a:normAutofit fontScale="90000"/>
+          </a:bodyPr>
           <a:lstStyle/>
           <a:p>
             <a:r>
               <a:rPr lang="en-US" dirty="0" smtClean="0"/>
-              <a:t>Monitoring Cloud SDK Invocations</a:t>
+              <a:t>HTTP Request to SDK Call Correlation</a:t>
             </a:r>
             <a:endParaRPr lang="en-US" dirty="0"/>
           </a:p>
@@ -13326,75 +15216,47 @@
         </p:nvSpPr>
         <p:spPr/>
         <p:txBody>
-          <a:bodyPr>
-            <a:normAutofit fontScale="92500"/>
-          </a:bodyPr>
+          <a:bodyPr/>
           <a:lstStyle/>
           <a:p>
             <a:r>
               <a:rPr lang="en-US" dirty="0" smtClean="0"/>
-              <a:t>Added some instrumentation to </a:t>
-            </a:r>
+              <a:t>Front-end server (</a:t>
+            </a:r>
+            <a:r>
+              <a:rPr lang="en-US" dirty="0" err="1" smtClean="0"/>
+              <a:t>Nginx</a:t>
+            </a:r>
+            <a:r>
+              <a:rPr lang="en-US" dirty="0" smtClean="0"/>
+              <a:t>) tags each incoming request with a unique ID</a:t>
+            </a:r>
+          </a:p>
+          <a:p>
             <a:r>
               <a:rPr lang="en-US" dirty="0" err="1" smtClean="0"/>
               <a:t>PBServer</a:t>
             </a:r>
             <a:r>
               <a:rPr lang="en-US" dirty="0" smtClean="0"/>
-              <a:t> to record all cloud SDK calls</a:t>
-            </a:r>
-          </a:p>
-          <a:p>
-            <a:pPr lvl="1"/>
-            <a:r>
-              <a:rPr lang="en-US" dirty="0" smtClean="0"/>
-              <a:t>Timestamp</a:t>
-            </a:r>
-          </a:p>
-          <a:p>
-            <a:pPr lvl="1"/>
-            <a:r>
-              <a:rPr lang="en-US" dirty="0" smtClean="0"/>
-              <a:t>Source application and HTTP request</a:t>
-            </a:r>
-          </a:p>
-          <a:p>
-            <a:pPr lvl="1"/>
-            <a:r>
-              <a:rPr lang="en-US" dirty="0" smtClean="0"/>
-              <a:t>Target cloud SDK service and operation</a:t>
-            </a:r>
-          </a:p>
-          <a:p>
-            <a:pPr lvl="1"/>
-            <a:r>
-              <a:rPr lang="en-US" dirty="0" smtClean="0"/>
-              <a:t>Request size and hash (PB payload)</a:t>
-            </a:r>
-          </a:p>
-          <a:p>
-            <a:pPr lvl="1"/>
-            <a:r>
-              <a:rPr lang="en-US" dirty="0" smtClean="0"/>
-              <a:t>Time spent executing the SDK call</a:t>
-            </a:r>
-          </a:p>
-          <a:p>
-            <a:r>
-              <a:rPr lang="en-US" dirty="0" err="1" smtClean="0"/>
-              <a:t>PBServer</a:t>
-            </a:r>
-            <a:r>
-              <a:rPr lang="en-US" dirty="0" smtClean="0"/>
-              <a:t> accumulates this information in memory, and reports to </a:t>
-            </a:r>
+              <a:t> records this “HTTP request ID” whenever inspecting a cloud SDK call</a:t>
+            </a:r>
+          </a:p>
+          <a:p>
             <a:r>
               <a:rPr lang="en-US" dirty="0" err="1" smtClean="0"/>
               <a:t>ElasticSearch</a:t>
             </a:r>
             <a:r>
               <a:rPr lang="en-US" dirty="0" smtClean="0"/>
-              <a:t> in batches</a:t>
+              <a:t> can aggregate (group) cloud SDK calls by HTTP request ID</a:t>
+            </a:r>
+          </a:p>
+          <a:p>
+            <a:pPr lvl="1"/>
+            <a:r>
+              <a:rPr lang="en-US" dirty="0" smtClean="0"/>
+              <a:t>Implemented a Python script that performs a SDK call time analysis at request level</a:t>
             </a:r>
             <a:endParaRPr lang="en-US" dirty="0"/>
           </a:p>
@@ -13403,13 +15265,20 @@
     </p:spTree>
     <p:extLst>
       <p:ext uri="{BB962C8B-B14F-4D97-AF65-F5344CB8AC3E}">
-        <p14:creationId xmlns:p14="http://schemas.microsoft.com/office/powerpoint/2010/main" val="2934107477"/>
+        <p14:creationId xmlns:p14="http://schemas.microsoft.com/office/powerpoint/2010/main" val="3289274012"/>
       </p:ext>
     </p:extLst>
   </p:cSld>
   <p:clrMapOvr>
     <a:masterClrMapping/>
   </p:clrMapOvr>
+  <p:timing>
+    <p:tnLst>
+      <p:par>
+        <p:cTn xmlns:p14="http://schemas.microsoft.com/office/powerpoint/2010/main" id="1" dur="indefinite" restart="never" nodeType="tmRoot"/>
+      </p:par>
+    </p:tnLst>
+  </p:timing>
 </p:sld>
 </file>
 

</xml_diff>

<commit_message>
Updated text and diagram
</commit_message>
<xml_diff>
--- a/Eager/elk-experiment/Huawei_Presentation_1.pptx
+++ b/Eager/elk-experiment/Huawei_Presentation_1.pptx
@@ -3080,8 +3080,8 @@
     <dgm:cxn modelId="{1018F0F1-6E7B-DC40-BE52-700C5AD8B728}" srcId="{B95D4F37-1D8A-8749-8B39-2CB7397FA252}" destId="{B859EB50-B895-2549-9384-E2BCDE3C968C}" srcOrd="2" destOrd="0" parTransId="{A1FC67BA-DBDE-8C4A-8361-C52EDE89BBAE}" sibTransId="{1B17C232-6568-9545-944B-5551ABA3B464}"/>
     <dgm:cxn modelId="{9C504291-6760-1B4A-A609-11D462DDB442}" srcId="{B859EB50-B895-2549-9384-E2BCDE3C968C}" destId="{5C0014C3-2263-504E-9FCE-9FA2E3674F4F}" srcOrd="0" destOrd="0" parTransId="{9C105334-FA49-694D-820C-36D5CA8EC00A}" sibTransId="{4C0134B1-5A1B-814F-B67D-369FAE3186CF}"/>
     <dgm:cxn modelId="{43625586-24BE-4B41-9DA0-3F2088EE3174}" type="presOf" srcId="{31FF09B4-248A-D248-869E-D7534E0E666E}" destId="{377D39BC-B80D-9944-8D55-3791B3605780}" srcOrd="0" destOrd="1" presId="urn:microsoft.com/office/officeart/2005/8/layout/vList5"/>
+    <dgm:cxn modelId="{98AF7EC9-B0A4-A447-90FB-2C679610506D}" srcId="{B859EB50-B895-2549-9384-E2BCDE3C968C}" destId="{093DE271-6615-3C46-90F6-655CE029D9D0}" srcOrd="1" destOrd="0" parTransId="{49A9E02E-934A-E246-AF9E-B4D9D0D62D6D}" sibTransId="{AFE06E13-E600-6B42-84D2-E0CB85125385}"/>
     <dgm:cxn modelId="{BBCA9D30-DA20-8A45-A95F-E5C052F81296}" type="presOf" srcId="{A27A3876-3C67-354A-A9E6-1281E94DE7B3}" destId="{2F51A5BA-F3CA-2D43-B035-27A42F7B00E1}" srcOrd="0" destOrd="0" presId="urn:microsoft.com/office/officeart/2005/8/layout/vList5"/>
-    <dgm:cxn modelId="{98AF7EC9-B0A4-A447-90FB-2C679610506D}" srcId="{B859EB50-B895-2549-9384-E2BCDE3C968C}" destId="{093DE271-6615-3C46-90F6-655CE029D9D0}" srcOrd="1" destOrd="0" parTransId="{49A9E02E-934A-E246-AF9E-B4D9D0D62D6D}" sibTransId="{AFE06E13-E600-6B42-84D2-E0CB85125385}"/>
     <dgm:cxn modelId="{9CF250DA-D343-2743-918A-2B643828FF04}" type="presOf" srcId="{1988179C-0019-8D4F-BA6D-31EFF596AF01}" destId="{377D39BC-B80D-9944-8D55-3791B3605780}" srcOrd="0" destOrd="0" presId="urn:microsoft.com/office/officeart/2005/8/layout/vList5"/>
     <dgm:cxn modelId="{F223971D-1215-2149-BFE9-EB0926F72A85}" type="presOf" srcId="{8D3E64A9-4621-224F-BDB9-F2731A1CC811}" destId="{ED256A8E-3577-F04B-A6F5-C5D127EEDFF7}" srcOrd="0" destOrd="2" presId="urn:microsoft.com/office/officeart/2005/8/layout/vList5"/>
     <dgm:cxn modelId="{C7DCB44E-67A4-7044-A779-973DE1D694CE}" type="presOf" srcId="{B859EB50-B895-2549-9384-E2BCDE3C968C}" destId="{1F309CAE-C2CA-6D46-8C05-0080B6A637BD}" srcOrd="0" destOrd="0" presId="urn:microsoft.com/office/officeart/2005/8/layout/vList5"/>
@@ -3833,8 +3833,8 @@
     <dgm:cxn modelId="{5CB98E25-DC4B-014C-9FA3-471EB8E0DF52}" type="presOf" srcId="{BE5CD4A6-B5D8-C34A-A9A9-70A30BD82EEE}" destId="{ED256A8E-3577-F04B-A6F5-C5D127EEDFF7}" srcOrd="0" destOrd="1" presId="urn:microsoft.com/office/officeart/2005/8/layout/vList5"/>
     <dgm:cxn modelId="{1A726084-BD4E-3544-BD4A-6EADA04118C2}" srcId="{D2A98552-7206-B54B-8916-313B2DDD4B1F}" destId="{BE5CD4A6-B5D8-C34A-A9A9-70A30BD82EEE}" srcOrd="1" destOrd="0" parTransId="{2EA5CC8F-0046-2A4D-B97D-C200CD764370}" sibTransId="{3B086D1B-5300-5C45-B552-EC2D10A8E026}"/>
     <dgm:cxn modelId="{F570798A-DE72-E742-9847-236B2B8F43A4}" srcId="{B95D4F37-1D8A-8749-8B39-2CB7397FA252}" destId="{B2DC663A-2019-3047-9DCF-0B248892D2E8}" srcOrd="3" destOrd="0" parTransId="{ED829C2B-8C9A-7443-9ABA-DE776BCD6E8C}" sibTransId="{A8C43371-DCA0-9A42-BCD8-990D6C443216}"/>
+    <dgm:cxn modelId="{7F72C51A-CB11-0548-9128-913EB59487F0}" type="presOf" srcId="{31FF09B4-248A-D248-869E-D7534E0E666E}" destId="{377D39BC-B80D-9944-8D55-3791B3605780}" srcOrd="0" destOrd="1" presId="urn:microsoft.com/office/officeart/2005/8/layout/vList5"/>
     <dgm:cxn modelId="{0C34C52A-84E6-7E48-9E83-872254C4563D}" type="presOf" srcId="{97B9A300-C9B3-AB4E-A721-12CAD3F01375}" destId="{4B6D0C25-8FB9-184A-858D-D81E0BA90C4D}" srcOrd="0" destOrd="1" presId="urn:microsoft.com/office/officeart/2005/8/layout/vList5"/>
-    <dgm:cxn modelId="{7F72C51A-CB11-0548-9128-913EB59487F0}" type="presOf" srcId="{31FF09B4-248A-D248-869E-D7534E0E666E}" destId="{377D39BC-B80D-9944-8D55-3791B3605780}" srcOrd="0" destOrd="1" presId="urn:microsoft.com/office/officeart/2005/8/layout/vList5"/>
     <dgm:cxn modelId="{14DE4371-9B66-4D4F-9DFC-BDB9428C36B0}" srcId="{B2DC663A-2019-3047-9DCF-0B248892D2E8}" destId="{1988179C-0019-8D4F-BA6D-31EFF596AF01}" srcOrd="0" destOrd="0" parTransId="{B481B68A-1F19-314A-81D4-70BFB3A04400}" sibTransId="{1F0FF57F-7A88-7C4A-8E74-03E544111B09}"/>
     <dgm:cxn modelId="{F6947121-F0B4-234F-A52D-B33006F1A607}" srcId="{A27A3876-3C67-354A-A9E6-1281E94DE7B3}" destId="{908F87EC-A238-4E4F-9FE2-FFCE714A35A1}" srcOrd="0" destOrd="0" parTransId="{696795E0-9803-4C40-B438-6FE89DA1CBAC}" sibTransId="{966D4E03-F813-364F-87D4-26EFE4E6C3C6}"/>
     <dgm:cxn modelId="{BDE2A438-3829-464A-9235-03F0E493651F}" srcId="{A27A3876-3C67-354A-A9E6-1281E94DE7B3}" destId="{97B9A300-C9B3-AB4E-A721-12CAD3F01375}" srcOrd="1" destOrd="0" parTransId="{D2848B50-03A0-C144-923D-660BCA5F1AD4}" sibTransId="{D68089A8-A972-7F47-8119-56C683DD45EE}"/>
@@ -16045,8 +16045,8 @@
         </p:nvGrpSpPr>
         <p:grpSpPr>
           <a:xfrm>
-            <a:off x="465863" y="916727"/>
-            <a:ext cx="5733384" cy="4225244"/>
+            <a:off x="465862" y="916727"/>
+            <a:ext cx="6082779" cy="4225244"/>
             <a:chOff x="433939" y="145972"/>
             <a:chExt cx="11578945" cy="6144130"/>
           </a:xfrm>
@@ -16089,17 +16089,17 @@
             <a:p>
               <a:pPr algn="ctr"/>
               <a:r>
-                <a:rPr lang="en-US" sz="1100" dirty="0" smtClean="0"/>
+                <a:rPr lang="en-US" sz="1200" dirty="0" smtClean="0"/>
                 <a:t>Frontend Server/</a:t>
               </a:r>
             </a:p>
             <a:p>
               <a:pPr algn="ctr"/>
               <a:r>
-                <a:rPr lang="en-US" sz="1100" dirty="0" smtClean="0"/>
+                <a:rPr lang="en-US" sz="1200" dirty="0" smtClean="0"/>
                 <a:t>Load Balancer</a:t>
               </a:r>
-              <a:endParaRPr lang="en-US" sz="1100" dirty="0"/>
+              <a:endParaRPr lang="en-US" sz="1200" dirty="0"/>
             </a:p>
           </p:txBody>
         </p:sp>
@@ -16141,10 +16141,10 @@
             <a:p>
               <a:pPr algn="ctr"/>
               <a:r>
-                <a:rPr lang="en-US" sz="1100" dirty="0" smtClean="0"/>
+                <a:rPr lang="en-US" sz="1200" dirty="0" smtClean="0"/>
                 <a:t>Application Server</a:t>
               </a:r>
-              <a:endParaRPr lang="en-US" sz="1100" dirty="0"/>
+              <a:endParaRPr lang="en-US" sz="1200" dirty="0"/>
             </a:p>
           </p:txBody>
         </p:sp>
@@ -16222,18 +16222,13 @@
             <a:p>
               <a:pPr algn="ctr"/>
               <a:r>
-                <a:rPr lang="en-US" sz="1100" dirty="0" err="1" smtClean="0"/>
+                <a:rPr lang="en-US" sz="1200" dirty="0" err="1" smtClean="0"/>
                 <a:t>PaaS</a:t>
               </a:r>
               <a:r>
-                <a:rPr lang="en-US" sz="1100" dirty="0" smtClean="0"/>
-                <a:t> </a:t>
+                <a:rPr lang="en-US" sz="1200" dirty="0" smtClean="0"/>
+                <a:t> Kernel</a:t>
               </a:r>
-              <a:r>
-                <a:rPr lang="en-US" sz="1100" dirty="0" smtClean="0"/>
-                <a:t>Kernel</a:t>
-              </a:r>
-              <a:endParaRPr lang="en-US" sz="1100" dirty="0" smtClean="0"/>
             </a:p>
           </p:txBody>
         </p:sp>
@@ -16275,14 +16270,9 @@
             <a:p>
               <a:pPr algn="ctr"/>
               <a:r>
-                <a:rPr lang="en-US" sz="1100" dirty="0" smtClean="0"/>
-                <a:t>Cloud </a:t>
+                <a:rPr lang="en-US" sz="1200" dirty="0" smtClean="0"/>
+                <a:t>Cloud Infrastructure</a:t>
               </a:r>
-              <a:r>
-                <a:rPr lang="en-US" sz="1100" dirty="0" smtClean="0"/>
-                <a:t>Infrastructure</a:t>
-              </a:r>
-              <a:endParaRPr lang="en-US" sz="1100" dirty="0" smtClean="0"/>
             </a:p>
           </p:txBody>
         </p:sp>
@@ -16367,7 +16357,7 @@
           <p:spPr>
             <a:xfrm>
               <a:off x="3776051" y="145972"/>
-              <a:ext cx="2565828" cy="872727"/>
+              <a:ext cx="2565828" cy="939861"/>
             </a:xfrm>
             <a:prstGeom prst="rect">
               <a:avLst/>
@@ -16382,10 +16372,10 @@
             <a:p>
               <a:pPr algn="ctr"/>
               <a:r>
-                <a:rPr lang="en-US" sz="1100" dirty="0" smtClean="0"/>
+                <a:rPr lang="en-US" sz="1200" dirty="0" smtClean="0"/>
                 <a:t>Access logs and other request traffic metrics </a:t>
               </a:r>
-              <a:endParaRPr lang="en-US" sz="1100" dirty="0"/>
+              <a:endParaRPr lang="en-US" sz="1200" dirty="0"/>
             </a:p>
           </p:txBody>
         </p:sp>
@@ -16398,7 +16388,7 @@
           <p:spPr>
             <a:xfrm>
               <a:off x="4023386" y="1922074"/>
-              <a:ext cx="1827741" cy="626573"/>
+              <a:ext cx="1827741" cy="671329"/>
             </a:xfrm>
             <a:prstGeom prst="rect">
               <a:avLst/>
@@ -16413,10 +16403,10 @@
             <a:p>
               <a:pPr algn="ctr"/>
               <a:r>
-                <a:rPr lang="en-US" sz="1100" dirty="0" smtClean="0"/>
+                <a:rPr lang="en-US" sz="1200" dirty="0" smtClean="0"/>
                 <a:t>App Server logs</a:t>
               </a:r>
-              <a:endParaRPr lang="en-US" sz="1100" dirty="0"/>
+              <a:endParaRPr lang="en-US" sz="1200" dirty="0"/>
             </a:p>
           </p:txBody>
         </p:sp>
@@ -16429,7 +16419,7 @@
           <p:spPr>
             <a:xfrm>
               <a:off x="3776051" y="3491141"/>
-              <a:ext cx="2258789" cy="626573"/>
+              <a:ext cx="2258789" cy="671329"/>
             </a:xfrm>
             <a:prstGeom prst="rect">
               <a:avLst/>
@@ -16444,14 +16434,14 @@
             <a:p>
               <a:pPr algn="ctr"/>
               <a:r>
-                <a:rPr lang="en-US" sz="1100" dirty="0" err="1" smtClean="0"/>
+                <a:rPr lang="en-US" sz="1200" dirty="0" err="1" smtClean="0"/>
                 <a:t>PaaS</a:t>
               </a:r>
               <a:r>
-                <a:rPr lang="en-US" sz="1100" dirty="0" smtClean="0"/>
+                <a:rPr lang="en-US" sz="1200" dirty="0" smtClean="0"/>
                 <a:t> kernel invocation data</a:t>
               </a:r>
-              <a:endParaRPr lang="en-US" sz="1100" dirty="0"/>
+              <a:endParaRPr lang="en-US" sz="1200" dirty="0"/>
             </a:p>
           </p:txBody>
         </p:sp>
@@ -16464,7 +16454,7 @@
           <p:spPr>
             <a:xfrm>
               <a:off x="4023386" y="5184084"/>
-              <a:ext cx="1952013" cy="626573"/>
+              <a:ext cx="1952013" cy="671329"/>
             </a:xfrm>
             <a:prstGeom prst="rect">
               <a:avLst/>
@@ -16479,10 +16469,10 @@
             <a:p>
               <a:pPr algn="ctr"/>
               <a:r>
-                <a:rPr lang="en-US" sz="1100" dirty="0" smtClean="0"/>
+                <a:rPr lang="en-US" sz="1200" dirty="0" smtClean="0"/>
                 <a:t>Resource usage data</a:t>
               </a:r>
-              <a:endParaRPr lang="en-US" sz="1100" dirty="0"/>
+              <a:endParaRPr lang="en-US" sz="1200" dirty="0"/>
             </a:p>
           </p:txBody>
         </p:sp>
@@ -16533,10 +16523,10 @@
             <a:p>
               <a:pPr algn="ctr"/>
               <a:r>
-                <a:rPr lang="en-US" sz="1100" dirty="0" smtClean="0"/>
+                <a:rPr lang="en-US" sz="1200" b="1" u="sng" dirty="0" smtClean="0"/>
                 <a:t>Data Storage</a:t>
               </a:r>
-              <a:endParaRPr lang="en-US" sz="1100" dirty="0"/>
+              <a:endParaRPr lang="en-US" sz="1200" b="1" u="sng" dirty="0"/>
             </a:p>
           </p:txBody>
         </p:sp>
@@ -16736,7 +16726,7 @@
             <a:lstStyle/>
             <a:p>
               <a:pPr algn="ctr"/>
-              <a:endParaRPr lang="en-US" sz="1100"/>
+              <a:endParaRPr lang="en-US" sz="1200"/>
             </a:p>
           </p:txBody>
         </p:sp>
@@ -16784,7 +16774,7 @@
             <a:lstStyle/>
             <a:p>
               <a:pPr algn="ctr"/>
-              <a:endParaRPr lang="en-US" sz="1100"/>
+              <a:endParaRPr lang="en-US" sz="1200"/>
             </a:p>
           </p:txBody>
         </p:sp>
@@ -16832,7 +16822,7 @@
             <a:lstStyle/>
             <a:p>
               <a:pPr algn="ctr"/>
-              <a:endParaRPr lang="en-US" sz="1100"/>
+              <a:endParaRPr lang="en-US" sz="1200"/>
             </a:p>
           </p:txBody>
         </p:sp>
@@ -16880,7 +16870,7 @@
             <a:lstStyle/>
             <a:p>
               <a:pPr algn="ctr"/>
-              <a:endParaRPr lang="en-US" sz="1100"/>
+              <a:endParaRPr lang="en-US" sz="1200"/>
             </a:p>
           </p:txBody>
         </p:sp>
@@ -16892,8 +16882,8 @@
           </p:nvSpPr>
           <p:spPr>
             <a:xfrm>
-              <a:off x="9936185" y="2807569"/>
-              <a:ext cx="2076699" cy="1278075"/>
+              <a:off x="9443057" y="567899"/>
+              <a:ext cx="2569827" cy="5722203"/>
             </a:xfrm>
             <a:prstGeom prst="rect">
               <a:avLst/>
@@ -16927,74 +16917,38 @@
             <a:p>
               <a:pPr algn="ctr"/>
               <a:r>
-                <a:rPr lang="en-US" sz="1100" dirty="0" smtClean="0"/>
-                <a:t>Data Processing</a:t>
+                <a:rPr lang="en-US" sz="1200" b="1" u="sng" dirty="0" smtClean="0"/>
+                <a:t>Data </a:t>
               </a:r>
-              <a:endParaRPr lang="en-US" sz="1100" dirty="0"/>
+              <a:r>
+                <a:rPr lang="en-US" sz="1200" b="1" u="sng" dirty="0" smtClean="0"/>
+                <a:t>Analysis</a:t>
+              </a:r>
             </a:p>
-          </p:txBody>
-        </p:sp>
-        <p:sp>
-          <p:nvSpPr>
-            <p:cNvPr id="68" name="Rectangle 67"/>
-            <p:cNvSpPr/>
-            <p:nvPr/>
-          </p:nvSpPr>
-          <p:spPr>
-            <a:xfrm>
-              <a:off x="9936185" y="567897"/>
-              <a:ext cx="2076699" cy="1278075"/>
-            </a:xfrm>
-            <a:prstGeom prst="rect">
-              <a:avLst/>
-            </a:prstGeom>
-            <a:solidFill>
-              <a:srgbClr val="7F7F7F"/>
-            </a:solidFill>
-            <a:ln>
-              <a:solidFill>
-                <a:srgbClr val="7F7F7F"/>
-              </a:solidFill>
-            </a:ln>
-          </p:spPr>
-          <p:style>
-            <a:lnRef idx="1">
-              <a:schemeClr val="accent1"/>
-            </a:lnRef>
-            <a:fillRef idx="3">
-              <a:schemeClr val="accent1"/>
-            </a:fillRef>
-            <a:effectRef idx="2">
-              <a:schemeClr val="accent1"/>
-            </a:effectRef>
-            <a:fontRef idx="minor">
-              <a:schemeClr val="lt1"/>
-            </a:fontRef>
-          </p:style>
-          <p:txBody>
-            <a:bodyPr rtlCol="0" anchor="ctr"/>
-            <a:lstStyle/>
+            <a:p>
+              <a:pPr algn="ctr"/>
+              <a:endParaRPr lang="en-US" sz="1200" dirty="0"/>
+            </a:p>
             <a:p>
               <a:pPr algn="ctr"/>
               <a:r>
-                <a:rPr lang="en-US" sz="1100" dirty="0" smtClean="0"/>
-                <a:t>Visualization</a:t>
+                <a:rPr lang="en-US" sz="1200" dirty="0" smtClean="0"/>
+                <a:t>Anomaly detectors</a:t>
               </a:r>
             </a:p>
             <a:p>
               <a:pPr algn="ctr"/>
               <a:r>
-                <a:rPr lang="en-US" sz="1100" dirty="0" smtClean="0"/>
+                <a:rPr lang="en-US" sz="1200" dirty="0" smtClean="0"/>
                 <a:t>and</a:t>
               </a:r>
             </a:p>
             <a:p>
               <a:pPr algn="ctr"/>
               <a:r>
-                <a:rPr lang="en-US" sz="1100" dirty="0" smtClean="0"/>
-                <a:t>Notifications</a:t>
+                <a:rPr lang="en-US" sz="1200" dirty="0" smtClean="0"/>
+                <a:t>Anomaly handlers</a:t>
               </a:r>
-              <a:endParaRPr lang="en-US" sz="1100" dirty="0"/>
             </a:p>
           </p:txBody>
         </p:sp>
@@ -17010,7 +16964,7 @@
           <p:spPr>
             <a:xfrm>
               <a:off x="8664293" y="3429000"/>
-              <a:ext cx="1271892" cy="17607"/>
+              <a:ext cx="778765" cy="0"/>
             </a:xfrm>
             <a:prstGeom prst="straightConnector1">
               <a:avLst/>
@@ -17018,45 +16972,6 @@
             <a:ln>
               <a:solidFill>
                 <a:srgbClr val="000000"/>
-              </a:solidFill>
-              <a:tailEnd type="arrow"/>
-            </a:ln>
-          </p:spPr>
-          <p:style>
-            <a:lnRef idx="2">
-              <a:schemeClr val="accent1"/>
-            </a:lnRef>
-            <a:fillRef idx="0">
-              <a:schemeClr val="accent1"/>
-            </a:fillRef>
-            <a:effectRef idx="1">
-              <a:schemeClr val="accent1"/>
-            </a:effectRef>
-            <a:fontRef idx="minor">
-              <a:schemeClr val="tx1"/>
-            </a:fontRef>
-          </p:style>
-        </p:cxnSp>
-        <p:cxnSp>
-          <p:nvCxnSpPr>
-            <p:cNvPr id="73" name="Straight Arrow Connector 72"/>
-            <p:cNvCxnSpPr>
-              <a:stCxn id="67" idx="0"/>
-              <a:endCxn id="68" idx="2"/>
-            </p:cNvCxnSpPr>
-            <p:nvPr/>
-          </p:nvCxnSpPr>
-          <p:spPr>
-            <a:xfrm flipV="1">
-              <a:off x="10974535" y="1845973"/>
-              <a:ext cx="0" cy="961596"/>
-            </a:xfrm>
-            <a:prstGeom prst="straightConnector1">
-              <a:avLst/>
-            </a:prstGeom>
-            <a:ln>
-              <a:solidFill>
-                <a:schemeClr val="tx1"/>
               </a:solidFill>
               <a:tailEnd type="arrow"/>
             </a:ln>

</xml_diff>

<commit_message>
Added section on workload change analysis
</commit_message>
<xml_diff>
--- a/Eager/elk-experiment/Huawei_Presentation_1.pptx
+++ b/Eager/elk-experiment/Huawei_Presentation_1.pptx
@@ -5,7 +5,7 @@
     <p:sldMasterId id="2147483648" r:id="rId1"/>
   </p:sldMasterIdLst>
   <p:notesMasterIdLst>
-    <p:notesMasterId r:id="rId18"/>
+    <p:notesMasterId r:id="rId19"/>
   </p:notesMasterIdLst>
   <p:sldIdLst>
     <p:sldId id="256" r:id="rId2"/>
@@ -24,6 +24,7 @@
     <p:sldId id="270" r:id="rId15"/>
     <p:sldId id="267" r:id="rId16"/>
     <p:sldId id="268" r:id="rId17"/>
+    <p:sldId id="274" r:id="rId18"/>
   </p:sldIdLst>
   <p:sldSz cx="9144000" cy="6858000" type="screen4x3"/>
   <p:notesSz cx="6858000" cy="9144000"/>
@@ -3080,8 +3081,8 @@
     <dgm:cxn modelId="{1018F0F1-6E7B-DC40-BE52-700C5AD8B728}" srcId="{B95D4F37-1D8A-8749-8B39-2CB7397FA252}" destId="{B859EB50-B895-2549-9384-E2BCDE3C968C}" srcOrd="2" destOrd="0" parTransId="{A1FC67BA-DBDE-8C4A-8361-C52EDE89BBAE}" sibTransId="{1B17C232-6568-9545-944B-5551ABA3B464}"/>
     <dgm:cxn modelId="{9C504291-6760-1B4A-A609-11D462DDB442}" srcId="{B859EB50-B895-2549-9384-E2BCDE3C968C}" destId="{5C0014C3-2263-504E-9FCE-9FA2E3674F4F}" srcOrd="0" destOrd="0" parTransId="{9C105334-FA49-694D-820C-36D5CA8EC00A}" sibTransId="{4C0134B1-5A1B-814F-B67D-369FAE3186CF}"/>
     <dgm:cxn modelId="{43625586-24BE-4B41-9DA0-3F2088EE3174}" type="presOf" srcId="{31FF09B4-248A-D248-869E-D7534E0E666E}" destId="{377D39BC-B80D-9944-8D55-3791B3605780}" srcOrd="0" destOrd="1" presId="urn:microsoft.com/office/officeart/2005/8/layout/vList5"/>
+    <dgm:cxn modelId="{BBCA9D30-DA20-8A45-A95F-E5C052F81296}" type="presOf" srcId="{A27A3876-3C67-354A-A9E6-1281E94DE7B3}" destId="{2F51A5BA-F3CA-2D43-B035-27A42F7B00E1}" srcOrd="0" destOrd="0" presId="urn:microsoft.com/office/officeart/2005/8/layout/vList5"/>
     <dgm:cxn modelId="{98AF7EC9-B0A4-A447-90FB-2C679610506D}" srcId="{B859EB50-B895-2549-9384-E2BCDE3C968C}" destId="{093DE271-6615-3C46-90F6-655CE029D9D0}" srcOrd="1" destOrd="0" parTransId="{49A9E02E-934A-E246-AF9E-B4D9D0D62D6D}" sibTransId="{AFE06E13-E600-6B42-84D2-E0CB85125385}"/>
-    <dgm:cxn modelId="{BBCA9D30-DA20-8A45-A95F-E5C052F81296}" type="presOf" srcId="{A27A3876-3C67-354A-A9E6-1281E94DE7B3}" destId="{2F51A5BA-F3CA-2D43-B035-27A42F7B00E1}" srcOrd="0" destOrd="0" presId="urn:microsoft.com/office/officeart/2005/8/layout/vList5"/>
     <dgm:cxn modelId="{9CF250DA-D343-2743-918A-2B643828FF04}" type="presOf" srcId="{1988179C-0019-8D4F-BA6D-31EFF596AF01}" destId="{377D39BC-B80D-9944-8D55-3791B3605780}" srcOrd="0" destOrd="0" presId="urn:microsoft.com/office/officeart/2005/8/layout/vList5"/>
     <dgm:cxn modelId="{F223971D-1215-2149-BFE9-EB0926F72A85}" type="presOf" srcId="{8D3E64A9-4621-224F-BDB9-F2731A1CC811}" destId="{ED256A8E-3577-F04B-A6F5-C5D127EEDFF7}" srcOrd="0" destOrd="2" presId="urn:microsoft.com/office/officeart/2005/8/layout/vList5"/>
     <dgm:cxn modelId="{C7DCB44E-67A4-7044-A779-973DE1D694CE}" type="presOf" srcId="{B859EB50-B895-2549-9384-E2BCDE3C968C}" destId="{1F309CAE-C2CA-6D46-8C05-0080B6A637BD}" srcOrd="0" destOrd="0" presId="urn:microsoft.com/office/officeart/2005/8/layout/vList5"/>
@@ -3833,8 +3834,8 @@
     <dgm:cxn modelId="{5CB98E25-DC4B-014C-9FA3-471EB8E0DF52}" type="presOf" srcId="{BE5CD4A6-B5D8-C34A-A9A9-70A30BD82EEE}" destId="{ED256A8E-3577-F04B-A6F5-C5D127EEDFF7}" srcOrd="0" destOrd="1" presId="urn:microsoft.com/office/officeart/2005/8/layout/vList5"/>
     <dgm:cxn modelId="{1A726084-BD4E-3544-BD4A-6EADA04118C2}" srcId="{D2A98552-7206-B54B-8916-313B2DDD4B1F}" destId="{BE5CD4A6-B5D8-C34A-A9A9-70A30BD82EEE}" srcOrd="1" destOrd="0" parTransId="{2EA5CC8F-0046-2A4D-B97D-C200CD764370}" sibTransId="{3B086D1B-5300-5C45-B552-EC2D10A8E026}"/>
     <dgm:cxn modelId="{F570798A-DE72-E742-9847-236B2B8F43A4}" srcId="{B95D4F37-1D8A-8749-8B39-2CB7397FA252}" destId="{B2DC663A-2019-3047-9DCF-0B248892D2E8}" srcOrd="3" destOrd="0" parTransId="{ED829C2B-8C9A-7443-9ABA-DE776BCD6E8C}" sibTransId="{A8C43371-DCA0-9A42-BCD8-990D6C443216}"/>
+    <dgm:cxn modelId="{0C34C52A-84E6-7E48-9E83-872254C4563D}" type="presOf" srcId="{97B9A300-C9B3-AB4E-A721-12CAD3F01375}" destId="{4B6D0C25-8FB9-184A-858D-D81E0BA90C4D}" srcOrd="0" destOrd="1" presId="urn:microsoft.com/office/officeart/2005/8/layout/vList5"/>
     <dgm:cxn modelId="{7F72C51A-CB11-0548-9128-913EB59487F0}" type="presOf" srcId="{31FF09B4-248A-D248-869E-D7534E0E666E}" destId="{377D39BC-B80D-9944-8D55-3791B3605780}" srcOrd="0" destOrd="1" presId="urn:microsoft.com/office/officeart/2005/8/layout/vList5"/>
-    <dgm:cxn modelId="{0C34C52A-84E6-7E48-9E83-872254C4563D}" type="presOf" srcId="{97B9A300-C9B3-AB4E-A721-12CAD3F01375}" destId="{4B6D0C25-8FB9-184A-858D-D81E0BA90C4D}" srcOrd="0" destOrd="1" presId="urn:microsoft.com/office/officeart/2005/8/layout/vList5"/>
     <dgm:cxn modelId="{14DE4371-9B66-4D4F-9DFC-BDB9428C36B0}" srcId="{B2DC663A-2019-3047-9DCF-0B248892D2E8}" destId="{1988179C-0019-8D4F-BA6D-31EFF596AF01}" srcOrd="0" destOrd="0" parTransId="{B481B68A-1F19-314A-81D4-70BFB3A04400}" sibTransId="{1F0FF57F-7A88-7C4A-8E74-03E544111B09}"/>
     <dgm:cxn modelId="{F6947121-F0B4-234F-A52D-B33006F1A607}" srcId="{A27A3876-3C67-354A-A9E6-1281E94DE7B3}" destId="{908F87EC-A238-4E4F-9FE2-FFCE714A35A1}" srcOrd="0" destOrd="0" parTransId="{696795E0-9803-4C40-B438-6FE89DA1CBAC}" sibTransId="{966D4E03-F813-364F-87D4-26EFE4E6C3C6}"/>
     <dgm:cxn modelId="{BDE2A438-3829-464A-9235-03F0E493651F}" srcId="{A27A3876-3C67-354A-A9E6-1281E94DE7B3}" destId="{97B9A300-C9B3-AB4E-A721-12CAD3F01375}" srcOrd="1" destOrd="0" parTransId="{D2848B50-03A0-C144-923D-660BCA5F1AD4}" sibTransId="{D68089A8-A972-7F47-8119-56C683DD45EE}"/>
@@ -11089,7 +11090,7 @@
           <a:p>
             <a:fld id="{46BC3617-597D-1247-997B-8DDF16F77B98}" type="datetimeFigureOut">
               <a:rPr lang="en-US" smtClean="0"/>
-              <a:t>8/27/16</a:t>
+              <a:t>8/28/16</a:t>
             </a:fld>
             <a:endParaRPr lang="en-US"/>
           </a:p>
@@ -11814,7 +11815,7 @@
           <a:p>
             <a:fld id="{4A5245BB-0D79-6B47-AF19-6C2947DF989D}" type="datetimeFigureOut">
               <a:rPr lang="en-US" smtClean="0"/>
-              <a:t>8/27/16</a:t>
+              <a:t>8/28/16</a:t>
             </a:fld>
             <a:endParaRPr lang="en-US"/>
           </a:p>
@@ -11984,7 +11985,7 @@
           <a:p>
             <a:fld id="{4A5245BB-0D79-6B47-AF19-6C2947DF989D}" type="datetimeFigureOut">
               <a:rPr lang="en-US" smtClean="0"/>
-              <a:t>8/27/16</a:t>
+              <a:t>8/28/16</a:t>
             </a:fld>
             <a:endParaRPr lang="en-US"/>
           </a:p>
@@ -12164,7 +12165,7 @@
           <a:p>
             <a:fld id="{4A5245BB-0D79-6B47-AF19-6C2947DF989D}" type="datetimeFigureOut">
               <a:rPr lang="en-US" smtClean="0"/>
-              <a:t>8/27/16</a:t>
+              <a:t>8/28/16</a:t>
             </a:fld>
             <a:endParaRPr lang="en-US"/>
           </a:p>
@@ -12334,7 +12335,7 @@
           <a:p>
             <a:fld id="{4A5245BB-0D79-6B47-AF19-6C2947DF989D}" type="datetimeFigureOut">
               <a:rPr lang="en-US" smtClean="0"/>
-              <a:t>8/27/16</a:t>
+              <a:t>8/28/16</a:t>
             </a:fld>
             <a:endParaRPr lang="en-US"/>
           </a:p>
@@ -12580,7 +12581,7 @@
           <a:p>
             <a:fld id="{4A5245BB-0D79-6B47-AF19-6C2947DF989D}" type="datetimeFigureOut">
               <a:rPr lang="en-US" smtClean="0"/>
-              <a:t>8/27/16</a:t>
+              <a:t>8/28/16</a:t>
             </a:fld>
             <a:endParaRPr lang="en-US"/>
           </a:p>
@@ -12868,7 +12869,7 @@
           <a:p>
             <a:fld id="{4A5245BB-0D79-6B47-AF19-6C2947DF989D}" type="datetimeFigureOut">
               <a:rPr lang="en-US" smtClean="0"/>
-              <a:t>8/27/16</a:t>
+              <a:t>8/28/16</a:t>
             </a:fld>
             <a:endParaRPr lang="en-US"/>
           </a:p>
@@ -13290,7 +13291,7 @@
           <a:p>
             <a:fld id="{4A5245BB-0D79-6B47-AF19-6C2947DF989D}" type="datetimeFigureOut">
               <a:rPr lang="en-US" smtClean="0"/>
-              <a:t>8/27/16</a:t>
+              <a:t>8/28/16</a:t>
             </a:fld>
             <a:endParaRPr lang="en-US"/>
           </a:p>
@@ -13408,7 +13409,7 @@
           <a:p>
             <a:fld id="{4A5245BB-0D79-6B47-AF19-6C2947DF989D}" type="datetimeFigureOut">
               <a:rPr lang="en-US" smtClean="0"/>
-              <a:t>8/27/16</a:t>
+              <a:t>8/28/16</a:t>
             </a:fld>
             <a:endParaRPr lang="en-US"/>
           </a:p>
@@ -13503,7 +13504,7 @@
           <a:p>
             <a:fld id="{4A5245BB-0D79-6B47-AF19-6C2947DF989D}" type="datetimeFigureOut">
               <a:rPr lang="en-US" smtClean="0"/>
-              <a:t>8/27/16</a:t>
+              <a:t>8/28/16</a:t>
             </a:fld>
             <a:endParaRPr lang="en-US"/>
           </a:p>
@@ -13780,7 +13781,7 @@
           <a:p>
             <a:fld id="{4A5245BB-0D79-6B47-AF19-6C2947DF989D}" type="datetimeFigureOut">
               <a:rPr lang="en-US" smtClean="0"/>
-              <a:t>8/27/16</a:t>
+              <a:t>8/28/16</a:t>
             </a:fld>
             <a:endParaRPr lang="en-US"/>
           </a:p>
@@ -14033,7 +14034,7 @@
           <a:p>
             <a:fld id="{4A5245BB-0D79-6B47-AF19-6C2947DF989D}" type="datetimeFigureOut">
               <a:rPr lang="en-US" smtClean="0"/>
-              <a:t>8/27/16</a:t>
+              <a:t>8/28/16</a:t>
             </a:fld>
             <a:endParaRPr lang="en-US"/>
           </a:p>
@@ -14246,7 +14247,7 @@
           <a:p>
             <a:fld id="{4A5245BB-0D79-6B47-AF19-6C2947DF989D}" type="datetimeFigureOut">
               <a:rPr lang="en-US" smtClean="0"/>
-              <a:t>8/27/16</a:t>
+              <a:t>8/28/16</a:t>
             </a:fld>
             <a:endParaRPr lang="en-US"/>
           </a:p>
@@ -16918,11 +16919,7 @@
               <a:pPr algn="ctr"/>
               <a:r>
                 <a:rPr lang="en-US" sz="1200" b="1" u="sng" dirty="0" smtClean="0"/>
-                <a:t>Data </a:t>
-              </a:r>
-              <a:r>
-                <a:rPr lang="en-US" sz="1200" b="1" u="sng" dirty="0" smtClean="0"/>
-                <a:t>Analysis</a:t>
+                <a:t>Data Analysis</a:t>
               </a:r>
             </a:p>
             <a:p>
@@ -17467,6 +17464,934 @@
       <p:bldP spid="6" grpId="0" animBg="1"/>
     </p:bldLst>
   </p:timing>
+</p:sld>
+</file>
+
+<file path=ppt/slides/slide17.xml><?xml version="1.0" encoding="utf-8"?>
+<p:sld xmlns:a="http://schemas.openxmlformats.org/drawingml/2006/main" xmlns:r="http://schemas.openxmlformats.org/officeDocument/2006/relationships" xmlns:p="http://schemas.openxmlformats.org/presentationml/2006/main">
+  <p:cSld>
+    <p:spTree>
+      <p:nvGrpSpPr>
+        <p:cNvPr id="1" name=""/>
+        <p:cNvGrpSpPr/>
+        <p:nvPr/>
+      </p:nvGrpSpPr>
+      <p:grpSpPr>
+        <a:xfrm>
+          <a:off x="0" y="0"/>
+          <a:ext cx="0" cy="0"/>
+          <a:chOff x="0" y="0"/>
+          <a:chExt cx="0" cy="0"/>
+        </a:xfrm>
+      </p:grpSpPr>
+      <p:grpSp>
+        <p:nvGrpSpPr>
+          <p:cNvPr id="35" name="Group 34"/>
+          <p:cNvGrpSpPr/>
+          <p:nvPr/>
+        </p:nvGrpSpPr>
+        <p:grpSpPr>
+          <a:xfrm>
+            <a:off x="2403121" y="2029694"/>
+            <a:ext cx="6524530" cy="4383143"/>
+            <a:chOff x="2403121" y="2029694"/>
+            <a:chExt cx="6524530" cy="4383143"/>
+          </a:xfrm>
+        </p:grpSpPr>
+        <p:sp>
+          <p:nvSpPr>
+            <p:cNvPr id="5" name="Rectangle 4"/>
+            <p:cNvSpPr/>
+            <p:nvPr/>
+          </p:nvSpPr>
+          <p:spPr>
+            <a:xfrm>
+              <a:off x="2403121" y="2029694"/>
+              <a:ext cx="1232689" cy="933908"/>
+            </a:xfrm>
+            <a:prstGeom prst="rect">
+              <a:avLst/>
+            </a:prstGeom>
+          </p:spPr>
+          <p:style>
+            <a:lnRef idx="1">
+              <a:schemeClr val="accent1"/>
+            </a:lnRef>
+            <a:fillRef idx="3">
+              <a:schemeClr val="accent1"/>
+            </a:fillRef>
+            <a:effectRef idx="2">
+              <a:schemeClr val="accent1"/>
+            </a:effectRef>
+            <a:fontRef idx="minor">
+              <a:schemeClr val="lt1"/>
+            </a:fontRef>
+          </p:style>
+          <p:txBody>
+            <a:bodyPr rtlCol="0" anchor="ctr"/>
+            <a:lstStyle/>
+            <a:p>
+              <a:pPr algn="ctr"/>
+              <a:r>
+                <a:rPr lang="en-US" dirty="0" smtClean="0"/>
+                <a:t>App 1</a:t>
+              </a:r>
+              <a:endParaRPr lang="en-US" dirty="0"/>
+            </a:p>
+          </p:txBody>
+        </p:sp>
+        <p:sp>
+          <p:nvSpPr>
+            <p:cNvPr id="6" name="Rectangle 5"/>
+            <p:cNvSpPr/>
+            <p:nvPr/>
+          </p:nvSpPr>
+          <p:spPr>
+            <a:xfrm>
+              <a:off x="5117527" y="2029694"/>
+              <a:ext cx="1232689" cy="933908"/>
+            </a:xfrm>
+            <a:prstGeom prst="rect">
+              <a:avLst/>
+            </a:prstGeom>
+          </p:spPr>
+          <p:style>
+            <a:lnRef idx="1">
+              <a:schemeClr val="accent1"/>
+            </a:lnRef>
+            <a:fillRef idx="3">
+              <a:schemeClr val="accent1"/>
+            </a:fillRef>
+            <a:effectRef idx="2">
+              <a:schemeClr val="accent1"/>
+            </a:effectRef>
+            <a:fontRef idx="minor">
+              <a:schemeClr val="lt1"/>
+            </a:fontRef>
+          </p:style>
+          <p:txBody>
+            <a:bodyPr rtlCol="0" anchor="ctr"/>
+            <a:lstStyle/>
+            <a:p>
+              <a:pPr algn="ctr"/>
+              <a:r>
+                <a:rPr lang="en-US" dirty="0" smtClean="0"/>
+                <a:t>App 2</a:t>
+              </a:r>
+              <a:endParaRPr lang="en-US" dirty="0"/>
+            </a:p>
+          </p:txBody>
+        </p:sp>
+        <p:sp>
+          <p:nvSpPr>
+            <p:cNvPr id="7" name="Rectangle 6"/>
+            <p:cNvSpPr/>
+            <p:nvPr/>
+          </p:nvSpPr>
+          <p:spPr>
+            <a:xfrm>
+              <a:off x="2403121" y="3673373"/>
+              <a:ext cx="3947095" cy="2739464"/>
+            </a:xfrm>
+            <a:prstGeom prst="rect">
+              <a:avLst/>
+            </a:prstGeom>
+            <a:solidFill>
+              <a:schemeClr val="bg1">
+                <a:lumMod val="75000"/>
+              </a:schemeClr>
+            </a:solidFill>
+            <a:ln>
+              <a:noFill/>
+            </a:ln>
+          </p:spPr>
+          <p:style>
+            <a:lnRef idx="1">
+              <a:schemeClr val="accent1"/>
+            </a:lnRef>
+            <a:fillRef idx="3">
+              <a:schemeClr val="accent1"/>
+            </a:fillRef>
+            <a:effectRef idx="2">
+              <a:schemeClr val="accent1"/>
+            </a:effectRef>
+            <a:fontRef idx="minor">
+              <a:schemeClr val="lt1"/>
+            </a:fontRef>
+          </p:style>
+          <p:txBody>
+            <a:bodyPr rtlCol="0" anchor="ctr"/>
+            <a:lstStyle/>
+            <a:p>
+              <a:pPr algn="ctr"/>
+              <a:endParaRPr lang="en-US"/>
+            </a:p>
+          </p:txBody>
+        </p:sp>
+        <p:sp>
+          <p:nvSpPr>
+            <p:cNvPr id="8" name="Rectangle 7"/>
+            <p:cNvSpPr/>
+            <p:nvPr/>
+          </p:nvSpPr>
+          <p:spPr>
+            <a:xfrm>
+              <a:off x="2555521" y="3900486"/>
+              <a:ext cx="544879" cy="532466"/>
+            </a:xfrm>
+            <a:prstGeom prst="rect">
+              <a:avLst/>
+            </a:prstGeom>
+          </p:spPr>
+          <p:style>
+            <a:lnRef idx="1">
+              <a:schemeClr val="accent1"/>
+            </a:lnRef>
+            <a:fillRef idx="3">
+              <a:schemeClr val="accent1"/>
+            </a:fillRef>
+            <a:effectRef idx="2">
+              <a:schemeClr val="accent1"/>
+            </a:effectRef>
+            <a:fontRef idx="minor">
+              <a:schemeClr val="lt1"/>
+            </a:fontRef>
+          </p:style>
+          <p:txBody>
+            <a:bodyPr rtlCol="0" anchor="ctr"/>
+            <a:lstStyle/>
+            <a:p>
+              <a:pPr algn="ctr"/>
+              <a:r>
+                <a:rPr lang="en-US" b="1" dirty="0" smtClean="0"/>
+                <a:t>B</a:t>
+              </a:r>
+            </a:p>
+          </p:txBody>
+        </p:sp>
+        <p:sp>
+          <p:nvSpPr>
+            <p:cNvPr id="9" name="Rectangle 8"/>
+            <p:cNvSpPr/>
+            <p:nvPr/>
+          </p:nvSpPr>
+          <p:spPr>
+            <a:xfrm>
+              <a:off x="3328254" y="3900486"/>
+              <a:ext cx="544879" cy="532466"/>
+            </a:xfrm>
+            <a:prstGeom prst="rect">
+              <a:avLst/>
+            </a:prstGeom>
+          </p:spPr>
+          <p:style>
+            <a:lnRef idx="1">
+              <a:schemeClr val="accent1"/>
+            </a:lnRef>
+            <a:fillRef idx="3">
+              <a:schemeClr val="accent1"/>
+            </a:fillRef>
+            <a:effectRef idx="2">
+              <a:schemeClr val="accent1"/>
+            </a:effectRef>
+            <a:fontRef idx="minor">
+              <a:schemeClr val="lt1"/>
+            </a:fontRef>
+          </p:style>
+          <p:txBody>
+            <a:bodyPr rtlCol="0" anchor="ctr"/>
+            <a:lstStyle/>
+            <a:p>
+              <a:pPr algn="ctr"/>
+              <a:r>
+                <a:rPr lang="en-US" b="1" dirty="0" smtClean="0"/>
+                <a:t>B</a:t>
+              </a:r>
+            </a:p>
+          </p:txBody>
+        </p:sp>
+        <p:sp>
+          <p:nvSpPr>
+            <p:cNvPr id="10" name="Rectangle 9"/>
+            <p:cNvSpPr/>
+            <p:nvPr/>
+          </p:nvSpPr>
+          <p:spPr>
+            <a:xfrm>
+              <a:off x="4100987" y="3900487"/>
+              <a:ext cx="544879" cy="532466"/>
+            </a:xfrm>
+            <a:prstGeom prst="rect">
+              <a:avLst/>
+            </a:prstGeom>
+            <a:solidFill>
+              <a:srgbClr val="FF0000"/>
+            </a:solidFill>
+            <a:ln>
+              <a:noFill/>
+            </a:ln>
+          </p:spPr>
+          <p:style>
+            <a:lnRef idx="1">
+              <a:schemeClr val="accent1"/>
+            </a:lnRef>
+            <a:fillRef idx="3">
+              <a:schemeClr val="accent1"/>
+            </a:fillRef>
+            <a:effectRef idx="2">
+              <a:schemeClr val="accent1"/>
+            </a:effectRef>
+            <a:fontRef idx="minor">
+              <a:schemeClr val="lt1"/>
+            </a:fontRef>
+          </p:style>
+          <p:txBody>
+            <a:bodyPr rtlCol="0" anchor="ctr"/>
+            <a:lstStyle/>
+            <a:p>
+              <a:pPr algn="ctr"/>
+              <a:r>
+                <a:rPr lang="en-US" b="1" dirty="0"/>
+                <a:t>D</a:t>
+              </a:r>
+              <a:endParaRPr lang="en-US" b="1" dirty="0" smtClean="0"/>
+            </a:p>
+          </p:txBody>
+        </p:sp>
+        <p:sp>
+          <p:nvSpPr>
+            <p:cNvPr id="11" name="Rectangle 10"/>
+            <p:cNvSpPr/>
+            <p:nvPr/>
+          </p:nvSpPr>
+          <p:spPr>
+            <a:xfrm>
+              <a:off x="4873720" y="3900487"/>
+              <a:ext cx="544879" cy="532466"/>
+            </a:xfrm>
+            <a:prstGeom prst="rect">
+              <a:avLst/>
+            </a:prstGeom>
+            <a:solidFill>
+              <a:srgbClr val="FF0000"/>
+            </a:solidFill>
+            <a:ln>
+              <a:noFill/>
+            </a:ln>
+          </p:spPr>
+          <p:style>
+            <a:lnRef idx="1">
+              <a:schemeClr val="accent1"/>
+            </a:lnRef>
+            <a:fillRef idx="3">
+              <a:schemeClr val="accent1"/>
+            </a:fillRef>
+            <a:effectRef idx="2">
+              <a:schemeClr val="accent1"/>
+            </a:effectRef>
+            <a:fontRef idx="minor">
+              <a:schemeClr val="lt1"/>
+            </a:fontRef>
+          </p:style>
+          <p:txBody>
+            <a:bodyPr rtlCol="0" anchor="ctr"/>
+            <a:lstStyle/>
+            <a:p>
+              <a:pPr algn="ctr"/>
+              <a:r>
+                <a:rPr lang="en-US" b="1" dirty="0"/>
+                <a:t>D</a:t>
+              </a:r>
+              <a:endParaRPr lang="en-US" b="1" dirty="0" smtClean="0"/>
+            </a:p>
+          </p:txBody>
+        </p:sp>
+        <p:sp>
+          <p:nvSpPr>
+            <p:cNvPr id="12" name="Rectangle 11"/>
+            <p:cNvSpPr/>
+            <p:nvPr/>
+          </p:nvSpPr>
+          <p:spPr>
+            <a:xfrm>
+              <a:off x="5646452" y="3900487"/>
+              <a:ext cx="544879" cy="532466"/>
+            </a:xfrm>
+            <a:prstGeom prst="rect">
+              <a:avLst/>
+            </a:prstGeom>
+            <a:solidFill>
+              <a:srgbClr val="FF0000"/>
+            </a:solidFill>
+            <a:ln>
+              <a:noFill/>
+            </a:ln>
+          </p:spPr>
+          <p:style>
+            <a:lnRef idx="1">
+              <a:schemeClr val="accent1"/>
+            </a:lnRef>
+            <a:fillRef idx="3">
+              <a:schemeClr val="accent1"/>
+            </a:fillRef>
+            <a:effectRef idx="2">
+              <a:schemeClr val="accent1"/>
+            </a:effectRef>
+            <a:fontRef idx="minor">
+              <a:schemeClr val="lt1"/>
+            </a:fontRef>
+          </p:style>
+          <p:txBody>
+            <a:bodyPr rtlCol="0" anchor="ctr"/>
+            <a:lstStyle/>
+            <a:p>
+              <a:pPr algn="ctr"/>
+              <a:r>
+                <a:rPr lang="en-US" b="1" dirty="0"/>
+                <a:t>D</a:t>
+              </a:r>
+              <a:endParaRPr lang="en-US" b="1" dirty="0" smtClean="0"/>
+            </a:p>
+          </p:txBody>
+        </p:sp>
+        <p:sp>
+          <p:nvSpPr>
+            <p:cNvPr id="13" name="Rectangle 12"/>
+            <p:cNvSpPr/>
+            <p:nvPr/>
+          </p:nvSpPr>
+          <p:spPr>
+            <a:xfrm>
+              <a:off x="3328254" y="5736894"/>
+              <a:ext cx="544879" cy="532466"/>
+            </a:xfrm>
+            <a:prstGeom prst="rect">
+              <a:avLst/>
+            </a:prstGeom>
+            <a:solidFill>
+              <a:srgbClr val="008000"/>
+            </a:solidFill>
+            <a:ln>
+              <a:noFill/>
+            </a:ln>
+          </p:spPr>
+          <p:style>
+            <a:lnRef idx="1">
+              <a:schemeClr val="accent1"/>
+            </a:lnRef>
+            <a:fillRef idx="3">
+              <a:schemeClr val="accent1"/>
+            </a:fillRef>
+            <a:effectRef idx="2">
+              <a:schemeClr val="accent1"/>
+            </a:effectRef>
+            <a:fontRef idx="minor">
+              <a:schemeClr val="lt1"/>
+            </a:fontRef>
+          </p:style>
+          <p:txBody>
+            <a:bodyPr rtlCol="0" anchor="ctr"/>
+            <a:lstStyle/>
+            <a:p>
+              <a:pPr algn="ctr"/>
+              <a:r>
+                <a:rPr lang="en-US" b="1" dirty="0"/>
+                <a:t>H</a:t>
+              </a:r>
+              <a:endParaRPr lang="en-US" b="1" dirty="0" smtClean="0"/>
+            </a:p>
+          </p:txBody>
+        </p:sp>
+        <p:sp>
+          <p:nvSpPr>
+            <p:cNvPr id="14" name="Rectangle 13"/>
+            <p:cNvSpPr/>
+            <p:nvPr/>
+          </p:nvSpPr>
+          <p:spPr>
+            <a:xfrm>
+              <a:off x="2587881" y="5736894"/>
+              <a:ext cx="544879" cy="532466"/>
+            </a:xfrm>
+            <a:prstGeom prst="rect">
+              <a:avLst/>
+            </a:prstGeom>
+            <a:solidFill>
+              <a:srgbClr val="008000"/>
+            </a:solidFill>
+            <a:ln>
+              <a:noFill/>
+            </a:ln>
+          </p:spPr>
+          <p:style>
+            <a:lnRef idx="1">
+              <a:schemeClr val="accent1"/>
+            </a:lnRef>
+            <a:fillRef idx="3">
+              <a:schemeClr val="accent1"/>
+            </a:fillRef>
+            <a:effectRef idx="2">
+              <a:schemeClr val="accent1"/>
+            </a:effectRef>
+            <a:fontRef idx="minor">
+              <a:schemeClr val="lt1"/>
+            </a:fontRef>
+          </p:style>
+          <p:txBody>
+            <a:bodyPr rtlCol="0" anchor="ctr"/>
+            <a:lstStyle/>
+            <a:p>
+              <a:pPr algn="ctr"/>
+              <a:r>
+                <a:rPr lang="en-US" b="1" dirty="0"/>
+                <a:t>H</a:t>
+              </a:r>
+              <a:endParaRPr lang="en-US" b="1" dirty="0" smtClean="0"/>
+            </a:p>
+          </p:txBody>
+        </p:sp>
+        <p:cxnSp>
+          <p:nvCxnSpPr>
+            <p:cNvPr id="16" name="Elbow Connector 15"/>
+            <p:cNvCxnSpPr>
+              <a:stCxn id="8" idx="0"/>
+              <a:endCxn id="5" idx="2"/>
+            </p:cNvCxnSpPr>
+            <p:nvPr/>
+          </p:nvCxnSpPr>
+          <p:spPr>
+            <a:xfrm rot="5400000" flipH="1" flipV="1">
+              <a:off x="2455271" y="3336292"/>
+              <a:ext cx="936884" cy="191505"/>
+            </a:xfrm>
+            <a:prstGeom prst="bentConnector3">
+              <a:avLst/>
+            </a:prstGeom>
+            <a:ln>
+              <a:tailEnd type="arrow"/>
+            </a:ln>
+          </p:spPr>
+          <p:style>
+            <a:lnRef idx="2">
+              <a:schemeClr val="accent1"/>
+            </a:lnRef>
+            <a:fillRef idx="0">
+              <a:schemeClr val="accent1"/>
+            </a:fillRef>
+            <a:effectRef idx="1">
+              <a:schemeClr val="accent1"/>
+            </a:effectRef>
+            <a:fontRef idx="minor">
+              <a:schemeClr val="tx1"/>
+            </a:fontRef>
+          </p:style>
+        </p:cxnSp>
+        <p:cxnSp>
+          <p:nvCxnSpPr>
+            <p:cNvPr id="18" name="Elbow Connector 17"/>
+            <p:cNvCxnSpPr>
+              <a:stCxn id="9" idx="0"/>
+              <a:endCxn id="6" idx="2"/>
+            </p:cNvCxnSpPr>
+            <p:nvPr/>
+          </p:nvCxnSpPr>
+          <p:spPr>
+            <a:xfrm rot="5400000" flipH="1" flipV="1">
+              <a:off x="4198841" y="2365455"/>
+              <a:ext cx="936884" cy="2133178"/>
+            </a:xfrm>
+            <a:prstGeom prst="bentConnector3">
+              <a:avLst/>
+            </a:prstGeom>
+            <a:ln>
+              <a:tailEnd type="arrow"/>
+            </a:ln>
+          </p:spPr>
+          <p:style>
+            <a:lnRef idx="2">
+              <a:schemeClr val="accent1"/>
+            </a:lnRef>
+            <a:fillRef idx="0">
+              <a:schemeClr val="accent1"/>
+            </a:fillRef>
+            <a:effectRef idx="1">
+              <a:schemeClr val="accent1"/>
+            </a:effectRef>
+            <a:fontRef idx="minor">
+              <a:schemeClr val="tx1"/>
+            </a:fontRef>
+          </p:style>
+        </p:cxnSp>
+        <p:sp>
+          <p:nvSpPr>
+            <p:cNvPr id="20" name="Rectangle 19"/>
+            <p:cNvSpPr/>
+            <p:nvPr/>
+          </p:nvSpPr>
+          <p:spPr>
+            <a:xfrm>
+              <a:off x="2555521" y="4756707"/>
+              <a:ext cx="3635810" cy="610153"/>
+            </a:xfrm>
+            <a:prstGeom prst="rect">
+              <a:avLst/>
+            </a:prstGeom>
+          </p:spPr>
+          <p:style>
+            <a:lnRef idx="1">
+              <a:schemeClr val="accent1"/>
+            </a:lnRef>
+            <a:fillRef idx="3">
+              <a:schemeClr val="accent1"/>
+            </a:fillRef>
+            <a:effectRef idx="2">
+              <a:schemeClr val="accent1"/>
+            </a:effectRef>
+            <a:fontRef idx="minor">
+              <a:schemeClr val="lt1"/>
+            </a:fontRef>
+          </p:style>
+          <p:txBody>
+            <a:bodyPr rtlCol="0" anchor="ctr"/>
+            <a:lstStyle/>
+            <a:p>
+              <a:pPr algn="ctr"/>
+              <a:r>
+                <a:rPr lang="en-US" dirty="0" smtClean="0"/>
+                <a:t>Internal Communication Bus</a:t>
+              </a:r>
+              <a:endParaRPr lang="en-US" dirty="0"/>
+            </a:p>
+          </p:txBody>
+        </p:sp>
+        <p:cxnSp>
+          <p:nvCxnSpPr>
+            <p:cNvPr id="24" name="Straight Arrow Connector 23"/>
+            <p:cNvCxnSpPr>
+              <a:stCxn id="10" idx="2"/>
+              <a:endCxn id="20" idx="0"/>
+            </p:cNvCxnSpPr>
+            <p:nvPr/>
+          </p:nvCxnSpPr>
+          <p:spPr>
+            <a:xfrm flipH="1">
+              <a:off x="4373426" y="4432953"/>
+              <a:ext cx="1" cy="323754"/>
+            </a:xfrm>
+            <a:prstGeom prst="straightConnector1">
+              <a:avLst/>
+            </a:prstGeom>
+            <a:ln>
+              <a:solidFill>
+                <a:srgbClr val="FF0000"/>
+              </a:solidFill>
+              <a:tailEnd type="arrow"/>
+            </a:ln>
+          </p:spPr>
+          <p:style>
+            <a:lnRef idx="2">
+              <a:schemeClr val="accent1"/>
+            </a:lnRef>
+            <a:fillRef idx="0">
+              <a:schemeClr val="accent1"/>
+            </a:fillRef>
+            <a:effectRef idx="1">
+              <a:schemeClr val="accent1"/>
+            </a:effectRef>
+            <a:fontRef idx="minor">
+              <a:schemeClr val="tx1"/>
+            </a:fontRef>
+          </p:style>
+        </p:cxnSp>
+        <p:cxnSp>
+          <p:nvCxnSpPr>
+            <p:cNvPr id="28" name="Straight Arrow Connector 27"/>
+            <p:cNvCxnSpPr/>
+            <p:nvPr/>
+          </p:nvCxnSpPr>
+          <p:spPr>
+            <a:xfrm flipH="1">
+              <a:off x="5142429" y="4432953"/>
+              <a:ext cx="1" cy="323754"/>
+            </a:xfrm>
+            <a:prstGeom prst="straightConnector1">
+              <a:avLst/>
+            </a:prstGeom>
+            <a:ln>
+              <a:solidFill>
+                <a:srgbClr val="FF0000"/>
+              </a:solidFill>
+              <a:tailEnd type="arrow"/>
+            </a:ln>
+          </p:spPr>
+          <p:style>
+            <a:lnRef idx="2">
+              <a:schemeClr val="accent1"/>
+            </a:lnRef>
+            <a:fillRef idx="0">
+              <a:schemeClr val="accent1"/>
+            </a:fillRef>
+            <a:effectRef idx="1">
+              <a:schemeClr val="accent1"/>
+            </a:effectRef>
+            <a:fontRef idx="minor">
+              <a:schemeClr val="tx1"/>
+            </a:fontRef>
+          </p:style>
+        </p:cxnSp>
+        <p:cxnSp>
+          <p:nvCxnSpPr>
+            <p:cNvPr id="29" name="Straight Arrow Connector 28"/>
+            <p:cNvCxnSpPr/>
+            <p:nvPr/>
+          </p:nvCxnSpPr>
+          <p:spPr>
+            <a:xfrm flipH="1">
+              <a:off x="5920383" y="4432953"/>
+              <a:ext cx="1" cy="323754"/>
+            </a:xfrm>
+            <a:prstGeom prst="straightConnector1">
+              <a:avLst/>
+            </a:prstGeom>
+            <a:ln>
+              <a:solidFill>
+                <a:srgbClr val="FF0000"/>
+              </a:solidFill>
+              <a:tailEnd type="arrow"/>
+            </a:ln>
+          </p:spPr>
+          <p:style>
+            <a:lnRef idx="2">
+              <a:schemeClr val="accent1"/>
+            </a:lnRef>
+            <a:fillRef idx="0">
+              <a:schemeClr val="accent1"/>
+            </a:fillRef>
+            <a:effectRef idx="1">
+              <a:schemeClr val="accent1"/>
+            </a:effectRef>
+            <a:fontRef idx="minor">
+              <a:schemeClr val="tx1"/>
+            </a:fontRef>
+          </p:style>
+        </p:cxnSp>
+        <p:cxnSp>
+          <p:nvCxnSpPr>
+            <p:cNvPr id="30" name="Straight Arrow Connector 29"/>
+            <p:cNvCxnSpPr/>
+            <p:nvPr/>
+          </p:nvCxnSpPr>
+          <p:spPr>
+            <a:xfrm flipH="1">
+              <a:off x="2840411" y="5400689"/>
+              <a:ext cx="1" cy="323754"/>
+            </a:xfrm>
+            <a:prstGeom prst="straightConnector1">
+              <a:avLst/>
+            </a:prstGeom>
+            <a:ln>
+              <a:solidFill>
+                <a:srgbClr val="008000"/>
+              </a:solidFill>
+              <a:tailEnd type="arrow"/>
+            </a:ln>
+          </p:spPr>
+          <p:style>
+            <a:lnRef idx="2">
+              <a:schemeClr val="accent1"/>
+            </a:lnRef>
+            <a:fillRef idx="0">
+              <a:schemeClr val="accent1"/>
+            </a:fillRef>
+            <a:effectRef idx="1">
+              <a:schemeClr val="accent1"/>
+            </a:effectRef>
+            <a:fontRef idx="minor">
+              <a:schemeClr val="tx1"/>
+            </a:fontRef>
+          </p:style>
+        </p:cxnSp>
+        <p:cxnSp>
+          <p:nvCxnSpPr>
+            <p:cNvPr id="31" name="Straight Arrow Connector 30"/>
+            <p:cNvCxnSpPr/>
+            <p:nvPr/>
+          </p:nvCxnSpPr>
+          <p:spPr>
+            <a:xfrm flipH="1">
+              <a:off x="3610908" y="5404217"/>
+              <a:ext cx="1" cy="323754"/>
+            </a:xfrm>
+            <a:prstGeom prst="straightConnector1">
+              <a:avLst/>
+            </a:prstGeom>
+            <a:ln>
+              <a:solidFill>
+                <a:srgbClr val="008000"/>
+              </a:solidFill>
+              <a:tailEnd type="arrow"/>
+            </a:ln>
+          </p:spPr>
+          <p:style>
+            <a:lnRef idx="2">
+              <a:schemeClr val="accent1"/>
+            </a:lnRef>
+            <a:fillRef idx="0">
+              <a:schemeClr val="accent1"/>
+            </a:fillRef>
+            <a:effectRef idx="1">
+              <a:schemeClr val="accent1"/>
+            </a:effectRef>
+            <a:fontRef idx="minor">
+              <a:schemeClr val="tx1"/>
+            </a:fontRef>
+          </p:style>
+        </p:cxnSp>
+        <p:sp>
+          <p:nvSpPr>
+            <p:cNvPr id="32" name="Rectangle 31"/>
+            <p:cNvSpPr/>
+            <p:nvPr/>
+          </p:nvSpPr>
+          <p:spPr>
+            <a:xfrm>
+              <a:off x="7159552" y="3673373"/>
+              <a:ext cx="1768099" cy="2739464"/>
+            </a:xfrm>
+            <a:prstGeom prst="rect">
+              <a:avLst/>
+            </a:prstGeom>
+            <a:solidFill>
+              <a:schemeClr val="bg1">
+                <a:lumMod val="75000"/>
+              </a:schemeClr>
+            </a:solidFill>
+            <a:ln>
+              <a:noFill/>
+            </a:ln>
+          </p:spPr>
+          <p:style>
+            <a:lnRef idx="1">
+              <a:schemeClr val="accent1"/>
+            </a:lnRef>
+            <a:fillRef idx="3">
+              <a:schemeClr val="accent1"/>
+            </a:fillRef>
+            <a:effectRef idx="2">
+              <a:schemeClr val="accent1"/>
+            </a:effectRef>
+            <a:fontRef idx="minor">
+              <a:schemeClr val="lt1"/>
+            </a:fontRef>
+          </p:style>
+          <p:txBody>
+            <a:bodyPr rtlCol="0" anchor="ctr"/>
+            <a:lstStyle/>
+            <a:p>
+              <a:pPr algn="ctr"/>
+              <a:r>
+                <a:rPr lang="en-US" dirty="0" smtClean="0"/>
+                <a:t>Data Storage</a:t>
+              </a:r>
+              <a:endParaRPr lang="en-US" dirty="0"/>
+            </a:p>
+          </p:txBody>
+        </p:sp>
+        <p:sp>
+          <p:nvSpPr>
+            <p:cNvPr id="33" name="Left-Right Arrow 32"/>
+            <p:cNvSpPr/>
+            <p:nvPr/>
+          </p:nvSpPr>
+          <p:spPr>
+            <a:xfrm>
+              <a:off x="6387569" y="4918584"/>
+              <a:ext cx="722176" cy="298850"/>
+            </a:xfrm>
+            <a:prstGeom prst="leftRightArrow">
+              <a:avLst/>
+            </a:prstGeom>
+            <a:solidFill>
+              <a:schemeClr val="bg1">
+                <a:lumMod val="75000"/>
+              </a:schemeClr>
+            </a:solidFill>
+            <a:ln>
+              <a:noFill/>
+            </a:ln>
+          </p:spPr>
+          <p:style>
+            <a:lnRef idx="1">
+              <a:schemeClr val="accent1"/>
+            </a:lnRef>
+            <a:fillRef idx="3">
+              <a:schemeClr val="accent1"/>
+            </a:fillRef>
+            <a:effectRef idx="2">
+              <a:schemeClr val="accent1"/>
+            </a:effectRef>
+            <a:fontRef idx="minor">
+              <a:schemeClr val="lt1"/>
+            </a:fontRef>
+          </p:style>
+          <p:txBody>
+            <a:bodyPr rtlCol="0" anchor="ctr"/>
+            <a:lstStyle/>
+            <a:p>
+              <a:pPr algn="ctr"/>
+              <a:endParaRPr lang="en-US"/>
+            </a:p>
+          </p:txBody>
+        </p:sp>
+        <p:sp>
+          <p:nvSpPr>
+            <p:cNvPr id="34" name="TextBox 33"/>
+            <p:cNvSpPr txBox="1"/>
+            <p:nvPr/>
+          </p:nvSpPr>
+          <p:spPr>
+            <a:xfrm>
+              <a:off x="5098853" y="6039976"/>
+              <a:ext cx="1438134" cy="369332"/>
+            </a:xfrm>
+            <a:prstGeom prst="rect">
+              <a:avLst/>
+            </a:prstGeom>
+            <a:noFill/>
+          </p:spPr>
+          <p:txBody>
+            <a:bodyPr wrap="square" rtlCol="0">
+              <a:spAutoFit/>
+            </a:bodyPr>
+            <a:lstStyle/>
+            <a:p>
+              <a:r>
+                <a:rPr lang="en-US" b="1" dirty="0" smtClean="0">
+                  <a:solidFill>
+                    <a:schemeClr val="bg1"/>
+                  </a:solidFill>
+                </a:rPr>
+                <a:t>Roots Pod</a:t>
+              </a:r>
+              <a:endParaRPr lang="en-US" b="1" dirty="0">
+                <a:solidFill>
+                  <a:schemeClr val="bg1"/>
+                </a:solidFill>
+              </a:endParaRPr>
+            </a:p>
+          </p:txBody>
+        </p:sp>
+      </p:grpSp>
+    </p:spTree>
+    <p:extLst>
+      <p:ext uri="{BB962C8B-B14F-4D97-AF65-F5344CB8AC3E}">
+        <p14:creationId xmlns:p14="http://schemas.microsoft.com/office/powerpoint/2010/main" val="419603761"/>
+      </p:ext>
+    </p:extLst>
+  </p:cSld>
+  <p:clrMapOvr>
+    <a:masterClrMapping/>
+  </p:clrMapOvr>
 </p:sld>
 </file>
 

</xml_diff>

<commit_message>
Updated the results section
</commit_message>
<xml_diff>
--- a/Eager/elk-experiment/Huawei_Presentation_1.pptx
+++ b/Eager/elk-experiment/Huawei_Presentation_1.pptx
@@ -5,7 +5,7 @@
     <p:sldMasterId id="2147483648" r:id="rId1"/>
   </p:sldMasterIdLst>
   <p:notesMasterIdLst>
-    <p:notesMasterId r:id="rId19"/>
+    <p:notesMasterId r:id="rId20"/>
   </p:notesMasterIdLst>
   <p:sldIdLst>
     <p:sldId id="256" r:id="rId2"/>
@@ -25,6 +25,7 @@
     <p:sldId id="267" r:id="rId16"/>
     <p:sldId id="268" r:id="rId17"/>
     <p:sldId id="274" r:id="rId18"/>
+    <p:sldId id="275" r:id="rId19"/>
   </p:sldIdLst>
   <p:sldSz cx="9144000" cy="6858000" type="screen4x3"/>
   <p:notesSz cx="6858000" cy="9144000"/>
@@ -3081,8 +3082,8 @@
     <dgm:cxn modelId="{1018F0F1-6E7B-DC40-BE52-700C5AD8B728}" srcId="{B95D4F37-1D8A-8749-8B39-2CB7397FA252}" destId="{B859EB50-B895-2549-9384-E2BCDE3C968C}" srcOrd="2" destOrd="0" parTransId="{A1FC67BA-DBDE-8C4A-8361-C52EDE89BBAE}" sibTransId="{1B17C232-6568-9545-944B-5551ABA3B464}"/>
     <dgm:cxn modelId="{9C504291-6760-1B4A-A609-11D462DDB442}" srcId="{B859EB50-B895-2549-9384-E2BCDE3C968C}" destId="{5C0014C3-2263-504E-9FCE-9FA2E3674F4F}" srcOrd="0" destOrd="0" parTransId="{9C105334-FA49-694D-820C-36D5CA8EC00A}" sibTransId="{4C0134B1-5A1B-814F-B67D-369FAE3186CF}"/>
     <dgm:cxn modelId="{43625586-24BE-4B41-9DA0-3F2088EE3174}" type="presOf" srcId="{31FF09B4-248A-D248-869E-D7534E0E666E}" destId="{377D39BC-B80D-9944-8D55-3791B3605780}" srcOrd="0" destOrd="1" presId="urn:microsoft.com/office/officeart/2005/8/layout/vList5"/>
+    <dgm:cxn modelId="{BBCA9D30-DA20-8A45-A95F-E5C052F81296}" type="presOf" srcId="{A27A3876-3C67-354A-A9E6-1281E94DE7B3}" destId="{2F51A5BA-F3CA-2D43-B035-27A42F7B00E1}" srcOrd="0" destOrd="0" presId="urn:microsoft.com/office/officeart/2005/8/layout/vList5"/>
     <dgm:cxn modelId="{98AF7EC9-B0A4-A447-90FB-2C679610506D}" srcId="{B859EB50-B895-2549-9384-E2BCDE3C968C}" destId="{093DE271-6615-3C46-90F6-655CE029D9D0}" srcOrd="1" destOrd="0" parTransId="{49A9E02E-934A-E246-AF9E-B4D9D0D62D6D}" sibTransId="{AFE06E13-E600-6B42-84D2-E0CB85125385}"/>
-    <dgm:cxn modelId="{BBCA9D30-DA20-8A45-A95F-E5C052F81296}" type="presOf" srcId="{A27A3876-3C67-354A-A9E6-1281E94DE7B3}" destId="{2F51A5BA-F3CA-2D43-B035-27A42F7B00E1}" srcOrd="0" destOrd="0" presId="urn:microsoft.com/office/officeart/2005/8/layout/vList5"/>
     <dgm:cxn modelId="{9CF250DA-D343-2743-918A-2B643828FF04}" type="presOf" srcId="{1988179C-0019-8D4F-BA6D-31EFF596AF01}" destId="{377D39BC-B80D-9944-8D55-3791B3605780}" srcOrd="0" destOrd="0" presId="urn:microsoft.com/office/officeart/2005/8/layout/vList5"/>
     <dgm:cxn modelId="{F223971D-1215-2149-BFE9-EB0926F72A85}" type="presOf" srcId="{8D3E64A9-4621-224F-BDB9-F2731A1CC811}" destId="{ED256A8E-3577-F04B-A6F5-C5D127EEDFF7}" srcOrd="0" destOrd="2" presId="urn:microsoft.com/office/officeart/2005/8/layout/vList5"/>
     <dgm:cxn modelId="{C7DCB44E-67A4-7044-A779-973DE1D694CE}" type="presOf" srcId="{B859EB50-B895-2549-9384-E2BCDE3C968C}" destId="{1F309CAE-C2CA-6D46-8C05-0080B6A637BD}" srcOrd="0" destOrd="0" presId="urn:microsoft.com/office/officeart/2005/8/layout/vList5"/>
@@ -3834,8 +3835,8 @@
     <dgm:cxn modelId="{5CB98E25-DC4B-014C-9FA3-471EB8E0DF52}" type="presOf" srcId="{BE5CD4A6-B5D8-C34A-A9A9-70A30BD82EEE}" destId="{ED256A8E-3577-F04B-A6F5-C5D127EEDFF7}" srcOrd="0" destOrd="1" presId="urn:microsoft.com/office/officeart/2005/8/layout/vList5"/>
     <dgm:cxn modelId="{1A726084-BD4E-3544-BD4A-6EADA04118C2}" srcId="{D2A98552-7206-B54B-8916-313B2DDD4B1F}" destId="{BE5CD4A6-B5D8-C34A-A9A9-70A30BD82EEE}" srcOrd="1" destOrd="0" parTransId="{2EA5CC8F-0046-2A4D-B97D-C200CD764370}" sibTransId="{3B086D1B-5300-5C45-B552-EC2D10A8E026}"/>
     <dgm:cxn modelId="{F570798A-DE72-E742-9847-236B2B8F43A4}" srcId="{B95D4F37-1D8A-8749-8B39-2CB7397FA252}" destId="{B2DC663A-2019-3047-9DCF-0B248892D2E8}" srcOrd="3" destOrd="0" parTransId="{ED829C2B-8C9A-7443-9ABA-DE776BCD6E8C}" sibTransId="{A8C43371-DCA0-9A42-BCD8-990D6C443216}"/>
+    <dgm:cxn modelId="{0C34C52A-84E6-7E48-9E83-872254C4563D}" type="presOf" srcId="{97B9A300-C9B3-AB4E-A721-12CAD3F01375}" destId="{4B6D0C25-8FB9-184A-858D-D81E0BA90C4D}" srcOrd="0" destOrd="1" presId="urn:microsoft.com/office/officeart/2005/8/layout/vList5"/>
     <dgm:cxn modelId="{7F72C51A-CB11-0548-9128-913EB59487F0}" type="presOf" srcId="{31FF09B4-248A-D248-869E-D7534E0E666E}" destId="{377D39BC-B80D-9944-8D55-3791B3605780}" srcOrd="0" destOrd="1" presId="urn:microsoft.com/office/officeart/2005/8/layout/vList5"/>
-    <dgm:cxn modelId="{0C34C52A-84E6-7E48-9E83-872254C4563D}" type="presOf" srcId="{97B9A300-C9B3-AB4E-A721-12CAD3F01375}" destId="{4B6D0C25-8FB9-184A-858D-D81E0BA90C4D}" srcOrd="0" destOrd="1" presId="urn:microsoft.com/office/officeart/2005/8/layout/vList5"/>
     <dgm:cxn modelId="{14DE4371-9B66-4D4F-9DFC-BDB9428C36B0}" srcId="{B2DC663A-2019-3047-9DCF-0B248892D2E8}" destId="{1988179C-0019-8D4F-BA6D-31EFF596AF01}" srcOrd="0" destOrd="0" parTransId="{B481B68A-1F19-314A-81D4-70BFB3A04400}" sibTransId="{1F0FF57F-7A88-7C4A-8E74-03E544111B09}"/>
     <dgm:cxn modelId="{F6947121-F0B4-234F-A52D-B33006F1A607}" srcId="{A27A3876-3C67-354A-A9E6-1281E94DE7B3}" destId="{908F87EC-A238-4E4F-9FE2-FFCE714A35A1}" srcOrd="0" destOrd="0" parTransId="{696795E0-9803-4C40-B438-6FE89DA1CBAC}" sibTransId="{966D4E03-F813-364F-87D4-26EFE4E6C3C6}"/>
     <dgm:cxn modelId="{BDE2A438-3829-464A-9235-03F0E493651F}" srcId="{A27A3876-3C67-354A-A9E6-1281E94DE7B3}" destId="{97B9A300-C9B3-AB4E-A721-12CAD3F01375}" srcOrd="1" destOrd="0" parTransId="{D2848B50-03A0-C144-923D-660BCA5F1AD4}" sibTransId="{D68089A8-A972-7F47-8119-56C683DD45EE}"/>
@@ -16360,11 +16361,7 @@
             <a:pPr algn="ctr"/>
             <a:r>
               <a:rPr lang="en-US" sz="1200" dirty="0" smtClean="0"/>
-              <a:t>Access </a:t>
-            </a:r>
-            <a:r>
-              <a:rPr lang="en-US" sz="1200" dirty="0" smtClean="0"/>
-              <a:t>logs</a:t>
+              <a:t>Access logs</a:t>
             </a:r>
             <a:endParaRPr lang="en-US" sz="1200" dirty="0"/>
           </a:p>
@@ -18975,6 +18972,856 @@
 </p:sld>
 </file>
 
+<file path=ppt/slides/slide18.xml><?xml version="1.0" encoding="utf-8"?>
+<p:sld xmlns:a="http://schemas.openxmlformats.org/drawingml/2006/main" xmlns:r="http://schemas.openxmlformats.org/officeDocument/2006/relationships" xmlns:p="http://schemas.openxmlformats.org/presentationml/2006/main">
+  <p:cSld>
+    <p:spTree>
+      <p:nvGrpSpPr>
+        <p:cNvPr id="1" name=""/>
+        <p:cNvGrpSpPr/>
+        <p:nvPr/>
+      </p:nvGrpSpPr>
+      <p:grpSpPr>
+        <a:xfrm>
+          <a:off x="0" y="0"/>
+          <a:ext cx="0" cy="0"/>
+          <a:chOff x="0" y="0"/>
+          <a:chExt cx="0" cy="0"/>
+        </a:xfrm>
+      </p:grpSpPr>
+      <p:grpSp>
+        <p:nvGrpSpPr>
+          <p:cNvPr id="31" name="Group 30"/>
+          <p:cNvGrpSpPr/>
+          <p:nvPr/>
+        </p:nvGrpSpPr>
+        <p:grpSpPr>
+          <a:xfrm>
+            <a:off x="971210" y="1431993"/>
+            <a:ext cx="7433488" cy="4254394"/>
+            <a:chOff x="971210" y="1431993"/>
+            <a:chExt cx="7433488" cy="4254394"/>
+          </a:xfrm>
+        </p:grpSpPr>
+        <p:sp>
+          <p:nvSpPr>
+            <p:cNvPr id="4" name="Rectangle 3"/>
+            <p:cNvSpPr/>
+            <p:nvPr/>
+          </p:nvSpPr>
+          <p:spPr>
+            <a:xfrm>
+              <a:off x="971210" y="1431993"/>
+              <a:ext cx="7433488" cy="4233718"/>
+            </a:xfrm>
+            <a:prstGeom prst="rect">
+              <a:avLst/>
+            </a:prstGeom>
+            <a:noFill/>
+            <a:ln w="28575" cmpd="sng">
+              <a:solidFill>
+                <a:schemeClr val="tx2">
+                  <a:lumMod val="75000"/>
+                </a:schemeClr>
+              </a:solidFill>
+            </a:ln>
+          </p:spPr>
+          <p:style>
+            <a:lnRef idx="1">
+              <a:schemeClr val="accent1"/>
+            </a:lnRef>
+            <a:fillRef idx="3">
+              <a:schemeClr val="accent1"/>
+            </a:fillRef>
+            <a:effectRef idx="2">
+              <a:schemeClr val="accent1"/>
+            </a:effectRef>
+            <a:fontRef idx="minor">
+              <a:schemeClr val="lt1"/>
+            </a:fontRef>
+          </p:style>
+          <p:txBody>
+            <a:bodyPr rtlCol="0" anchor="ctr"/>
+            <a:lstStyle/>
+            <a:p>
+              <a:pPr algn="ctr"/>
+              <a:endParaRPr lang="en-US"/>
+            </a:p>
+          </p:txBody>
+        </p:sp>
+        <p:sp>
+          <p:nvSpPr>
+            <p:cNvPr id="6" name="Rectangle 5"/>
+            <p:cNvSpPr/>
+            <p:nvPr/>
+          </p:nvSpPr>
+          <p:spPr>
+            <a:xfrm>
+              <a:off x="1232689" y="1730843"/>
+              <a:ext cx="1556426" cy="560345"/>
+            </a:xfrm>
+            <a:prstGeom prst="rect">
+              <a:avLst/>
+            </a:prstGeom>
+            <a:solidFill>
+              <a:schemeClr val="tx2">
+                <a:lumMod val="75000"/>
+              </a:schemeClr>
+            </a:solidFill>
+            <a:ln>
+              <a:noFill/>
+            </a:ln>
+          </p:spPr>
+          <p:style>
+            <a:lnRef idx="1">
+              <a:schemeClr val="accent1"/>
+            </a:lnRef>
+            <a:fillRef idx="3">
+              <a:schemeClr val="accent1"/>
+            </a:fillRef>
+            <a:effectRef idx="2">
+              <a:schemeClr val="accent1"/>
+            </a:effectRef>
+            <a:fontRef idx="minor">
+              <a:schemeClr val="lt1"/>
+            </a:fontRef>
+          </p:style>
+          <p:txBody>
+            <a:bodyPr rtlCol="0" anchor="ctr"/>
+            <a:lstStyle/>
+            <a:p>
+              <a:pPr algn="ctr"/>
+              <a:r>
+                <a:rPr lang="en-US" dirty="0" smtClean="0"/>
+                <a:t>Front-end Servers</a:t>
+              </a:r>
+              <a:endParaRPr lang="en-US" dirty="0"/>
+            </a:p>
+          </p:txBody>
+        </p:sp>
+        <p:sp>
+          <p:nvSpPr>
+            <p:cNvPr id="8" name="Rectangle 7"/>
+            <p:cNvSpPr/>
+            <p:nvPr/>
+          </p:nvSpPr>
+          <p:spPr>
+            <a:xfrm>
+              <a:off x="1232689" y="2590040"/>
+              <a:ext cx="1556426" cy="1083334"/>
+            </a:xfrm>
+            <a:prstGeom prst="rect">
+              <a:avLst/>
+            </a:prstGeom>
+            <a:solidFill>
+              <a:srgbClr val="17375E"/>
+            </a:solidFill>
+            <a:ln>
+              <a:noFill/>
+            </a:ln>
+          </p:spPr>
+          <p:style>
+            <a:lnRef idx="1">
+              <a:schemeClr val="accent1"/>
+            </a:lnRef>
+            <a:fillRef idx="3">
+              <a:schemeClr val="accent1"/>
+            </a:fillRef>
+            <a:effectRef idx="2">
+              <a:schemeClr val="accent1"/>
+            </a:effectRef>
+            <a:fontRef idx="minor">
+              <a:schemeClr val="lt1"/>
+            </a:fontRef>
+          </p:style>
+          <p:txBody>
+            <a:bodyPr rtlCol="0" anchor="ctr"/>
+            <a:lstStyle/>
+            <a:p>
+              <a:pPr algn="ctr"/>
+              <a:r>
+                <a:rPr lang="en-US" dirty="0" smtClean="0"/>
+                <a:t>Application Servers</a:t>
+              </a:r>
+              <a:endParaRPr lang="en-US" dirty="0"/>
+            </a:p>
+          </p:txBody>
+        </p:sp>
+        <p:sp>
+          <p:nvSpPr>
+            <p:cNvPr id="9" name="Rectangle 8"/>
+            <p:cNvSpPr/>
+            <p:nvPr/>
+          </p:nvSpPr>
+          <p:spPr>
+            <a:xfrm>
+              <a:off x="1232689" y="3997130"/>
+              <a:ext cx="1556426" cy="1232759"/>
+            </a:xfrm>
+            <a:prstGeom prst="rect">
+              <a:avLst/>
+            </a:prstGeom>
+            <a:solidFill>
+              <a:srgbClr val="17375E"/>
+            </a:solidFill>
+            <a:ln>
+              <a:noFill/>
+            </a:ln>
+          </p:spPr>
+          <p:style>
+            <a:lnRef idx="1">
+              <a:schemeClr val="accent1"/>
+            </a:lnRef>
+            <a:fillRef idx="3">
+              <a:schemeClr val="accent1"/>
+            </a:fillRef>
+            <a:effectRef idx="2">
+              <a:schemeClr val="accent1"/>
+            </a:effectRef>
+            <a:fontRef idx="minor">
+              <a:schemeClr val="lt1"/>
+            </a:fontRef>
+          </p:style>
+          <p:txBody>
+            <a:bodyPr rtlCol="0" anchor="ctr"/>
+            <a:lstStyle/>
+            <a:p>
+              <a:pPr algn="ctr"/>
+              <a:r>
+                <a:rPr lang="en-US" dirty="0" err="1" smtClean="0"/>
+                <a:t>PaaS</a:t>
+              </a:r>
+              <a:r>
+                <a:rPr lang="en-US" dirty="0" smtClean="0"/>
+                <a:t> Kernel Services</a:t>
+              </a:r>
+              <a:endParaRPr lang="en-US" dirty="0"/>
+            </a:p>
+          </p:txBody>
+        </p:sp>
+        <p:sp>
+          <p:nvSpPr>
+            <p:cNvPr id="10" name="Rectangle 9"/>
+            <p:cNvSpPr/>
+            <p:nvPr/>
+          </p:nvSpPr>
+          <p:spPr>
+            <a:xfrm>
+              <a:off x="5428812" y="1730843"/>
+              <a:ext cx="2739309" cy="2340997"/>
+            </a:xfrm>
+            <a:prstGeom prst="rect">
+              <a:avLst/>
+            </a:prstGeom>
+            <a:solidFill>
+              <a:schemeClr val="bg1">
+                <a:lumMod val="50000"/>
+              </a:schemeClr>
+            </a:solidFill>
+            <a:ln>
+              <a:noFill/>
+            </a:ln>
+          </p:spPr>
+          <p:style>
+            <a:lnRef idx="1">
+              <a:schemeClr val="accent1"/>
+            </a:lnRef>
+            <a:fillRef idx="3">
+              <a:schemeClr val="accent1"/>
+            </a:fillRef>
+            <a:effectRef idx="2">
+              <a:schemeClr val="accent1"/>
+            </a:effectRef>
+            <a:fontRef idx="minor">
+              <a:schemeClr val="lt1"/>
+            </a:fontRef>
+          </p:style>
+          <p:txBody>
+            <a:bodyPr rtlCol="0" anchor="ctr"/>
+            <a:lstStyle/>
+            <a:p>
+              <a:pPr algn="ctr"/>
+              <a:r>
+                <a:rPr lang="en-US" dirty="0" err="1" smtClean="0"/>
+                <a:t>ElasticSearch</a:t>
+              </a:r>
+              <a:r>
+                <a:rPr lang="en-US" dirty="0" smtClean="0"/>
+                <a:t> Cluster</a:t>
+              </a:r>
+              <a:endParaRPr lang="en-US" dirty="0"/>
+            </a:p>
+          </p:txBody>
+        </p:sp>
+        <p:sp>
+          <p:nvSpPr>
+            <p:cNvPr id="11" name="Rectangle 10"/>
+            <p:cNvSpPr/>
+            <p:nvPr/>
+          </p:nvSpPr>
+          <p:spPr>
+            <a:xfrm>
+              <a:off x="3461490" y="1730843"/>
+              <a:ext cx="1344752" cy="560345"/>
+            </a:xfrm>
+            <a:prstGeom prst="rect">
+              <a:avLst/>
+            </a:prstGeom>
+            <a:solidFill>
+              <a:schemeClr val="bg1">
+                <a:lumMod val="50000"/>
+              </a:schemeClr>
+            </a:solidFill>
+            <a:ln>
+              <a:noFill/>
+            </a:ln>
+          </p:spPr>
+          <p:style>
+            <a:lnRef idx="1">
+              <a:schemeClr val="accent1"/>
+            </a:lnRef>
+            <a:fillRef idx="3">
+              <a:schemeClr val="accent1"/>
+            </a:fillRef>
+            <a:effectRef idx="2">
+              <a:schemeClr val="accent1"/>
+            </a:effectRef>
+            <a:fontRef idx="minor">
+              <a:schemeClr val="lt1"/>
+            </a:fontRef>
+          </p:style>
+          <p:txBody>
+            <a:bodyPr rtlCol="0" anchor="ctr"/>
+            <a:lstStyle/>
+            <a:p>
+              <a:pPr algn="ctr"/>
+              <a:r>
+                <a:rPr lang="en-US" dirty="0" err="1" smtClean="0"/>
+                <a:t>Logstash</a:t>
+              </a:r>
+              <a:endParaRPr lang="en-US" dirty="0"/>
+            </a:p>
+          </p:txBody>
+        </p:sp>
+        <p:cxnSp>
+          <p:nvCxnSpPr>
+            <p:cNvPr id="13" name="Straight Arrow Connector 12"/>
+            <p:cNvCxnSpPr>
+              <a:stCxn id="6" idx="3"/>
+              <a:endCxn id="11" idx="1"/>
+            </p:cNvCxnSpPr>
+            <p:nvPr/>
+          </p:nvCxnSpPr>
+          <p:spPr>
+            <a:xfrm>
+              <a:off x="2789115" y="2011016"/>
+              <a:ext cx="672375" cy="0"/>
+            </a:xfrm>
+            <a:prstGeom prst="straightConnector1">
+              <a:avLst/>
+            </a:prstGeom>
+            <a:ln>
+              <a:solidFill>
+                <a:schemeClr val="tx1"/>
+              </a:solidFill>
+              <a:tailEnd type="arrow"/>
+            </a:ln>
+          </p:spPr>
+          <p:style>
+            <a:lnRef idx="2">
+              <a:schemeClr val="accent1"/>
+            </a:lnRef>
+            <a:fillRef idx="0">
+              <a:schemeClr val="accent1"/>
+            </a:fillRef>
+            <a:effectRef idx="1">
+              <a:schemeClr val="accent1"/>
+            </a:effectRef>
+            <a:fontRef idx="minor">
+              <a:schemeClr val="tx1"/>
+            </a:fontRef>
+          </p:style>
+        </p:cxnSp>
+        <p:cxnSp>
+          <p:nvCxnSpPr>
+            <p:cNvPr id="15" name="Straight Arrow Connector 14"/>
+            <p:cNvCxnSpPr>
+              <a:stCxn id="11" idx="3"/>
+            </p:cNvCxnSpPr>
+            <p:nvPr/>
+          </p:nvCxnSpPr>
+          <p:spPr>
+            <a:xfrm>
+              <a:off x="4806242" y="2011016"/>
+              <a:ext cx="622570" cy="0"/>
+            </a:xfrm>
+            <a:prstGeom prst="straightConnector1">
+              <a:avLst/>
+            </a:prstGeom>
+            <a:ln>
+              <a:solidFill>
+                <a:schemeClr val="tx1"/>
+              </a:solidFill>
+              <a:tailEnd type="arrow"/>
+            </a:ln>
+          </p:spPr>
+          <p:style>
+            <a:lnRef idx="2">
+              <a:schemeClr val="accent1"/>
+            </a:lnRef>
+            <a:fillRef idx="0">
+              <a:schemeClr val="accent1"/>
+            </a:fillRef>
+            <a:effectRef idx="1">
+              <a:schemeClr val="accent1"/>
+            </a:effectRef>
+            <a:fontRef idx="minor">
+              <a:schemeClr val="tx1"/>
+            </a:fontRef>
+          </p:style>
+        </p:cxnSp>
+        <p:cxnSp>
+          <p:nvCxnSpPr>
+            <p:cNvPr id="17" name="Straight Arrow Connector 16"/>
+            <p:cNvCxnSpPr>
+              <a:stCxn id="8" idx="3"/>
+            </p:cNvCxnSpPr>
+            <p:nvPr/>
+          </p:nvCxnSpPr>
+          <p:spPr>
+            <a:xfrm flipV="1">
+              <a:off x="2789115" y="3125481"/>
+              <a:ext cx="2639697" cy="6226"/>
+            </a:xfrm>
+            <a:prstGeom prst="straightConnector1">
+              <a:avLst/>
+            </a:prstGeom>
+            <a:ln>
+              <a:solidFill>
+                <a:schemeClr val="tx1"/>
+              </a:solidFill>
+              <a:tailEnd type="arrow"/>
+            </a:ln>
+          </p:spPr>
+          <p:style>
+            <a:lnRef idx="2">
+              <a:schemeClr val="accent1"/>
+            </a:lnRef>
+            <a:fillRef idx="0">
+              <a:schemeClr val="accent1"/>
+            </a:fillRef>
+            <a:effectRef idx="1">
+              <a:schemeClr val="accent1"/>
+            </a:effectRef>
+            <a:fontRef idx="minor">
+              <a:schemeClr val="tx1"/>
+            </a:fontRef>
+          </p:style>
+        </p:cxnSp>
+        <p:cxnSp>
+          <p:nvCxnSpPr>
+            <p:cNvPr id="19" name="Elbow Connector 18"/>
+            <p:cNvCxnSpPr>
+              <a:stCxn id="9" idx="3"/>
+            </p:cNvCxnSpPr>
+            <p:nvPr/>
+          </p:nvCxnSpPr>
+          <p:spPr>
+            <a:xfrm flipV="1">
+              <a:off x="2789115" y="3561306"/>
+              <a:ext cx="2639697" cy="1052204"/>
+            </a:xfrm>
+            <a:prstGeom prst="bentConnector3">
+              <a:avLst/>
+            </a:prstGeom>
+            <a:ln>
+              <a:solidFill>
+                <a:schemeClr val="tx1"/>
+              </a:solidFill>
+              <a:tailEnd type="arrow"/>
+            </a:ln>
+          </p:spPr>
+          <p:style>
+            <a:lnRef idx="2">
+              <a:schemeClr val="accent1"/>
+            </a:lnRef>
+            <a:fillRef idx="0">
+              <a:schemeClr val="accent1"/>
+            </a:fillRef>
+            <a:effectRef idx="1">
+              <a:schemeClr val="accent1"/>
+            </a:effectRef>
+            <a:fontRef idx="minor">
+              <a:schemeClr val="tx1"/>
+            </a:fontRef>
+          </p:style>
+        </p:cxnSp>
+        <p:sp>
+          <p:nvSpPr>
+            <p:cNvPr id="20" name="Rectangle 19"/>
+            <p:cNvSpPr/>
+            <p:nvPr/>
+          </p:nvSpPr>
+          <p:spPr>
+            <a:xfrm>
+              <a:off x="5428812" y="4445404"/>
+              <a:ext cx="1232689" cy="1008621"/>
+            </a:xfrm>
+            <a:prstGeom prst="rect">
+              <a:avLst/>
+            </a:prstGeom>
+            <a:solidFill>
+              <a:schemeClr val="bg1">
+                <a:lumMod val="50000"/>
+              </a:schemeClr>
+            </a:solidFill>
+            <a:ln>
+              <a:noFill/>
+            </a:ln>
+          </p:spPr>
+          <p:style>
+            <a:lnRef idx="1">
+              <a:schemeClr val="accent1"/>
+            </a:lnRef>
+            <a:fillRef idx="3">
+              <a:schemeClr val="accent1"/>
+            </a:fillRef>
+            <a:effectRef idx="2">
+              <a:schemeClr val="accent1"/>
+            </a:effectRef>
+            <a:fontRef idx="minor">
+              <a:schemeClr val="lt1"/>
+            </a:fontRef>
+          </p:style>
+          <p:txBody>
+            <a:bodyPr rtlCol="0" anchor="ctr"/>
+            <a:lstStyle/>
+            <a:p>
+              <a:pPr algn="ctr"/>
+              <a:r>
+                <a:rPr lang="en-US" dirty="0" smtClean="0"/>
+                <a:t>Pod 1</a:t>
+              </a:r>
+              <a:endParaRPr lang="en-US" dirty="0"/>
+            </a:p>
+          </p:txBody>
+        </p:sp>
+        <p:sp>
+          <p:nvSpPr>
+            <p:cNvPr id="22" name="Rectangle 21"/>
+            <p:cNvSpPr/>
+            <p:nvPr/>
+          </p:nvSpPr>
+          <p:spPr>
+            <a:xfrm>
+              <a:off x="6935432" y="4445404"/>
+              <a:ext cx="1232689" cy="1008621"/>
+            </a:xfrm>
+            <a:prstGeom prst="rect">
+              <a:avLst/>
+            </a:prstGeom>
+            <a:solidFill>
+              <a:schemeClr val="bg1">
+                <a:lumMod val="50000"/>
+              </a:schemeClr>
+            </a:solidFill>
+            <a:ln>
+              <a:noFill/>
+            </a:ln>
+          </p:spPr>
+          <p:style>
+            <a:lnRef idx="1">
+              <a:schemeClr val="accent1"/>
+            </a:lnRef>
+            <a:fillRef idx="3">
+              <a:schemeClr val="accent1"/>
+            </a:fillRef>
+            <a:effectRef idx="2">
+              <a:schemeClr val="accent1"/>
+            </a:effectRef>
+            <a:fontRef idx="minor">
+              <a:schemeClr val="lt1"/>
+            </a:fontRef>
+          </p:style>
+          <p:txBody>
+            <a:bodyPr rtlCol="0" anchor="ctr"/>
+            <a:lstStyle/>
+            <a:p>
+              <a:pPr algn="ctr"/>
+              <a:r>
+                <a:rPr lang="en-US" dirty="0" smtClean="0"/>
+                <a:t>Pod 2</a:t>
+              </a:r>
+              <a:endParaRPr lang="en-US" dirty="0"/>
+            </a:p>
+          </p:txBody>
+        </p:sp>
+        <p:cxnSp>
+          <p:nvCxnSpPr>
+            <p:cNvPr id="24" name="Straight Arrow Connector 23"/>
+            <p:cNvCxnSpPr>
+              <a:stCxn id="20" idx="0"/>
+            </p:cNvCxnSpPr>
+            <p:nvPr/>
+          </p:nvCxnSpPr>
+          <p:spPr>
+            <a:xfrm flipH="1" flipV="1">
+              <a:off x="6038931" y="4071840"/>
+              <a:ext cx="6226" cy="373564"/>
+            </a:xfrm>
+            <a:prstGeom prst="straightConnector1">
+              <a:avLst/>
+            </a:prstGeom>
+            <a:ln>
+              <a:solidFill>
+                <a:schemeClr val="tx1"/>
+              </a:solidFill>
+              <a:headEnd type="arrow"/>
+              <a:tailEnd type="arrow"/>
+            </a:ln>
+          </p:spPr>
+          <p:style>
+            <a:lnRef idx="2">
+              <a:schemeClr val="accent1"/>
+            </a:lnRef>
+            <a:fillRef idx="0">
+              <a:schemeClr val="accent1"/>
+            </a:fillRef>
+            <a:effectRef idx="1">
+              <a:schemeClr val="accent1"/>
+            </a:effectRef>
+            <a:fontRef idx="minor">
+              <a:schemeClr val="tx1"/>
+            </a:fontRef>
+          </p:style>
+        </p:cxnSp>
+        <p:cxnSp>
+          <p:nvCxnSpPr>
+            <p:cNvPr id="26" name="Straight Arrow Connector 25"/>
+            <p:cNvCxnSpPr>
+              <a:stCxn id="22" idx="0"/>
+            </p:cNvCxnSpPr>
+            <p:nvPr/>
+          </p:nvCxnSpPr>
+          <p:spPr>
+            <a:xfrm flipV="1">
+              <a:off x="7551777" y="4071840"/>
+              <a:ext cx="6225" cy="373564"/>
+            </a:xfrm>
+            <a:prstGeom prst="straightConnector1">
+              <a:avLst/>
+            </a:prstGeom>
+            <a:ln>
+              <a:solidFill>
+                <a:schemeClr val="tx1"/>
+              </a:solidFill>
+              <a:headEnd type="arrow"/>
+              <a:tailEnd type="arrow"/>
+            </a:ln>
+          </p:spPr>
+          <p:style>
+            <a:lnRef idx="2">
+              <a:schemeClr val="accent1"/>
+            </a:lnRef>
+            <a:fillRef idx="0">
+              <a:schemeClr val="accent1"/>
+            </a:fillRef>
+            <a:effectRef idx="1">
+              <a:schemeClr val="accent1"/>
+            </a:effectRef>
+            <a:fontRef idx="minor">
+              <a:schemeClr val="tx1"/>
+            </a:fontRef>
+          </p:style>
+        </p:cxnSp>
+        <p:sp>
+          <p:nvSpPr>
+            <p:cNvPr id="27" name="Rectangle 26"/>
+            <p:cNvSpPr/>
+            <p:nvPr/>
+          </p:nvSpPr>
+          <p:spPr>
+            <a:xfrm>
+              <a:off x="2789115" y="1842912"/>
+              <a:ext cx="336188" cy="336207"/>
+            </a:xfrm>
+            <a:prstGeom prst="rect">
+              <a:avLst/>
+            </a:prstGeom>
+            <a:solidFill>
+              <a:srgbClr val="7F7F7F"/>
+            </a:solidFill>
+            <a:ln>
+              <a:noFill/>
+            </a:ln>
+          </p:spPr>
+          <p:style>
+            <a:lnRef idx="1">
+              <a:schemeClr val="accent1"/>
+            </a:lnRef>
+            <a:fillRef idx="3">
+              <a:schemeClr val="accent1"/>
+            </a:fillRef>
+            <a:effectRef idx="2">
+              <a:schemeClr val="accent1"/>
+            </a:effectRef>
+            <a:fontRef idx="minor">
+              <a:schemeClr val="lt1"/>
+            </a:fontRef>
+          </p:style>
+          <p:txBody>
+            <a:bodyPr rtlCol="0" anchor="ctr"/>
+            <a:lstStyle/>
+            <a:p>
+              <a:pPr algn="ctr"/>
+              <a:endParaRPr lang="en-US"/>
+            </a:p>
+          </p:txBody>
+        </p:sp>
+        <p:sp>
+          <p:nvSpPr>
+            <p:cNvPr id="28" name="Rectangle 27"/>
+            <p:cNvSpPr/>
+            <p:nvPr/>
+          </p:nvSpPr>
+          <p:spPr>
+            <a:xfrm>
+              <a:off x="2789115" y="2957377"/>
+              <a:ext cx="336188" cy="336207"/>
+            </a:xfrm>
+            <a:prstGeom prst="rect">
+              <a:avLst/>
+            </a:prstGeom>
+            <a:solidFill>
+              <a:srgbClr val="7F7F7F"/>
+            </a:solidFill>
+            <a:ln>
+              <a:noFill/>
+            </a:ln>
+          </p:spPr>
+          <p:style>
+            <a:lnRef idx="1">
+              <a:schemeClr val="accent1"/>
+            </a:lnRef>
+            <a:fillRef idx="3">
+              <a:schemeClr val="accent1"/>
+            </a:fillRef>
+            <a:effectRef idx="2">
+              <a:schemeClr val="accent1"/>
+            </a:effectRef>
+            <a:fontRef idx="minor">
+              <a:schemeClr val="lt1"/>
+            </a:fontRef>
+          </p:style>
+          <p:txBody>
+            <a:bodyPr rtlCol="0" anchor="ctr"/>
+            <a:lstStyle/>
+            <a:p>
+              <a:pPr algn="ctr"/>
+              <a:endParaRPr lang="en-US"/>
+            </a:p>
+          </p:txBody>
+        </p:sp>
+        <p:sp>
+          <p:nvSpPr>
+            <p:cNvPr id="29" name="Rectangle 28"/>
+            <p:cNvSpPr/>
+            <p:nvPr/>
+          </p:nvSpPr>
+          <p:spPr>
+            <a:xfrm>
+              <a:off x="2773421" y="4445406"/>
+              <a:ext cx="336188" cy="336207"/>
+            </a:xfrm>
+            <a:prstGeom prst="rect">
+              <a:avLst/>
+            </a:prstGeom>
+            <a:solidFill>
+              <a:srgbClr val="7F7F7F"/>
+            </a:solidFill>
+            <a:ln>
+              <a:noFill/>
+            </a:ln>
+          </p:spPr>
+          <p:style>
+            <a:lnRef idx="1">
+              <a:schemeClr val="accent1"/>
+            </a:lnRef>
+            <a:fillRef idx="3">
+              <a:schemeClr val="accent1"/>
+            </a:fillRef>
+            <a:effectRef idx="2">
+              <a:schemeClr val="accent1"/>
+            </a:effectRef>
+            <a:fontRef idx="minor">
+              <a:schemeClr val="lt1"/>
+            </a:fontRef>
+          </p:style>
+          <p:txBody>
+            <a:bodyPr rtlCol="0" anchor="ctr"/>
+            <a:lstStyle/>
+            <a:p>
+              <a:pPr algn="ctr"/>
+              <a:endParaRPr lang="en-US"/>
+            </a:p>
+          </p:txBody>
+        </p:sp>
+        <p:sp>
+          <p:nvSpPr>
+            <p:cNvPr id="30" name="TextBox 29"/>
+            <p:cNvSpPr txBox="1"/>
+            <p:nvPr/>
+          </p:nvSpPr>
+          <p:spPr>
+            <a:xfrm>
+              <a:off x="971210" y="5317055"/>
+              <a:ext cx="2975885" cy="369332"/>
+            </a:xfrm>
+            <a:prstGeom prst="rect">
+              <a:avLst/>
+            </a:prstGeom>
+            <a:noFill/>
+          </p:spPr>
+          <p:txBody>
+            <a:bodyPr wrap="square" rtlCol="0">
+              <a:spAutoFit/>
+            </a:bodyPr>
+            <a:lstStyle/>
+            <a:p>
+              <a:r>
+                <a:rPr lang="en-US" b="1" dirty="0" err="1" smtClean="0"/>
+                <a:t>AppScale</a:t>
+              </a:r>
+              <a:r>
+                <a:rPr lang="en-US" b="1" dirty="0" smtClean="0"/>
+                <a:t> </a:t>
+              </a:r>
+              <a:r>
+                <a:rPr lang="en-US" b="1" dirty="0" err="1" smtClean="0"/>
+                <a:t>PaaS</a:t>
+              </a:r>
+              <a:r>
+                <a:rPr lang="en-US" b="1" dirty="0" smtClean="0"/>
+                <a:t> Cloud</a:t>
+              </a:r>
+              <a:endParaRPr lang="en-US" b="1" dirty="0"/>
+            </a:p>
+          </p:txBody>
+        </p:sp>
+      </p:grpSp>
+    </p:spTree>
+    <p:extLst>
+      <p:ext uri="{BB962C8B-B14F-4D97-AF65-F5344CB8AC3E}">
+        <p14:creationId xmlns:p14="http://schemas.microsoft.com/office/powerpoint/2010/main" val="3760029606"/>
+      </p:ext>
+    </p:extLst>
+  </p:cSld>
+  <p:clrMapOvr>
+    <a:masterClrMapping/>
+  </p:clrMapOvr>
+</p:sld>
+</file>
+
 <file path=ppt/slides/slide2.xml><?xml version="1.0" encoding="utf-8"?>
 <p:sld xmlns:a="http://schemas.openxmlformats.org/drawingml/2006/main" xmlns:r="http://schemas.openxmlformats.org/officeDocument/2006/relationships" xmlns:p="http://schemas.openxmlformats.org/presentationml/2006/main">
   <p:cSld>

</xml_diff>